<commit_message>
more consistent diagram style
</commit_message>
<xml_diff>
--- a/images/arch-high-level-alt.pptx
+++ b/images/arch-high-level-alt.pptx
@@ -4,13 +4,18 @@
   <p:sldMasterIdLst>
     <p:sldMasterId id="2147483648" r:id="rId1"/>
   </p:sldMasterIdLst>
+  <p:notesMasterIdLst>
+    <p:notesMasterId r:id="rId10"/>
+  </p:notesMasterIdLst>
   <p:sldIdLst>
     <p:sldId id="256" r:id="rId2"/>
     <p:sldId id="258" r:id="rId3"/>
     <p:sldId id="260" r:id="rId4"/>
-    <p:sldId id="257" r:id="rId5"/>
-    <p:sldId id="261" r:id="rId6"/>
-    <p:sldId id="259" r:id="rId7"/>
+    <p:sldId id="263" r:id="rId5"/>
+    <p:sldId id="257" r:id="rId6"/>
+    <p:sldId id="261" r:id="rId7"/>
+    <p:sldId id="259" r:id="rId8"/>
+    <p:sldId id="264" r:id="rId9"/>
   </p:sldIdLst>
   <p:sldSz cx="12192000" cy="6858000"/>
   <p:notesSz cx="6858000" cy="9144000"/>
@@ -120,9 +125,474 @@
 <file path=ppt/revisionInfo.xml><?xml version="1.0" encoding="utf-8"?>
 <p1510:revInfo xmlns:a="http://schemas.openxmlformats.org/drawingml/2006/main" xmlns:r="http://schemas.openxmlformats.org/officeDocument/2006/relationships" xmlns:p1510="http://schemas.microsoft.com/office/powerpoint/2015/10/main">
   <p1510:revLst>
-    <p1510:client id="{5893FC80-EFCA-44BE-BFD0-91E4F218C6AE}" v="7" dt="2019-02-24T03:53:08.908"/>
+    <p1510:client id="{5893FC80-EFCA-44BE-BFD0-91E4F218C6AE}" v="32" dt="2019-03-12T09:12:57.391"/>
   </p1510:revLst>
 </p1510:revInfo>
+</file>
+
+<file path=ppt/notesMasters/notesMaster1.xml><?xml version="1.0" encoding="utf-8"?>
+<p:notesMaster xmlns:a="http://schemas.openxmlformats.org/drawingml/2006/main" xmlns:r="http://schemas.openxmlformats.org/officeDocument/2006/relationships" xmlns:p="http://schemas.openxmlformats.org/presentationml/2006/main">
+  <p:cSld>
+    <p:bg>
+      <p:bgRef idx="1001">
+        <a:schemeClr val="bg1"/>
+      </p:bgRef>
+    </p:bg>
+    <p:spTree>
+      <p:nvGrpSpPr>
+        <p:cNvPr id="1" name=""/>
+        <p:cNvGrpSpPr/>
+        <p:nvPr/>
+      </p:nvGrpSpPr>
+      <p:grpSpPr>
+        <a:xfrm>
+          <a:off x="0" y="0"/>
+          <a:ext cx="0" cy="0"/>
+          <a:chOff x="0" y="0"/>
+          <a:chExt cx="0" cy="0"/>
+        </a:xfrm>
+      </p:grpSpPr>
+      <p:sp>
+        <p:nvSpPr>
+          <p:cNvPr id="2" name="ヘッダー プレースホルダー 1"/>
+          <p:cNvSpPr>
+            <a:spLocks noGrp="1"/>
+          </p:cNvSpPr>
+          <p:nvPr>
+            <p:ph type="hdr" sz="quarter"/>
+          </p:nvPr>
+        </p:nvSpPr>
+        <p:spPr>
+          <a:xfrm>
+            <a:off x="0" y="0"/>
+            <a:ext cx="2971800" cy="458788"/>
+          </a:xfrm>
+          <a:prstGeom prst="rect">
+            <a:avLst/>
+          </a:prstGeom>
+        </p:spPr>
+        <p:txBody>
+          <a:bodyPr vert="horz" lIns="91440" tIns="45720" rIns="91440" bIns="45720" rtlCol="0"/>
+          <a:lstStyle>
+            <a:lvl1pPr algn="l">
+              <a:defRPr sz="1200"/>
+            </a:lvl1pPr>
+          </a:lstStyle>
+          <a:p>
+            <a:endParaRPr kumimoji="1" lang="ja-JP" altLang="en-US"/>
+          </a:p>
+        </p:txBody>
+      </p:sp>
+      <p:sp>
+        <p:nvSpPr>
+          <p:cNvPr id="3" name="日付プレースホルダー 2"/>
+          <p:cNvSpPr>
+            <a:spLocks noGrp="1"/>
+          </p:cNvSpPr>
+          <p:nvPr>
+            <p:ph type="dt" idx="1"/>
+          </p:nvPr>
+        </p:nvSpPr>
+        <p:spPr>
+          <a:xfrm>
+            <a:off x="3884613" y="0"/>
+            <a:ext cx="2971800" cy="458788"/>
+          </a:xfrm>
+          <a:prstGeom prst="rect">
+            <a:avLst/>
+          </a:prstGeom>
+        </p:spPr>
+        <p:txBody>
+          <a:bodyPr vert="horz" lIns="91440" tIns="45720" rIns="91440" bIns="45720" rtlCol="0"/>
+          <a:lstStyle>
+            <a:lvl1pPr algn="r">
+              <a:defRPr sz="1200"/>
+            </a:lvl1pPr>
+          </a:lstStyle>
+          <a:p>
+            <a:fld id="{B1A173A8-DAE6-4CFB-9894-525984AA74FE}" type="datetimeFigureOut">
+              <a:rPr kumimoji="1" lang="ja-JP" altLang="en-US" smtClean="0"/>
+              <a:t>2019/3/12</a:t>
+            </a:fld>
+            <a:endParaRPr kumimoji="1" lang="ja-JP" altLang="en-US"/>
+          </a:p>
+        </p:txBody>
+      </p:sp>
+      <p:sp>
+        <p:nvSpPr>
+          <p:cNvPr id="4" name="スライド イメージ プレースホルダー 3"/>
+          <p:cNvSpPr>
+            <a:spLocks noGrp="1" noRot="1" noChangeAspect="1"/>
+          </p:cNvSpPr>
+          <p:nvPr>
+            <p:ph type="sldImg" idx="2"/>
+          </p:nvPr>
+        </p:nvSpPr>
+        <p:spPr>
+          <a:xfrm>
+            <a:off x="685800" y="1143000"/>
+            <a:ext cx="5486400" cy="3086100"/>
+          </a:xfrm>
+          <a:prstGeom prst="rect">
+            <a:avLst/>
+          </a:prstGeom>
+          <a:noFill/>
+          <a:ln w="12700">
+            <a:solidFill>
+              <a:prstClr val="black"/>
+            </a:solidFill>
+          </a:ln>
+        </p:spPr>
+        <p:txBody>
+          <a:bodyPr vert="horz" lIns="91440" tIns="45720" rIns="91440" bIns="45720" rtlCol="0" anchor="ctr"/>
+          <a:lstStyle/>
+          <a:p>
+            <a:endParaRPr lang="ja-JP" altLang="en-US"/>
+          </a:p>
+        </p:txBody>
+      </p:sp>
+      <p:sp>
+        <p:nvSpPr>
+          <p:cNvPr id="5" name="ノート プレースホルダー 4"/>
+          <p:cNvSpPr>
+            <a:spLocks noGrp="1"/>
+          </p:cNvSpPr>
+          <p:nvPr>
+            <p:ph type="body" sz="quarter" idx="3"/>
+          </p:nvPr>
+        </p:nvSpPr>
+        <p:spPr>
+          <a:xfrm>
+            <a:off x="685800" y="4400550"/>
+            <a:ext cx="5486400" cy="3600450"/>
+          </a:xfrm>
+          <a:prstGeom prst="rect">
+            <a:avLst/>
+          </a:prstGeom>
+        </p:spPr>
+        <p:txBody>
+          <a:bodyPr vert="horz" lIns="91440" tIns="45720" rIns="91440" bIns="45720" rtlCol="0"/>
+          <a:lstStyle/>
+          <a:p>
+            <a:pPr lvl="0"/>
+            <a:r>
+              <a:rPr kumimoji="1" lang="ja-JP" altLang="en-US"/>
+              <a:t>マスター テキストの書式設定</a:t>
+            </a:r>
+          </a:p>
+          <a:p>
+            <a:pPr lvl="1"/>
+            <a:r>
+              <a:rPr kumimoji="1" lang="ja-JP" altLang="en-US"/>
+              <a:t>第 </a:t>
+            </a:r>
+            <a:r>
+              <a:rPr kumimoji="1" lang="en-US" altLang="ja-JP"/>
+              <a:t>2 </a:t>
+            </a:r>
+            <a:r>
+              <a:rPr kumimoji="1" lang="ja-JP" altLang="en-US"/>
+              <a:t>レベル</a:t>
+            </a:r>
+          </a:p>
+          <a:p>
+            <a:pPr lvl="2"/>
+            <a:r>
+              <a:rPr kumimoji="1" lang="ja-JP" altLang="en-US"/>
+              <a:t>第 </a:t>
+            </a:r>
+            <a:r>
+              <a:rPr kumimoji="1" lang="en-US" altLang="ja-JP"/>
+              <a:t>3 </a:t>
+            </a:r>
+            <a:r>
+              <a:rPr kumimoji="1" lang="ja-JP" altLang="en-US"/>
+              <a:t>レベル</a:t>
+            </a:r>
+          </a:p>
+          <a:p>
+            <a:pPr lvl="3"/>
+            <a:r>
+              <a:rPr kumimoji="1" lang="ja-JP" altLang="en-US"/>
+              <a:t>第 </a:t>
+            </a:r>
+            <a:r>
+              <a:rPr kumimoji="1" lang="en-US" altLang="ja-JP"/>
+              <a:t>4 </a:t>
+            </a:r>
+            <a:r>
+              <a:rPr kumimoji="1" lang="ja-JP" altLang="en-US"/>
+              <a:t>レベル</a:t>
+            </a:r>
+          </a:p>
+          <a:p>
+            <a:pPr lvl="4"/>
+            <a:r>
+              <a:rPr kumimoji="1" lang="ja-JP" altLang="en-US"/>
+              <a:t>第 </a:t>
+            </a:r>
+            <a:r>
+              <a:rPr kumimoji="1" lang="en-US" altLang="ja-JP"/>
+              <a:t>5 </a:t>
+            </a:r>
+            <a:r>
+              <a:rPr kumimoji="1" lang="ja-JP" altLang="en-US"/>
+              <a:t>レベル</a:t>
+            </a:r>
+          </a:p>
+        </p:txBody>
+      </p:sp>
+      <p:sp>
+        <p:nvSpPr>
+          <p:cNvPr id="6" name="フッター プレースホルダー 5"/>
+          <p:cNvSpPr>
+            <a:spLocks noGrp="1"/>
+          </p:cNvSpPr>
+          <p:nvPr>
+            <p:ph type="ftr" sz="quarter" idx="4"/>
+          </p:nvPr>
+        </p:nvSpPr>
+        <p:spPr>
+          <a:xfrm>
+            <a:off x="0" y="8685213"/>
+            <a:ext cx="2971800" cy="458787"/>
+          </a:xfrm>
+          <a:prstGeom prst="rect">
+            <a:avLst/>
+          </a:prstGeom>
+        </p:spPr>
+        <p:txBody>
+          <a:bodyPr vert="horz" lIns="91440" tIns="45720" rIns="91440" bIns="45720" rtlCol="0" anchor="b"/>
+          <a:lstStyle>
+            <a:lvl1pPr algn="l">
+              <a:defRPr sz="1200"/>
+            </a:lvl1pPr>
+          </a:lstStyle>
+          <a:p>
+            <a:endParaRPr kumimoji="1" lang="ja-JP" altLang="en-US"/>
+          </a:p>
+        </p:txBody>
+      </p:sp>
+      <p:sp>
+        <p:nvSpPr>
+          <p:cNvPr id="7" name="スライド番号プレースホルダー 6"/>
+          <p:cNvSpPr>
+            <a:spLocks noGrp="1"/>
+          </p:cNvSpPr>
+          <p:nvPr>
+            <p:ph type="sldNum" sz="quarter" idx="5"/>
+          </p:nvPr>
+        </p:nvSpPr>
+        <p:spPr>
+          <a:xfrm>
+            <a:off x="3884613" y="8685213"/>
+            <a:ext cx="2971800" cy="458787"/>
+          </a:xfrm>
+          <a:prstGeom prst="rect">
+            <a:avLst/>
+          </a:prstGeom>
+        </p:spPr>
+        <p:txBody>
+          <a:bodyPr vert="horz" lIns="91440" tIns="45720" rIns="91440" bIns="45720" rtlCol="0" anchor="b"/>
+          <a:lstStyle>
+            <a:lvl1pPr algn="r">
+              <a:defRPr sz="1200"/>
+            </a:lvl1pPr>
+          </a:lstStyle>
+          <a:p>
+            <a:fld id="{672E3FB9-D101-470C-816C-9E6313236755}" type="slidenum">
+              <a:rPr kumimoji="1" lang="ja-JP" altLang="en-US" smtClean="0"/>
+              <a:t>‹#›</a:t>
+            </a:fld>
+            <a:endParaRPr kumimoji="1" lang="ja-JP" altLang="en-US"/>
+          </a:p>
+        </p:txBody>
+      </p:sp>
+    </p:spTree>
+    <p:extLst>
+      <p:ext uri="{BB962C8B-B14F-4D97-AF65-F5344CB8AC3E}">
+        <p14:creationId xmlns:p14="http://schemas.microsoft.com/office/powerpoint/2010/main" val="2786138010"/>
+      </p:ext>
+    </p:extLst>
+  </p:cSld>
+  <p:clrMap bg1="lt1" tx1="dk1" bg2="lt2" tx2="dk2" accent1="accent1" accent2="accent2" accent3="accent3" accent4="accent4" accent5="accent5" accent6="accent6" hlink="hlink" folHlink="folHlink"/>
+  <p:notesStyle>
+    <a:lvl1pPr marL="0" algn="l" defTabSz="914400" rtl="0" eaLnBrk="1" latinLnBrk="0" hangingPunct="1">
+      <a:defRPr kumimoji="1" sz="1200" kern="1200">
+        <a:solidFill>
+          <a:schemeClr val="tx1"/>
+        </a:solidFill>
+        <a:latin typeface="+mn-lt"/>
+        <a:ea typeface="+mn-ea"/>
+        <a:cs typeface="+mn-cs"/>
+      </a:defRPr>
+    </a:lvl1pPr>
+    <a:lvl2pPr marL="457200" algn="l" defTabSz="914400" rtl="0" eaLnBrk="1" latinLnBrk="0" hangingPunct="1">
+      <a:defRPr kumimoji="1" sz="1200" kern="1200">
+        <a:solidFill>
+          <a:schemeClr val="tx1"/>
+        </a:solidFill>
+        <a:latin typeface="+mn-lt"/>
+        <a:ea typeface="+mn-ea"/>
+        <a:cs typeface="+mn-cs"/>
+      </a:defRPr>
+    </a:lvl2pPr>
+    <a:lvl3pPr marL="914400" algn="l" defTabSz="914400" rtl="0" eaLnBrk="1" latinLnBrk="0" hangingPunct="1">
+      <a:defRPr kumimoji="1" sz="1200" kern="1200">
+        <a:solidFill>
+          <a:schemeClr val="tx1"/>
+        </a:solidFill>
+        <a:latin typeface="+mn-lt"/>
+        <a:ea typeface="+mn-ea"/>
+        <a:cs typeface="+mn-cs"/>
+      </a:defRPr>
+    </a:lvl3pPr>
+    <a:lvl4pPr marL="1371600" algn="l" defTabSz="914400" rtl="0" eaLnBrk="1" latinLnBrk="0" hangingPunct="1">
+      <a:defRPr kumimoji="1" sz="1200" kern="1200">
+        <a:solidFill>
+          <a:schemeClr val="tx1"/>
+        </a:solidFill>
+        <a:latin typeface="+mn-lt"/>
+        <a:ea typeface="+mn-ea"/>
+        <a:cs typeface="+mn-cs"/>
+      </a:defRPr>
+    </a:lvl4pPr>
+    <a:lvl5pPr marL="1828800" algn="l" defTabSz="914400" rtl="0" eaLnBrk="1" latinLnBrk="0" hangingPunct="1">
+      <a:defRPr kumimoji="1" sz="1200" kern="1200">
+        <a:solidFill>
+          <a:schemeClr val="tx1"/>
+        </a:solidFill>
+        <a:latin typeface="+mn-lt"/>
+        <a:ea typeface="+mn-ea"/>
+        <a:cs typeface="+mn-cs"/>
+      </a:defRPr>
+    </a:lvl5pPr>
+    <a:lvl6pPr marL="2286000" algn="l" defTabSz="914400" rtl="0" eaLnBrk="1" latinLnBrk="0" hangingPunct="1">
+      <a:defRPr kumimoji="1" sz="1200" kern="1200">
+        <a:solidFill>
+          <a:schemeClr val="tx1"/>
+        </a:solidFill>
+        <a:latin typeface="+mn-lt"/>
+        <a:ea typeface="+mn-ea"/>
+        <a:cs typeface="+mn-cs"/>
+      </a:defRPr>
+    </a:lvl6pPr>
+    <a:lvl7pPr marL="2743200" algn="l" defTabSz="914400" rtl="0" eaLnBrk="1" latinLnBrk="0" hangingPunct="1">
+      <a:defRPr kumimoji="1" sz="1200" kern="1200">
+        <a:solidFill>
+          <a:schemeClr val="tx1"/>
+        </a:solidFill>
+        <a:latin typeface="+mn-lt"/>
+        <a:ea typeface="+mn-ea"/>
+        <a:cs typeface="+mn-cs"/>
+      </a:defRPr>
+    </a:lvl7pPr>
+    <a:lvl8pPr marL="3200400" algn="l" defTabSz="914400" rtl="0" eaLnBrk="1" latinLnBrk="0" hangingPunct="1">
+      <a:defRPr kumimoji="1" sz="1200" kern="1200">
+        <a:solidFill>
+          <a:schemeClr val="tx1"/>
+        </a:solidFill>
+        <a:latin typeface="+mn-lt"/>
+        <a:ea typeface="+mn-ea"/>
+        <a:cs typeface="+mn-cs"/>
+      </a:defRPr>
+    </a:lvl8pPr>
+    <a:lvl9pPr marL="3657600" algn="l" defTabSz="914400" rtl="0" eaLnBrk="1" latinLnBrk="0" hangingPunct="1">
+      <a:defRPr kumimoji="1" sz="1200" kern="1200">
+        <a:solidFill>
+          <a:schemeClr val="tx1"/>
+        </a:solidFill>
+        <a:latin typeface="+mn-lt"/>
+        <a:ea typeface="+mn-ea"/>
+        <a:cs typeface="+mn-cs"/>
+      </a:defRPr>
+    </a:lvl9pPr>
+  </p:notesStyle>
+</p:notesMaster>
+</file>
+
+<file path=ppt/notesSlides/notesSlide1.xml><?xml version="1.0" encoding="utf-8"?>
+<p:notes xmlns:a="http://schemas.openxmlformats.org/drawingml/2006/main" xmlns:r="http://schemas.openxmlformats.org/officeDocument/2006/relationships" xmlns:p="http://schemas.openxmlformats.org/presentationml/2006/main">
+  <p:cSld>
+    <p:spTree>
+      <p:nvGrpSpPr>
+        <p:cNvPr id="1" name=""/>
+        <p:cNvGrpSpPr/>
+        <p:nvPr/>
+      </p:nvGrpSpPr>
+      <p:grpSpPr>
+        <a:xfrm>
+          <a:off x="0" y="0"/>
+          <a:ext cx="0" cy="0"/>
+          <a:chOff x="0" y="0"/>
+          <a:chExt cx="0" cy="0"/>
+        </a:xfrm>
+      </p:grpSpPr>
+      <p:sp>
+        <p:nvSpPr>
+          <p:cNvPr id="2" name="スライド イメージ プレースホルダー 1"/>
+          <p:cNvSpPr>
+            <a:spLocks noGrp="1" noRot="1" noChangeAspect="1"/>
+          </p:cNvSpPr>
+          <p:nvPr>
+            <p:ph type="sldImg"/>
+          </p:nvPr>
+        </p:nvSpPr>
+        <p:spPr/>
+      </p:sp>
+      <p:sp>
+        <p:nvSpPr>
+          <p:cNvPr id="3" name="ノート プレースホルダー 2"/>
+          <p:cNvSpPr>
+            <a:spLocks noGrp="1"/>
+          </p:cNvSpPr>
+          <p:nvPr>
+            <p:ph type="body" idx="1"/>
+          </p:nvPr>
+        </p:nvSpPr>
+        <p:spPr/>
+        <p:txBody>
+          <a:bodyPr/>
+          <a:lstStyle/>
+          <a:p>
+            <a:endParaRPr kumimoji="1" lang="ja-JP" altLang="en-US" dirty="0"/>
+          </a:p>
+        </p:txBody>
+      </p:sp>
+      <p:sp>
+        <p:nvSpPr>
+          <p:cNvPr id="4" name="スライド番号プレースホルダー 3"/>
+          <p:cNvSpPr>
+            <a:spLocks noGrp="1"/>
+          </p:cNvSpPr>
+          <p:nvPr>
+            <p:ph type="sldNum" sz="quarter" idx="5"/>
+          </p:nvPr>
+        </p:nvSpPr>
+        <p:spPr/>
+        <p:txBody>
+          <a:bodyPr/>
+          <a:lstStyle/>
+          <a:p>
+            <a:fld id="{672E3FB9-D101-470C-816C-9E6313236755}" type="slidenum">
+              <a:rPr kumimoji="1" lang="ja-JP" altLang="en-US" smtClean="0"/>
+              <a:t>8</a:t>
+            </a:fld>
+            <a:endParaRPr kumimoji="1" lang="ja-JP" altLang="en-US"/>
+          </a:p>
+        </p:txBody>
+      </p:sp>
+    </p:spTree>
+    <p:extLst>
+      <p:ext uri="{BB962C8B-B14F-4D97-AF65-F5344CB8AC3E}">
+        <p14:creationId xmlns:p14="http://schemas.microsoft.com/office/powerpoint/2010/main" val="3336589211"/>
+      </p:ext>
+    </p:extLst>
+  </p:cSld>
+  <p:clrMapOvr>
+    <a:masterClrMapping/>
+  </p:clrMapOvr>
+</p:notes>
 </file>
 
 <file path=ppt/slideLayouts/slideLayout1.xml><?xml version="1.0" encoding="utf-8"?>
@@ -272,7 +742,7 @@
           <a:p>
             <a:fld id="{E759B8C4-E491-4AE8-BFE3-235CF9118C4F}" type="datetimeFigureOut">
               <a:rPr kumimoji="1" lang="ja-JP" altLang="en-US" smtClean="0"/>
-              <a:t>2019/2/24</a:t>
+              <a:t>2019/3/12</a:t>
             </a:fld>
             <a:endParaRPr kumimoji="1" lang="ja-JP" altLang="en-US"/>
           </a:p>
@@ -502,7 +972,7 @@
           <a:p>
             <a:fld id="{E759B8C4-E491-4AE8-BFE3-235CF9118C4F}" type="datetimeFigureOut">
               <a:rPr kumimoji="1" lang="ja-JP" altLang="en-US" smtClean="0"/>
-              <a:t>2019/2/24</a:t>
+              <a:t>2019/3/12</a:t>
             </a:fld>
             <a:endParaRPr kumimoji="1" lang="ja-JP" altLang="en-US"/>
           </a:p>
@@ -742,7 +1212,7 @@
           <a:p>
             <a:fld id="{E759B8C4-E491-4AE8-BFE3-235CF9118C4F}" type="datetimeFigureOut">
               <a:rPr kumimoji="1" lang="ja-JP" altLang="en-US" smtClean="0"/>
-              <a:t>2019/2/24</a:t>
+              <a:t>2019/3/12</a:t>
             </a:fld>
             <a:endParaRPr kumimoji="1" lang="ja-JP" altLang="en-US"/>
           </a:p>
@@ -972,7 +1442,7 @@
           <a:p>
             <a:fld id="{E759B8C4-E491-4AE8-BFE3-235CF9118C4F}" type="datetimeFigureOut">
               <a:rPr kumimoji="1" lang="ja-JP" altLang="en-US" smtClean="0"/>
-              <a:t>2019/2/24</a:t>
+              <a:t>2019/3/12</a:t>
             </a:fld>
             <a:endParaRPr kumimoji="1" lang="ja-JP" altLang="en-US"/>
           </a:p>
@@ -1247,7 +1717,7 @@
           <a:p>
             <a:fld id="{E759B8C4-E491-4AE8-BFE3-235CF9118C4F}" type="datetimeFigureOut">
               <a:rPr kumimoji="1" lang="ja-JP" altLang="en-US" smtClean="0"/>
-              <a:t>2019/2/24</a:t>
+              <a:t>2019/3/12</a:t>
             </a:fld>
             <a:endParaRPr kumimoji="1" lang="ja-JP" altLang="en-US"/>
           </a:p>
@@ -1576,7 +2046,7 @@
           <a:p>
             <a:fld id="{E759B8C4-E491-4AE8-BFE3-235CF9118C4F}" type="datetimeFigureOut">
               <a:rPr kumimoji="1" lang="ja-JP" altLang="en-US" smtClean="0"/>
-              <a:t>2019/2/24</a:t>
+              <a:t>2019/3/12</a:t>
             </a:fld>
             <a:endParaRPr kumimoji="1" lang="ja-JP" altLang="en-US"/>
           </a:p>
@@ -2052,7 +2522,7 @@
           <a:p>
             <a:fld id="{E759B8C4-E491-4AE8-BFE3-235CF9118C4F}" type="datetimeFigureOut">
               <a:rPr kumimoji="1" lang="ja-JP" altLang="en-US" smtClean="0"/>
-              <a:t>2019/2/24</a:t>
+              <a:t>2019/3/12</a:t>
             </a:fld>
             <a:endParaRPr kumimoji="1" lang="ja-JP" altLang="en-US"/>
           </a:p>
@@ -2193,7 +2663,7 @@
           <a:p>
             <a:fld id="{E759B8C4-E491-4AE8-BFE3-235CF9118C4F}" type="datetimeFigureOut">
               <a:rPr kumimoji="1" lang="ja-JP" altLang="en-US" smtClean="0"/>
-              <a:t>2019/2/24</a:t>
+              <a:t>2019/3/12</a:t>
             </a:fld>
             <a:endParaRPr kumimoji="1" lang="ja-JP" altLang="en-US"/>
           </a:p>
@@ -2306,7 +2776,7 @@
           <a:p>
             <a:fld id="{E759B8C4-E491-4AE8-BFE3-235CF9118C4F}" type="datetimeFigureOut">
               <a:rPr kumimoji="1" lang="ja-JP" altLang="en-US" smtClean="0"/>
-              <a:t>2019/2/24</a:t>
+              <a:t>2019/3/12</a:t>
             </a:fld>
             <a:endParaRPr kumimoji="1" lang="ja-JP" altLang="en-US"/>
           </a:p>
@@ -2649,7 +3119,7 @@
           <a:p>
             <a:fld id="{E759B8C4-E491-4AE8-BFE3-235CF9118C4F}" type="datetimeFigureOut">
               <a:rPr kumimoji="1" lang="ja-JP" altLang="en-US" smtClean="0"/>
-              <a:t>2019/2/24</a:t>
+              <a:t>2019/3/12</a:t>
             </a:fld>
             <a:endParaRPr kumimoji="1" lang="ja-JP" altLang="en-US"/>
           </a:p>
@@ -2937,7 +3407,7 @@
           <a:p>
             <a:fld id="{E759B8C4-E491-4AE8-BFE3-235CF9118C4F}" type="datetimeFigureOut">
               <a:rPr kumimoji="1" lang="ja-JP" altLang="en-US" smtClean="0"/>
-              <a:t>2019/2/24</a:t>
+              <a:t>2019/3/12</a:t>
             </a:fld>
             <a:endParaRPr kumimoji="1" lang="ja-JP" altLang="en-US"/>
           </a:p>
@@ -3210,7 +3680,7 @@
           <a:p>
             <a:fld id="{E759B8C4-E491-4AE8-BFE3-235CF9118C4F}" type="datetimeFigureOut">
               <a:rPr kumimoji="1" lang="ja-JP" altLang="en-US" smtClean="0"/>
-              <a:t>2019/2/24</a:t>
+              <a:t>2019/3/12</a:t>
             </a:fld>
             <a:endParaRPr kumimoji="1" lang="ja-JP" altLang="en-US"/>
           </a:p>
@@ -5784,6 +6254,1299 @@
       </p:grpSpPr>
       <p:sp>
         <p:nvSpPr>
+          <p:cNvPr id="54" name="正方形/長方形 53">
+            <a:extLst>
+              <a:ext uri="{FF2B5EF4-FFF2-40B4-BE49-F238E27FC236}">
+                <a16:creationId xmlns:a16="http://schemas.microsoft.com/office/drawing/2014/main" id="{5A8F7A9F-7BD7-4D28-A9D3-88016DE35CBB}"/>
+              </a:ext>
+            </a:extLst>
+          </p:cNvPr>
+          <p:cNvSpPr/>
+          <p:nvPr/>
+        </p:nvSpPr>
+        <p:spPr>
+          <a:xfrm>
+            <a:off x="-1198283" y="2002163"/>
+            <a:ext cx="14588565" cy="2853674"/>
+          </a:xfrm>
+          <a:prstGeom prst="rect">
+            <a:avLst/>
+          </a:prstGeom>
+          <a:solidFill>
+            <a:schemeClr val="bg1"/>
+          </a:solidFill>
+          <a:ln>
+            <a:noFill/>
+          </a:ln>
+        </p:spPr>
+        <p:style>
+          <a:lnRef idx="2">
+            <a:schemeClr val="accent1">
+              <a:shade val="50000"/>
+            </a:schemeClr>
+          </a:lnRef>
+          <a:fillRef idx="1">
+            <a:schemeClr val="accent1"/>
+          </a:fillRef>
+          <a:effectRef idx="0">
+            <a:schemeClr val="accent1"/>
+          </a:effectRef>
+          <a:fontRef idx="minor">
+            <a:schemeClr val="lt1"/>
+          </a:fontRef>
+        </p:style>
+        <p:txBody>
+          <a:bodyPr rtlCol="0" anchor="ctr"/>
+          <a:lstStyle/>
+          <a:p>
+            <a:pPr algn="ctr"/>
+            <a:endParaRPr kumimoji="1" lang="ja-JP" altLang="en-US"/>
+          </a:p>
+        </p:txBody>
+      </p:sp>
+      <p:sp>
+        <p:nvSpPr>
+          <p:cNvPr id="6" name="四角形: 角を丸くする 5">
+            <a:extLst>
+              <a:ext uri="{FF2B5EF4-FFF2-40B4-BE49-F238E27FC236}">
+                <a16:creationId xmlns:a16="http://schemas.microsoft.com/office/drawing/2014/main" id="{E1883DBD-7E83-4F3C-8FC8-563AEB36A257}"/>
+              </a:ext>
+            </a:extLst>
+          </p:cNvPr>
+          <p:cNvSpPr/>
+          <p:nvPr/>
+        </p:nvSpPr>
+        <p:spPr>
+          <a:xfrm>
+            <a:off x="1839673" y="3032148"/>
+            <a:ext cx="2654969" cy="1119418"/>
+          </a:xfrm>
+          <a:prstGeom prst="roundRect">
+            <a:avLst/>
+          </a:prstGeom>
+          <a:solidFill>
+            <a:srgbClr val="7F7F7F"/>
+          </a:solidFill>
+          <a:ln>
+            <a:noFill/>
+          </a:ln>
+          <a:effectLst>
+            <a:outerShdw blurRad="50800" dist="38100" dir="2700000" algn="tl" rotWithShape="0">
+              <a:prstClr val="black">
+                <a:alpha val="40000"/>
+              </a:prstClr>
+            </a:outerShdw>
+          </a:effectLst>
+        </p:spPr>
+        <p:style>
+          <a:lnRef idx="3">
+            <a:schemeClr val="lt1"/>
+          </a:lnRef>
+          <a:fillRef idx="1">
+            <a:schemeClr val="accent3"/>
+          </a:fillRef>
+          <a:effectRef idx="1">
+            <a:schemeClr val="accent3"/>
+          </a:effectRef>
+          <a:fontRef idx="minor">
+            <a:schemeClr val="lt1"/>
+          </a:fontRef>
+        </p:style>
+        <p:txBody>
+          <a:bodyPr lIns="72000" tIns="36000" rIns="72000" bIns="36000" rtlCol="0" anchor="t"/>
+          <a:lstStyle/>
+          <a:p>
+            <a:pPr algn="ctr"/>
+            <a:r>
+              <a:rPr kumimoji="1" lang="en-US" altLang="ja-JP" sz="2400" b="1" dirty="0">
+                <a:solidFill>
+                  <a:schemeClr val="tx1"/>
+                </a:solidFill>
+              </a:rPr>
+              <a:t>Application</a:t>
+            </a:r>
+          </a:p>
+        </p:txBody>
+      </p:sp>
+      <p:sp>
+        <p:nvSpPr>
+          <p:cNvPr id="8" name="四角形: 角を丸くする 7">
+            <a:extLst>
+              <a:ext uri="{FF2B5EF4-FFF2-40B4-BE49-F238E27FC236}">
+                <a16:creationId xmlns:a16="http://schemas.microsoft.com/office/drawing/2014/main" id="{A4B36517-6546-4324-B602-66920A143647}"/>
+              </a:ext>
+            </a:extLst>
+          </p:cNvPr>
+          <p:cNvSpPr/>
+          <p:nvPr/>
+        </p:nvSpPr>
+        <p:spPr>
+          <a:xfrm>
+            <a:off x="7549023" y="3039798"/>
+            <a:ext cx="2654969" cy="1119418"/>
+          </a:xfrm>
+          <a:prstGeom prst="roundRect">
+            <a:avLst/>
+          </a:prstGeom>
+          <a:solidFill>
+            <a:srgbClr val="7F7F7F"/>
+          </a:solidFill>
+          <a:ln>
+            <a:noFill/>
+          </a:ln>
+          <a:effectLst>
+            <a:outerShdw blurRad="50800" dist="38100" dir="2700000" algn="tl" rotWithShape="0">
+              <a:prstClr val="black">
+                <a:alpha val="40000"/>
+              </a:prstClr>
+            </a:outerShdw>
+          </a:effectLst>
+        </p:spPr>
+        <p:style>
+          <a:lnRef idx="3">
+            <a:schemeClr val="lt1"/>
+          </a:lnRef>
+          <a:fillRef idx="1">
+            <a:schemeClr val="accent3"/>
+          </a:fillRef>
+          <a:effectRef idx="1">
+            <a:schemeClr val="accent3"/>
+          </a:effectRef>
+          <a:fontRef idx="minor">
+            <a:schemeClr val="lt1"/>
+          </a:fontRef>
+        </p:style>
+        <p:txBody>
+          <a:bodyPr lIns="72000" tIns="36000" rIns="72000" bIns="36000" rtlCol="0" anchor="t"/>
+          <a:lstStyle/>
+          <a:p>
+            <a:pPr algn="ctr"/>
+            <a:r>
+              <a:rPr kumimoji="1" lang="en-US" altLang="ja-JP" sz="2400" b="1" dirty="0">
+                <a:solidFill>
+                  <a:schemeClr val="tx1"/>
+                </a:solidFill>
+              </a:rPr>
+              <a:t>Device</a:t>
+            </a:r>
+          </a:p>
+        </p:txBody>
+      </p:sp>
+      <p:sp>
+        <p:nvSpPr>
+          <p:cNvPr id="9" name="四角形: 角を丸くする 8">
+            <a:extLst>
+              <a:ext uri="{FF2B5EF4-FFF2-40B4-BE49-F238E27FC236}">
+                <a16:creationId xmlns:a16="http://schemas.microsoft.com/office/drawing/2014/main" id="{478343BE-306E-4657-841B-17ACD2762DA9}"/>
+              </a:ext>
+            </a:extLst>
+          </p:cNvPr>
+          <p:cNvSpPr/>
+          <p:nvPr/>
+        </p:nvSpPr>
+        <p:spPr>
+          <a:xfrm>
+            <a:off x="2273464" y="-866437"/>
+            <a:ext cx="812800" cy="440267"/>
+          </a:xfrm>
+          <a:prstGeom prst="roundRect">
+            <a:avLst/>
+          </a:prstGeom>
+          <a:solidFill>
+            <a:srgbClr val="00B050"/>
+          </a:solidFill>
+          <a:ln>
+            <a:noFill/>
+          </a:ln>
+        </p:spPr>
+        <p:style>
+          <a:lnRef idx="1">
+            <a:schemeClr val="accent5"/>
+          </a:lnRef>
+          <a:fillRef idx="3">
+            <a:schemeClr val="accent5"/>
+          </a:fillRef>
+          <a:effectRef idx="2">
+            <a:schemeClr val="accent5"/>
+          </a:effectRef>
+          <a:fontRef idx="minor">
+            <a:schemeClr val="lt1"/>
+          </a:fontRef>
+        </p:style>
+        <p:txBody>
+          <a:bodyPr rtlCol="0" anchor="ctr"/>
+          <a:lstStyle/>
+          <a:p>
+            <a:pPr algn="ctr"/>
+            <a:r>
+              <a:rPr kumimoji="1" lang="en-US" altLang="ja-JP" sz="3200" dirty="0"/>
+              <a:t>C</a:t>
+            </a:r>
+            <a:endParaRPr kumimoji="1" lang="ja-JP" altLang="en-US" sz="3200" dirty="0"/>
+          </a:p>
+        </p:txBody>
+      </p:sp>
+      <p:sp>
+        <p:nvSpPr>
+          <p:cNvPr id="10" name="四角形: 角を丸くする 9">
+            <a:extLst>
+              <a:ext uri="{FF2B5EF4-FFF2-40B4-BE49-F238E27FC236}">
+                <a16:creationId xmlns:a16="http://schemas.microsoft.com/office/drawing/2014/main" id="{7F7394D1-AB71-4F83-88CF-0D70AEA90BB3}"/>
+              </a:ext>
+            </a:extLst>
+          </p:cNvPr>
+          <p:cNvSpPr/>
+          <p:nvPr/>
+        </p:nvSpPr>
+        <p:spPr>
+          <a:xfrm>
+            <a:off x="7737000" y="3599507"/>
+            <a:ext cx="2282021" cy="440267"/>
+          </a:xfrm>
+          <a:prstGeom prst="roundRect">
+            <a:avLst/>
+          </a:prstGeom>
+          <a:solidFill>
+            <a:srgbClr val="00B050"/>
+          </a:solidFill>
+          <a:ln>
+            <a:noFill/>
+          </a:ln>
+        </p:spPr>
+        <p:style>
+          <a:lnRef idx="1">
+            <a:schemeClr val="accent5"/>
+          </a:lnRef>
+          <a:fillRef idx="3">
+            <a:schemeClr val="accent5"/>
+          </a:fillRef>
+          <a:effectRef idx="2">
+            <a:schemeClr val="accent5"/>
+          </a:effectRef>
+          <a:fontRef idx="minor">
+            <a:schemeClr val="lt1"/>
+          </a:fontRef>
+        </p:style>
+        <p:txBody>
+          <a:bodyPr rtlCol="0" anchor="ctr"/>
+          <a:lstStyle/>
+          <a:p>
+            <a:pPr algn="ctr"/>
+            <a:r>
+              <a:rPr lang="en-US" altLang="ja-JP" sz="2000" dirty="0"/>
+              <a:t>Exposed Thing</a:t>
+            </a:r>
+            <a:endParaRPr kumimoji="1" lang="ja-JP" altLang="en-US" sz="2000" dirty="0"/>
+          </a:p>
+        </p:txBody>
+      </p:sp>
+      <p:sp>
+        <p:nvSpPr>
+          <p:cNvPr id="13" name="四角形: 角を丸くする 12">
+            <a:extLst>
+              <a:ext uri="{FF2B5EF4-FFF2-40B4-BE49-F238E27FC236}">
+                <a16:creationId xmlns:a16="http://schemas.microsoft.com/office/drawing/2014/main" id="{B5CD2B9F-227C-466A-9DC6-760504E532C1}"/>
+              </a:ext>
+            </a:extLst>
+          </p:cNvPr>
+          <p:cNvSpPr/>
+          <p:nvPr/>
+        </p:nvSpPr>
+        <p:spPr>
+          <a:xfrm>
+            <a:off x="7421657" y="-1333106"/>
+            <a:ext cx="812800" cy="440267"/>
+          </a:xfrm>
+          <a:prstGeom prst="roundRect">
+            <a:avLst/>
+          </a:prstGeom>
+          <a:solidFill>
+            <a:srgbClr val="00B050"/>
+          </a:solidFill>
+          <a:ln>
+            <a:noFill/>
+          </a:ln>
+        </p:spPr>
+        <p:style>
+          <a:lnRef idx="1">
+            <a:schemeClr val="accent5"/>
+          </a:lnRef>
+          <a:fillRef idx="3">
+            <a:schemeClr val="accent5"/>
+          </a:fillRef>
+          <a:effectRef idx="2">
+            <a:schemeClr val="accent5"/>
+          </a:effectRef>
+          <a:fontRef idx="minor">
+            <a:schemeClr val="lt1"/>
+          </a:fontRef>
+        </p:style>
+        <p:txBody>
+          <a:bodyPr rtlCol="0" anchor="ctr"/>
+          <a:lstStyle/>
+          <a:p>
+            <a:pPr algn="ctr"/>
+            <a:r>
+              <a:rPr kumimoji="1" lang="en-US" altLang="ja-JP" sz="3200" dirty="0"/>
+              <a:t>C</a:t>
+            </a:r>
+            <a:endParaRPr kumimoji="1" lang="ja-JP" altLang="en-US" sz="3200" dirty="0"/>
+          </a:p>
+        </p:txBody>
+      </p:sp>
+      <p:sp>
+        <p:nvSpPr>
+          <p:cNvPr id="14" name="四角形: 角を丸くする 13">
+            <a:extLst>
+              <a:ext uri="{FF2B5EF4-FFF2-40B4-BE49-F238E27FC236}">
+                <a16:creationId xmlns:a16="http://schemas.microsoft.com/office/drawing/2014/main" id="{DAC9719D-BC55-4BAA-827B-3741647E133B}"/>
+              </a:ext>
+            </a:extLst>
+          </p:cNvPr>
+          <p:cNvSpPr/>
+          <p:nvPr/>
+        </p:nvSpPr>
+        <p:spPr>
+          <a:xfrm>
+            <a:off x="7421657" y="-2008619"/>
+            <a:ext cx="812800" cy="440267"/>
+          </a:xfrm>
+          <a:prstGeom prst="roundRect">
+            <a:avLst/>
+          </a:prstGeom>
+          <a:solidFill>
+            <a:srgbClr val="00B050"/>
+          </a:solidFill>
+          <a:ln>
+            <a:noFill/>
+          </a:ln>
+        </p:spPr>
+        <p:style>
+          <a:lnRef idx="1">
+            <a:schemeClr val="accent5"/>
+          </a:lnRef>
+          <a:fillRef idx="3">
+            <a:schemeClr val="accent5"/>
+          </a:fillRef>
+          <a:effectRef idx="2">
+            <a:schemeClr val="accent5"/>
+          </a:effectRef>
+          <a:fontRef idx="minor">
+            <a:schemeClr val="lt1"/>
+          </a:fontRef>
+        </p:style>
+        <p:txBody>
+          <a:bodyPr rtlCol="0" anchor="ctr"/>
+          <a:lstStyle/>
+          <a:p>
+            <a:pPr algn="ctr"/>
+            <a:r>
+              <a:rPr kumimoji="1" lang="en-US" altLang="ja-JP" sz="3200" dirty="0"/>
+              <a:t>E</a:t>
+            </a:r>
+            <a:endParaRPr kumimoji="1" lang="ja-JP" altLang="en-US" sz="3200" dirty="0"/>
+          </a:p>
+        </p:txBody>
+      </p:sp>
+      <p:sp>
+        <p:nvSpPr>
+          <p:cNvPr id="15" name="四角形: メモ 14">
+            <a:extLst>
+              <a:ext uri="{FF2B5EF4-FFF2-40B4-BE49-F238E27FC236}">
+                <a16:creationId xmlns:a16="http://schemas.microsoft.com/office/drawing/2014/main" id="{B13C0EAD-EA26-4ADA-AFD3-C60E5A7E354F}"/>
+              </a:ext>
+            </a:extLst>
+          </p:cNvPr>
+          <p:cNvSpPr/>
+          <p:nvPr/>
+        </p:nvSpPr>
+        <p:spPr>
+          <a:xfrm>
+            <a:off x="7421657" y="-646304"/>
+            <a:ext cx="812800" cy="440267"/>
+          </a:xfrm>
+          <a:prstGeom prst="foldedCorner">
+            <a:avLst/>
+          </a:prstGeom>
+          <a:solidFill>
+            <a:srgbClr val="4A7B7C"/>
+          </a:solidFill>
+          <a:ln>
+            <a:noFill/>
+          </a:ln>
+        </p:spPr>
+        <p:style>
+          <a:lnRef idx="1">
+            <a:schemeClr val="accent5"/>
+          </a:lnRef>
+          <a:fillRef idx="3">
+            <a:schemeClr val="accent5"/>
+          </a:fillRef>
+          <a:effectRef idx="2">
+            <a:schemeClr val="accent5"/>
+          </a:effectRef>
+          <a:fontRef idx="minor">
+            <a:schemeClr val="lt1"/>
+          </a:fontRef>
+        </p:style>
+        <p:txBody>
+          <a:bodyPr rtlCol="0" anchor="ctr"/>
+          <a:lstStyle/>
+          <a:p>
+            <a:pPr algn="ctr"/>
+            <a:r>
+              <a:rPr kumimoji="1" lang="en-US" altLang="ja-JP" sz="3200" dirty="0"/>
+              <a:t>TD</a:t>
+            </a:r>
+            <a:endParaRPr kumimoji="1" lang="ja-JP" altLang="en-US" sz="3200" dirty="0"/>
+          </a:p>
+        </p:txBody>
+      </p:sp>
+      <p:sp>
+        <p:nvSpPr>
+          <p:cNvPr id="16" name="テキスト ボックス 15">
+            <a:extLst>
+              <a:ext uri="{FF2B5EF4-FFF2-40B4-BE49-F238E27FC236}">
+                <a16:creationId xmlns:a16="http://schemas.microsoft.com/office/drawing/2014/main" id="{DF7894EE-1174-4828-B7DF-51B52BE5F642}"/>
+              </a:ext>
+            </a:extLst>
+          </p:cNvPr>
+          <p:cNvSpPr txBox="1"/>
+          <p:nvPr/>
+        </p:nvSpPr>
+        <p:spPr>
+          <a:xfrm>
+            <a:off x="8448945" y="-2111652"/>
+            <a:ext cx="2885726" cy="646331"/>
+          </a:xfrm>
+          <a:prstGeom prst="rect">
+            <a:avLst/>
+          </a:prstGeom>
+          <a:noFill/>
+        </p:spPr>
+        <p:txBody>
+          <a:bodyPr wrap="none" rtlCol="0">
+            <a:spAutoFit/>
+          </a:bodyPr>
+          <a:lstStyle/>
+          <a:p>
+            <a:r>
+              <a:rPr lang="en-US" altLang="ja-JP" sz="3600" dirty="0"/>
+              <a:t>Exposed</a:t>
+            </a:r>
+            <a:r>
+              <a:rPr lang="ja-JP" altLang="en-US" sz="3600" dirty="0"/>
+              <a:t> </a:t>
+            </a:r>
+            <a:r>
+              <a:rPr lang="en-US" altLang="ja-JP" sz="3600" dirty="0"/>
+              <a:t>Thing</a:t>
+            </a:r>
+            <a:endParaRPr kumimoji="1" lang="ja-JP" altLang="en-US" sz="3600" dirty="0"/>
+          </a:p>
+        </p:txBody>
+      </p:sp>
+      <p:sp>
+        <p:nvSpPr>
+          <p:cNvPr id="17" name="テキスト ボックス 16">
+            <a:extLst>
+              <a:ext uri="{FF2B5EF4-FFF2-40B4-BE49-F238E27FC236}">
+                <a16:creationId xmlns:a16="http://schemas.microsoft.com/office/drawing/2014/main" id="{0CF33ABF-3C66-435D-B875-AA53D751472E}"/>
+              </a:ext>
+            </a:extLst>
+          </p:cNvPr>
+          <p:cNvSpPr txBox="1"/>
+          <p:nvPr/>
+        </p:nvSpPr>
+        <p:spPr>
+          <a:xfrm>
+            <a:off x="8448945" y="-1429103"/>
+            <a:ext cx="3316934" cy="646331"/>
+          </a:xfrm>
+          <a:prstGeom prst="rect">
+            <a:avLst/>
+          </a:prstGeom>
+          <a:noFill/>
+        </p:spPr>
+        <p:txBody>
+          <a:bodyPr wrap="none" rtlCol="0">
+            <a:spAutoFit/>
+          </a:bodyPr>
+          <a:lstStyle/>
+          <a:p>
+            <a:r>
+              <a:rPr lang="en-US" altLang="ja-JP" sz="3600" dirty="0"/>
+              <a:t>Consumed Thing</a:t>
+            </a:r>
+            <a:endParaRPr kumimoji="1" lang="ja-JP" altLang="en-US" sz="3600" dirty="0"/>
+          </a:p>
+        </p:txBody>
+      </p:sp>
+      <p:sp>
+        <p:nvSpPr>
+          <p:cNvPr id="18" name="テキスト ボックス 17">
+            <a:extLst>
+              <a:ext uri="{FF2B5EF4-FFF2-40B4-BE49-F238E27FC236}">
+                <a16:creationId xmlns:a16="http://schemas.microsoft.com/office/drawing/2014/main" id="{F4CC1D14-7AA6-41AD-85BC-5B3BD9AC308C}"/>
+              </a:ext>
+            </a:extLst>
+          </p:cNvPr>
+          <p:cNvSpPr txBox="1"/>
+          <p:nvPr/>
+        </p:nvSpPr>
+        <p:spPr>
+          <a:xfrm>
+            <a:off x="8448945" y="-746554"/>
+            <a:ext cx="3462358" cy="646331"/>
+          </a:xfrm>
+          <a:prstGeom prst="rect">
+            <a:avLst/>
+          </a:prstGeom>
+          <a:noFill/>
+        </p:spPr>
+        <p:txBody>
+          <a:bodyPr wrap="none" rtlCol="0">
+            <a:spAutoFit/>
+          </a:bodyPr>
+          <a:lstStyle/>
+          <a:p>
+            <a:r>
+              <a:rPr lang="en-US" altLang="ja-JP" sz="3600" dirty="0"/>
+              <a:t>Thing Description</a:t>
+            </a:r>
+            <a:endParaRPr kumimoji="1" lang="ja-JP" altLang="en-US" sz="3600" dirty="0"/>
+          </a:p>
+        </p:txBody>
+      </p:sp>
+      <p:cxnSp>
+        <p:nvCxnSpPr>
+          <p:cNvPr id="21" name="直線矢印コネクタ 20">
+            <a:extLst>
+              <a:ext uri="{FF2B5EF4-FFF2-40B4-BE49-F238E27FC236}">
+                <a16:creationId xmlns:a16="http://schemas.microsoft.com/office/drawing/2014/main" id="{36428CDD-CC0D-4876-9F07-F4A6D227D45A}"/>
+              </a:ext>
+            </a:extLst>
+          </p:cNvPr>
+          <p:cNvCxnSpPr>
+            <a:cxnSpLocks/>
+          </p:cNvCxnSpPr>
+          <p:nvPr/>
+        </p:nvCxnSpPr>
+        <p:spPr>
+          <a:xfrm flipH="1">
+            <a:off x="2136189" y="-180230"/>
+            <a:ext cx="1389094" cy="0"/>
+          </a:xfrm>
+          <a:prstGeom prst="straightConnector1">
+            <a:avLst/>
+          </a:prstGeom>
+          <a:ln w="57150">
+            <a:solidFill>
+              <a:schemeClr val="tx1"/>
+            </a:solidFill>
+            <a:prstDash val="sysDash"/>
+            <a:tailEnd type="triangle"/>
+          </a:ln>
+        </p:spPr>
+        <p:style>
+          <a:lnRef idx="1">
+            <a:schemeClr val="accent1"/>
+          </a:lnRef>
+          <a:fillRef idx="0">
+            <a:schemeClr val="accent1"/>
+          </a:fillRef>
+          <a:effectRef idx="0">
+            <a:schemeClr val="accent1"/>
+          </a:effectRef>
+          <a:fontRef idx="minor">
+            <a:schemeClr val="tx1"/>
+          </a:fontRef>
+        </p:style>
+      </p:cxnSp>
+      <p:sp>
+        <p:nvSpPr>
+          <p:cNvPr id="19" name="四角形: 角を丸くする 18">
+            <a:extLst>
+              <a:ext uri="{FF2B5EF4-FFF2-40B4-BE49-F238E27FC236}">
+                <a16:creationId xmlns:a16="http://schemas.microsoft.com/office/drawing/2014/main" id="{46146C38-6712-4A36-BEAE-7DD2A922D693}"/>
+              </a:ext>
+            </a:extLst>
+          </p:cNvPr>
+          <p:cNvSpPr/>
+          <p:nvPr/>
+        </p:nvSpPr>
+        <p:spPr>
+          <a:xfrm>
+            <a:off x="2026146" y="3591857"/>
+            <a:ext cx="2282021" cy="440267"/>
+          </a:xfrm>
+          <a:prstGeom prst="roundRect">
+            <a:avLst/>
+          </a:prstGeom>
+          <a:solidFill>
+            <a:srgbClr val="00B050"/>
+          </a:solidFill>
+          <a:ln>
+            <a:noFill/>
+          </a:ln>
+        </p:spPr>
+        <p:style>
+          <a:lnRef idx="1">
+            <a:schemeClr val="accent5"/>
+          </a:lnRef>
+          <a:fillRef idx="3">
+            <a:schemeClr val="accent5"/>
+          </a:fillRef>
+          <a:effectRef idx="2">
+            <a:schemeClr val="accent5"/>
+          </a:effectRef>
+          <a:fontRef idx="minor">
+            <a:schemeClr val="lt1"/>
+          </a:fontRef>
+        </p:style>
+        <p:txBody>
+          <a:bodyPr wrap="none" rtlCol="0" anchor="ctr"/>
+          <a:lstStyle/>
+          <a:p>
+            <a:pPr algn="ctr"/>
+            <a:r>
+              <a:rPr kumimoji="1" lang="en-US" altLang="ja-JP" sz="2000" dirty="0"/>
+              <a:t>Consumed Thing</a:t>
+            </a:r>
+            <a:endParaRPr kumimoji="1" lang="ja-JP" altLang="en-US" sz="2000" dirty="0"/>
+          </a:p>
+        </p:txBody>
+      </p:sp>
+      <p:cxnSp>
+        <p:nvCxnSpPr>
+          <p:cNvPr id="25" name="Gerade Verbindung mit Pfeil 42">
+            <a:extLst>
+              <a:ext uri="{FF2B5EF4-FFF2-40B4-BE49-F238E27FC236}">
+                <a16:creationId xmlns:a16="http://schemas.microsoft.com/office/drawing/2014/main" id="{32FD418E-ACA3-4090-96FF-CBAAD989B740}"/>
+              </a:ext>
+            </a:extLst>
+          </p:cNvPr>
+          <p:cNvCxnSpPr>
+            <a:cxnSpLocks/>
+            <a:endCxn id="10" idx="1"/>
+          </p:cNvCxnSpPr>
+          <p:nvPr/>
+        </p:nvCxnSpPr>
+        <p:spPr>
+          <a:xfrm flipV="1">
+            <a:off x="4308167" y="3819641"/>
+            <a:ext cx="3428833" cy="7650"/>
+          </a:xfrm>
+          <a:prstGeom prst="straightConnector1">
+            <a:avLst/>
+          </a:prstGeom>
+          <a:ln w="38100">
+            <a:solidFill>
+              <a:srgbClr val="008000"/>
+            </a:solidFill>
+            <a:prstDash val="sysDot"/>
+            <a:headEnd type="arrow" w="med" len="med"/>
+            <a:tailEnd type="arrow" w="med" len="med"/>
+          </a:ln>
+        </p:spPr>
+        <p:style>
+          <a:lnRef idx="1">
+            <a:schemeClr val="accent1"/>
+          </a:lnRef>
+          <a:fillRef idx="0">
+            <a:schemeClr val="accent1"/>
+          </a:fillRef>
+          <a:effectRef idx="0">
+            <a:schemeClr val="accent1"/>
+          </a:effectRef>
+          <a:fontRef idx="minor">
+            <a:schemeClr val="tx1"/>
+          </a:fontRef>
+        </p:style>
+      </p:cxnSp>
+      <p:grpSp>
+        <p:nvGrpSpPr>
+          <p:cNvPr id="29" name="Group 38">
+            <a:extLst>
+              <a:ext uri="{FF2B5EF4-FFF2-40B4-BE49-F238E27FC236}">
+                <a16:creationId xmlns:a16="http://schemas.microsoft.com/office/drawing/2014/main" id="{4FFE457D-83D2-49D0-A0F3-DDFEEA55E2E5}"/>
+              </a:ext>
+            </a:extLst>
+          </p:cNvPr>
+          <p:cNvGrpSpPr/>
+          <p:nvPr/>
+        </p:nvGrpSpPr>
+        <p:grpSpPr>
+          <a:xfrm>
+            <a:off x="5034869" y="2771507"/>
+            <a:ext cx="2060941" cy="828000"/>
+            <a:chOff x="2670082" y="4186219"/>
+            <a:chExt cx="2060941" cy="828000"/>
+          </a:xfrm>
+        </p:grpSpPr>
+        <p:sp>
+          <p:nvSpPr>
+            <p:cNvPr id="30" name="角丸四角形 21">
+              <a:extLst>
+                <a:ext uri="{FF2B5EF4-FFF2-40B4-BE49-F238E27FC236}">
+                  <a16:creationId xmlns:a16="http://schemas.microsoft.com/office/drawing/2014/main" id="{024C5D63-C675-4753-B4EC-F2F06403B347}"/>
+                </a:ext>
+              </a:extLst>
+            </p:cNvPr>
+            <p:cNvSpPr/>
+            <p:nvPr/>
+          </p:nvSpPr>
+          <p:spPr bwMode="auto">
+            <a:xfrm>
+              <a:off x="2670082" y="4186219"/>
+              <a:ext cx="2060941" cy="828000"/>
+            </a:xfrm>
+            <a:prstGeom prst="foldedCorner">
+              <a:avLst>
+                <a:gd name="adj" fmla="val 20194"/>
+              </a:avLst>
+            </a:prstGeom>
+            <a:solidFill>
+              <a:srgbClr val="4A7B7C"/>
+            </a:solidFill>
+            <a:ln w="25400" cap="flat" cmpd="sng" algn="ctr">
+              <a:noFill/>
+              <a:prstDash val="solid"/>
+              <a:round/>
+              <a:headEnd type="none" w="med" len="med"/>
+              <a:tailEnd type="none" w="med" len="med"/>
+            </a:ln>
+            <a:effectLst/>
+            <a:extLst/>
+          </p:spPr>
+          <p:txBody>
+            <a:bodyPr vert="horz" wrap="none" lIns="432000" tIns="144000" rIns="0" bIns="0" numCol="1" rtlCol="0" anchor="ctr" anchorCtr="0" compatLnSpc="1">
+              <a:prstTxWarp prst="textNoShape">
+                <a:avLst/>
+              </a:prstTxWarp>
+              <a:noAutofit/>
+            </a:bodyPr>
+            <a:lstStyle/>
+            <a:p>
+              <a:pPr marL="0" marR="0" lvl="0" indent="0" algn="ctr" defTabSz="914400" eaLnBrk="1" fontAlgn="ctr" latinLnBrk="0" hangingPunct="1">
+                <a:lnSpc>
+                  <a:spcPct val="100000"/>
+                </a:lnSpc>
+                <a:spcBef>
+                  <a:spcPts val="0"/>
+                </a:spcBef>
+                <a:spcAft>
+                  <a:spcPts val="0"/>
+                </a:spcAft>
+                <a:buClrTx/>
+                <a:buSzTx/>
+                <a:buFontTx/>
+                <a:buNone/>
+                <a:tabLst/>
+                <a:defRPr/>
+              </a:pPr>
+              <a:r>
+                <a:rPr kumimoji="0" lang="en-US" altLang="ja-JP" sz="2000" i="0" u="none" strike="noStrike" kern="0" cap="none" spc="0" normalizeH="0" baseline="0" dirty="0">
+                  <a:ln>
+                    <a:noFill/>
+                  </a:ln>
+                  <a:solidFill>
+                    <a:prstClr val="white"/>
+                  </a:solidFill>
+                  <a:effectLst/>
+                  <a:uLnTx/>
+                  <a:uFillTx/>
+                  <a:latin typeface="+mj-lt"/>
+                  <a:ea typeface="HG明朝E" panose="02020909000000000000" pitchFamily="17" charset="-128"/>
+                  <a:cs typeface="Arial" pitchFamily="34" charset="0"/>
+                </a:rPr>
+                <a:t>Thing</a:t>
+              </a:r>
+              <a:br>
+                <a:rPr kumimoji="0" lang="en-US" altLang="ja-JP" sz="2000" i="0" u="none" strike="noStrike" kern="0" cap="none" spc="0" normalizeH="0" baseline="0" dirty="0">
+                  <a:ln>
+                    <a:noFill/>
+                  </a:ln>
+                  <a:solidFill>
+                    <a:prstClr val="white"/>
+                  </a:solidFill>
+                  <a:effectLst/>
+                  <a:uLnTx/>
+                  <a:uFillTx/>
+                  <a:latin typeface="+mj-lt"/>
+                  <a:ea typeface="HG明朝E" panose="02020909000000000000" pitchFamily="17" charset="-128"/>
+                  <a:cs typeface="Arial" pitchFamily="34" charset="0"/>
+                </a:rPr>
+              </a:br>
+              <a:r>
+                <a:rPr kumimoji="0" lang="en-US" altLang="ja-JP" sz="2000" i="0" u="none" strike="noStrike" kern="0" cap="none" spc="0" normalizeH="0" baseline="0" dirty="0">
+                  <a:ln>
+                    <a:noFill/>
+                  </a:ln>
+                  <a:solidFill>
+                    <a:prstClr val="white"/>
+                  </a:solidFill>
+                  <a:effectLst/>
+                  <a:uLnTx/>
+                  <a:uFillTx/>
+                  <a:latin typeface="+mj-lt"/>
+                  <a:ea typeface="HG明朝E" panose="02020909000000000000" pitchFamily="17" charset="-128"/>
+                  <a:cs typeface="Arial" pitchFamily="34" charset="0"/>
+                </a:rPr>
+                <a:t>Description</a:t>
+              </a:r>
+              <a:endParaRPr kumimoji="0" lang="en-US" altLang="ja-JP" sz="2800" i="0" u="none" strike="noStrike" kern="0" cap="none" spc="0" normalizeH="0" baseline="0" dirty="0">
+                <a:ln>
+                  <a:noFill/>
+                </a:ln>
+                <a:solidFill>
+                  <a:prstClr val="white"/>
+                </a:solidFill>
+                <a:effectLst/>
+                <a:uLnTx/>
+                <a:uFillTx/>
+                <a:latin typeface="+mj-lt"/>
+                <a:ea typeface="HG明朝E" panose="02020909000000000000" pitchFamily="17" charset="-128"/>
+                <a:cs typeface="Arial" pitchFamily="34" charset="0"/>
+              </a:endParaRPr>
+            </a:p>
+          </p:txBody>
+        </p:sp>
+        <p:grpSp>
+          <p:nvGrpSpPr>
+            <p:cNvPr id="31" name="Group 28">
+              <a:extLst>
+                <a:ext uri="{FF2B5EF4-FFF2-40B4-BE49-F238E27FC236}">
+                  <a16:creationId xmlns:a16="http://schemas.microsoft.com/office/drawing/2014/main" id="{A5488A5F-252B-4EB8-AA83-97711B5B4618}"/>
+                </a:ext>
+              </a:extLst>
+            </p:cNvPr>
+            <p:cNvGrpSpPr/>
+            <p:nvPr/>
+          </p:nvGrpSpPr>
+          <p:grpSpPr>
+            <a:xfrm>
+              <a:off x="2812207" y="4399725"/>
+              <a:ext cx="413417" cy="426971"/>
+              <a:chOff x="4042160" y="993559"/>
+              <a:chExt cx="548293" cy="566272"/>
+            </a:xfrm>
+            <a:solidFill>
+              <a:sysClr val="window" lastClr="FFFFFF"/>
+            </a:solidFill>
+          </p:grpSpPr>
+          <p:sp>
+            <p:nvSpPr>
+              <p:cNvPr id="32" name="Isosceles Triangle 29">
+                <a:extLst>
+                  <a:ext uri="{FF2B5EF4-FFF2-40B4-BE49-F238E27FC236}">
+                    <a16:creationId xmlns:a16="http://schemas.microsoft.com/office/drawing/2014/main" id="{AAB48341-E11F-47E0-ADE3-15F5732CB54D}"/>
+                  </a:ext>
+                </a:extLst>
+              </p:cNvPr>
+              <p:cNvSpPr/>
+              <p:nvPr/>
+            </p:nvSpPr>
+            <p:spPr>
+              <a:xfrm rot="1800000">
+                <a:off x="4184483" y="1052736"/>
+                <a:ext cx="405970" cy="349975"/>
+              </a:xfrm>
+              <a:prstGeom prst="triangle">
+                <a:avLst/>
+              </a:prstGeom>
+              <a:noFill/>
+              <a:ln w="28575" cap="rnd" cmpd="sng" algn="ctr">
+                <a:solidFill>
+                  <a:sysClr val="window" lastClr="FFFFFF"/>
+                </a:solidFill>
+                <a:prstDash val="solid"/>
+              </a:ln>
+              <a:effectLst/>
+            </p:spPr>
+            <p:txBody>
+              <a:bodyPr wrap="none" rtlCol="0" anchor="ctr"/>
+              <a:lstStyle/>
+              <a:p>
+                <a:pPr marL="0" marR="0" lvl="0" indent="0" algn="ctr" defTabSz="914400" eaLnBrk="1" fontAlgn="auto" latinLnBrk="0" hangingPunct="1">
+                  <a:lnSpc>
+                    <a:spcPct val="100000"/>
+                  </a:lnSpc>
+                  <a:spcBef>
+                    <a:spcPts val="0"/>
+                  </a:spcBef>
+                  <a:spcAft>
+                    <a:spcPts val="0"/>
+                  </a:spcAft>
+                  <a:buClrTx/>
+                  <a:buSzTx/>
+                  <a:buFontTx/>
+                  <a:buNone/>
+                  <a:tabLst/>
+                  <a:defRPr/>
+                </a:pPr>
+                <a:endParaRPr kumimoji="0" lang="en-US" sz="4400" i="0" u="none" strike="noStrike" kern="0" cap="none" spc="0" normalizeH="0" baseline="0">
+                  <a:ln>
+                    <a:noFill/>
+                  </a:ln>
+                  <a:solidFill>
+                    <a:prstClr val="white"/>
+                  </a:solidFill>
+                  <a:effectLst/>
+                  <a:uLnTx/>
+                  <a:uFillTx/>
+                  <a:latin typeface="+mj-lt"/>
+                  <a:cs typeface="Arial" pitchFamily="34" charset="0"/>
+                </a:endParaRPr>
+              </a:p>
+            </p:txBody>
+          </p:sp>
+          <p:sp>
+            <p:nvSpPr>
+              <p:cNvPr id="33" name="Oval 30">
+                <a:extLst>
+                  <a:ext uri="{FF2B5EF4-FFF2-40B4-BE49-F238E27FC236}">
+                    <a16:creationId xmlns:a16="http://schemas.microsoft.com/office/drawing/2014/main" id="{F5DD1807-415C-4F20-87B3-DC9D99DA43B9}"/>
+                  </a:ext>
+                </a:extLst>
+              </p:cNvPr>
+              <p:cNvSpPr/>
+              <p:nvPr/>
+            </p:nvSpPr>
+            <p:spPr>
+              <a:xfrm rot="19800000">
+                <a:off x="4394607" y="993559"/>
+                <a:ext cx="161145" cy="161145"/>
+              </a:xfrm>
+              <a:prstGeom prst="ellipse">
+                <a:avLst/>
+              </a:prstGeom>
+              <a:grpFill/>
+              <a:ln w="25400" cap="rnd" cmpd="sng" algn="ctr">
+                <a:noFill/>
+                <a:prstDash val="solid"/>
+              </a:ln>
+              <a:effectLst/>
+            </p:spPr>
+            <p:txBody>
+              <a:bodyPr wrap="none" rtlCol="0" anchor="ctr"/>
+              <a:lstStyle/>
+              <a:p>
+                <a:pPr marL="0" marR="0" lvl="0" indent="0" algn="ctr" defTabSz="914400" eaLnBrk="1" fontAlgn="auto" latinLnBrk="0" hangingPunct="1">
+                  <a:lnSpc>
+                    <a:spcPct val="100000"/>
+                  </a:lnSpc>
+                  <a:spcBef>
+                    <a:spcPts val="0"/>
+                  </a:spcBef>
+                  <a:spcAft>
+                    <a:spcPts val="0"/>
+                  </a:spcAft>
+                  <a:buClrTx/>
+                  <a:buSzTx/>
+                  <a:buFontTx/>
+                  <a:buNone/>
+                  <a:tabLst/>
+                  <a:defRPr/>
+                </a:pPr>
+                <a:endParaRPr kumimoji="0" lang="en-US" sz="4400" i="0" u="none" strike="noStrike" kern="0" cap="none" spc="0" normalizeH="0" baseline="0">
+                  <a:ln>
+                    <a:noFill/>
+                  </a:ln>
+                  <a:solidFill>
+                    <a:prstClr val="white"/>
+                  </a:solidFill>
+                  <a:effectLst/>
+                  <a:uLnTx/>
+                  <a:uFillTx/>
+                  <a:latin typeface="+mj-lt"/>
+                  <a:cs typeface="Arial" pitchFamily="34" charset="0"/>
+                </a:endParaRPr>
+              </a:p>
+            </p:txBody>
+          </p:sp>
+          <p:sp>
+            <p:nvSpPr>
+              <p:cNvPr id="34" name="Oval 31">
+                <a:extLst>
+                  <a:ext uri="{FF2B5EF4-FFF2-40B4-BE49-F238E27FC236}">
+                    <a16:creationId xmlns:a16="http://schemas.microsoft.com/office/drawing/2014/main" id="{ABEA0394-2BF9-4967-9823-22C32CCD88DA}"/>
+                  </a:ext>
+                </a:extLst>
+              </p:cNvPr>
+              <p:cNvSpPr/>
+              <p:nvPr/>
+            </p:nvSpPr>
+            <p:spPr>
+              <a:xfrm rot="19800000">
+                <a:off x="4042160" y="1196566"/>
+                <a:ext cx="161145" cy="161145"/>
+              </a:xfrm>
+              <a:prstGeom prst="ellipse">
+                <a:avLst/>
+              </a:prstGeom>
+              <a:grpFill/>
+              <a:ln w="25400" cap="rnd" cmpd="sng" algn="ctr">
+                <a:noFill/>
+                <a:prstDash val="solid"/>
+              </a:ln>
+              <a:effectLst/>
+            </p:spPr>
+            <p:txBody>
+              <a:bodyPr wrap="none" rtlCol="0" anchor="ctr"/>
+              <a:lstStyle/>
+              <a:p>
+                <a:pPr marL="0" marR="0" lvl="0" indent="0" algn="ctr" defTabSz="914400" eaLnBrk="1" fontAlgn="auto" latinLnBrk="0" hangingPunct="1">
+                  <a:lnSpc>
+                    <a:spcPct val="100000"/>
+                  </a:lnSpc>
+                  <a:spcBef>
+                    <a:spcPts val="0"/>
+                  </a:spcBef>
+                  <a:spcAft>
+                    <a:spcPts val="0"/>
+                  </a:spcAft>
+                  <a:buClrTx/>
+                  <a:buSzTx/>
+                  <a:buFontTx/>
+                  <a:buNone/>
+                  <a:tabLst/>
+                  <a:defRPr/>
+                </a:pPr>
+                <a:endParaRPr kumimoji="0" lang="en-US" sz="4400" i="0" u="none" strike="noStrike" kern="0" cap="none" spc="0" normalizeH="0" baseline="0">
+                  <a:ln>
+                    <a:noFill/>
+                  </a:ln>
+                  <a:solidFill>
+                    <a:prstClr val="white"/>
+                  </a:solidFill>
+                  <a:effectLst/>
+                  <a:uLnTx/>
+                  <a:uFillTx/>
+                  <a:latin typeface="+mj-lt"/>
+                  <a:cs typeface="Arial" pitchFamily="34" charset="0"/>
+                </a:endParaRPr>
+              </a:p>
+            </p:txBody>
+          </p:sp>
+          <p:sp>
+            <p:nvSpPr>
+              <p:cNvPr id="35" name="Oval 32">
+                <a:extLst>
+                  <a:ext uri="{FF2B5EF4-FFF2-40B4-BE49-F238E27FC236}">
+                    <a16:creationId xmlns:a16="http://schemas.microsoft.com/office/drawing/2014/main" id="{B86A9EA5-24F9-4D3F-AB41-726B8B8B7C20}"/>
+                  </a:ext>
+                </a:extLst>
+              </p:cNvPr>
+              <p:cNvSpPr/>
+              <p:nvPr/>
+            </p:nvSpPr>
+            <p:spPr>
+              <a:xfrm rot="1800000">
+                <a:off x="4394610" y="1398686"/>
+                <a:ext cx="161145" cy="161145"/>
+              </a:xfrm>
+              <a:prstGeom prst="ellipse">
+                <a:avLst/>
+              </a:prstGeom>
+              <a:grpFill/>
+              <a:ln w="25400" cap="rnd" cmpd="sng" algn="ctr">
+                <a:noFill/>
+                <a:prstDash val="solid"/>
+              </a:ln>
+              <a:effectLst/>
+            </p:spPr>
+            <p:txBody>
+              <a:bodyPr wrap="none" rtlCol="0" anchor="ctr"/>
+              <a:lstStyle/>
+              <a:p>
+                <a:pPr marL="0" marR="0" lvl="0" indent="0" algn="ctr" defTabSz="914400" eaLnBrk="1" fontAlgn="auto" latinLnBrk="0" hangingPunct="1">
+                  <a:lnSpc>
+                    <a:spcPct val="100000"/>
+                  </a:lnSpc>
+                  <a:spcBef>
+                    <a:spcPts val="0"/>
+                  </a:spcBef>
+                  <a:spcAft>
+                    <a:spcPts val="0"/>
+                  </a:spcAft>
+                  <a:buClrTx/>
+                  <a:buSzTx/>
+                  <a:buFontTx/>
+                  <a:buNone/>
+                  <a:tabLst/>
+                  <a:defRPr/>
+                </a:pPr>
+                <a:endParaRPr kumimoji="0" lang="en-US" sz="4400" i="0" u="none" strike="noStrike" kern="0" cap="none" spc="0" normalizeH="0" baseline="0">
+                  <a:ln>
+                    <a:noFill/>
+                  </a:ln>
+                  <a:solidFill>
+                    <a:prstClr val="white"/>
+                  </a:solidFill>
+                  <a:effectLst/>
+                  <a:uLnTx/>
+                  <a:uFillTx/>
+                  <a:latin typeface="+mj-lt"/>
+                  <a:cs typeface="Arial" pitchFamily="34" charset="0"/>
+                </a:endParaRPr>
+              </a:p>
+            </p:txBody>
+          </p:sp>
+        </p:grpSp>
+      </p:grpSp>
+      <p:sp>
+        <p:nvSpPr>
+          <p:cNvPr id="36" name="Down Arrow 40">
+            <a:extLst>
+              <a:ext uri="{FF2B5EF4-FFF2-40B4-BE49-F238E27FC236}">
+                <a16:creationId xmlns:a16="http://schemas.microsoft.com/office/drawing/2014/main" id="{0FE59E28-4CBD-4783-85B2-324EB3670127}"/>
+              </a:ext>
+            </a:extLst>
+          </p:cNvPr>
+          <p:cNvSpPr/>
+          <p:nvPr/>
+        </p:nvSpPr>
+        <p:spPr>
+          <a:xfrm rot="5400000">
+            <a:off x="7079965" y="3000132"/>
+            <a:ext cx="439632" cy="518965"/>
+          </a:xfrm>
+          <a:prstGeom prst="downArrow">
+            <a:avLst>
+              <a:gd name="adj1" fmla="val 50000"/>
+              <a:gd name="adj2" fmla="val 50000"/>
+            </a:avLst>
+          </a:prstGeom>
+          <a:solidFill>
+            <a:schemeClr val="bg1">
+              <a:lumMod val="75000"/>
+            </a:schemeClr>
+          </a:solidFill>
+          <a:ln>
+            <a:noFill/>
+          </a:ln>
+        </p:spPr>
+        <p:style>
+          <a:lnRef idx="2">
+            <a:schemeClr val="accent1">
+              <a:shade val="50000"/>
+            </a:schemeClr>
+          </a:lnRef>
+          <a:fillRef idx="1">
+            <a:schemeClr val="accent1"/>
+          </a:fillRef>
+          <a:effectRef idx="0">
+            <a:schemeClr val="accent1"/>
+          </a:effectRef>
+          <a:fontRef idx="minor">
+            <a:schemeClr val="lt1"/>
+          </a:fontRef>
+        </p:style>
+        <p:txBody>
+          <a:bodyPr rtlCol="0" anchor="ctr"/>
+          <a:lstStyle/>
+          <a:p>
+            <a:pPr algn="ctr"/>
+            <a:endParaRPr lang="en-US">
+              <a:latin typeface="+mj-lt"/>
+              <a:cs typeface="Arial" pitchFamily="34" charset="0"/>
+            </a:endParaRPr>
+          </a:p>
+        </p:txBody>
+      </p:sp>
+      <p:sp>
+        <p:nvSpPr>
+          <p:cNvPr id="37" name="Down Arrow 40">
+            <a:extLst>
+              <a:ext uri="{FF2B5EF4-FFF2-40B4-BE49-F238E27FC236}">
+                <a16:creationId xmlns:a16="http://schemas.microsoft.com/office/drawing/2014/main" id="{A0B76F1B-01A8-4996-9734-5669198AA028}"/>
+              </a:ext>
+            </a:extLst>
+          </p:cNvPr>
+          <p:cNvSpPr/>
+          <p:nvPr/>
+        </p:nvSpPr>
+        <p:spPr>
+          <a:xfrm rot="5400000">
+            <a:off x="4552296" y="3004366"/>
+            <a:ext cx="439632" cy="518965"/>
+          </a:xfrm>
+          <a:prstGeom prst="downArrow">
+            <a:avLst>
+              <a:gd name="adj1" fmla="val 50000"/>
+              <a:gd name="adj2" fmla="val 50000"/>
+            </a:avLst>
+          </a:prstGeom>
+          <a:solidFill>
+            <a:schemeClr val="bg1">
+              <a:lumMod val="75000"/>
+            </a:schemeClr>
+          </a:solidFill>
+          <a:ln>
+            <a:noFill/>
+          </a:ln>
+        </p:spPr>
+        <p:style>
+          <a:lnRef idx="2">
+            <a:schemeClr val="accent1">
+              <a:shade val="50000"/>
+            </a:schemeClr>
+          </a:lnRef>
+          <a:fillRef idx="1">
+            <a:schemeClr val="accent1"/>
+          </a:fillRef>
+          <a:effectRef idx="0">
+            <a:schemeClr val="accent1"/>
+          </a:effectRef>
+          <a:fontRef idx="minor">
+            <a:schemeClr val="lt1"/>
+          </a:fontRef>
+        </p:style>
+        <p:txBody>
+          <a:bodyPr rtlCol="0" anchor="ctr"/>
+          <a:lstStyle/>
+          <a:p>
+            <a:pPr algn="ctr"/>
+            <a:endParaRPr lang="en-US">
+              <a:latin typeface="+mj-lt"/>
+              <a:cs typeface="Arial" pitchFamily="34" charset="0"/>
+            </a:endParaRPr>
+          </a:p>
+        </p:txBody>
+      </p:sp>
+    </p:spTree>
+    <p:extLst>
+      <p:ext uri="{BB962C8B-B14F-4D97-AF65-F5344CB8AC3E}">
+        <p14:creationId xmlns:p14="http://schemas.microsoft.com/office/powerpoint/2010/main" val="4084058221"/>
+      </p:ext>
+    </p:extLst>
+  </p:cSld>
+  <p:clrMapOvr>
+    <a:masterClrMapping/>
+  </p:clrMapOvr>
+</p:sld>
+</file>
+
+<file path=ppt/slides/slide5.xml><?xml version="1.0" encoding="utf-8"?>
+<p:sld xmlns:a="http://schemas.openxmlformats.org/drawingml/2006/main" xmlns:r="http://schemas.openxmlformats.org/officeDocument/2006/relationships" xmlns:p="http://schemas.openxmlformats.org/presentationml/2006/main">
+  <p:cSld>
+    <p:spTree>
+      <p:nvGrpSpPr>
+        <p:cNvPr id="1" name=""/>
+        <p:cNvGrpSpPr/>
+        <p:nvPr/>
+      </p:nvGrpSpPr>
+      <p:grpSpPr>
+        <a:xfrm>
+          <a:off x="0" y="0"/>
+          <a:ext cx="0" cy="0"/>
+          <a:chOff x="0" y="0"/>
+          <a:chExt cx="0" cy="0"/>
+        </a:xfrm>
+      </p:grpSpPr>
+      <p:sp>
+        <p:nvSpPr>
           <p:cNvPr id="6" name="正方形/長方形 5">
             <a:extLst>
               <a:ext uri="{FF2B5EF4-FFF2-40B4-BE49-F238E27FC236}">
@@ -6781,7 +8544,7 @@
 </p:sld>
 </file>
 
-<file path=ppt/slides/slide5.xml><?xml version="1.0" encoding="utf-8"?>
+<file path=ppt/slides/slide6.xml><?xml version="1.0" encoding="utf-8"?>
 <p:sld xmlns:a="http://schemas.openxmlformats.org/drawingml/2006/main" xmlns:r="http://schemas.openxmlformats.org/officeDocument/2006/relationships" xmlns:p="http://schemas.openxmlformats.org/presentationml/2006/main">
   <p:cSld>
     <p:spTree>
@@ -7871,7 +9634,7 @@
 </p:sld>
 </file>
 
-<file path=ppt/slides/slide6.xml><?xml version="1.0" encoding="utf-8"?>
+<file path=ppt/slides/slide7.xml><?xml version="1.0" encoding="utf-8"?>
 <p:sld xmlns:a="http://schemas.openxmlformats.org/drawingml/2006/main" xmlns:r="http://schemas.openxmlformats.org/officeDocument/2006/relationships" xmlns:p="http://schemas.openxmlformats.org/presentationml/2006/main">
   <p:cSld>
     <p:spTree>
@@ -8933,6 +10696,2100 @@
     <p:extLst>
       <p:ext uri="{BB962C8B-B14F-4D97-AF65-F5344CB8AC3E}">
         <p14:creationId xmlns:p14="http://schemas.microsoft.com/office/powerpoint/2010/main" val="3631579567"/>
+      </p:ext>
+    </p:extLst>
+  </p:cSld>
+  <p:clrMapOvr>
+    <a:masterClrMapping/>
+  </p:clrMapOvr>
+</p:sld>
+</file>
+
+<file path=ppt/slides/slide8.xml><?xml version="1.0" encoding="utf-8"?>
+<p:sld xmlns:a="http://schemas.openxmlformats.org/drawingml/2006/main" xmlns:r="http://schemas.openxmlformats.org/officeDocument/2006/relationships" xmlns:p="http://schemas.openxmlformats.org/presentationml/2006/main">
+  <p:cSld>
+    <p:spTree>
+      <p:nvGrpSpPr>
+        <p:cNvPr id="1" name=""/>
+        <p:cNvGrpSpPr/>
+        <p:nvPr/>
+      </p:nvGrpSpPr>
+      <p:grpSpPr>
+        <a:xfrm>
+          <a:off x="0" y="0"/>
+          <a:ext cx="0" cy="0"/>
+          <a:chOff x="0" y="0"/>
+          <a:chExt cx="0" cy="0"/>
+        </a:xfrm>
+      </p:grpSpPr>
+      <p:sp>
+        <p:nvSpPr>
+          <p:cNvPr id="24" name="正方形/長方形 23">
+            <a:extLst>
+              <a:ext uri="{FF2B5EF4-FFF2-40B4-BE49-F238E27FC236}">
+                <a16:creationId xmlns:a16="http://schemas.microsoft.com/office/drawing/2014/main" id="{7F22FDF9-CD34-44FC-A142-278E1B05C7F2}"/>
+              </a:ext>
+            </a:extLst>
+          </p:cNvPr>
+          <p:cNvSpPr/>
+          <p:nvPr/>
+        </p:nvSpPr>
+        <p:spPr>
+          <a:xfrm>
+            <a:off x="-1264880" y="2002163"/>
+            <a:ext cx="14588565" cy="2853674"/>
+          </a:xfrm>
+          <a:prstGeom prst="rect">
+            <a:avLst/>
+          </a:prstGeom>
+          <a:solidFill>
+            <a:schemeClr val="bg1"/>
+          </a:solidFill>
+          <a:ln>
+            <a:noFill/>
+          </a:ln>
+        </p:spPr>
+        <p:style>
+          <a:lnRef idx="2">
+            <a:schemeClr val="accent1">
+              <a:shade val="50000"/>
+            </a:schemeClr>
+          </a:lnRef>
+          <a:fillRef idx="1">
+            <a:schemeClr val="accent1"/>
+          </a:fillRef>
+          <a:effectRef idx="0">
+            <a:schemeClr val="accent1"/>
+          </a:effectRef>
+          <a:fontRef idx="minor">
+            <a:schemeClr val="lt1"/>
+          </a:fontRef>
+        </p:style>
+        <p:txBody>
+          <a:bodyPr rtlCol="0" anchor="ctr"/>
+          <a:lstStyle/>
+          <a:p>
+            <a:pPr algn="ctr"/>
+            <a:endParaRPr kumimoji="1" lang="ja-JP" altLang="en-US"/>
+          </a:p>
+        </p:txBody>
+      </p:sp>
+      <p:sp>
+        <p:nvSpPr>
+          <p:cNvPr id="6" name="四角形: 角を丸くする 5">
+            <a:extLst>
+              <a:ext uri="{FF2B5EF4-FFF2-40B4-BE49-F238E27FC236}">
+                <a16:creationId xmlns:a16="http://schemas.microsoft.com/office/drawing/2014/main" id="{E1883DBD-7E83-4F3C-8FC8-563AEB36A257}"/>
+              </a:ext>
+            </a:extLst>
+          </p:cNvPr>
+          <p:cNvSpPr/>
+          <p:nvPr/>
+        </p:nvSpPr>
+        <p:spPr>
+          <a:xfrm>
+            <a:off x="-1007117" y="2989132"/>
+            <a:ext cx="2654969" cy="1119418"/>
+          </a:xfrm>
+          <a:prstGeom prst="roundRect">
+            <a:avLst/>
+          </a:prstGeom>
+          <a:solidFill>
+            <a:srgbClr val="7F7F7F"/>
+          </a:solidFill>
+          <a:ln>
+            <a:noFill/>
+          </a:ln>
+          <a:effectLst>
+            <a:outerShdw blurRad="50800" dist="38100" dir="2700000" algn="tl" rotWithShape="0">
+              <a:prstClr val="black">
+                <a:alpha val="40000"/>
+              </a:prstClr>
+            </a:outerShdw>
+          </a:effectLst>
+        </p:spPr>
+        <p:style>
+          <a:lnRef idx="3">
+            <a:schemeClr val="lt1"/>
+          </a:lnRef>
+          <a:fillRef idx="1">
+            <a:schemeClr val="accent3"/>
+          </a:fillRef>
+          <a:effectRef idx="1">
+            <a:schemeClr val="accent3"/>
+          </a:effectRef>
+          <a:fontRef idx="minor">
+            <a:schemeClr val="lt1"/>
+          </a:fontRef>
+        </p:style>
+        <p:txBody>
+          <a:bodyPr lIns="72000" tIns="36000" rIns="72000" bIns="36000" rtlCol="0" anchor="t"/>
+          <a:lstStyle/>
+          <a:p>
+            <a:pPr algn="ctr"/>
+            <a:r>
+              <a:rPr kumimoji="1" lang="en-US" altLang="ja-JP" sz="2400" b="1" dirty="0">
+                <a:solidFill>
+                  <a:schemeClr val="tx1"/>
+                </a:solidFill>
+              </a:rPr>
+              <a:t>Application</a:t>
+            </a:r>
+          </a:p>
+        </p:txBody>
+      </p:sp>
+      <p:sp>
+        <p:nvSpPr>
+          <p:cNvPr id="8" name="四角形: 角を丸くする 7">
+            <a:extLst>
+              <a:ext uri="{FF2B5EF4-FFF2-40B4-BE49-F238E27FC236}">
+                <a16:creationId xmlns:a16="http://schemas.microsoft.com/office/drawing/2014/main" id="{A4B36517-6546-4324-B602-66920A143647}"/>
+              </a:ext>
+            </a:extLst>
+          </p:cNvPr>
+          <p:cNvSpPr/>
+          <p:nvPr/>
+        </p:nvSpPr>
+        <p:spPr>
+          <a:xfrm>
+            <a:off x="4702233" y="2996782"/>
+            <a:ext cx="2656800" cy="1119418"/>
+          </a:xfrm>
+          <a:prstGeom prst="roundRect">
+            <a:avLst/>
+          </a:prstGeom>
+          <a:solidFill>
+            <a:srgbClr val="7F7F7F"/>
+          </a:solidFill>
+          <a:ln>
+            <a:noFill/>
+          </a:ln>
+          <a:effectLst>
+            <a:outerShdw blurRad="50800" dist="38100" dir="2700000" algn="tl" rotWithShape="0">
+              <a:prstClr val="black">
+                <a:alpha val="40000"/>
+              </a:prstClr>
+            </a:outerShdw>
+          </a:effectLst>
+        </p:spPr>
+        <p:style>
+          <a:lnRef idx="3">
+            <a:schemeClr val="lt1"/>
+          </a:lnRef>
+          <a:fillRef idx="1">
+            <a:schemeClr val="accent3"/>
+          </a:fillRef>
+          <a:effectRef idx="1">
+            <a:schemeClr val="accent3"/>
+          </a:effectRef>
+          <a:fontRef idx="minor">
+            <a:schemeClr val="lt1"/>
+          </a:fontRef>
+        </p:style>
+        <p:txBody>
+          <a:bodyPr lIns="72000" tIns="36000" rIns="72000" bIns="36000" rtlCol="0" anchor="t"/>
+          <a:lstStyle/>
+          <a:p>
+            <a:pPr algn="ctr"/>
+            <a:r>
+              <a:rPr kumimoji="1" lang="en-US" altLang="ja-JP" sz="2400" b="1" dirty="0">
+                <a:solidFill>
+                  <a:schemeClr val="tx1"/>
+                </a:solidFill>
+              </a:rPr>
+              <a:t>Proxy</a:t>
+            </a:r>
+          </a:p>
+        </p:txBody>
+      </p:sp>
+      <p:sp>
+        <p:nvSpPr>
+          <p:cNvPr id="9" name="四角形: 角を丸くする 8">
+            <a:extLst>
+              <a:ext uri="{FF2B5EF4-FFF2-40B4-BE49-F238E27FC236}">
+                <a16:creationId xmlns:a16="http://schemas.microsoft.com/office/drawing/2014/main" id="{478343BE-306E-4657-841B-17ACD2762DA9}"/>
+              </a:ext>
+            </a:extLst>
+          </p:cNvPr>
+          <p:cNvSpPr/>
+          <p:nvPr/>
+        </p:nvSpPr>
+        <p:spPr>
+          <a:xfrm>
+            <a:off x="2273464" y="-866437"/>
+            <a:ext cx="812800" cy="440267"/>
+          </a:xfrm>
+          <a:prstGeom prst="roundRect">
+            <a:avLst/>
+          </a:prstGeom>
+          <a:solidFill>
+            <a:srgbClr val="00B050"/>
+          </a:solidFill>
+          <a:ln>
+            <a:noFill/>
+          </a:ln>
+        </p:spPr>
+        <p:style>
+          <a:lnRef idx="1">
+            <a:schemeClr val="accent5"/>
+          </a:lnRef>
+          <a:fillRef idx="3">
+            <a:schemeClr val="accent5"/>
+          </a:fillRef>
+          <a:effectRef idx="2">
+            <a:schemeClr val="accent5"/>
+          </a:effectRef>
+          <a:fontRef idx="minor">
+            <a:schemeClr val="lt1"/>
+          </a:fontRef>
+        </p:style>
+        <p:txBody>
+          <a:bodyPr rtlCol="0" anchor="ctr"/>
+          <a:lstStyle/>
+          <a:p>
+            <a:pPr algn="ctr"/>
+            <a:r>
+              <a:rPr kumimoji="1" lang="en-US" altLang="ja-JP" sz="3200" dirty="0"/>
+              <a:t>C</a:t>
+            </a:r>
+            <a:endParaRPr kumimoji="1" lang="ja-JP" altLang="en-US" sz="3200" dirty="0"/>
+          </a:p>
+        </p:txBody>
+      </p:sp>
+      <p:sp>
+        <p:nvSpPr>
+          <p:cNvPr id="10" name="四角形: 角を丸くする 9">
+            <a:extLst>
+              <a:ext uri="{FF2B5EF4-FFF2-40B4-BE49-F238E27FC236}">
+                <a16:creationId xmlns:a16="http://schemas.microsoft.com/office/drawing/2014/main" id="{7F7394D1-AB71-4F83-88CF-0D70AEA90BB3}"/>
+              </a:ext>
+            </a:extLst>
+          </p:cNvPr>
+          <p:cNvSpPr/>
+          <p:nvPr/>
+        </p:nvSpPr>
+        <p:spPr>
+          <a:xfrm>
+            <a:off x="4812522" y="3556491"/>
+            <a:ext cx="1205375" cy="432617"/>
+          </a:xfrm>
+          <a:prstGeom prst="roundRect">
+            <a:avLst/>
+          </a:prstGeom>
+          <a:solidFill>
+            <a:srgbClr val="00B050"/>
+          </a:solidFill>
+          <a:ln>
+            <a:noFill/>
+          </a:ln>
+        </p:spPr>
+        <p:style>
+          <a:lnRef idx="1">
+            <a:schemeClr val="accent5"/>
+          </a:lnRef>
+          <a:fillRef idx="3">
+            <a:schemeClr val="accent5"/>
+          </a:fillRef>
+          <a:effectRef idx="2">
+            <a:schemeClr val="accent5"/>
+          </a:effectRef>
+          <a:fontRef idx="minor">
+            <a:schemeClr val="lt1"/>
+          </a:fontRef>
+        </p:style>
+        <p:txBody>
+          <a:bodyPr rtlCol="0" anchor="ctr"/>
+          <a:lstStyle/>
+          <a:p>
+            <a:pPr algn="ctr">
+              <a:lnSpc>
+                <a:spcPct val="80000"/>
+              </a:lnSpc>
+            </a:pPr>
+            <a:r>
+              <a:rPr lang="en-US" altLang="ja-JP" sz="2000" dirty="0"/>
+              <a:t>Exposed</a:t>
+            </a:r>
+          </a:p>
+          <a:p>
+            <a:pPr algn="ctr">
+              <a:lnSpc>
+                <a:spcPct val="80000"/>
+              </a:lnSpc>
+            </a:pPr>
+            <a:r>
+              <a:rPr lang="en-US" altLang="ja-JP" sz="2000" dirty="0"/>
+              <a:t>Thing</a:t>
+            </a:r>
+            <a:endParaRPr kumimoji="1" lang="ja-JP" altLang="en-US" sz="2000" dirty="0"/>
+          </a:p>
+        </p:txBody>
+      </p:sp>
+      <p:sp>
+        <p:nvSpPr>
+          <p:cNvPr id="13" name="四角形: 角を丸くする 12">
+            <a:extLst>
+              <a:ext uri="{FF2B5EF4-FFF2-40B4-BE49-F238E27FC236}">
+                <a16:creationId xmlns:a16="http://schemas.microsoft.com/office/drawing/2014/main" id="{B5CD2B9F-227C-466A-9DC6-760504E532C1}"/>
+              </a:ext>
+            </a:extLst>
+          </p:cNvPr>
+          <p:cNvSpPr/>
+          <p:nvPr/>
+        </p:nvSpPr>
+        <p:spPr>
+          <a:xfrm>
+            <a:off x="7421657" y="-1333106"/>
+            <a:ext cx="812800" cy="440267"/>
+          </a:xfrm>
+          <a:prstGeom prst="roundRect">
+            <a:avLst/>
+          </a:prstGeom>
+          <a:solidFill>
+            <a:srgbClr val="00B050"/>
+          </a:solidFill>
+          <a:ln>
+            <a:noFill/>
+          </a:ln>
+        </p:spPr>
+        <p:style>
+          <a:lnRef idx="1">
+            <a:schemeClr val="accent5"/>
+          </a:lnRef>
+          <a:fillRef idx="3">
+            <a:schemeClr val="accent5"/>
+          </a:fillRef>
+          <a:effectRef idx="2">
+            <a:schemeClr val="accent5"/>
+          </a:effectRef>
+          <a:fontRef idx="minor">
+            <a:schemeClr val="lt1"/>
+          </a:fontRef>
+        </p:style>
+        <p:txBody>
+          <a:bodyPr rtlCol="0" anchor="ctr"/>
+          <a:lstStyle/>
+          <a:p>
+            <a:pPr algn="ctr"/>
+            <a:r>
+              <a:rPr kumimoji="1" lang="en-US" altLang="ja-JP" sz="3200" dirty="0"/>
+              <a:t>C</a:t>
+            </a:r>
+            <a:endParaRPr kumimoji="1" lang="ja-JP" altLang="en-US" sz="3200" dirty="0"/>
+          </a:p>
+        </p:txBody>
+      </p:sp>
+      <p:sp>
+        <p:nvSpPr>
+          <p:cNvPr id="14" name="四角形: 角を丸くする 13">
+            <a:extLst>
+              <a:ext uri="{FF2B5EF4-FFF2-40B4-BE49-F238E27FC236}">
+                <a16:creationId xmlns:a16="http://schemas.microsoft.com/office/drawing/2014/main" id="{DAC9719D-BC55-4BAA-827B-3741647E133B}"/>
+              </a:ext>
+            </a:extLst>
+          </p:cNvPr>
+          <p:cNvSpPr/>
+          <p:nvPr/>
+        </p:nvSpPr>
+        <p:spPr>
+          <a:xfrm>
+            <a:off x="7421657" y="-2008619"/>
+            <a:ext cx="812800" cy="440267"/>
+          </a:xfrm>
+          <a:prstGeom prst="roundRect">
+            <a:avLst/>
+          </a:prstGeom>
+          <a:solidFill>
+            <a:srgbClr val="00B050"/>
+          </a:solidFill>
+          <a:ln>
+            <a:noFill/>
+          </a:ln>
+        </p:spPr>
+        <p:style>
+          <a:lnRef idx="1">
+            <a:schemeClr val="accent5"/>
+          </a:lnRef>
+          <a:fillRef idx="3">
+            <a:schemeClr val="accent5"/>
+          </a:fillRef>
+          <a:effectRef idx="2">
+            <a:schemeClr val="accent5"/>
+          </a:effectRef>
+          <a:fontRef idx="minor">
+            <a:schemeClr val="lt1"/>
+          </a:fontRef>
+        </p:style>
+        <p:txBody>
+          <a:bodyPr rtlCol="0" anchor="ctr"/>
+          <a:lstStyle/>
+          <a:p>
+            <a:pPr algn="ctr"/>
+            <a:r>
+              <a:rPr kumimoji="1" lang="en-US" altLang="ja-JP" sz="3200" dirty="0"/>
+              <a:t>E</a:t>
+            </a:r>
+            <a:endParaRPr kumimoji="1" lang="ja-JP" altLang="en-US" sz="3200" dirty="0"/>
+          </a:p>
+        </p:txBody>
+      </p:sp>
+      <p:sp>
+        <p:nvSpPr>
+          <p:cNvPr id="15" name="四角形: メモ 14">
+            <a:extLst>
+              <a:ext uri="{FF2B5EF4-FFF2-40B4-BE49-F238E27FC236}">
+                <a16:creationId xmlns:a16="http://schemas.microsoft.com/office/drawing/2014/main" id="{B13C0EAD-EA26-4ADA-AFD3-C60E5A7E354F}"/>
+              </a:ext>
+            </a:extLst>
+          </p:cNvPr>
+          <p:cNvSpPr/>
+          <p:nvPr/>
+        </p:nvSpPr>
+        <p:spPr>
+          <a:xfrm>
+            <a:off x="7421657" y="-646304"/>
+            <a:ext cx="812800" cy="440267"/>
+          </a:xfrm>
+          <a:prstGeom prst="foldedCorner">
+            <a:avLst/>
+          </a:prstGeom>
+          <a:solidFill>
+            <a:srgbClr val="4A7B7C"/>
+          </a:solidFill>
+          <a:ln>
+            <a:noFill/>
+          </a:ln>
+        </p:spPr>
+        <p:style>
+          <a:lnRef idx="1">
+            <a:schemeClr val="accent5"/>
+          </a:lnRef>
+          <a:fillRef idx="3">
+            <a:schemeClr val="accent5"/>
+          </a:fillRef>
+          <a:effectRef idx="2">
+            <a:schemeClr val="accent5"/>
+          </a:effectRef>
+          <a:fontRef idx="minor">
+            <a:schemeClr val="lt1"/>
+          </a:fontRef>
+        </p:style>
+        <p:txBody>
+          <a:bodyPr rtlCol="0" anchor="ctr"/>
+          <a:lstStyle/>
+          <a:p>
+            <a:pPr algn="ctr"/>
+            <a:r>
+              <a:rPr kumimoji="1" lang="en-US" altLang="ja-JP" sz="3200" dirty="0"/>
+              <a:t>TD</a:t>
+            </a:r>
+            <a:endParaRPr kumimoji="1" lang="ja-JP" altLang="en-US" sz="3200" dirty="0"/>
+          </a:p>
+        </p:txBody>
+      </p:sp>
+      <p:sp>
+        <p:nvSpPr>
+          <p:cNvPr id="16" name="テキスト ボックス 15">
+            <a:extLst>
+              <a:ext uri="{FF2B5EF4-FFF2-40B4-BE49-F238E27FC236}">
+                <a16:creationId xmlns:a16="http://schemas.microsoft.com/office/drawing/2014/main" id="{DF7894EE-1174-4828-B7DF-51B52BE5F642}"/>
+              </a:ext>
+            </a:extLst>
+          </p:cNvPr>
+          <p:cNvSpPr txBox="1"/>
+          <p:nvPr/>
+        </p:nvSpPr>
+        <p:spPr>
+          <a:xfrm>
+            <a:off x="8448945" y="-2111652"/>
+            <a:ext cx="2885726" cy="646331"/>
+          </a:xfrm>
+          <a:prstGeom prst="rect">
+            <a:avLst/>
+          </a:prstGeom>
+          <a:noFill/>
+        </p:spPr>
+        <p:txBody>
+          <a:bodyPr wrap="none" rtlCol="0">
+            <a:spAutoFit/>
+          </a:bodyPr>
+          <a:lstStyle/>
+          <a:p>
+            <a:r>
+              <a:rPr lang="en-US" altLang="ja-JP" sz="3600" dirty="0"/>
+              <a:t>Exposed</a:t>
+            </a:r>
+            <a:r>
+              <a:rPr lang="ja-JP" altLang="en-US" sz="3600" dirty="0"/>
+              <a:t> </a:t>
+            </a:r>
+            <a:r>
+              <a:rPr lang="en-US" altLang="ja-JP" sz="3600" dirty="0"/>
+              <a:t>Thing</a:t>
+            </a:r>
+            <a:endParaRPr kumimoji="1" lang="ja-JP" altLang="en-US" sz="3600" dirty="0"/>
+          </a:p>
+        </p:txBody>
+      </p:sp>
+      <p:sp>
+        <p:nvSpPr>
+          <p:cNvPr id="17" name="テキスト ボックス 16">
+            <a:extLst>
+              <a:ext uri="{FF2B5EF4-FFF2-40B4-BE49-F238E27FC236}">
+                <a16:creationId xmlns:a16="http://schemas.microsoft.com/office/drawing/2014/main" id="{0CF33ABF-3C66-435D-B875-AA53D751472E}"/>
+              </a:ext>
+            </a:extLst>
+          </p:cNvPr>
+          <p:cNvSpPr txBox="1"/>
+          <p:nvPr/>
+        </p:nvSpPr>
+        <p:spPr>
+          <a:xfrm>
+            <a:off x="8448945" y="-1429103"/>
+            <a:ext cx="3316934" cy="646331"/>
+          </a:xfrm>
+          <a:prstGeom prst="rect">
+            <a:avLst/>
+          </a:prstGeom>
+          <a:noFill/>
+        </p:spPr>
+        <p:txBody>
+          <a:bodyPr wrap="none" rtlCol="0">
+            <a:spAutoFit/>
+          </a:bodyPr>
+          <a:lstStyle/>
+          <a:p>
+            <a:r>
+              <a:rPr lang="en-US" altLang="ja-JP" sz="3600" dirty="0"/>
+              <a:t>Consumed Thing</a:t>
+            </a:r>
+            <a:endParaRPr kumimoji="1" lang="ja-JP" altLang="en-US" sz="3600" dirty="0"/>
+          </a:p>
+        </p:txBody>
+      </p:sp>
+      <p:sp>
+        <p:nvSpPr>
+          <p:cNvPr id="18" name="テキスト ボックス 17">
+            <a:extLst>
+              <a:ext uri="{FF2B5EF4-FFF2-40B4-BE49-F238E27FC236}">
+                <a16:creationId xmlns:a16="http://schemas.microsoft.com/office/drawing/2014/main" id="{F4CC1D14-7AA6-41AD-85BC-5B3BD9AC308C}"/>
+              </a:ext>
+            </a:extLst>
+          </p:cNvPr>
+          <p:cNvSpPr txBox="1"/>
+          <p:nvPr/>
+        </p:nvSpPr>
+        <p:spPr>
+          <a:xfrm>
+            <a:off x="8448945" y="-746554"/>
+            <a:ext cx="3462358" cy="646331"/>
+          </a:xfrm>
+          <a:prstGeom prst="rect">
+            <a:avLst/>
+          </a:prstGeom>
+          <a:noFill/>
+        </p:spPr>
+        <p:txBody>
+          <a:bodyPr wrap="none" rtlCol="0">
+            <a:spAutoFit/>
+          </a:bodyPr>
+          <a:lstStyle/>
+          <a:p>
+            <a:r>
+              <a:rPr lang="en-US" altLang="ja-JP" sz="3600" dirty="0"/>
+              <a:t>Thing Description</a:t>
+            </a:r>
+            <a:endParaRPr kumimoji="1" lang="ja-JP" altLang="en-US" sz="3600" dirty="0"/>
+          </a:p>
+        </p:txBody>
+      </p:sp>
+      <p:cxnSp>
+        <p:nvCxnSpPr>
+          <p:cNvPr id="21" name="直線矢印コネクタ 20">
+            <a:extLst>
+              <a:ext uri="{FF2B5EF4-FFF2-40B4-BE49-F238E27FC236}">
+                <a16:creationId xmlns:a16="http://schemas.microsoft.com/office/drawing/2014/main" id="{36428CDD-CC0D-4876-9F07-F4A6D227D45A}"/>
+              </a:ext>
+            </a:extLst>
+          </p:cNvPr>
+          <p:cNvCxnSpPr>
+            <a:cxnSpLocks/>
+          </p:cNvCxnSpPr>
+          <p:nvPr/>
+        </p:nvCxnSpPr>
+        <p:spPr>
+          <a:xfrm flipH="1">
+            <a:off x="2136189" y="-180230"/>
+            <a:ext cx="1389094" cy="0"/>
+          </a:xfrm>
+          <a:prstGeom prst="straightConnector1">
+            <a:avLst/>
+          </a:prstGeom>
+          <a:ln w="57150">
+            <a:solidFill>
+              <a:schemeClr val="tx1"/>
+            </a:solidFill>
+            <a:prstDash val="sysDash"/>
+            <a:tailEnd type="triangle"/>
+          </a:ln>
+        </p:spPr>
+        <p:style>
+          <a:lnRef idx="1">
+            <a:schemeClr val="accent1"/>
+          </a:lnRef>
+          <a:fillRef idx="0">
+            <a:schemeClr val="accent1"/>
+          </a:fillRef>
+          <a:effectRef idx="0">
+            <a:schemeClr val="accent1"/>
+          </a:effectRef>
+          <a:fontRef idx="minor">
+            <a:schemeClr val="tx1"/>
+          </a:fontRef>
+        </p:style>
+      </p:cxnSp>
+      <p:sp>
+        <p:nvSpPr>
+          <p:cNvPr id="19" name="四角形: 角を丸くする 18">
+            <a:extLst>
+              <a:ext uri="{FF2B5EF4-FFF2-40B4-BE49-F238E27FC236}">
+                <a16:creationId xmlns:a16="http://schemas.microsoft.com/office/drawing/2014/main" id="{46146C38-6712-4A36-BEAE-7DD2A922D693}"/>
+              </a:ext>
+            </a:extLst>
+          </p:cNvPr>
+          <p:cNvSpPr/>
+          <p:nvPr/>
+        </p:nvSpPr>
+        <p:spPr>
+          <a:xfrm>
+            <a:off x="-820644" y="3548841"/>
+            <a:ext cx="2282021" cy="440267"/>
+          </a:xfrm>
+          <a:prstGeom prst="roundRect">
+            <a:avLst/>
+          </a:prstGeom>
+          <a:solidFill>
+            <a:srgbClr val="00B050"/>
+          </a:solidFill>
+          <a:ln>
+            <a:noFill/>
+          </a:ln>
+        </p:spPr>
+        <p:style>
+          <a:lnRef idx="1">
+            <a:schemeClr val="accent5"/>
+          </a:lnRef>
+          <a:fillRef idx="3">
+            <a:schemeClr val="accent5"/>
+          </a:fillRef>
+          <a:effectRef idx="2">
+            <a:schemeClr val="accent5"/>
+          </a:effectRef>
+          <a:fontRef idx="minor">
+            <a:schemeClr val="lt1"/>
+          </a:fontRef>
+        </p:style>
+        <p:txBody>
+          <a:bodyPr wrap="none" rtlCol="0" anchor="ctr"/>
+          <a:lstStyle/>
+          <a:p>
+            <a:pPr algn="ctr"/>
+            <a:r>
+              <a:rPr kumimoji="1" lang="en-US" altLang="ja-JP" sz="2000" dirty="0"/>
+              <a:t>Consumed Thing</a:t>
+            </a:r>
+            <a:endParaRPr kumimoji="1" lang="ja-JP" altLang="en-US" sz="2000" dirty="0"/>
+          </a:p>
+        </p:txBody>
+      </p:sp>
+      <p:cxnSp>
+        <p:nvCxnSpPr>
+          <p:cNvPr id="25" name="Gerade Verbindung mit Pfeil 42">
+            <a:extLst>
+              <a:ext uri="{FF2B5EF4-FFF2-40B4-BE49-F238E27FC236}">
+                <a16:creationId xmlns:a16="http://schemas.microsoft.com/office/drawing/2014/main" id="{32FD418E-ACA3-4090-96FF-CBAAD989B740}"/>
+              </a:ext>
+            </a:extLst>
+          </p:cNvPr>
+          <p:cNvCxnSpPr>
+            <a:cxnSpLocks/>
+            <a:endCxn id="10" idx="1"/>
+          </p:cNvCxnSpPr>
+          <p:nvPr/>
+        </p:nvCxnSpPr>
+        <p:spPr>
+          <a:xfrm flipV="1">
+            <a:off x="1383689" y="3772800"/>
+            <a:ext cx="3428833" cy="11476"/>
+          </a:xfrm>
+          <a:prstGeom prst="straightConnector1">
+            <a:avLst/>
+          </a:prstGeom>
+          <a:ln w="38100">
+            <a:solidFill>
+              <a:srgbClr val="008000"/>
+            </a:solidFill>
+            <a:prstDash val="sysDot"/>
+            <a:headEnd type="arrow" w="med" len="med"/>
+            <a:tailEnd type="arrow" w="med" len="med"/>
+          </a:ln>
+        </p:spPr>
+        <p:style>
+          <a:lnRef idx="1">
+            <a:schemeClr val="accent1"/>
+          </a:lnRef>
+          <a:fillRef idx="0">
+            <a:schemeClr val="accent1"/>
+          </a:fillRef>
+          <a:effectRef idx="0">
+            <a:schemeClr val="accent1"/>
+          </a:effectRef>
+          <a:fontRef idx="minor">
+            <a:schemeClr val="tx1"/>
+          </a:fontRef>
+        </p:style>
+      </p:cxnSp>
+      <p:grpSp>
+        <p:nvGrpSpPr>
+          <p:cNvPr id="29" name="Group 38">
+            <a:extLst>
+              <a:ext uri="{FF2B5EF4-FFF2-40B4-BE49-F238E27FC236}">
+                <a16:creationId xmlns:a16="http://schemas.microsoft.com/office/drawing/2014/main" id="{4FFE457D-83D2-49D0-A0F3-DDFEEA55E2E5}"/>
+              </a:ext>
+            </a:extLst>
+          </p:cNvPr>
+          <p:cNvGrpSpPr/>
+          <p:nvPr/>
+        </p:nvGrpSpPr>
+        <p:grpSpPr>
+          <a:xfrm>
+            <a:off x="2188079" y="2728491"/>
+            <a:ext cx="2060941" cy="828000"/>
+            <a:chOff x="2670082" y="4186219"/>
+            <a:chExt cx="2060941" cy="828000"/>
+          </a:xfrm>
+        </p:grpSpPr>
+        <p:sp>
+          <p:nvSpPr>
+            <p:cNvPr id="30" name="角丸四角形 21">
+              <a:extLst>
+                <a:ext uri="{FF2B5EF4-FFF2-40B4-BE49-F238E27FC236}">
+                  <a16:creationId xmlns:a16="http://schemas.microsoft.com/office/drawing/2014/main" id="{024C5D63-C675-4753-B4EC-F2F06403B347}"/>
+                </a:ext>
+              </a:extLst>
+            </p:cNvPr>
+            <p:cNvSpPr/>
+            <p:nvPr/>
+          </p:nvSpPr>
+          <p:spPr bwMode="auto">
+            <a:xfrm>
+              <a:off x="2670082" y="4186219"/>
+              <a:ext cx="2060941" cy="828000"/>
+            </a:xfrm>
+            <a:prstGeom prst="foldedCorner">
+              <a:avLst>
+                <a:gd name="adj" fmla="val 20194"/>
+              </a:avLst>
+            </a:prstGeom>
+            <a:solidFill>
+              <a:srgbClr val="4A7B7C"/>
+            </a:solidFill>
+            <a:ln w="25400" cap="flat" cmpd="sng" algn="ctr">
+              <a:noFill/>
+              <a:prstDash val="solid"/>
+              <a:round/>
+              <a:headEnd type="none" w="med" len="med"/>
+              <a:tailEnd type="none" w="med" len="med"/>
+            </a:ln>
+            <a:effectLst/>
+            <a:extLst/>
+          </p:spPr>
+          <p:txBody>
+            <a:bodyPr vert="horz" wrap="none" lIns="432000" tIns="144000" rIns="0" bIns="0" numCol="1" rtlCol="0" anchor="ctr" anchorCtr="0" compatLnSpc="1">
+              <a:prstTxWarp prst="textNoShape">
+                <a:avLst/>
+              </a:prstTxWarp>
+              <a:noAutofit/>
+            </a:bodyPr>
+            <a:lstStyle/>
+            <a:p>
+              <a:pPr marL="0" marR="0" lvl="0" indent="0" algn="ctr" defTabSz="914400" eaLnBrk="1" fontAlgn="ctr" latinLnBrk="0" hangingPunct="1">
+                <a:lnSpc>
+                  <a:spcPct val="100000"/>
+                </a:lnSpc>
+                <a:spcBef>
+                  <a:spcPts val="0"/>
+                </a:spcBef>
+                <a:spcAft>
+                  <a:spcPts val="0"/>
+                </a:spcAft>
+                <a:buClrTx/>
+                <a:buSzTx/>
+                <a:buFontTx/>
+                <a:buNone/>
+                <a:tabLst/>
+                <a:defRPr/>
+              </a:pPr>
+              <a:r>
+                <a:rPr kumimoji="0" lang="en-US" altLang="ja-JP" sz="2000" i="0" u="none" strike="noStrike" kern="0" cap="none" spc="0" normalizeH="0" baseline="0" dirty="0">
+                  <a:ln>
+                    <a:noFill/>
+                  </a:ln>
+                  <a:solidFill>
+                    <a:prstClr val="white"/>
+                  </a:solidFill>
+                  <a:effectLst/>
+                  <a:uLnTx/>
+                  <a:uFillTx/>
+                  <a:latin typeface="+mj-lt"/>
+                  <a:ea typeface="HG明朝E" panose="02020909000000000000" pitchFamily="17" charset="-128"/>
+                  <a:cs typeface="Arial" pitchFamily="34" charset="0"/>
+                </a:rPr>
+                <a:t>Thing</a:t>
+              </a:r>
+              <a:br>
+                <a:rPr kumimoji="0" lang="en-US" altLang="ja-JP" sz="2000" i="0" u="none" strike="noStrike" kern="0" cap="none" spc="0" normalizeH="0" baseline="0" dirty="0">
+                  <a:ln>
+                    <a:noFill/>
+                  </a:ln>
+                  <a:solidFill>
+                    <a:prstClr val="white"/>
+                  </a:solidFill>
+                  <a:effectLst/>
+                  <a:uLnTx/>
+                  <a:uFillTx/>
+                  <a:latin typeface="+mj-lt"/>
+                  <a:ea typeface="HG明朝E" panose="02020909000000000000" pitchFamily="17" charset="-128"/>
+                  <a:cs typeface="Arial" pitchFamily="34" charset="0"/>
+                </a:rPr>
+              </a:br>
+              <a:r>
+                <a:rPr kumimoji="0" lang="en-US" altLang="ja-JP" sz="2000" i="0" u="none" strike="noStrike" kern="0" cap="none" spc="0" normalizeH="0" baseline="0" dirty="0">
+                  <a:ln>
+                    <a:noFill/>
+                  </a:ln>
+                  <a:solidFill>
+                    <a:prstClr val="white"/>
+                  </a:solidFill>
+                  <a:effectLst/>
+                  <a:uLnTx/>
+                  <a:uFillTx/>
+                  <a:latin typeface="+mj-lt"/>
+                  <a:ea typeface="HG明朝E" panose="02020909000000000000" pitchFamily="17" charset="-128"/>
+                  <a:cs typeface="Arial" pitchFamily="34" charset="0"/>
+                </a:rPr>
+                <a:t>Description</a:t>
+              </a:r>
+              <a:endParaRPr kumimoji="0" lang="en-US" altLang="ja-JP" sz="2800" i="0" u="none" strike="noStrike" kern="0" cap="none" spc="0" normalizeH="0" baseline="0" dirty="0">
+                <a:ln>
+                  <a:noFill/>
+                </a:ln>
+                <a:solidFill>
+                  <a:prstClr val="white"/>
+                </a:solidFill>
+                <a:effectLst/>
+                <a:uLnTx/>
+                <a:uFillTx/>
+                <a:latin typeface="+mj-lt"/>
+                <a:ea typeface="HG明朝E" panose="02020909000000000000" pitchFamily="17" charset="-128"/>
+                <a:cs typeface="Arial" pitchFamily="34" charset="0"/>
+              </a:endParaRPr>
+            </a:p>
+          </p:txBody>
+        </p:sp>
+        <p:grpSp>
+          <p:nvGrpSpPr>
+            <p:cNvPr id="31" name="Group 28">
+              <a:extLst>
+                <a:ext uri="{FF2B5EF4-FFF2-40B4-BE49-F238E27FC236}">
+                  <a16:creationId xmlns:a16="http://schemas.microsoft.com/office/drawing/2014/main" id="{A5488A5F-252B-4EB8-AA83-97711B5B4618}"/>
+                </a:ext>
+              </a:extLst>
+            </p:cNvPr>
+            <p:cNvGrpSpPr/>
+            <p:nvPr/>
+          </p:nvGrpSpPr>
+          <p:grpSpPr>
+            <a:xfrm>
+              <a:off x="2812207" y="4399725"/>
+              <a:ext cx="413417" cy="426971"/>
+              <a:chOff x="4042160" y="993559"/>
+              <a:chExt cx="548293" cy="566272"/>
+            </a:xfrm>
+            <a:solidFill>
+              <a:sysClr val="window" lastClr="FFFFFF"/>
+            </a:solidFill>
+          </p:grpSpPr>
+          <p:sp>
+            <p:nvSpPr>
+              <p:cNvPr id="32" name="Isosceles Triangle 29">
+                <a:extLst>
+                  <a:ext uri="{FF2B5EF4-FFF2-40B4-BE49-F238E27FC236}">
+                    <a16:creationId xmlns:a16="http://schemas.microsoft.com/office/drawing/2014/main" id="{AAB48341-E11F-47E0-ADE3-15F5732CB54D}"/>
+                  </a:ext>
+                </a:extLst>
+              </p:cNvPr>
+              <p:cNvSpPr/>
+              <p:nvPr/>
+            </p:nvSpPr>
+            <p:spPr>
+              <a:xfrm rot="1800000">
+                <a:off x="4184483" y="1052736"/>
+                <a:ext cx="405970" cy="349975"/>
+              </a:xfrm>
+              <a:prstGeom prst="triangle">
+                <a:avLst/>
+              </a:prstGeom>
+              <a:noFill/>
+              <a:ln w="28575" cap="rnd" cmpd="sng" algn="ctr">
+                <a:solidFill>
+                  <a:sysClr val="window" lastClr="FFFFFF"/>
+                </a:solidFill>
+                <a:prstDash val="solid"/>
+              </a:ln>
+              <a:effectLst/>
+            </p:spPr>
+            <p:txBody>
+              <a:bodyPr wrap="none" rtlCol="0" anchor="ctr"/>
+              <a:lstStyle/>
+              <a:p>
+                <a:pPr marL="0" marR="0" lvl="0" indent="0" algn="ctr" defTabSz="914400" eaLnBrk="1" fontAlgn="auto" latinLnBrk="0" hangingPunct="1">
+                  <a:lnSpc>
+                    <a:spcPct val="100000"/>
+                  </a:lnSpc>
+                  <a:spcBef>
+                    <a:spcPts val="0"/>
+                  </a:spcBef>
+                  <a:spcAft>
+                    <a:spcPts val="0"/>
+                  </a:spcAft>
+                  <a:buClrTx/>
+                  <a:buSzTx/>
+                  <a:buFontTx/>
+                  <a:buNone/>
+                  <a:tabLst/>
+                  <a:defRPr/>
+                </a:pPr>
+                <a:endParaRPr kumimoji="0" lang="en-US" sz="4400" i="0" u="none" strike="noStrike" kern="0" cap="none" spc="0" normalizeH="0" baseline="0">
+                  <a:ln>
+                    <a:noFill/>
+                  </a:ln>
+                  <a:solidFill>
+                    <a:prstClr val="white"/>
+                  </a:solidFill>
+                  <a:effectLst/>
+                  <a:uLnTx/>
+                  <a:uFillTx/>
+                  <a:latin typeface="+mj-lt"/>
+                  <a:cs typeface="Arial" pitchFamily="34" charset="0"/>
+                </a:endParaRPr>
+              </a:p>
+            </p:txBody>
+          </p:sp>
+          <p:sp>
+            <p:nvSpPr>
+              <p:cNvPr id="33" name="Oval 30">
+                <a:extLst>
+                  <a:ext uri="{FF2B5EF4-FFF2-40B4-BE49-F238E27FC236}">
+                    <a16:creationId xmlns:a16="http://schemas.microsoft.com/office/drawing/2014/main" id="{F5DD1807-415C-4F20-87B3-DC9D99DA43B9}"/>
+                  </a:ext>
+                </a:extLst>
+              </p:cNvPr>
+              <p:cNvSpPr/>
+              <p:nvPr/>
+            </p:nvSpPr>
+            <p:spPr>
+              <a:xfrm rot="19800000">
+                <a:off x="4394607" y="993559"/>
+                <a:ext cx="161145" cy="161145"/>
+              </a:xfrm>
+              <a:prstGeom prst="ellipse">
+                <a:avLst/>
+              </a:prstGeom>
+              <a:grpFill/>
+              <a:ln w="25400" cap="rnd" cmpd="sng" algn="ctr">
+                <a:noFill/>
+                <a:prstDash val="solid"/>
+              </a:ln>
+              <a:effectLst/>
+            </p:spPr>
+            <p:txBody>
+              <a:bodyPr wrap="none" rtlCol="0" anchor="ctr"/>
+              <a:lstStyle/>
+              <a:p>
+                <a:pPr marL="0" marR="0" lvl="0" indent="0" algn="ctr" defTabSz="914400" eaLnBrk="1" fontAlgn="auto" latinLnBrk="0" hangingPunct="1">
+                  <a:lnSpc>
+                    <a:spcPct val="100000"/>
+                  </a:lnSpc>
+                  <a:spcBef>
+                    <a:spcPts val="0"/>
+                  </a:spcBef>
+                  <a:spcAft>
+                    <a:spcPts val="0"/>
+                  </a:spcAft>
+                  <a:buClrTx/>
+                  <a:buSzTx/>
+                  <a:buFontTx/>
+                  <a:buNone/>
+                  <a:tabLst/>
+                  <a:defRPr/>
+                </a:pPr>
+                <a:endParaRPr kumimoji="0" lang="en-US" sz="4400" i="0" u="none" strike="noStrike" kern="0" cap="none" spc="0" normalizeH="0" baseline="0">
+                  <a:ln>
+                    <a:noFill/>
+                  </a:ln>
+                  <a:solidFill>
+                    <a:prstClr val="white"/>
+                  </a:solidFill>
+                  <a:effectLst/>
+                  <a:uLnTx/>
+                  <a:uFillTx/>
+                  <a:latin typeface="+mj-lt"/>
+                  <a:cs typeface="Arial" pitchFamily="34" charset="0"/>
+                </a:endParaRPr>
+              </a:p>
+            </p:txBody>
+          </p:sp>
+          <p:sp>
+            <p:nvSpPr>
+              <p:cNvPr id="34" name="Oval 31">
+                <a:extLst>
+                  <a:ext uri="{FF2B5EF4-FFF2-40B4-BE49-F238E27FC236}">
+                    <a16:creationId xmlns:a16="http://schemas.microsoft.com/office/drawing/2014/main" id="{ABEA0394-2BF9-4967-9823-22C32CCD88DA}"/>
+                  </a:ext>
+                </a:extLst>
+              </p:cNvPr>
+              <p:cNvSpPr/>
+              <p:nvPr/>
+            </p:nvSpPr>
+            <p:spPr>
+              <a:xfrm rot="19800000">
+                <a:off x="4042160" y="1196566"/>
+                <a:ext cx="161145" cy="161145"/>
+              </a:xfrm>
+              <a:prstGeom prst="ellipse">
+                <a:avLst/>
+              </a:prstGeom>
+              <a:grpFill/>
+              <a:ln w="25400" cap="rnd" cmpd="sng" algn="ctr">
+                <a:noFill/>
+                <a:prstDash val="solid"/>
+              </a:ln>
+              <a:effectLst/>
+            </p:spPr>
+            <p:txBody>
+              <a:bodyPr wrap="none" rtlCol="0" anchor="ctr"/>
+              <a:lstStyle/>
+              <a:p>
+                <a:pPr marL="0" marR="0" lvl="0" indent="0" algn="ctr" defTabSz="914400" eaLnBrk="1" fontAlgn="auto" latinLnBrk="0" hangingPunct="1">
+                  <a:lnSpc>
+                    <a:spcPct val="100000"/>
+                  </a:lnSpc>
+                  <a:spcBef>
+                    <a:spcPts val="0"/>
+                  </a:spcBef>
+                  <a:spcAft>
+                    <a:spcPts val="0"/>
+                  </a:spcAft>
+                  <a:buClrTx/>
+                  <a:buSzTx/>
+                  <a:buFontTx/>
+                  <a:buNone/>
+                  <a:tabLst/>
+                  <a:defRPr/>
+                </a:pPr>
+                <a:endParaRPr kumimoji="0" lang="en-US" sz="4400" i="0" u="none" strike="noStrike" kern="0" cap="none" spc="0" normalizeH="0" baseline="0">
+                  <a:ln>
+                    <a:noFill/>
+                  </a:ln>
+                  <a:solidFill>
+                    <a:prstClr val="white"/>
+                  </a:solidFill>
+                  <a:effectLst/>
+                  <a:uLnTx/>
+                  <a:uFillTx/>
+                  <a:latin typeface="+mj-lt"/>
+                  <a:cs typeface="Arial" pitchFamily="34" charset="0"/>
+                </a:endParaRPr>
+              </a:p>
+            </p:txBody>
+          </p:sp>
+          <p:sp>
+            <p:nvSpPr>
+              <p:cNvPr id="35" name="Oval 32">
+                <a:extLst>
+                  <a:ext uri="{FF2B5EF4-FFF2-40B4-BE49-F238E27FC236}">
+                    <a16:creationId xmlns:a16="http://schemas.microsoft.com/office/drawing/2014/main" id="{B86A9EA5-24F9-4D3F-AB41-726B8B8B7C20}"/>
+                  </a:ext>
+                </a:extLst>
+              </p:cNvPr>
+              <p:cNvSpPr/>
+              <p:nvPr/>
+            </p:nvSpPr>
+            <p:spPr>
+              <a:xfrm rot="1800000">
+                <a:off x="4394610" y="1398686"/>
+                <a:ext cx="161145" cy="161145"/>
+              </a:xfrm>
+              <a:prstGeom prst="ellipse">
+                <a:avLst/>
+              </a:prstGeom>
+              <a:grpFill/>
+              <a:ln w="25400" cap="rnd" cmpd="sng" algn="ctr">
+                <a:noFill/>
+                <a:prstDash val="solid"/>
+              </a:ln>
+              <a:effectLst/>
+            </p:spPr>
+            <p:txBody>
+              <a:bodyPr wrap="none" rtlCol="0" anchor="ctr"/>
+              <a:lstStyle/>
+              <a:p>
+                <a:pPr marL="0" marR="0" lvl="0" indent="0" algn="ctr" defTabSz="914400" eaLnBrk="1" fontAlgn="auto" latinLnBrk="0" hangingPunct="1">
+                  <a:lnSpc>
+                    <a:spcPct val="100000"/>
+                  </a:lnSpc>
+                  <a:spcBef>
+                    <a:spcPts val="0"/>
+                  </a:spcBef>
+                  <a:spcAft>
+                    <a:spcPts val="0"/>
+                  </a:spcAft>
+                  <a:buClrTx/>
+                  <a:buSzTx/>
+                  <a:buFontTx/>
+                  <a:buNone/>
+                  <a:tabLst/>
+                  <a:defRPr/>
+                </a:pPr>
+                <a:endParaRPr kumimoji="0" lang="en-US" sz="4400" i="0" u="none" strike="noStrike" kern="0" cap="none" spc="0" normalizeH="0" baseline="0">
+                  <a:ln>
+                    <a:noFill/>
+                  </a:ln>
+                  <a:solidFill>
+                    <a:prstClr val="white"/>
+                  </a:solidFill>
+                  <a:effectLst/>
+                  <a:uLnTx/>
+                  <a:uFillTx/>
+                  <a:latin typeface="+mj-lt"/>
+                  <a:cs typeface="Arial" pitchFamily="34" charset="0"/>
+                </a:endParaRPr>
+              </a:p>
+            </p:txBody>
+          </p:sp>
+        </p:grpSp>
+      </p:grpSp>
+      <p:sp>
+        <p:nvSpPr>
+          <p:cNvPr id="36" name="Down Arrow 40">
+            <a:extLst>
+              <a:ext uri="{FF2B5EF4-FFF2-40B4-BE49-F238E27FC236}">
+                <a16:creationId xmlns:a16="http://schemas.microsoft.com/office/drawing/2014/main" id="{0FE59E28-4CBD-4783-85B2-324EB3670127}"/>
+              </a:ext>
+            </a:extLst>
+          </p:cNvPr>
+          <p:cNvSpPr/>
+          <p:nvPr/>
+        </p:nvSpPr>
+        <p:spPr>
+          <a:xfrm rot="5400000">
+            <a:off x="4233175" y="2957116"/>
+            <a:ext cx="439632" cy="518965"/>
+          </a:xfrm>
+          <a:prstGeom prst="downArrow">
+            <a:avLst>
+              <a:gd name="adj1" fmla="val 50000"/>
+              <a:gd name="adj2" fmla="val 50000"/>
+            </a:avLst>
+          </a:prstGeom>
+          <a:solidFill>
+            <a:schemeClr val="bg1">
+              <a:lumMod val="75000"/>
+            </a:schemeClr>
+          </a:solidFill>
+          <a:ln>
+            <a:noFill/>
+          </a:ln>
+        </p:spPr>
+        <p:style>
+          <a:lnRef idx="2">
+            <a:schemeClr val="accent1">
+              <a:shade val="50000"/>
+            </a:schemeClr>
+          </a:lnRef>
+          <a:fillRef idx="1">
+            <a:schemeClr val="accent1"/>
+          </a:fillRef>
+          <a:effectRef idx="0">
+            <a:schemeClr val="accent1"/>
+          </a:effectRef>
+          <a:fontRef idx="minor">
+            <a:schemeClr val="lt1"/>
+          </a:fontRef>
+        </p:style>
+        <p:txBody>
+          <a:bodyPr rtlCol="0" anchor="ctr"/>
+          <a:lstStyle/>
+          <a:p>
+            <a:pPr algn="ctr"/>
+            <a:endParaRPr lang="en-US">
+              <a:latin typeface="+mj-lt"/>
+              <a:cs typeface="Arial" pitchFamily="34" charset="0"/>
+            </a:endParaRPr>
+          </a:p>
+        </p:txBody>
+      </p:sp>
+      <p:sp>
+        <p:nvSpPr>
+          <p:cNvPr id="37" name="Down Arrow 40">
+            <a:extLst>
+              <a:ext uri="{FF2B5EF4-FFF2-40B4-BE49-F238E27FC236}">
+                <a16:creationId xmlns:a16="http://schemas.microsoft.com/office/drawing/2014/main" id="{A0B76F1B-01A8-4996-9734-5669198AA028}"/>
+              </a:ext>
+            </a:extLst>
+          </p:cNvPr>
+          <p:cNvSpPr/>
+          <p:nvPr/>
+        </p:nvSpPr>
+        <p:spPr>
+          <a:xfrm rot="5400000">
+            <a:off x="1705506" y="2961350"/>
+            <a:ext cx="439632" cy="518965"/>
+          </a:xfrm>
+          <a:prstGeom prst="downArrow">
+            <a:avLst>
+              <a:gd name="adj1" fmla="val 50000"/>
+              <a:gd name="adj2" fmla="val 50000"/>
+            </a:avLst>
+          </a:prstGeom>
+          <a:solidFill>
+            <a:schemeClr val="bg1">
+              <a:lumMod val="75000"/>
+            </a:schemeClr>
+          </a:solidFill>
+          <a:ln>
+            <a:noFill/>
+          </a:ln>
+        </p:spPr>
+        <p:style>
+          <a:lnRef idx="2">
+            <a:schemeClr val="accent1">
+              <a:shade val="50000"/>
+            </a:schemeClr>
+          </a:lnRef>
+          <a:fillRef idx="1">
+            <a:schemeClr val="accent1"/>
+          </a:fillRef>
+          <a:effectRef idx="0">
+            <a:schemeClr val="accent1"/>
+          </a:effectRef>
+          <a:fontRef idx="minor">
+            <a:schemeClr val="lt1"/>
+          </a:fontRef>
+        </p:style>
+        <p:txBody>
+          <a:bodyPr rtlCol="0" anchor="ctr"/>
+          <a:lstStyle/>
+          <a:p>
+            <a:pPr algn="ctr"/>
+            <a:endParaRPr lang="en-US">
+              <a:latin typeface="+mj-lt"/>
+              <a:cs typeface="Arial" pitchFamily="34" charset="0"/>
+            </a:endParaRPr>
+          </a:p>
+        </p:txBody>
+      </p:sp>
+      <p:sp>
+        <p:nvSpPr>
+          <p:cNvPr id="26" name="四角形: 角を丸くする 25">
+            <a:extLst>
+              <a:ext uri="{FF2B5EF4-FFF2-40B4-BE49-F238E27FC236}">
+                <a16:creationId xmlns:a16="http://schemas.microsoft.com/office/drawing/2014/main" id="{3676A255-5FE7-4450-8438-735526CBA567}"/>
+              </a:ext>
+            </a:extLst>
+          </p:cNvPr>
+          <p:cNvSpPr/>
+          <p:nvPr/>
+        </p:nvSpPr>
+        <p:spPr>
+          <a:xfrm>
+            <a:off x="6052891" y="3558404"/>
+            <a:ext cx="1205375" cy="440267"/>
+          </a:xfrm>
+          <a:prstGeom prst="roundRect">
+            <a:avLst/>
+          </a:prstGeom>
+          <a:solidFill>
+            <a:srgbClr val="00B050"/>
+          </a:solidFill>
+          <a:ln>
+            <a:noFill/>
+          </a:ln>
+        </p:spPr>
+        <p:style>
+          <a:lnRef idx="1">
+            <a:schemeClr val="accent5"/>
+          </a:lnRef>
+          <a:fillRef idx="3">
+            <a:schemeClr val="accent5"/>
+          </a:fillRef>
+          <a:effectRef idx="2">
+            <a:schemeClr val="accent5"/>
+          </a:effectRef>
+          <a:fontRef idx="minor">
+            <a:schemeClr val="lt1"/>
+          </a:fontRef>
+        </p:style>
+        <p:txBody>
+          <a:bodyPr wrap="none" rtlCol="0" anchor="ctr"/>
+          <a:lstStyle/>
+          <a:p>
+            <a:pPr algn="ctr">
+              <a:lnSpc>
+                <a:spcPct val="80000"/>
+              </a:lnSpc>
+            </a:pPr>
+            <a:r>
+              <a:rPr lang="en-US" altLang="ja-JP" sz="2000" dirty="0"/>
+              <a:t>Consumed</a:t>
+            </a:r>
+          </a:p>
+          <a:p>
+            <a:pPr algn="ctr">
+              <a:lnSpc>
+                <a:spcPct val="80000"/>
+              </a:lnSpc>
+            </a:pPr>
+            <a:r>
+              <a:rPr lang="en-US" altLang="ja-JP" sz="2000" dirty="0"/>
+              <a:t>Thing</a:t>
+            </a:r>
+            <a:endParaRPr kumimoji="1" lang="ja-JP" altLang="en-US" sz="2000" dirty="0"/>
+          </a:p>
+        </p:txBody>
+      </p:sp>
+      <p:sp>
+        <p:nvSpPr>
+          <p:cNvPr id="27" name="四角形: 角を丸くする 26">
+            <a:extLst>
+              <a:ext uri="{FF2B5EF4-FFF2-40B4-BE49-F238E27FC236}">
+                <a16:creationId xmlns:a16="http://schemas.microsoft.com/office/drawing/2014/main" id="{6E7B91DA-21A4-46C0-8EDC-6AB81EDC472A}"/>
+              </a:ext>
+            </a:extLst>
+          </p:cNvPr>
+          <p:cNvSpPr/>
+          <p:nvPr/>
+        </p:nvSpPr>
+        <p:spPr>
+          <a:xfrm>
+            <a:off x="10321440" y="2989132"/>
+            <a:ext cx="2654969" cy="1119418"/>
+          </a:xfrm>
+          <a:prstGeom prst="roundRect">
+            <a:avLst/>
+          </a:prstGeom>
+          <a:solidFill>
+            <a:srgbClr val="7F7F7F"/>
+          </a:solidFill>
+          <a:ln>
+            <a:noFill/>
+          </a:ln>
+          <a:effectLst>
+            <a:outerShdw blurRad="50800" dist="38100" dir="2700000" algn="tl" rotWithShape="0">
+              <a:prstClr val="black">
+                <a:alpha val="40000"/>
+              </a:prstClr>
+            </a:outerShdw>
+          </a:effectLst>
+        </p:spPr>
+        <p:style>
+          <a:lnRef idx="3">
+            <a:schemeClr val="lt1"/>
+          </a:lnRef>
+          <a:fillRef idx="1">
+            <a:schemeClr val="accent3"/>
+          </a:fillRef>
+          <a:effectRef idx="1">
+            <a:schemeClr val="accent3"/>
+          </a:effectRef>
+          <a:fontRef idx="minor">
+            <a:schemeClr val="lt1"/>
+          </a:fontRef>
+        </p:style>
+        <p:txBody>
+          <a:bodyPr lIns="72000" tIns="36000" rIns="72000" bIns="36000" rtlCol="0" anchor="t"/>
+          <a:lstStyle/>
+          <a:p>
+            <a:pPr algn="ctr"/>
+            <a:r>
+              <a:rPr kumimoji="1" lang="en-US" altLang="ja-JP" sz="2400" b="1" dirty="0">
+                <a:solidFill>
+                  <a:schemeClr val="tx1"/>
+                </a:solidFill>
+              </a:rPr>
+              <a:t>Device</a:t>
+            </a:r>
+          </a:p>
+        </p:txBody>
+      </p:sp>
+      <p:sp>
+        <p:nvSpPr>
+          <p:cNvPr id="28" name="四角形: 角を丸くする 27">
+            <a:extLst>
+              <a:ext uri="{FF2B5EF4-FFF2-40B4-BE49-F238E27FC236}">
+                <a16:creationId xmlns:a16="http://schemas.microsoft.com/office/drawing/2014/main" id="{CCBB7A6D-AA8C-432A-8CB0-517B0E87F413}"/>
+              </a:ext>
+            </a:extLst>
+          </p:cNvPr>
+          <p:cNvSpPr/>
+          <p:nvPr/>
+        </p:nvSpPr>
+        <p:spPr>
+          <a:xfrm>
+            <a:off x="10509417" y="3548841"/>
+            <a:ext cx="2282021" cy="440267"/>
+          </a:xfrm>
+          <a:prstGeom prst="roundRect">
+            <a:avLst/>
+          </a:prstGeom>
+          <a:solidFill>
+            <a:srgbClr val="00B050"/>
+          </a:solidFill>
+          <a:ln>
+            <a:noFill/>
+          </a:ln>
+        </p:spPr>
+        <p:style>
+          <a:lnRef idx="1">
+            <a:schemeClr val="accent5"/>
+          </a:lnRef>
+          <a:fillRef idx="3">
+            <a:schemeClr val="accent5"/>
+          </a:fillRef>
+          <a:effectRef idx="2">
+            <a:schemeClr val="accent5"/>
+          </a:effectRef>
+          <a:fontRef idx="minor">
+            <a:schemeClr val="lt1"/>
+          </a:fontRef>
+        </p:style>
+        <p:txBody>
+          <a:bodyPr rtlCol="0" anchor="ctr"/>
+          <a:lstStyle/>
+          <a:p>
+            <a:pPr algn="ctr"/>
+            <a:r>
+              <a:rPr lang="en-US" altLang="ja-JP" sz="2000" dirty="0"/>
+              <a:t>Exposed Thing</a:t>
+            </a:r>
+            <a:endParaRPr kumimoji="1" lang="ja-JP" altLang="en-US" sz="2000" dirty="0"/>
+          </a:p>
+        </p:txBody>
+      </p:sp>
+      <p:grpSp>
+        <p:nvGrpSpPr>
+          <p:cNvPr id="38" name="Group 38">
+            <a:extLst>
+              <a:ext uri="{FF2B5EF4-FFF2-40B4-BE49-F238E27FC236}">
+                <a16:creationId xmlns:a16="http://schemas.microsoft.com/office/drawing/2014/main" id="{54623AD8-AF8C-4B9D-9CD4-E46C4DC17924}"/>
+              </a:ext>
+            </a:extLst>
+          </p:cNvPr>
+          <p:cNvGrpSpPr/>
+          <p:nvPr/>
+        </p:nvGrpSpPr>
+        <p:grpSpPr>
+          <a:xfrm>
+            <a:off x="7807286" y="2720841"/>
+            <a:ext cx="2060941" cy="828000"/>
+            <a:chOff x="2670082" y="4186219"/>
+            <a:chExt cx="2060941" cy="828000"/>
+          </a:xfrm>
+        </p:grpSpPr>
+        <p:sp>
+          <p:nvSpPr>
+            <p:cNvPr id="39" name="角丸四角形 21">
+              <a:extLst>
+                <a:ext uri="{FF2B5EF4-FFF2-40B4-BE49-F238E27FC236}">
+                  <a16:creationId xmlns:a16="http://schemas.microsoft.com/office/drawing/2014/main" id="{251184E1-0CB2-4BB6-AE73-DD14D204793D}"/>
+                </a:ext>
+              </a:extLst>
+            </p:cNvPr>
+            <p:cNvSpPr/>
+            <p:nvPr/>
+          </p:nvSpPr>
+          <p:spPr bwMode="auto">
+            <a:xfrm>
+              <a:off x="2670082" y="4186219"/>
+              <a:ext cx="2060941" cy="828000"/>
+            </a:xfrm>
+            <a:prstGeom prst="foldedCorner">
+              <a:avLst>
+                <a:gd name="adj" fmla="val 20194"/>
+              </a:avLst>
+            </a:prstGeom>
+            <a:solidFill>
+              <a:srgbClr val="4A7B7C"/>
+            </a:solidFill>
+            <a:ln w="25400" cap="flat" cmpd="sng" algn="ctr">
+              <a:noFill/>
+              <a:prstDash val="solid"/>
+              <a:round/>
+              <a:headEnd type="none" w="med" len="med"/>
+              <a:tailEnd type="none" w="med" len="med"/>
+            </a:ln>
+            <a:effectLst/>
+            <a:extLst/>
+          </p:spPr>
+          <p:txBody>
+            <a:bodyPr vert="horz" wrap="none" lIns="432000" tIns="144000" rIns="0" bIns="0" numCol="1" rtlCol="0" anchor="ctr" anchorCtr="0" compatLnSpc="1">
+              <a:prstTxWarp prst="textNoShape">
+                <a:avLst/>
+              </a:prstTxWarp>
+              <a:noAutofit/>
+            </a:bodyPr>
+            <a:lstStyle/>
+            <a:p>
+              <a:pPr marL="0" marR="0" lvl="0" indent="0" algn="ctr" defTabSz="914400" eaLnBrk="1" fontAlgn="ctr" latinLnBrk="0" hangingPunct="1">
+                <a:lnSpc>
+                  <a:spcPct val="100000"/>
+                </a:lnSpc>
+                <a:spcBef>
+                  <a:spcPts val="0"/>
+                </a:spcBef>
+                <a:spcAft>
+                  <a:spcPts val="0"/>
+                </a:spcAft>
+                <a:buClrTx/>
+                <a:buSzTx/>
+                <a:buFontTx/>
+                <a:buNone/>
+                <a:tabLst/>
+                <a:defRPr/>
+              </a:pPr>
+              <a:r>
+                <a:rPr kumimoji="0" lang="en-US" altLang="ja-JP" sz="2000" i="0" u="none" strike="noStrike" kern="0" cap="none" spc="0" normalizeH="0" baseline="0" dirty="0">
+                  <a:ln>
+                    <a:noFill/>
+                  </a:ln>
+                  <a:solidFill>
+                    <a:prstClr val="white"/>
+                  </a:solidFill>
+                  <a:effectLst/>
+                  <a:uLnTx/>
+                  <a:uFillTx/>
+                  <a:latin typeface="+mj-lt"/>
+                  <a:ea typeface="HG明朝E" panose="02020909000000000000" pitchFamily="17" charset="-128"/>
+                  <a:cs typeface="Arial" pitchFamily="34" charset="0"/>
+                </a:rPr>
+                <a:t>Thing</a:t>
+              </a:r>
+              <a:br>
+                <a:rPr kumimoji="0" lang="en-US" altLang="ja-JP" sz="2000" i="0" u="none" strike="noStrike" kern="0" cap="none" spc="0" normalizeH="0" baseline="0" dirty="0">
+                  <a:ln>
+                    <a:noFill/>
+                  </a:ln>
+                  <a:solidFill>
+                    <a:prstClr val="white"/>
+                  </a:solidFill>
+                  <a:effectLst/>
+                  <a:uLnTx/>
+                  <a:uFillTx/>
+                  <a:latin typeface="+mj-lt"/>
+                  <a:ea typeface="HG明朝E" panose="02020909000000000000" pitchFamily="17" charset="-128"/>
+                  <a:cs typeface="Arial" pitchFamily="34" charset="0"/>
+                </a:rPr>
+              </a:br>
+              <a:r>
+                <a:rPr kumimoji="0" lang="en-US" altLang="ja-JP" sz="2000" i="0" u="none" strike="noStrike" kern="0" cap="none" spc="0" normalizeH="0" baseline="0" dirty="0">
+                  <a:ln>
+                    <a:noFill/>
+                  </a:ln>
+                  <a:solidFill>
+                    <a:prstClr val="white"/>
+                  </a:solidFill>
+                  <a:effectLst/>
+                  <a:uLnTx/>
+                  <a:uFillTx/>
+                  <a:latin typeface="+mj-lt"/>
+                  <a:ea typeface="HG明朝E" panose="02020909000000000000" pitchFamily="17" charset="-128"/>
+                  <a:cs typeface="Arial" pitchFamily="34" charset="0"/>
+                </a:rPr>
+                <a:t>Description</a:t>
+              </a:r>
+              <a:endParaRPr kumimoji="0" lang="en-US" altLang="ja-JP" sz="2800" i="0" u="none" strike="noStrike" kern="0" cap="none" spc="0" normalizeH="0" baseline="0" dirty="0">
+                <a:ln>
+                  <a:noFill/>
+                </a:ln>
+                <a:solidFill>
+                  <a:prstClr val="white"/>
+                </a:solidFill>
+                <a:effectLst/>
+                <a:uLnTx/>
+                <a:uFillTx/>
+                <a:latin typeface="+mj-lt"/>
+                <a:ea typeface="HG明朝E" panose="02020909000000000000" pitchFamily="17" charset="-128"/>
+                <a:cs typeface="Arial" pitchFamily="34" charset="0"/>
+              </a:endParaRPr>
+            </a:p>
+          </p:txBody>
+        </p:sp>
+        <p:grpSp>
+          <p:nvGrpSpPr>
+            <p:cNvPr id="40" name="Group 28">
+              <a:extLst>
+                <a:ext uri="{FF2B5EF4-FFF2-40B4-BE49-F238E27FC236}">
+                  <a16:creationId xmlns:a16="http://schemas.microsoft.com/office/drawing/2014/main" id="{D0B59A3B-B44C-447F-88A9-466AC134ABCA}"/>
+                </a:ext>
+              </a:extLst>
+            </p:cNvPr>
+            <p:cNvGrpSpPr/>
+            <p:nvPr/>
+          </p:nvGrpSpPr>
+          <p:grpSpPr>
+            <a:xfrm>
+              <a:off x="2812207" y="4399725"/>
+              <a:ext cx="413417" cy="426971"/>
+              <a:chOff x="4042160" y="993559"/>
+              <a:chExt cx="548293" cy="566272"/>
+            </a:xfrm>
+            <a:solidFill>
+              <a:sysClr val="window" lastClr="FFFFFF"/>
+            </a:solidFill>
+          </p:grpSpPr>
+          <p:sp>
+            <p:nvSpPr>
+              <p:cNvPr id="41" name="Isosceles Triangle 29">
+                <a:extLst>
+                  <a:ext uri="{FF2B5EF4-FFF2-40B4-BE49-F238E27FC236}">
+                    <a16:creationId xmlns:a16="http://schemas.microsoft.com/office/drawing/2014/main" id="{3D763714-5949-41F5-A62E-CB2678077A5E}"/>
+                  </a:ext>
+                </a:extLst>
+              </p:cNvPr>
+              <p:cNvSpPr/>
+              <p:nvPr/>
+            </p:nvSpPr>
+            <p:spPr>
+              <a:xfrm rot="1800000">
+                <a:off x="4184483" y="1052736"/>
+                <a:ext cx="405970" cy="349975"/>
+              </a:xfrm>
+              <a:prstGeom prst="triangle">
+                <a:avLst/>
+              </a:prstGeom>
+              <a:noFill/>
+              <a:ln w="28575" cap="rnd" cmpd="sng" algn="ctr">
+                <a:solidFill>
+                  <a:sysClr val="window" lastClr="FFFFFF"/>
+                </a:solidFill>
+                <a:prstDash val="solid"/>
+              </a:ln>
+              <a:effectLst/>
+            </p:spPr>
+            <p:txBody>
+              <a:bodyPr wrap="none" rtlCol="0" anchor="ctr"/>
+              <a:lstStyle/>
+              <a:p>
+                <a:pPr marL="0" marR="0" lvl="0" indent="0" algn="ctr" defTabSz="914400" eaLnBrk="1" fontAlgn="auto" latinLnBrk="0" hangingPunct="1">
+                  <a:lnSpc>
+                    <a:spcPct val="100000"/>
+                  </a:lnSpc>
+                  <a:spcBef>
+                    <a:spcPts val="0"/>
+                  </a:spcBef>
+                  <a:spcAft>
+                    <a:spcPts val="0"/>
+                  </a:spcAft>
+                  <a:buClrTx/>
+                  <a:buSzTx/>
+                  <a:buFontTx/>
+                  <a:buNone/>
+                  <a:tabLst/>
+                  <a:defRPr/>
+                </a:pPr>
+                <a:endParaRPr kumimoji="0" lang="en-US" sz="4400" i="0" u="none" strike="noStrike" kern="0" cap="none" spc="0" normalizeH="0" baseline="0">
+                  <a:ln>
+                    <a:noFill/>
+                  </a:ln>
+                  <a:solidFill>
+                    <a:prstClr val="white"/>
+                  </a:solidFill>
+                  <a:effectLst/>
+                  <a:uLnTx/>
+                  <a:uFillTx/>
+                  <a:latin typeface="+mj-lt"/>
+                  <a:cs typeface="Arial" pitchFamily="34" charset="0"/>
+                </a:endParaRPr>
+              </a:p>
+            </p:txBody>
+          </p:sp>
+          <p:sp>
+            <p:nvSpPr>
+              <p:cNvPr id="42" name="Oval 30">
+                <a:extLst>
+                  <a:ext uri="{FF2B5EF4-FFF2-40B4-BE49-F238E27FC236}">
+                    <a16:creationId xmlns:a16="http://schemas.microsoft.com/office/drawing/2014/main" id="{C024B941-B597-4400-9C8C-5888A8514B95}"/>
+                  </a:ext>
+                </a:extLst>
+              </p:cNvPr>
+              <p:cNvSpPr/>
+              <p:nvPr/>
+            </p:nvSpPr>
+            <p:spPr>
+              <a:xfrm rot="19800000">
+                <a:off x="4394607" y="993559"/>
+                <a:ext cx="161145" cy="161145"/>
+              </a:xfrm>
+              <a:prstGeom prst="ellipse">
+                <a:avLst/>
+              </a:prstGeom>
+              <a:grpFill/>
+              <a:ln w="25400" cap="rnd" cmpd="sng" algn="ctr">
+                <a:noFill/>
+                <a:prstDash val="solid"/>
+              </a:ln>
+              <a:effectLst/>
+            </p:spPr>
+            <p:txBody>
+              <a:bodyPr wrap="none" rtlCol="0" anchor="ctr"/>
+              <a:lstStyle/>
+              <a:p>
+                <a:pPr marL="0" marR="0" lvl="0" indent="0" algn="ctr" defTabSz="914400" eaLnBrk="1" fontAlgn="auto" latinLnBrk="0" hangingPunct="1">
+                  <a:lnSpc>
+                    <a:spcPct val="100000"/>
+                  </a:lnSpc>
+                  <a:spcBef>
+                    <a:spcPts val="0"/>
+                  </a:spcBef>
+                  <a:spcAft>
+                    <a:spcPts val="0"/>
+                  </a:spcAft>
+                  <a:buClrTx/>
+                  <a:buSzTx/>
+                  <a:buFontTx/>
+                  <a:buNone/>
+                  <a:tabLst/>
+                  <a:defRPr/>
+                </a:pPr>
+                <a:endParaRPr kumimoji="0" lang="en-US" sz="4400" i="0" u="none" strike="noStrike" kern="0" cap="none" spc="0" normalizeH="0" baseline="0">
+                  <a:ln>
+                    <a:noFill/>
+                  </a:ln>
+                  <a:solidFill>
+                    <a:prstClr val="white"/>
+                  </a:solidFill>
+                  <a:effectLst/>
+                  <a:uLnTx/>
+                  <a:uFillTx/>
+                  <a:latin typeface="+mj-lt"/>
+                  <a:cs typeface="Arial" pitchFamily="34" charset="0"/>
+                </a:endParaRPr>
+              </a:p>
+            </p:txBody>
+          </p:sp>
+          <p:sp>
+            <p:nvSpPr>
+              <p:cNvPr id="43" name="Oval 31">
+                <a:extLst>
+                  <a:ext uri="{FF2B5EF4-FFF2-40B4-BE49-F238E27FC236}">
+                    <a16:creationId xmlns:a16="http://schemas.microsoft.com/office/drawing/2014/main" id="{79654117-6FBA-44EE-9721-7B436910B0E8}"/>
+                  </a:ext>
+                </a:extLst>
+              </p:cNvPr>
+              <p:cNvSpPr/>
+              <p:nvPr/>
+            </p:nvSpPr>
+            <p:spPr>
+              <a:xfrm rot="19800000">
+                <a:off x="4042160" y="1196566"/>
+                <a:ext cx="161145" cy="161145"/>
+              </a:xfrm>
+              <a:prstGeom prst="ellipse">
+                <a:avLst/>
+              </a:prstGeom>
+              <a:grpFill/>
+              <a:ln w="25400" cap="rnd" cmpd="sng" algn="ctr">
+                <a:noFill/>
+                <a:prstDash val="solid"/>
+              </a:ln>
+              <a:effectLst/>
+            </p:spPr>
+            <p:txBody>
+              <a:bodyPr wrap="none" rtlCol="0" anchor="ctr"/>
+              <a:lstStyle/>
+              <a:p>
+                <a:pPr marL="0" marR="0" lvl="0" indent="0" algn="ctr" defTabSz="914400" eaLnBrk="1" fontAlgn="auto" latinLnBrk="0" hangingPunct="1">
+                  <a:lnSpc>
+                    <a:spcPct val="100000"/>
+                  </a:lnSpc>
+                  <a:spcBef>
+                    <a:spcPts val="0"/>
+                  </a:spcBef>
+                  <a:spcAft>
+                    <a:spcPts val="0"/>
+                  </a:spcAft>
+                  <a:buClrTx/>
+                  <a:buSzTx/>
+                  <a:buFontTx/>
+                  <a:buNone/>
+                  <a:tabLst/>
+                  <a:defRPr/>
+                </a:pPr>
+                <a:endParaRPr kumimoji="0" lang="en-US" sz="4400" i="0" u="none" strike="noStrike" kern="0" cap="none" spc="0" normalizeH="0" baseline="0">
+                  <a:ln>
+                    <a:noFill/>
+                  </a:ln>
+                  <a:solidFill>
+                    <a:prstClr val="white"/>
+                  </a:solidFill>
+                  <a:effectLst/>
+                  <a:uLnTx/>
+                  <a:uFillTx/>
+                  <a:latin typeface="+mj-lt"/>
+                  <a:cs typeface="Arial" pitchFamily="34" charset="0"/>
+                </a:endParaRPr>
+              </a:p>
+            </p:txBody>
+          </p:sp>
+          <p:sp>
+            <p:nvSpPr>
+              <p:cNvPr id="44" name="Oval 32">
+                <a:extLst>
+                  <a:ext uri="{FF2B5EF4-FFF2-40B4-BE49-F238E27FC236}">
+                    <a16:creationId xmlns:a16="http://schemas.microsoft.com/office/drawing/2014/main" id="{0FD77DD4-B4C6-4322-867A-28B9A3761A9F}"/>
+                  </a:ext>
+                </a:extLst>
+              </p:cNvPr>
+              <p:cNvSpPr/>
+              <p:nvPr/>
+            </p:nvSpPr>
+            <p:spPr>
+              <a:xfrm rot="1800000">
+                <a:off x="4394610" y="1398686"/>
+                <a:ext cx="161145" cy="161145"/>
+              </a:xfrm>
+              <a:prstGeom prst="ellipse">
+                <a:avLst/>
+              </a:prstGeom>
+              <a:grpFill/>
+              <a:ln w="25400" cap="rnd" cmpd="sng" algn="ctr">
+                <a:noFill/>
+                <a:prstDash val="solid"/>
+              </a:ln>
+              <a:effectLst/>
+            </p:spPr>
+            <p:txBody>
+              <a:bodyPr wrap="none" rtlCol="0" anchor="ctr"/>
+              <a:lstStyle/>
+              <a:p>
+                <a:pPr marL="0" marR="0" lvl="0" indent="0" algn="ctr" defTabSz="914400" eaLnBrk="1" fontAlgn="auto" latinLnBrk="0" hangingPunct="1">
+                  <a:lnSpc>
+                    <a:spcPct val="100000"/>
+                  </a:lnSpc>
+                  <a:spcBef>
+                    <a:spcPts val="0"/>
+                  </a:spcBef>
+                  <a:spcAft>
+                    <a:spcPts val="0"/>
+                  </a:spcAft>
+                  <a:buClrTx/>
+                  <a:buSzTx/>
+                  <a:buFontTx/>
+                  <a:buNone/>
+                  <a:tabLst/>
+                  <a:defRPr/>
+                </a:pPr>
+                <a:endParaRPr kumimoji="0" lang="en-US" sz="4400" i="0" u="none" strike="noStrike" kern="0" cap="none" spc="0" normalizeH="0" baseline="0">
+                  <a:ln>
+                    <a:noFill/>
+                  </a:ln>
+                  <a:solidFill>
+                    <a:prstClr val="white"/>
+                  </a:solidFill>
+                  <a:effectLst/>
+                  <a:uLnTx/>
+                  <a:uFillTx/>
+                  <a:latin typeface="+mj-lt"/>
+                  <a:cs typeface="Arial" pitchFamily="34" charset="0"/>
+                </a:endParaRPr>
+              </a:p>
+            </p:txBody>
+          </p:sp>
+        </p:grpSp>
+      </p:grpSp>
+      <p:sp>
+        <p:nvSpPr>
+          <p:cNvPr id="45" name="Down Arrow 40">
+            <a:extLst>
+              <a:ext uri="{FF2B5EF4-FFF2-40B4-BE49-F238E27FC236}">
+                <a16:creationId xmlns:a16="http://schemas.microsoft.com/office/drawing/2014/main" id="{55E81437-DDD4-4CDE-9015-53895EFDCBF2}"/>
+              </a:ext>
+            </a:extLst>
+          </p:cNvPr>
+          <p:cNvSpPr/>
+          <p:nvPr/>
+        </p:nvSpPr>
+        <p:spPr>
+          <a:xfrm rot="5400000">
+            <a:off x="9852382" y="2949466"/>
+            <a:ext cx="439632" cy="518965"/>
+          </a:xfrm>
+          <a:prstGeom prst="downArrow">
+            <a:avLst>
+              <a:gd name="adj1" fmla="val 50000"/>
+              <a:gd name="adj2" fmla="val 50000"/>
+            </a:avLst>
+          </a:prstGeom>
+          <a:solidFill>
+            <a:schemeClr val="bg1">
+              <a:lumMod val="75000"/>
+            </a:schemeClr>
+          </a:solidFill>
+          <a:ln>
+            <a:noFill/>
+          </a:ln>
+        </p:spPr>
+        <p:style>
+          <a:lnRef idx="2">
+            <a:schemeClr val="accent1">
+              <a:shade val="50000"/>
+            </a:schemeClr>
+          </a:lnRef>
+          <a:fillRef idx="1">
+            <a:schemeClr val="accent1"/>
+          </a:fillRef>
+          <a:effectRef idx="0">
+            <a:schemeClr val="accent1"/>
+          </a:effectRef>
+          <a:fontRef idx="minor">
+            <a:schemeClr val="lt1"/>
+          </a:fontRef>
+        </p:style>
+        <p:txBody>
+          <a:bodyPr rtlCol="0" anchor="ctr"/>
+          <a:lstStyle/>
+          <a:p>
+            <a:pPr algn="ctr"/>
+            <a:endParaRPr lang="en-US">
+              <a:latin typeface="+mj-lt"/>
+              <a:cs typeface="Arial" pitchFamily="34" charset="0"/>
+            </a:endParaRPr>
+          </a:p>
+        </p:txBody>
+      </p:sp>
+      <p:sp>
+        <p:nvSpPr>
+          <p:cNvPr id="46" name="Down Arrow 40">
+            <a:extLst>
+              <a:ext uri="{FF2B5EF4-FFF2-40B4-BE49-F238E27FC236}">
+                <a16:creationId xmlns:a16="http://schemas.microsoft.com/office/drawing/2014/main" id="{57518CB0-38ED-4231-8DC7-1F71028AF7E6}"/>
+              </a:ext>
+            </a:extLst>
+          </p:cNvPr>
+          <p:cNvSpPr/>
+          <p:nvPr/>
+        </p:nvSpPr>
+        <p:spPr>
+          <a:xfrm rot="5400000">
+            <a:off x="7352293" y="2928344"/>
+            <a:ext cx="439632" cy="518965"/>
+          </a:xfrm>
+          <a:prstGeom prst="downArrow">
+            <a:avLst>
+              <a:gd name="adj1" fmla="val 50000"/>
+              <a:gd name="adj2" fmla="val 50000"/>
+            </a:avLst>
+          </a:prstGeom>
+          <a:solidFill>
+            <a:schemeClr val="bg1">
+              <a:lumMod val="75000"/>
+            </a:schemeClr>
+          </a:solidFill>
+          <a:ln>
+            <a:noFill/>
+          </a:ln>
+        </p:spPr>
+        <p:style>
+          <a:lnRef idx="2">
+            <a:schemeClr val="accent1">
+              <a:shade val="50000"/>
+            </a:schemeClr>
+          </a:lnRef>
+          <a:fillRef idx="1">
+            <a:schemeClr val="accent1"/>
+          </a:fillRef>
+          <a:effectRef idx="0">
+            <a:schemeClr val="accent1"/>
+          </a:effectRef>
+          <a:fontRef idx="minor">
+            <a:schemeClr val="lt1"/>
+          </a:fontRef>
+        </p:style>
+        <p:txBody>
+          <a:bodyPr rtlCol="0" anchor="ctr"/>
+          <a:lstStyle/>
+          <a:p>
+            <a:pPr algn="ctr"/>
+            <a:endParaRPr lang="en-US">
+              <a:latin typeface="+mj-lt"/>
+              <a:cs typeface="Arial" pitchFamily="34" charset="0"/>
+            </a:endParaRPr>
+          </a:p>
+        </p:txBody>
+      </p:sp>
+      <p:cxnSp>
+        <p:nvCxnSpPr>
+          <p:cNvPr id="47" name="Gerade Verbindung mit Pfeil 42">
+            <a:extLst>
+              <a:ext uri="{FF2B5EF4-FFF2-40B4-BE49-F238E27FC236}">
+                <a16:creationId xmlns:a16="http://schemas.microsoft.com/office/drawing/2014/main" id="{4C549D1D-6490-46C6-A0DB-A197E4E7AF27}"/>
+              </a:ext>
+            </a:extLst>
+          </p:cNvPr>
+          <p:cNvCxnSpPr>
+            <a:cxnSpLocks/>
+            <a:stCxn id="26" idx="3"/>
+            <a:endCxn id="28" idx="1"/>
+          </p:cNvCxnSpPr>
+          <p:nvPr/>
+        </p:nvCxnSpPr>
+        <p:spPr>
+          <a:xfrm flipV="1">
+            <a:off x="7258266" y="3768975"/>
+            <a:ext cx="3251151" cy="9563"/>
+          </a:xfrm>
+          <a:prstGeom prst="straightConnector1">
+            <a:avLst/>
+          </a:prstGeom>
+          <a:ln w="38100">
+            <a:solidFill>
+              <a:srgbClr val="008000"/>
+            </a:solidFill>
+            <a:prstDash val="sysDot"/>
+            <a:headEnd type="arrow" w="med" len="med"/>
+            <a:tailEnd type="arrow" w="med" len="med"/>
+          </a:ln>
+        </p:spPr>
+        <p:style>
+          <a:lnRef idx="1">
+            <a:schemeClr val="accent1"/>
+          </a:lnRef>
+          <a:fillRef idx="0">
+            <a:schemeClr val="accent1"/>
+          </a:fillRef>
+          <a:effectRef idx="0">
+            <a:schemeClr val="accent1"/>
+          </a:effectRef>
+          <a:fontRef idx="minor">
+            <a:schemeClr val="tx1"/>
+          </a:fontRef>
+        </p:style>
+      </p:cxnSp>
+    </p:spTree>
+    <p:extLst>
+      <p:ext uri="{BB962C8B-B14F-4D97-AF65-F5344CB8AC3E}">
+        <p14:creationId xmlns:p14="http://schemas.microsoft.com/office/powerpoint/2010/main" val="3820560717"/>
       </p:ext>
     </p:extLst>
   </p:cSld>
@@ -9201,4 +13058,299 @@
     </a:ext>
   </a:extLst>
 </a:theme>
+</file>
+
+<file path=ppt/theme/theme2.xml><?xml version="1.0" encoding="utf-8"?>
+<a:theme xmlns:a="http://schemas.openxmlformats.org/drawingml/2006/main" name="Office テーマ">
+  <a:themeElements>
+    <a:clrScheme name="Office">
+      <a:dk1>
+        <a:sysClr val="windowText" lastClr="000000"/>
+      </a:dk1>
+      <a:lt1>
+        <a:sysClr val="window" lastClr="FFFFFF"/>
+      </a:lt1>
+      <a:dk2>
+        <a:srgbClr val="44546A"/>
+      </a:dk2>
+      <a:lt2>
+        <a:srgbClr val="E7E6E6"/>
+      </a:lt2>
+      <a:accent1>
+        <a:srgbClr val="4472C4"/>
+      </a:accent1>
+      <a:accent2>
+        <a:srgbClr val="ED7D31"/>
+      </a:accent2>
+      <a:accent3>
+        <a:srgbClr val="A5A5A5"/>
+      </a:accent3>
+      <a:accent4>
+        <a:srgbClr val="FFC000"/>
+      </a:accent4>
+      <a:accent5>
+        <a:srgbClr val="5B9BD5"/>
+      </a:accent5>
+      <a:accent6>
+        <a:srgbClr val="70AD47"/>
+      </a:accent6>
+      <a:hlink>
+        <a:srgbClr val="0563C1"/>
+      </a:hlink>
+      <a:folHlink>
+        <a:srgbClr val="954F72"/>
+      </a:folHlink>
+    </a:clrScheme>
+    <a:fontScheme name="Office">
+      <a:majorFont>
+        <a:latin typeface="游ゴシック Light" panose="020F0302020204030204"/>
+        <a:ea typeface=""/>
+        <a:cs typeface=""/>
+        <a:font script="Jpan" typeface="游ゴシック Light"/>
+        <a:font script="Hang" typeface="맑은 고딕"/>
+        <a:font script="Hans" typeface="等线 Light"/>
+        <a:font script="Hant" typeface="新細明體"/>
+        <a:font script="Arab" typeface="Times New Roman"/>
+        <a:font script="Hebr" typeface="Times New Roman"/>
+        <a:font script="Thai" typeface="Angsana New"/>
+        <a:font script="Ethi" typeface="Nyala"/>
+        <a:font script="Beng" typeface="Vrinda"/>
+        <a:font script="Gujr" typeface="Shruti"/>
+        <a:font script="Khmr" typeface="MoolBoran"/>
+        <a:font script="Knda" typeface="Tunga"/>
+        <a:font script="Guru" typeface="Raavi"/>
+        <a:font script="Cans" typeface="Euphemia"/>
+        <a:font script="Cher" typeface="Plantagenet Cherokee"/>
+        <a:font script="Yiii" typeface="Microsoft Yi Baiti"/>
+        <a:font script="Tibt" typeface="Microsoft Himalaya"/>
+        <a:font script="Thaa" typeface="MV Boli"/>
+        <a:font script="Deva" typeface="Mangal"/>
+        <a:font script="Telu" typeface="Gautami"/>
+        <a:font script="Taml" typeface="Latha"/>
+        <a:font script="Syrc" typeface="Estrangelo Edessa"/>
+        <a:font script="Orya" typeface="Kalinga"/>
+        <a:font script="Mlym" typeface="Kartika"/>
+        <a:font script="Laoo" typeface="DokChampa"/>
+        <a:font script="Sinh" typeface="Iskoola Pota"/>
+        <a:font script="Mong" typeface="Mongolian Baiti"/>
+        <a:font script="Viet" typeface="Times New Roman"/>
+        <a:font script="Uigh" typeface="Microsoft Uighur"/>
+        <a:font script="Geor" typeface="Sylfaen"/>
+        <a:font script="Armn" typeface="Arial"/>
+        <a:font script="Bugi" typeface="Leelawadee UI"/>
+        <a:font script="Bopo" typeface="Microsoft JhengHei"/>
+        <a:font script="Java" typeface="Javanese Text"/>
+        <a:font script="Lisu" typeface="Segoe UI"/>
+        <a:font script="Mymr" typeface="Myanmar Text"/>
+        <a:font script="Nkoo" typeface="Ebrima"/>
+        <a:font script="Olck" typeface="Nirmala UI"/>
+        <a:font script="Osma" typeface="Ebrima"/>
+        <a:font script="Phag" typeface="Phagspa"/>
+        <a:font script="Syrn" typeface="Estrangelo Edessa"/>
+        <a:font script="Syrj" typeface="Estrangelo Edessa"/>
+        <a:font script="Syre" typeface="Estrangelo Edessa"/>
+        <a:font script="Sora" typeface="Nirmala UI"/>
+        <a:font script="Tale" typeface="Microsoft Tai Le"/>
+        <a:font script="Talu" typeface="Microsoft New Tai Lue"/>
+        <a:font script="Tfng" typeface="Ebrima"/>
+      </a:majorFont>
+      <a:minorFont>
+        <a:latin typeface="游ゴシック" panose="020F0502020204030204"/>
+        <a:ea typeface=""/>
+        <a:cs typeface=""/>
+        <a:font script="Jpan" typeface="游ゴシック"/>
+        <a:font script="Hang" typeface="맑은 고딕"/>
+        <a:font script="Hans" typeface="等线"/>
+        <a:font script="Hant" typeface="新細明體"/>
+        <a:font script="Arab" typeface="Arial"/>
+        <a:font script="Hebr" typeface="Arial"/>
+        <a:font script="Thai" typeface="Cordia New"/>
+        <a:font script="Ethi" typeface="Nyala"/>
+        <a:font script="Beng" typeface="Vrinda"/>
+        <a:font script="Gujr" typeface="Shruti"/>
+        <a:font script="Khmr" typeface="DaunPenh"/>
+        <a:font script="Knda" typeface="Tunga"/>
+        <a:font script="Guru" typeface="Raavi"/>
+        <a:font script="Cans" typeface="Euphemia"/>
+        <a:font script="Cher" typeface="Plantagenet Cherokee"/>
+        <a:font script="Yiii" typeface="Microsoft Yi Baiti"/>
+        <a:font script="Tibt" typeface="Microsoft Himalaya"/>
+        <a:font script="Thaa" typeface="MV Boli"/>
+        <a:font script="Deva" typeface="Mangal"/>
+        <a:font script="Telu" typeface="Gautami"/>
+        <a:font script="Taml" typeface="Latha"/>
+        <a:font script="Syrc" typeface="Estrangelo Edessa"/>
+        <a:font script="Orya" typeface="Kalinga"/>
+        <a:font script="Mlym" typeface="Kartika"/>
+        <a:font script="Laoo" typeface="DokChampa"/>
+        <a:font script="Sinh" typeface="Iskoola Pota"/>
+        <a:font script="Mong" typeface="Mongolian Baiti"/>
+        <a:font script="Viet" typeface="Arial"/>
+        <a:font script="Uigh" typeface="Microsoft Uighur"/>
+        <a:font script="Geor" typeface="Sylfaen"/>
+        <a:font script="Armn" typeface="Arial"/>
+        <a:font script="Bugi" typeface="Leelawadee UI"/>
+        <a:font script="Bopo" typeface="Microsoft JhengHei"/>
+        <a:font script="Java" typeface="Javanese Text"/>
+        <a:font script="Lisu" typeface="Segoe UI"/>
+        <a:font script="Mymr" typeface="Myanmar Text"/>
+        <a:font script="Nkoo" typeface="Ebrima"/>
+        <a:font script="Olck" typeface="Nirmala UI"/>
+        <a:font script="Osma" typeface="Ebrima"/>
+        <a:font script="Phag" typeface="Phagspa"/>
+        <a:font script="Syrn" typeface="Estrangelo Edessa"/>
+        <a:font script="Syrj" typeface="Estrangelo Edessa"/>
+        <a:font script="Syre" typeface="Estrangelo Edessa"/>
+        <a:font script="Sora" typeface="Nirmala UI"/>
+        <a:font script="Tale" typeface="Microsoft Tai Le"/>
+        <a:font script="Talu" typeface="Microsoft New Tai Lue"/>
+        <a:font script="Tfng" typeface="Ebrima"/>
+      </a:minorFont>
+    </a:fontScheme>
+    <a:fmtScheme name="Office">
+      <a:fillStyleLst>
+        <a:solidFill>
+          <a:schemeClr val="phClr"/>
+        </a:solidFill>
+        <a:gradFill rotWithShape="1">
+          <a:gsLst>
+            <a:gs pos="0">
+              <a:schemeClr val="phClr">
+                <a:lumMod val="110000"/>
+                <a:satMod val="105000"/>
+                <a:tint val="67000"/>
+              </a:schemeClr>
+            </a:gs>
+            <a:gs pos="50000">
+              <a:schemeClr val="phClr">
+                <a:lumMod val="105000"/>
+                <a:satMod val="103000"/>
+                <a:tint val="73000"/>
+              </a:schemeClr>
+            </a:gs>
+            <a:gs pos="100000">
+              <a:schemeClr val="phClr">
+                <a:lumMod val="105000"/>
+                <a:satMod val="109000"/>
+                <a:tint val="81000"/>
+              </a:schemeClr>
+            </a:gs>
+          </a:gsLst>
+          <a:lin ang="5400000" scaled="0"/>
+        </a:gradFill>
+        <a:gradFill rotWithShape="1">
+          <a:gsLst>
+            <a:gs pos="0">
+              <a:schemeClr val="phClr">
+                <a:satMod val="103000"/>
+                <a:lumMod val="102000"/>
+                <a:tint val="94000"/>
+              </a:schemeClr>
+            </a:gs>
+            <a:gs pos="50000">
+              <a:schemeClr val="phClr">
+                <a:satMod val="110000"/>
+                <a:lumMod val="100000"/>
+                <a:shade val="100000"/>
+              </a:schemeClr>
+            </a:gs>
+            <a:gs pos="100000">
+              <a:schemeClr val="phClr">
+                <a:lumMod val="99000"/>
+                <a:satMod val="120000"/>
+                <a:shade val="78000"/>
+              </a:schemeClr>
+            </a:gs>
+          </a:gsLst>
+          <a:lin ang="5400000" scaled="0"/>
+        </a:gradFill>
+      </a:fillStyleLst>
+      <a:lnStyleLst>
+        <a:ln w="6350" cap="flat" cmpd="sng" algn="ctr">
+          <a:solidFill>
+            <a:schemeClr val="phClr"/>
+          </a:solidFill>
+          <a:prstDash val="solid"/>
+          <a:miter lim="800000"/>
+        </a:ln>
+        <a:ln w="12700" cap="flat" cmpd="sng" algn="ctr">
+          <a:solidFill>
+            <a:schemeClr val="phClr"/>
+          </a:solidFill>
+          <a:prstDash val="solid"/>
+          <a:miter lim="800000"/>
+        </a:ln>
+        <a:ln w="19050" cap="flat" cmpd="sng" algn="ctr">
+          <a:solidFill>
+            <a:schemeClr val="phClr"/>
+          </a:solidFill>
+          <a:prstDash val="solid"/>
+          <a:miter lim="800000"/>
+        </a:ln>
+      </a:lnStyleLst>
+      <a:effectStyleLst>
+        <a:effectStyle>
+          <a:effectLst/>
+        </a:effectStyle>
+        <a:effectStyle>
+          <a:effectLst/>
+        </a:effectStyle>
+        <a:effectStyle>
+          <a:effectLst>
+            <a:outerShdw blurRad="57150" dist="19050" dir="5400000" algn="ctr" rotWithShape="0">
+              <a:srgbClr val="000000">
+                <a:alpha val="63000"/>
+              </a:srgbClr>
+            </a:outerShdw>
+          </a:effectLst>
+        </a:effectStyle>
+      </a:effectStyleLst>
+      <a:bgFillStyleLst>
+        <a:solidFill>
+          <a:schemeClr val="phClr"/>
+        </a:solidFill>
+        <a:solidFill>
+          <a:schemeClr val="phClr">
+            <a:tint val="95000"/>
+            <a:satMod val="170000"/>
+          </a:schemeClr>
+        </a:solidFill>
+        <a:gradFill rotWithShape="1">
+          <a:gsLst>
+            <a:gs pos="0">
+              <a:schemeClr val="phClr">
+                <a:tint val="93000"/>
+                <a:satMod val="150000"/>
+                <a:shade val="98000"/>
+                <a:lumMod val="102000"/>
+              </a:schemeClr>
+            </a:gs>
+            <a:gs pos="50000">
+              <a:schemeClr val="phClr">
+                <a:tint val="98000"/>
+                <a:satMod val="130000"/>
+                <a:shade val="90000"/>
+                <a:lumMod val="103000"/>
+              </a:schemeClr>
+            </a:gs>
+            <a:gs pos="100000">
+              <a:schemeClr val="phClr">
+                <a:shade val="63000"/>
+                <a:satMod val="120000"/>
+              </a:schemeClr>
+            </a:gs>
+          </a:gsLst>
+          <a:lin ang="5400000" scaled="0"/>
+        </a:gradFill>
+      </a:bgFillStyleLst>
+    </a:fmtScheme>
+  </a:themeElements>
+  <a:objectDefaults/>
+  <a:extraClrSchemeLst/>
+  <a:extLst>
+    <a:ext uri="{05A4C25C-085E-4340-85A3-A5531E510DB2}">
+      <thm15:themeFamily xmlns:thm15="http://schemas.microsoft.com/office/thememl/2012/main" name="Office Theme" id="{62F939B6-93AF-4DB8-9C6B-D6C7DFDC589F}" vid="{4A3C46E8-61CC-4603-A589-7422A47A8E4A}"/>
+    </a:ext>
+  </a:extLst>
+</a:theme>
 </file>
</xml_diff>

<commit_message>
Update figures in High-Level Architecture section
</commit_message>
<xml_diff>
--- a/images/arch-high-level-alt.pptx
+++ b/images/arch-high-level-alt.pptx
@@ -5,17 +5,19 @@
     <p:sldMasterId id="2147483648" r:id="rId1"/>
   </p:sldMasterIdLst>
   <p:notesMasterIdLst>
-    <p:notesMasterId r:id="rId10"/>
+    <p:notesMasterId r:id="rId12"/>
   </p:notesMasterIdLst>
   <p:sldIdLst>
     <p:sldId id="256" r:id="rId2"/>
     <p:sldId id="258" r:id="rId3"/>
     <p:sldId id="260" r:id="rId4"/>
     <p:sldId id="263" r:id="rId5"/>
-    <p:sldId id="257" r:id="rId6"/>
-    <p:sldId id="261" r:id="rId7"/>
-    <p:sldId id="259" r:id="rId8"/>
-    <p:sldId id="264" r:id="rId9"/>
+    <p:sldId id="265" r:id="rId6"/>
+    <p:sldId id="257" r:id="rId7"/>
+    <p:sldId id="261" r:id="rId8"/>
+    <p:sldId id="259" r:id="rId9"/>
+    <p:sldId id="264" r:id="rId10"/>
+    <p:sldId id="266" r:id="rId11"/>
   </p:sldIdLst>
   <p:sldSz cx="12192000" cy="6858000"/>
   <p:notesSz cx="6858000" cy="9144000"/>
@@ -125,7 +127,7 @@
 <file path=ppt/revisionInfo.xml><?xml version="1.0" encoding="utf-8"?>
 <p1510:revInfo xmlns:a="http://schemas.openxmlformats.org/drawingml/2006/main" xmlns:r="http://schemas.openxmlformats.org/officeDocument/2006/relationships" xmlns:p1510="http://schemas.microsoft.com/office/powerpoint/2015/10/main">
   <p1510:revLst>
-    <p1510:client id="{5893FC80-EFCA-44BE-BFD0-91E4F218C6AE}" v="32" dt="2019-03-12T09:12:57.391"/>
+    <p1510:client id="{5893FC80-EFCA-44BE-BFD0-91E4F218C6AE}" v="50" dt="2019-03-21T15:33:00.574"/>
   </p1510:revLst>
 </p1510:revInfo>
 </file>
@@ -212,7 +214,7 @@
           <a:p>
             <a:fld id="{B1A173A8-DAE6-4CFB-9894-525984AA74FE}" type="datetimeFigureOut">
               <a:rPr kumimoji="1" lang="ja-JP" altLang="en-US" smtClean="0"/>
-              <a:t>2019/3/12</a:t>
+              <a:t>2019/3/22</a:t>
             </a:fld>
             <a:endParaRPr kumimoji="1" lang="ja-JP" altLang="en-US"/>
           </a:p>
@@ -576,7 +578,7 @@
           <a:p>
             <a:fld id="{672E3FB9-D101-470C-816C-9E6313236755}" type="slidenum">
               <a:rPr kumimoji="1" lang="ja-JP" altLang="en-US" smtClean="0"/>
-              <a:t>8</a:t>
+              <a:t>9</a:t>
             </a:fld>
             <a:endParaRPr kumimoji="1" lang="ja-JP" altLang="en-US"/>
           </a:p>
@@ -586,6 +588,90 @@
     <p:extLst>
       <p:ext uri="{BB962C8B-B14F-4D97-AF65-F5344CB8AC3E}">
         <p14:creationId xmlns:p14="http://schemas.microsoft.com/office/powerpoint/2010/main" val="3336589211"/>
+      </p:ext>
+    </p:extLst>
+  </p:cSld>
+  <p:clrMapOvr>
+    <a:masterClrMapping/>
+  </p:clrMapOvr>
+</p:notes>
+</file>
+
+<file path=ppt/notesSlides/notesSlide2.xml><?xml version="1.0" encoding="utf-8"?>
+<p:notes xmlns:a="http://schemas.openxmlformats.org/drawingml/2006/main" xmlns:r="http://schemas.openxmlformats.org/officeDocument/2006/relationships" xmlns:p="http://schemas.openxmlformats.org/presentationml/2006/main">
+  <p:cSld>
+    <p:spTree>
+      <p:nvGrpSpPr>
+        <p:cNvPr id="1" name=""/>
+        <p:cNvGrpSpPr/>
+        <p:nvPr/>
+      </p:nvGrpSpPr>
+      <p:grpSpPr>
+        <a:xfrm>
+          <a:off x="0" y="0"/>
+          <a:ext cx="0" cy="0"/>
+          <a:chOff x="0" y="0"/>
+          <a:chExt cx="0" cy="0"/>
+        </a:xfrm>
+      </p:grpSpPr>
+      <p:sp>
+        <p:nvSpPr>
+          <p:cNvPr id="2" name="スライド イメージ プレースホルダー 1"/>
+          <p:cNvSpPr>
+            <a:spLocks noGrp="1" noRot="1" noChangeAspect="1"/>
+          </p:cNvSpPr>
+          <p:nvPr>
+            <p:ph type="sldImg"/>
+          </p:nvPr>
+        </p:nvSpPr>
+        <p:spPr/>
+      </p:sp>
+      <p:sp>
+        <p:nvSpPr>
+          <p:cNvPr id="3" name="ノート プレースホルダー 2"/>
+          <p:cNvSpPr>
+            <a:spLocks noGrp="1"/>
+          </p:cNvSpPr>
+          <p:nvPr>
+            <p:ph type="body" idx="1"/>
+          </p:nvPr>
+        </p:nvSpPr>
+        <p:spPr/>
+        <p:txBody>
+          <a:bodyPr/>
+          <a:lstStyle/>
+          <a:p>
+            <a:endParaRPr kumimoji="1" lang="ja-JP" altLang="en-US" dirty="0"/>
+          </a:p>
+        </p:txBody>
+      </p:sp>
+      <p:sp>
+        <p:nvSpPr>
+          <p:cNvPr id="4" name="スライド番号プレースホルダー 3"/>
+          <p:cNvSpPr>
+            <a:spLocks noGrp="1"/>
+          </p:cNvSpPr>
+          <p:nvPr>
+            <p:ph type="sldNum" sz="quarter" idx="5"/>
+          </p:nvPr>
+        </p:nvSpPr>
+        <p:spPr/>
+        <p:txBody>
+          <a:bodyPr/>
+          <a:lstStyle/>
+          <a:p>
+            <a:fld id="{672E3FB9-D101-470C-816C-9E6313236755}" type="slidenum">
+              <a:rPr kumimoji="1" lang="ja-JP" altLang="en-US" smtClean="0"/>
+              <a:t>10</a:t>
+            </a:fld>
+            <a:endParaRPr kumimoji="1" lang="ja-JP" altLang="en-US"/>
+          </a:p>
+        </p:txBody>
+      </p:sp>
+    </p:spTree>
+    <p:extLst>
+      <p:ext uri="{BB962C8B-B14F-4D97-AF65-F5344CB8AC3E}">
+        <p14:creationId xmlns:p14="http://schemas.microsoft.com/office/powerpoint/2010/main" val="1972129912"/>
       </p:ext>
     </p:extLst>
   </p:cSld>
@@ -742,7 +828,7 @@
           <a:p>
             <a:fld id="{E759B8C4-E491-4AE8-BFE3-235CF9118C4F}" type="datetimeFigureOut">
               <a:rPr kumimoji="1" lang="ja-JP" altLang="en-US" smtClean="0"/>
-              <a:t>2019/3/12</a:t>
+              <a:t>2019/3/22</a:t>
             </a:fld>
             <a:endParaRPr kumimoji="1" lang="ja-JP" altLang="en-US"/>
           </a:p>
@@ -972,7 +1058,7 @@
           <a:p>
             <a:fld id="{E759B8C4-E491-4AE8-BFE3-235CF9118C4F}" type="datetimeFigureOut">
               <a:rPr kumimoji="1" lang="ja-JP" altLang="en-US" smtClean="0"/>
-              <a:t>2019/3/12</a:t>
+              <a:t>2019/3/22</a:t>
             </a:fld>
             <a:endParaRPr kumimoji="1" lang="ja-JP" altLang="en-US"/>
           </a:p>
@@ -1212,7 +1298,7 @@
           <a:p>
             <a:fld id="{E759B8C4-E491-4AE8-BFE3-235CF9118C4F}" type="datetimeFigureOut">
               <a:rPr kumimoji="1" lang="ja-JP" altLang="en-US" smtClean="0"/>
-              <a:t>2019/3/12</a:t>
+              <a:t>2019/3/22</a:t>
             </a:fld>
             <a:endParaRPr kumimoji="1" lang="ja-JP" altLang="en-US"/>
           </a:p>
@@ -1442,7 +1528,7 @@
           <a:p>
             <a:fld id="{E759B8C4-E491-4AE8-BFE3-235CF9118C4F}" type="datetimeFigureOut">
               <a:rPr kumimoji="1" lang="ja-JP" altLang="en-US" smtClean="0"/>
-              <a:t>2019/3/12</a:t>
+              <a:t>2019/3/22</a:t>
             </a:fld>
             <a:endParaRPr kumimoji="1" lang="ja-JP" altLang="en-US"/>
           </a:p>
@@ -1717,7 +1803,7 @@
           <a:p>
             <a:fld id="{E759B8C4-E491-4AE8-BFE3-235CF9118C4F}" type="datetimeFigureOut">
               <a:rPr kumimoji="1" lang="ja-JP" altLang="en-US" smtClean="0"/>
-              <a:t>2019/3/12</a:t>
+              <a:t>2019/3/22</a:t>
             </a:fld>
             <a:endParaRPr kumimoji="1" lang="ja-JP" altLang="en-US"/>
           </a:p>
@@ -2046,7 +2132,7 @@
           <a:p>
             <a:fld id="{E759B8C4-E491-4AE8-BFE3-235CF9118C4F}" type="datetimeFigureOut">
               <a:rPr kumimoji="1" lang="ja-JP" altLang="en-US" smtClean="0"/>
-              <a:t>2019/3/12</a:t>
+              <a:t>2019/3/22</a:t>
             </a:fld>
             <a:endParaRPr kumimoji="1" lang="ja-JP" altLang="en-US"/>
           </a:p>
@@ -2522,7 +2608,7 @@
           <a:p>
             <a:fld id="{E759B8C4-E491-4AE8-BFE3-235CF9118C4F}" type="datetimeFigureOut">
               <a:rPr kumimoji="1" lang="ja-JP" altLang="en-US" smtClean="0"/>
-              <a:t>2019/3/12</a:t>
+              <a:t>2019/3/22</a:t>
             </a:fld>
             <a:endParaRPr kumimoji="1" lang="ja-JP" altLang="en-US"/>
           </a:p>
@@ -2663,7 +2749,7 @@
           <a:p>
             <a:fld id="{E759B8C4-E491-4AE8-BFE3-235CF9118C4F}" type="datetimeFigureOut">
               <a:rPr kumimoji="1" lang="ja-JP" altLang="en-US" smtClean="0"/>
-              <a:t>2019/3/12</a:t>
+              <a:t>2019/3/22</a:t>
             </a:fld>
             <a:endParaRPr kumimoji="1" lang="ja-JP" altLang="en-US"/>
           </a:p>
@@ -2776,7 +2862,7 @@
           <a:p>
             <a:fld id="{E759B8C4-E491-4AE8-BFE3-235CF9118C4F}" type="datetimeFigureOut">
               <a:rPr kumimoji="1" lang="ja-JP" altLang="en-US" smtClean="0"/>
-              <a:t>2019/3/12</a:t>
+              <a:t>2019/3/22</a:t>
             </a:fld>
             <a:endParaRPr kumimoji="1" lang="ja-JP" altLang="en-US"/>
           </a:p>
@@ -3119,7 +3205,7 @@
           <a:p>
             <a:fld id="{E759B8C4-E491-4AE8-BFE3-235CF9118C4F}" type="datetimeFigureOut">
               <a:rPr kumimoji="1" lang="ja-JP" altLang="en-US" smtClean="0"/>
-              <a:t>2019/3/12</a:t>
+              <a:t>2019/3/22</a:t>
             </a:fld>
             <a:endParaRPr kumimoji="1" lang="ja-JP" altLang="en-US"/>
           </a:p>
@@ -3407,7 +3493,7 @@
           <a:p>
             <a:fld id="{E759B8C4-E491-4AE8-BFE3-235CF9118C4F}" type="datetimeFigureOut">
               <a:rPr kumimoji="1" lang="ja-JP" altLang="en-US" smtClean="0"/>
-              <a:t>2019/3/12</a:t>
+              <a:t>2019/3/22</a:t>
             </a:fld>
             <a:endParaRPr kumimoji="1" lang="ja-JP" altLang="en-US"/>
           </a:p>
@@ -3680,7 +3766,7 @@
           <a:p>
             <a:fld id="{E759B8C4-E491-4AE8-BFE3-235CF9118C4F}" type="datetimeFigureOut">
               <a:rPr kumimoji="1" lang="ja-JP" altLang="en-US" smtClean="0"/>
-              <a:t>2019/3/12</a:t>
+              <a:t>2019/3/22</a:t>
             </a:fld>
             <a:endParaRPr kumimoji="1" lang="ja-JP" altLang="en-US"/>
           </a:p>
@@ -4744,6 +4830,2250 @@
     <p:extLst>
       <p:ext uri="{BB962C8B-B14F-4D97-AF65-F5344CB8AC3E}">
         <p14:creationId xmlns:p14="http://schemas.microsoft.com/office/powerpoint/2010/main" val="3492455646"/>
+      </p:ext>
+    </p:extLst>
+  </p:cSld>
+  <p:clrMapOvr>
+    <a:masterClrMapping/>
+  </p:clrMapOvr>
+</p:sld>
+</file>
+
+<file path=ppt/slides/slide10.xml><?xml version="1.0" encoding="utf-8"?>
+<p:sld xmlns:a="http://schemas.openxmlformats.org/drawingml/2006/main" xmlns:r="http://schemas.openxmlformats.org/officeDocument/2006/relationships" xmlns:p="http://schemas.openxmlformats.org/presentationml/2006/main">
+  <p:cSld>
+    <p:spTree>
+      <p:nvGrpSpPr>
+        <p:cNvPr id="1" name=""/>
+        <p:cNvGrpSpPr/>
+        <p:nvPr/>
+      </p:nvGrpSpPr>
+      <p:grpSpPr>
+        <a:xfrm>
+          <a:off x="0" y="0"/>
+          <a:ext cx="0" cy="0"/>
+          <a:chOff x="0" y="0"/>
+          <a:chExt cx="0" cy="0"/>
+        </a:xfrm>
+      </p:grpSpPr>
+      <p:sp>
+        <p:nvSpPr>
+          <p:cNvPr id="24" name="正方形/長方形 23">
+            <a:extLst>
+              <a:ext uri="{FF2B5EF4-FFF2-40B4-BE49-F238E27FC236}">
+                <a16:creationId xmlns:a16="http://schemas.microsoft.com/office/drawing/2014/main" id="{7F22FDF9-CD34-44FC-A142-278E1B05C7F2}"/>
+              </a:ext>
+            </a:extLst>
+          </p:cNvPr>
+          <p:cNvSpPr/>
+          <p:nvPr/>
+        </p:nvSpPr>
+        <p:spPr>
+          <a:xfrm>
+            <a:off x="-1264880" y="2002163"/>
+            <a:ext cx="14588565" cy="2853674"/>
+          </a:xfrm>
+          <a:prstGeom prst="rect">
+            <a:avLst/>
+          </a:prstGeom>
+          <a:solidFill>
+            <a:schemeClr val="bg1"/>
+          </a:solidFill>
+          <a:ln>
+            <a:noFill/>
+          </a:ln>
+        </p:spPr>
+        <p:style>
+          <a:lnRef idx="2">
+            <a:schemeClr val="accent1">
+              <a:shade val="50000"/>
+            </a:schemeClr>
+          </a:lnRef>
+          <a:fillRef idx="1">
+            <a:schemeClr val="accent1"/>
+          </a:fillRef>
+          <a:effectRef idx="0">
+            <a:schemeClr val="accent1"/>
+          </a:effectRef>
+          <a:fontRef idx="minor">
+            <a:schemeClr val="lt1"/>
+          </a:fontRef>
+        </p:style>
+        <p:txBody>
+          <a:bodyPr rtlCol="0" anchor="ctr"/>
+          <a:lstStyle/>
+          <a:p>
+            <a:pPr algn="ctr"/>
+            <a:endParaRPr kumimoji="1" lang="ja-JP" altLang="en-US"/>
+          </a:p>
+        </p:txBody>
+      </p:sp>
+      <p:sp>
+        <p:nvSpPr>
+          <p:cNvPr id="6" name="四角形: 角を丸くする 5">
+            <a:extLst>
+              <a:ext uri="{FF2B5EF4-FFF2-40B4-BE49-F238E27FC236}">
+                <a16:creationId xmlns:a16="http://schemas.microsoft.com/office/drawing/2014/main" id="{E1883DBD-7E83-4F3C-8FC8-563AEB36A257}"/>
+              </a:ext>
+            </a:extLst>
+          </p:cNvPr>
+          <p:cNvSpPr/>
+          <p:nvPr/>
+        </p:nvSpPr>
+        <p:spPr>
+          <a:xfrm>
+            <a:off x="-1007117" y="2989132"/>
+            <a:ext cx="2654969" cy="1119418"/>
+          </a:xfrm>
+          <a:prstGeom prst="roundRect">
+            <a:avLst/>
+          </a:prstGeom>
+          <a:solidFill>
+            <a:srgbClr val="7F7F7F"/>
+          </a:solidFill>
+          <a:ln>
+            <a:noFill/>
+          </a:ln>
+          <a:effectLst>
+            <a:outerShdw blurRad="50800" dist="38100" dir="2700000" algn="tl" rotWithShape="0">
+              <a:prstClr val="black">
+                <a:alpha val="40000"/>
+              </a:prstClr>
+            </a:outerShdw>
+          </a:effectLst>
+        </p:spPr>
+        <p:style>
+          <a:lnRef idx="3">
+            <a:schemeClr val="lt1"/>
+          </a:lnRef>
+          <a:fillRef idx="1">
+            <a:schemeClr val="accent3"/>
+          </a:fillRef>
+          <a:effectRef idx="1">
+            <a:schemeClr val="accent3"/>
+          </a:effectRef>
+          <a:fontRef idx="minor">
+            <a:schemeClr val="lt1"/>
+          </a:fontRef>
+        </p:style>
+        <p:txBody>
+          <a:bodyPr lIns="72000" tIns="36000" rIns="72000" bIns="36000" rtlCol="0" anchor="t"/>
+          <a:lstStyle/>
+          <a:p>
+            <a:pPr algn="ctr"/>
+            <a:r>
+              <a:rPr kumimoji="1" lang="en-US" altLang="ja-JP" sz="2400" b="1" dirty="0">
+                <a:solidFill>
+                  <a:schemeClr val="tx1"/>
+                </a:solidFill>
+              </a:rPr>
+              <a:t>Client</a:t>
+            </a:r>
+          </a:p>
+        </p:txBody>
+      </p:sp>
+      <p:sp>
+        <p:nvSpPr>
+          <p:cNvPr id="8" name="四角形: 角を丸くする 7">
+            <a:extLst>
+              <a:ext uri="{FF2B5EF4-FFF2-40B4-BE49-F238E27FC236}">
+                <a16:creationId xmlns:a16="http://schemas.microsoft.com/office/drawing/2014/main" id="{A4B36517-6546-4324-B602-66920A143647}"/>
+              </a:ext>
+            </a:extLst>
+          </p:cNvPr>
+          <p:cNvSpPr/>
+          <p:nvPr/>
+        </p:nvSpPr>
+        <p:spPr>
+          <a:xfrm>
+            <a:off x="4702233" y="2996782"/>
+            <a:ext cx="2656800" cy="1119418"/>
+          </a:xfrm>
+          <a:prstGeom prst="roundRect">
+            <a:avLst/>
+          </a:prstGeom>
+          <a:solidFill>
+            <a:srgbClr val="7F7F7F"/>
+          </a:solidFill>
+          <a:ln>
+            <a:noFill/>
+          </a:ln>
+          <a:effectLst>
+            <a:outerShdw blurRad="50800" dist="38100" dir="2700000" algn="tl" rotWithShape="0">
+              <a:prstClr val="black">
+                <a:alpha val="40000"/>
+              </a:prstClr>
+            </a:outerShdw>
+          </a:effectLst>
+        </p:spPr>
+        <p:style>
+          <a:lnRef idx="3">
+            <a:schemeClr val="lt1"/>
+          </a:lnRef>
+          <a:fillRef idx="1">
+            <a:schemeClr val="accent3"/>
+          </a:fillRef>
+          <a:effectRef idx="1">
+            <a:schemeClr val="accent3"/>
+          </a:effectRef>
+          <a:fontRef idx="minor">
+            <a:schemeClr val="lt1"/>
+          </a:fontRef>
+        </p:style>
+        <p:txBody>
+          <a:bodyPr lIns="72000" tIns="36000" rIns="72000" bIns="36000" rtlCol="0" anchor="t"/>
+          <a:lstStyle/>
+          <a:p>
+            <a:pPr algn="ctr"/>
+            <a:r>
+              <a:rPr kumimoji="1" lang="en-US" altLang="ja-JP" sz="2400" b="1" dirty="0">
+                <a:solidFill>
+                  <a:schemeClr val="tx1"/>
+                </a:solidFill>
+              </a:rPr>
+              <a:t>Servient</a:t>
+            </a:r>
+          </a:p>
+        </p:txBody>
+      </p:sp>
+      <p:sp>
+        <p:nvSpPr>
+          <p:cNvPr id="9" name="四角形: 角を丸くする 8">
+            <a:extLst>
+              <a:ext uri="{FF2B5EF4-FFF2-40B4-BE49-F238E27FC236}">
+                <a16:creationId xmlns:a16="http://schemas.microsoft.com/office/drawing/2014/main" id="{478343BE-306E-4657-841B-17ACD2762DA9}"/>
+              </a:ext>
+            </a:extLst>
+          </p:cNvPr>
+          <p:cNvSpPr/>
+          <p:nvPr/>
+        </p:nvSpPr>
+        <p:spPr>
+          <a:xfrm>
+            <a:off x="2273464" y="-866437"/>
+            <a:ext cx="812800" cy="440267"/>
+          </a:xfrm>
+          <a:prstGeom prst="roundRect">
+            <a:avLst/>
+          </a:prstGeom>
+          <a:solidFill>
+            <a:srgbClr val="00B050"/>
+          </a:solidFill>
+          <a:ln>
+            <a:noFill/>
+          </a:ln>
+        </p:spPr>
+        <p:style>
+          <a:lnRef idx="1">
+            <a:schemeClr val="accent5"/>
+          </a:lnRef>
+          <a:fillRef idx="3">
+            <a:schemeClr val="accent5"/>
+          </a:fillRef>
+          <a:effectRef idx="2">
+            <a:schemeClr val="accent5"/>
+          </a:effectRef>
+          <a:fontRef idx="minor">
+            <a:schemeClr val="lt1"/>
+          </a:fontRef>
+        </p:style>
+        <p:txBody>
+          <a:bodyPr rtlCol="0" anchor="ctr"/>
+          <a:lstStyle/>
+          <a:p>
+            <a:pPr algn="ctr"/>
+            <a:r>
+              <a:rPr kumimoji="1" lang="en-US" altLang="ja-JP" sz="3200" dirty="0"/>
+              <a:t>C</a:t>
+            </a:r>
+            <a:endParaRPr kumimoji="1" lang="ja-JP" altLang="en-US" sz="3200" dirty="0"/>
+          </a:p>
+        </p:txBody>
+      </p:sp>
+      <p:sp>
+        <p:nvSpPr>
+          <p:cNvPr id="10" name="四角形: 角を丸くする 9">
+            <a:extLst>
+              <a:ext uri="{FF2B5EF4-FFF2-40B4-BE49-F238E27FC236}">
+                <a16:creationId xmlns:a16="http://schemas.microsoft.com/office/drawing/2014/main" id="{7F7394D1-AB71-4F83-88CF-0D70AEA90BB3}"/>
+              </a:ext>
+            </a:extLst>
+          </p:cNvPr>
+          <p:cNvSpPr/>
+          <p:nvPr/>
+        </p:nvSpPr>
+        <p:spPr>
+          <a:xfrm>
+            <a:off x="4812522" y="3556491"/>
+            <a:ext cx="1205375" cy="432617"/>
+          </a:xfrm>
+          <a:prstGeom prst="roundRect">
+            <a:avLst/>
+          </a:prstGeom>
+          <a:solidFill>
+            <a:srgbClr val="00B050"/>
+          </a:solidFill>
+          <a:ln>
+            <a:noFill/>
+          </a:ln>
+        </p:spPr>
+        <p:style>
+          <a:lnRef idx="1">
+            <a:schemeClr val="accent5"/>
+          </a:lnRef>
+          <a:fillRef idx="3">
+            <a:schemeClr val="accent5"/>
+          </a:fillRef>
+          <a:effectRef idx="2">
+            <a:schemeClr val="accent5"/>
+          </a:effectRef>
+          <a:fontRef idx="minor">
+            <a:schemeClr val="lt1"/>
+          </a:fontRef>
+        </p:style>
+        <p:txBody>
+          <a:bodyPr rtlCol="0" anchor="ctr"/>
+          <a:lstStyle/>
+          <a:p>
+            <a:pPr algn="ctr">
+              <a:lnSpc>
+                <a:spcPct val="80000"/>
+              </a:lnSpc>
+            </a:pPr>
+            <a:r>
+              <a:rPr lang="en-US" altLang="ja-JP" sz="2000" dirty="0"/>
+              <a:t>Exposed</a:t>
+            </a:r>
+          </a:p>
+          <a:p>
+            <a:pPr algn="ctr">
+              <a:lnSpc>
+                <a:spcPct val="80000"/>
+              </a:lnSpc>
+            </a:pPr>
+            <a:r>
+              <a:rPr lang="en-US" altLang="ja-JP" sz="2000" dirty="0"/>
+              <a:t>Thing</a:t>
+            </a:r>
+            <a:endParaRPr kumimoji="1" lang="ja-JP" altLang="en-US" sz="2000" dirty="0"/>
+          </a:p>
+        </p:txBody>
+      </p:sp>
+      <p:sp>
+        <p:nvSpPr>
+          <p:cNvPr id="13" name="四角形: 角を丸くする 12">
+            <a:extLst>
+              <a:ext uri="{FF2B5EF4-FFF2-40B4-BE49-F238E27FC236}">
+                <a16:creationId xmlns:a16="http://schemas.microsoft.com/office/drawing/2014/main" id="{B5CD2B9F-227C-466A-9DC6-760504E532C1}"/>
+              </a:ext>
+            </a:extLst>
+          </p:cNvPr>
+          <p:cNvSpPr/>
+          <p:nvPr/>
+        </p:nvSpPr>
+        <p:spPr>
+          <a:xfrm>
+            <a:off x="7421657" y="-1333106"/>
+            <a:ext cx="812800" cy="440267"/>
+          </a:xfrm>
+          <a:prstGeom prst="roundRect">
+            <a:avLst/>
+          </a:prstGeom>
+          <a:solidFill>
+            <a:srgbClr val="00B050"/>
+          </a:solidFill>
+          <a:ln>
+            <a:noFill/>
+          </a:ln>
+        </p:spPr>
+        <p:style>
+          <a:lnRef idx="1">
+            <a:schemeClr val="accent5"/>
+          </a:lnRef>
+          <a:fillRef idx="3">
+            <a:schemeClr val="accent5"/>
+          </a:fillRef>
+          <a:effectRef idx="2">
+            <a:schemeClr val="accent5"/>
+          </a:effectRef>
+          <a:fontRef idx="minor">
+            <a:schemeClr val="lt1"/>
+          </a:fontRef>
+        </p:style>
+        <p:txBody>
+          <a:bodyPr rtlCol="0" anchor="ctr"/>
+          <a:lstStyle/>
+          <a:p>
+            <a:pPr algn="ctr"/>
+            <a:r>
+              <a:rPr kumimoji="1" lang="en-US" altLang="ja-JP" sz="3200" dirty="0"/>
+              <a:t>C</a:t>
+            </a:r>
+            <a:endParaRPr kumimoji="1" lang="ja-JP" altLang="en-US" sz="3200" dirty="0"/>
+          </a:p>
+        </p:txBody>
+      </p:sp>
+      <p:sp>
+        <p:nvSpPr>
+          <p:cNvPr id="14" name="四角形: 角を丸くする 13">
+            <a:extLst>
+              <a:ext uri="{FF2B5EF4-FFF2-40B4-BE49-F238E27FC236}">
+                <a16:creationId xmlns:a16="http://schemas.microsoft.com/office/drawing/2014/main" id="{DAC9719D-BC55-4BAA-827B-3741647E133B}"/>
+              </a:ext>
+            </a:extLst>
+          </p:cNvPr>
+          <p:cNvSpPr/>
+          <p:nvPr/>
+        </p:nvSpPr>
+        <p:spPr>
+          <a:xfrm>
+            <a:off x="7421657" y="-2008619"/>
+            <a:ext cx="812800" cy="440267"/>
+          </a:xfrm>
+          <a:prstGeom prst="roundRect">
+            <a:avLst/>
+          </a:prstGeom>
+          <a:solidFill>
+            <a:srgbClr val="00B050"/>
+          </a:solidFill>
+          <a:ln>
+            <a:noFill/>
+          </a:ln>
+        </p:spPr>
+        <p:style>
+          <a:lnRef idx="1">
+            <a:schemeClr val="accent5"/>
+          </a:lnRef>
+          <a:fillRef idx="3">
+            <a:schemeClr val="accent5"/>
+          </a:fillRef>
+          <a:effectRef idx="2">
+            <a:schemeClr val="accent5"/>
+          </a:effectRef>
+          <a:fontRef idx="minor">
+            <a:schemeClr val="lt1"/>
+          </a:fontRef>
+        </p:style>
+        <p:txBody>
+          <a:bodyPr rtlCol="0" anchor="ctr"/>
+          <a:lstStyle/>
+          <a:p>
+            <a:pPr algn="ctr"/>
+            <a:r>
+              <a:rPr kumimoji="1" lang="en-US" altLang="ja-JP" sz="3200" dirty="0"/>
+              <a:t>E</a:t>
+            </a:r>
+            <a:endParaRPr kumimoji="1" lang="ja-JP" altLang="en-US" sz="3200" dirty="0"/>
+          </a:p>
+        </p:txBody>
+      </p:sp>
+      <p:sp>
+        <p:nvSpPr>
+          <p:cNvPr id="15" name="四角形: メモ 14">
+            <a:extLst>
+              <a:ext uri="{FF2B5EF4-FFF2-40B4-BE49-F238E27FC236}">
+                <a16:creationId xmlns:a16="http://schemas.microsoft.com/office/drawing/2014/main" id="{B13C0EAD-EA26-4ADA-AFD3-C60E5A7E354F}"/>
+              </a:ext>
+            </a:extLst>
+          </p:cNvPr>
+          <p:cNvSpPr/>
+          <p:nvPr/>
+        </p:nvSpPr>
+        <p:spPr>
+          <a:xfrm>
+            <a:off x="7421657" y="-646304"/>
+            <a:ext cx="812800" cy="440267"/>
+          </a:xfrm>
+          <a:prstGeom prst="foldedCorner">
+            <a:avLst/>
+          </a:prstGeom>
+          <a:solidFill>
+            <a:srgbClr val="4A7B7C"/>
+          </a:solidFill>
+          <a:ln>
+            <a:noFill/>
+          </a:ln>
+        </p:spPr>
+        <p:style>
+          <a:lnRef idx="1">
+            <a:schemeClr val="accent5"/>
+          </a:lnRef>
+          <a:fillRef idx="3">
+            <a:schemeClr val="accent5"/>
+          </a:fillRef>
+          <a:effectRef idx="2">
+            <a:schemeClr val="accent5"/>
+          </a:effectRef>
+          <a:fontRef idx="minor">
+            <a:schemeClr val="lt1"/>
+          </a:fontRef>
+        </p:style>
+        <p:txBody>
+          <a:bodyPr rtlCol="0" anchor="ctr"/>
+          <a:lstStyle/>
+          <a:p>
+            <a:pPr algn="ctr"/>
+            <a:r>
+              <a:rPr kumimoji="1" lang="en-US" altLang="ja-JP" sz="3200" dirty="0"/>
+              <a:t>TD</a:t>
+            </a:r>
+            <a:endParaRPr kumimoji="1" lang="ja-JP" altLang="en-US" sz="3200" dirty="0"/>
+          </a:p>
+        </p:txBody>
+      </p:sp>
+      <p:sp>
+        <p:nvSpPr>
+          <p:cNvPr id="16" name="テキスト ボックス 15">
+            <a:extLst>
+              <a:ext uri="{FF2B5EF4-FFF2-40B4-BE49-F238E27FC236}">
+                <a16:creationId xmlns:a16="http://schemas.microsoft.com/office/drawing/2014/main" id="{DF7894EE-1174-4828-B7DF-51B52BE5F642}"/>
+              </a:ext>
+            </a:extLst>
+          </p:cNvPr>
+          <p:cNvSpPr txBox="1"/>
+          <p:nvPr/>
+        </p:nvSpPr>
+        <p:spPr>
+          <a:xfrm>
+            <a:off x="8448945" y="-2111652"/>
+            <a:ext cx="2885726" cy="646331"/>
+          </a:xfrm>
+          <a:prstGeom prst="rect">
+            <a:avLst/>
+          </a:prstGeom>
+          <a:noFill/>
+        </p:spPr>
+        <p:txBody>
+          <a:bodyPr wrap="none" rtlCol="0">
+            <a:spAutoFit/>
+          </a:bodyPr>
+          <a:lstStyle/>
+          <a:p>
+            <a:r>
+              <a:rPr lang="en-US" altLang="ja-JP" sz="3600" dirty="0"/>
+              <a:t>Exposed</a:t>
+            </a:r>
+            <a:r>
+              <a:rPr lang="ja-JP" altLang="en-US" sz="3600" dirty="0"/>
+              <a:t> </a:t>
+            </a:r>
+            <a:r>
+              <a:rPr lang="en-US" altLang="ja-JP" sz="3600" dirty="0"/>
+              <a:t>Thing</a:t>
+            </a:r>
+            <a:endParaRPr kumimoji="1" lang="ja-JP" altLang="en-US" sz="3600" dirty="0"/>
+          </a:p>
+        </p:txBody>
+      </p:sp>
+      <p:sp>
+        <p:nvSpPr>
+          <p:cNvPr id="17" name="テキスト ボックス 16">
+            <a:extLst>
+              <a:ext uri="{FF2B5EF4-FFF2-40B4-BE49-F238E27FC236}">
+                <a16:creationId xmlns:a16="http://schemas.microsoft.com/office/drawing/2014/main" id="{0CF33ABF-3C66-435D-B875-AA53D751472E}"/>
+              </a:ext>
+            </a:extLst>
+          </p:cNvPr>
+          <p:cNvSpPr txBox="1"/>
+          <p:nvPr/>
+        </p:nvSpPr>
+        <p:spPr>
+          <a:xfrm>
+            <a:off x="8448945" y="-1429103"/>
+            <a:ext cx="3316934" cy="646331"/>
+          </a:xfrm>
+          <a:prstGeom prst="rect">
+            <a:avLst/>
+          </a:prstGeom>
+          <a:noFill/>
+        </p:spPr>
+        <p:txBody>
+          <a:bodyPr wrap="none" rtlCol="0">
+            <a:spAutoFit/>
+          </a:bodyPr>
+          <a:lstStyle/>
+          <a:p>
+            <a:r>
+              <a:rPr lang="en-US" altLang="ja-JP" sz="3600" dirty="0"/>
+              <a:t>Consumed Thing</a:t>
+            </a:r>
+            <a:endParaRPr kumimoji="1" lang="ja-JP" altLang="en-US" sz="3600" dirty="0"/>
+          </a:p>
+        </p:txBody>
+      </p:sp>
+      <p:sp>
+        <p:nvSpPr>
+          <p:cNvPr id="18" name="テキスト ボックス 17">
+            <a:extLst>
+              <a:ext uri="{FF2B5EF4-FFF2-40B4-BE49-F238E27FC236}">
+                <a16:creationId xmlns:a16="http://schemas.microsoft.com/office/drawing/2014/main" id="{F4CC1D14-7AA6-41AD-85BC-5B3BD9AC308C}"/>
+              </a:ext>
+            </a:extLst>
+          </p:cNvPr>
+          <p:cNvSpPr txBox="1"/>
+          <p:nvPr/>
+        </p:nvSpPr>
+        <p:spPr>
+          <a:xfrm>
+            <a:off x="8448945" y="-746554"/>
+            <a:ext cx="3462358" cy="646331"/>
+          </a:xfrm>
+          <a:prstGeom prst="rect">
+            <a:avLst/>
+          </a:prstGeom>
+          <a:noFill/>
+        </p:spPr>
+        <p:txBody>
+          <a:bodyPr wrap="none" rtlCol="0">
+            <a:spAutoFit/>
+          </a:bodyPr>
+          <a:lstStyle/>
+          <a:p>
+            <a:r>
+              <a:rPr lang="en-US" altLang="ja-JP" sz="3600" dirty="0"/>
+              <a:t>Thing Description</a:t>
+            </a:r>
+            <a:endParaRPr kumimoji="1" lang="ja-JP" altLang="en-US" sz="3600" dirty="0"/>
+          </a:p>
+        </p:txBody>
+      </p:sp>
+      <p:cxnSp>
+        <p:nvCxnSpPr>
+          <p:cNvPr id="21" name="直線矢印コネクタ 20">
+            <a:extLst>
+              <a:ext uri="{FF2B5EF4-FFF2-40B4-BE49-F238E27FC236}">
+                <a16:creationId xmlns:a16="http://schemas.microsoft.com/office/drawing/2014/main" id="{36428CDD-CC0D-4876-9F07-F4A6D227D45A}"/>
+              </a:ext>
+            </a:extLst>
+          </p:cNvPr>
+          <p:cNvCxnSpPr>
+            <a:cxnSpLocks/>
+          </p:cNvCxnSpPr>
+          <p:nvPr/>
+        </p:nvCxnSpPr>
+        <p:spPr>
+          <a:xfrm flipH="1">
+            <a:off x="2136189" y="-180230"/>
+            <a:ext cx="1389094" cy="0"/>
+          </a:xfrm>
+          <a:prstGeom prst="straightConnector1">
+            <a:avLst/>
+          </a:prstGeom>
+          <a:ln w="57150">
+            <a:solidFill>
+              <a:schemeClr val="tx1"/>
+            </a:solidFill>
+            <a:prstDash val="sysDash"/>
+            <a:tailEnd type="triangle"/>
+          </a:ln>
+        </p:spPr>
+        <p:style>
+          <a:lnRef idx="1">
+            <a:schemeClr val="accent1"/>
+          </a:lnRef>
+          <a:fillRef idx="0">
+            <a:schemeClr val="accent1"/>
+          </a:fillRef>
+          <a:effectRef idx="0">
+            <a:schemeClr val="accent1"/>
+          </a:effectRef>
+          <a:fontRef idx="minor">
+            <a:schemeClr val="tx1"/>
+          </a:fontRef>
+        </p:style>
+      </p:cxnSp>
+      <p:sp>
+        <p:nvSpPr>
+          <p:cNvPr id="19" name="四角形: 角を丸くする 18">
+            <a:extLst>
+              <a:ext uri="{FF2B5EF4-FFF2-40B4-BE49-F238E27FC236}">
+                <a16:creationId xmlns:a16="http://schemas.microsoft.com/office/drawing/2014/main" id="{46146C38-6712-4A36-BEAE-7DD2A922D693}"/>
+              </a:ext>
+            </a:extLst>
+          </p:cNvPr>
+          <p:cNvSpPr/>
+          <p:nvPr/>
+        </p:nvSpPr>
+        <p:spPr>
+          <a:xfrm>
+            <a:off x="-820644" y="3548841"/>
+            <a:ext cx="2282021" cy="440267"/>
+          </a:xfrm>
+          <a:prstGeom prst="roundRect">
+            <a:avLst/>
+          </a:prstGeom>
+          <a:solidFill>
+            <a:srgbClr val="00B050"/>
+          </a:solidFill>
+          <a:ln>
+            <a:noFill/>
+          </a:ln>
+        </p:spPr>
+        <p:style>
+          <a:lnRef idx="1">
+            <a:schemeClr val="accent5"/>
+          </a:lnRef>
+          <a:fillRef idx="3">
+            <a:schemeClr val="accent5"/>
+          </a:fillRef>
+          <a:effectRef idx="2">
+            <a:schemeClr val="accent5"/>
+          </a:effectRef>
+          <a:fontRef idx="minor">
+            <a:schemeClr val="lt1"/>
+          </a:fontRef>
+        </p:style>
+        <p:txBody>
+          <a:bodyPr wrap="none" rtlCol="0" anchor="ctr"/>
+          <a:lstStyle/>
+          <a:p>
+            <a:pPr algn="ctr"/>
+            <a:r>
+              <a:rPr kumimoji="1" lang="en-US" altLang="ja-JP" sz="2000" dirty="0"/>
+              <a:t>Consumed Thing</a:t>
+            </a:r>
+            <a:endParaRPr kumimoji="1" lang="ja-JP" altLang="en-US" sz="2000" dirty="0"/>
+          </a:p>
+        </p:txBody>
+      </p:sp>
+      <p:cxnSp>
+        <p:nvCxnSpPr>
+          <p:cNvPr id="25" name="Gerade Verbindung mit Pfeil 42">
+            <a:extLst>
+              <a:ext uri="{FF2B5EF4-FFF2-40B4-BE49-F238E27FC236}">
+                <a16:creationId xmlns:a16="http://schemas.microsoft.com/office/drawing/2014/main" id="{32FD418E-ACA3-4090-96FF-CBAAD989B740}"/>
+              </a:ext>
+            </a:extLst>
+          </p:cNvPr>
+          <p:cNvCxnSpPr>
+            <a:cxnSpLocks/>
+            <a:endCxn id="10" idx="1"/>
+          </p:cNvCxnSpPr>
+          <p:nvPr/>
+        </p:nvCxnSpPr>
+        <p:spPr>
+          <a:xfrm flipV="1">
+            <a:off x="1383689" y="3772800"/>
+            <a:ext cx="3428833" cy="11476"/>
+          </a:xfrm>
+          <a:prstGeom prst="straightConnector1">
+            <a:avLst/>
+          </a:prstGeom>
+          <a:ln w="38100">
+            <a:solidFill>
+              <a:srgbClr val="008000"/>
+            </a:solidFill>
+            <a:prstDash val="sysDot"/>
+            <a:headEnd type="arrow" w="med" len="med"/>
+            <a:tailEnd type="arrow" w="med" len="med"/>
+          </a:ln>
+        </p:spPr>
+        <p:style>
+          <a:lnRef idx="1">
+            <a:schemeClr val="accent1"/>
+          </a:lnRef>
+          <a:fillRef idx="0">
+            <a:schemeClr val="accent1"/>
+          </a:fillRef>
+          <a:effectRef idx="0">
+            <a:schemeClr val="accent1"/>
+          </a:effectRef>
+          <a:fontRef idx="minor">
+            <a:schemeClr val="tx1"/>
+          </a:fontRef>
+        </p:style>
+      </p:cxnSp>
+      <p:grpSp>
+        <p:nvGrpSpPr>
+          <p:cNvPr id="29" name="Group 38">
+            <a:extLst>
+              <a:ext uri="{FF2B5EF4-FFF2-40B4-BE49-F238E27FC236}">
+                <a16:creationId xmlns:a16="http://schemas.microsoft.com/office/drawing/2014/main" id="{4FFE457D-83D2-49D0-A0F3-DDFEEA55E2E5}"/>
+              </a:ext>
+            </a:extLst>
+          </p:cNvPr>
+          <p:cNvGrpSpPr/>
+          <p:nvPr/>
+        </p:nvGrpSpPr>
+        <p:grpSpPr>
+          <a:xfrm>
+            <a:off x="2188079" y="2728491"/>
+            <a:ext cx="2060941" cy="828000"/>
+            <a:chOff x="2670082" y="4186219"/>
+            <a:chExt cx="2060941" cy="828000"/>
+          </a:xfrm>
+        </p:grpSpPr>
+        <p:sp>
+          <p:nvSpPr>
+            <p:cNvPr id="30" name="角丸四角形 21">
+              <a:extLst>
+                <a:ext uri="{FF2B5EF4-FFF2-40B4-BE49-F238E27FC236}">
+                  <a16:creationId xmlns:a16="http://schemas.microsoft.com/office/drawing/2014/main" id="{024C5D63-C675-4753-B4EC-F2F06403B347}"/>
+                </a:ext>
+              </a:extLst>
+            </p:cNvPr>
+            <p:cNvSpPr/>
+            <p:nvPr/>
+          </p:nvSpPr>
+          <p:spPr bwMode="auto">
+            <a:xfrm>
+              <a:off x="2670082" y="4186219"/>
+              <a:ext cx="2060941" cy="828000"/>
+            </a:xfrm>
+            <a:prstGeom prst="foldedCorner">
+              <a:avLst>
+                <a:gd name="adj" fmla="val 20194"/>
+              </a:avLst>
+            </a:prstGeom>
+            <a:solidFill>
+              <a:srgbClr val="C0504D"/>
+            </a:solidFill>
+            <a:ln w="25400" cap="flat" cmpd="sng" algn="ctr">
+              <a:noFill/>
+              <a:prstDash val="solid"/>
+              <a:round/>
+              <a:headEnd type="none" w="med" len="med"/>
+              <a:tailEnd type="none" w="med" len="med"/>
+            </a:ln>
+            <a:effectLst/>
+            <a:extLst/>
+          </p:spPr>
+          <p:txBody>
+            <a:bodyPr vert="horz" wrap="none" lIns="432000" tIns="144000" rIns="0" bIns="0" numCol="1" rtlCol="0" anchor="ctr" anchorCtr="0" compatLnSpc="1">
+              <a:prstTxWarp prst="textNoShape">
+                <a:avLst/>
+              </a:prstTxWarp>
+              <a:noAutofit/>
+            </a:bodyPr>
+            <a:lstStyle/>
+            <a:p>
+              <a:pPr marL="0" marR="0" lvl="0" indent="0" algn="ctr" defTabSz="914400" eaLnBrk="1" fontAlgn="ctr" latinLnBrk="0" hangingPunct="1">
+                <a:lnSpc>
+                  <a:spcPct val="100000"/>
+                </a:lnSpc>
+                <a:spcBef>
+                  <a:spcPts val="0"/>
+                </a:spcBef>
+                <a:spcAft>
+                  <a:spcPts val="0"/>
+                </a:spcAft>
+                <a:buClrTx/>
+                <a:buSzTx/>
+                <a:buFontTx/>
+                <a:buNone/>
+                <a:tabLst/>
+                <a:defRPr/>
+              </a:pPr>
+              <a:r>
+                <a:rPr kumimoji="0" lang="en-US" altLang="ja-JP" sz="2000" i="0" u="none" strike="noStrike" kern="0" cap="none" spc="0" normalizeH="0" baseline="0" dirty="0" err="1">
+                  <a:ln>
+                    <a:noFill/>
+                  </a:ln>
+                  <a:solidFill>
+                    <a:prstClr val="white"/>
+                  </a:solidFill>
+                  <a:effectLst/>
+                  <a:uLnTx/>
+                  <a:uFillTx/>
+                  <a:latin typeface="+mj-lt"/>
+                  <a:ea typeface="HG明朝E" panose="02020909000000000000" pitchFamily="17" charset="-128"/>
+                  <a:cs typeface="Arial" pitchFamily="34" charset="0"/>
+                </a:rPr>
+                <a:t>WoT</a:t>
+              </a:r>
+              <a:r>
+                <a:rPr kumimoji="0" lang="en-US" altLang="ja-JP" sz="2000" i="0" u="none" strike="noStrike" kern="0" cap="none" spc="0" normalizeH="0" baseline="0" dirty="0">
+                  <a:ln>
+                    <a:noFill/>
+                  </a:ln>
+                  <a:solidFill>
+                    <a:prstClr val="white"/>
+                  </a:solidFill>
+                  <a:effectLst/>
+                  <a:uLnTx/>
+                  <a:uFillTx/>
+                  <a:latin typeface="+mj-lt"/>
+                  <a:ea typeface="HG明朝E" panose="02020909000000000000" pitchFamily="17" charset="-128"/>
+                  <a:cs typeface="Arial" pitchFamily="34" charset="0"/>
+                </a:rPr>
+                <a:t> Thing</a:t>
+              </a:r>
+              <a:br>
+                <a:rPr kumimoji="0" lang="en-US" altLang="ja-JP" sz="2000" i="0" u="none" strike="noStrike" kern="0" cap="none" spc="0" normalizeH="0" baseline="0" dirty="0">
+                  <a:ln>
+                    <a:noFill/>
+                  </a:ln>
+                  <a:solidFill>
+                    <a:prstClr val="white"/>
+                  </a:solidFill>
+                  <a:effectLst/>
+                  <a:uLnTx/>
+                  <a:uFillTx/>
+                  <a:latin typeface="+mj-lt"/>
+                  <a:ea typeface="HG明朝E" panose="02020909000000000000" pitchFamily="17" charset="-128"/>
+                  <a:cs typeface="Arial" pitchFamily="34" charset="0"/>
+                </a:rPr>
+              </a:br>
+              <a:r>
+                <a:rPr kumimoji="0" lang="en-US" altLang="ja-JP" sz="2000" i="0" u="none" strike="noStrike" kern="0" cap="none" spc="0" normalizeH="0" baseline="0" dirty="0">
+                  <a:ln>
+                    <a:noFill/>
+                  </a:ln>
+                  <a:solidFill>
+                    <a:prstClr val="white"/>
+                  </a:solidFill>
+                  <a:effectLst/>
+                  <a:uLnTx/>
+                  <a:uFillTx/>
+                  <a:latin typeface="+mj-lt"/>
+                  <a:ea typeface="HG明朝E" panose="02020909000000000000" pitchFamily="17" charset="-128"/>
+                  <a:cs typeface="Arial" pitchFamily="34" charset="0"/>
+                </a:rPr>
+                <a:t>Description</a:t>
+              </a:r>
+              <a:endParaRPr kumimoji="0" lang="en-US" altLang="ja-JP" sz="2800" i="0" u="none" strike="noStrike" kern="0" cap="none" spc="0" normalizeH="0" baseline="0" dirty="0">
+                <a:ln>
+                  <a:noFill/>
+                </a:ln>
+                <a:solidFill>
+                  <a:prstClr val="white"/>
+                </a:solidFill>
+                <a:effectLst/>
+                <a:uLnTx/>
+                <a:uFillTx/>
+                <a:latin typeface="+mj-lt"/>
+                <a:ea typeface="HG明朝E" panose="02020909000000000000" pitchFamily="17" charset="-128"/>
+                <a:cs typeface="Arial" pitchFamily="34" charset="0"/>
+              </a:endParaRPr>
+            </a:p>
+          </p:txBody>
+        </p:sp>
+        <p:grpSp>
+          <p:nvGrpSpPr>
+            <p:cNvPr id="31" name="Group 28">
+              <a:extLst>
+                <a:ext uri="{FF2B5EF4-FFF2-40B4-BE49-F238E27FC236}">
+                  <a16:creationId xmlns:a16="http://schemas.microsoft.com/office/drawing/2014/main" id="{A5488A5F-252B-4EB8-AA83-97711B5B4618}"/>
+                </a:ext>
+              </a:extLst>
+            </p:cNvPr>
+            <p:cNvGrpSpPr/>
+            <p:nvPr/>
+          </p:nvGrpSpPr>
+          <p:grpSpPr>
+            <a:xfrm>
+              <a:off x="2812207" y="4399725"/>
+              <a:ext cx="413417" cy="426971"/>
+              <a:chOff x="4042160" y="993559"/>
+              <a:chExt cx="548293" cy="566272"/>
+            </a:xfrm>
+            <a:solidFill>
+              <a:sysClr val="window" lastClr="FFFFFF"/>
+            </a:solidFill>
+          </p:grpSpPr>
+          <p:sp>
+            <p:nvSpPr>
+              <p:cNvPr id="32" name="Isosceles Triangle 29">
+                <a:extLst>
+                  <a:ext uri="{FF2B5EF4-FFF2-40B4-BE49-F238E27FC236}">
+                    <a16:creationId xmlns:a16="http://schemas.microsoft.com/office/drawing/2014/main" id="{AAB48341-E11F-47E0-ADE3-15F5732CB54D}"/>
+                  </a:ext>
+                </a:extLst>
+              </p:cNvPr>
+              <p:cNvSpPr/>
+              <p:nvPr/>
+            </p:nvSpPr>
+            <p:spPr>
+              <a:xfrm rot="1800000">
+                <a:off x="4184483" y="1052736"/>
+                <a:ext cx="405970" cy="349975"/>
+              </a:xfrm>
+              <a:prstGeom prst="triangle">
+                <a:avLst/>
+              </a:prstGeom>
+              <a:noFill/>
+              <a:ln w="28575" cap="rnd" cmpd="sng" algn="ctr">
+                <a:solidFill>
+                  <a:sysClr val="window" lastClr="FFFFFF"/>
+                </a:solidFill>
+                <a:prstDash val="solid"/>
+              </a:ln>
+              <a:effectLst/>
+            </p:spPr>
+            <p:txBody>
+              <a:bodyPr wrap="none" rtlCol="0" anchor="ctr"/>
+              <a:lstStyle/>
+              <a:p>
+                <a:pPr marL="0" marR="0" lvl="0" indent="0" algn="ctr" defTabSz="914400" eaLnBrk="1" fontAlgn="auto" latinLnBrk="0" hangingPunct="1">
+                  <a:lnSpc>
+                    <a:spcPct val="100000"/>
+                  </a:lnSpc>
+                  <a:spcBef>
+                    <a:spcPts val="0"/>
+                  </a:spcBef>
+                  <a:spcAft>
+                    <a:spcPts val="0"/>
+                  </a:spcAft>
+                  <a:buClrTx/>
+                  <a:buSzTx/>
+                  <a:buFontTx/>
+                  <a:buNone/>
+                  <a:tabLst/>
+                  <a:defRPr/>
+                </a:pPr>
+                <a:endParaRPr kumimoji="0" lang="en-US" sz="4400" i="0" u="none" strike="noStrike" kern="0" cap="none" spc="0" normalizeH="0" baseline="0">
+                  <a:ln>
+                    <a:noFill/>
+                  </a:ln>
+                  <a:solidFill>
+                    <a:prstClr val="white"/>
+                  </a:solidFill>
+                  <a:effectLst/>
+                  <a:uLnTx/>
+                  <a:uFillTx/>
+                  <a:latin typeface="+mj-lt"/>
+                  <a:cs typeface="Arial" pitchFamily="34" charset="0"/>
+                </a:endParaRPr>
+              </a:p>
+            </p:txBody>
+          </p:sp>
+          <p:sp>
+            <p:nvSpPr>
+              <p:cNvPr id="33" name="Oval 30">
+                <a:extLst>
+                  <a:ext uri="{FF2B5EF4-FFF2-40B4-BE49-F238E27FC236}">
+                    <a16:creationId xmlns:a16="http://schemas.microsoft.com/office/drawing/2014/main" id="{F5DD1807-415C-4F20-87B3-DC9D99DA43B9}"/>
+                  </a:ext>
+                </a:extLst>
+              </p:cNvPr>
+              <p:cNvSpPr/>
+              <p:nvPr/>
+            </p:nvSpPr>
+            <p:spPr>
+              <a:xfrm rot="19800000">
+                <a:off x="4394607" y="993559"/>
+                <a:ext cx="161145" cy="161145"/>
+              </a:xfrm>
+              <a:prstGeom prst="ellipse">
+                <a:avLst/>
+              </a:prstGeom>
+              <a:grpFill/>
+              <a:ln w="25400" cap="rnd" cmpd="sng" algn="ctr">
+                <a:noFill/>
+                <a:prstDash val="solid"/>
+              </a:ln>
+              <a:effectLst/>
+            </p:spPr>
+            <p:txBody>
+              <a:bodyPr wrap="none" rtlCol="0" anchor="ctr"/>
+              <a:lstStyle/>
+              <a:p>
+                <a:pPr marL="0" marR="0" lvl="0" indent="0" algn="ctr" defTabSz="914400" eaLnBrk="1" fontAlgn="auto" latinLnBrk="0" hangingPunct="1">
+                  <a:lnSpc>
+                    <a:spcPct val="100000"/>
+                  </a:lnSpc>
+                  <a:spcBef>
+                    <a:spcPts val="0"/>
+                  </a:spcBef>
+                  <a:spcAft>
+                    <a:spcPts val="0"/>
+                  </a:spcAft>
+                  <a:buClrTx/>
+                  <a:buSzTx/>
+                  <a:buFontTx/>
+                  <a:buNone/>
+                  <a:tabLst/>
+                  <a:defRPr/>
+                </a:pPr>
+                <a:endParaRPr kumimoji="0" lang="en-US" sz="4400" i="0" u="none" strike="noStrike" kern="0" cap="none" spc="0" normalizeH="0" baseline="0">
+                  <a:ln>
+                    <a:noFill/>
+                  </a:ln>
+                  <a:solidFill>
+                    <a:prstClr val="white"/>
+                  </a:solidFill>
+                  <a:effectLst/>
+                  <a:uLnTx/>
+                  <a:uFillTx/>
+                  <a:latin typeface="+mj-lt"/>
+                  <a:cs typeface="Arial" pitchFamily="34" charset="0"/>
+                </a:endParaRPr>
+              </a:p>
+            </p:txBody>
+          </p:sp>
+          <p:sp>
+            <p:nvSpPr>
+              <p:cNvPr id="34" name="Oval 31">
+                <a:extLst>
+                  <a:ext uri="{FF2B5EF4-FFF2-40B4-BE49-F238E27FC236}">
+                    <a16:creationId xmlns:a16="http://schemas.microsoft.com/office/drawing/2014/main" id="{ABEA0394-2BF9-4967-9823-22C32CCD88DA}"/>
+                  </a:ext>
+                </a:extLst>
+              </p:cNvPr>
+              <p:cNvSpPr/>
+              <p:nvPr/>
+            </p:nvSpPr>
+            <p:spPr>
+              <a:xfrm rot="19800000">
+                <a:off x="4042160" y="1196566"/>
+                <a:ext cx="161145" cy="161145"/>
+              </a:xfrm>
+              <a:prstGeom prst="ellipse">
+                <a:avLst/>
+              </a:prstGeom>
+              <a:grpFill/>
+              <a:ln w="25400" cap="rnd" cmpd="sng" algn="ctr">
+                <a:noFill/>
+                <a:prstDash val="solid"/>
+              </a:ln>
+              <a:effectLst/>
+            </p:spPr>
+            <p:txBody>
+              <a:bodyPr wrap="none" rtlCol="0" anchor="ctr"/>
+              <a:lstStyle/>
+              <a:p>
+                <a:pPr marL="0" marR="0" lvl="0" indent="0" algn="ctr" defTabSz="914400" eaLnBrk="1" fontAlgn="auto" latinLnBrk="0" hangingPunct="1">
+                  <a:lnSpc>
+                    <a:spcPct val="100000"/>
+                  </a:lnSpc>
+                  <a:spcBef>
+                    <a:spcPts val="0"/>
+                  </a:spcBef>
+                  <a:spcAft>
+                    <a:spcPts val="0"/>
+                  </a:spcAft>
+                  <a:buClrTx/>
+                  <a:buSzTx/>
+                  <a:buFontTx/>
+                  <a:buNone/>
+                  <a:tabLst/>
+                  <a:defRPr/>
+                </a:pPr>
+                <a:endParaRPr kumimoji="0" lang="en-US" sz="4400" i="0" u="none" strike="noStrike" kern="0" cap="none" spc="0" normalizeH="0" baseline="0">
+                  <a:ln>
+                    <a:noFill/>
+                  </a:ln>
+                  <a:solidFill>
+                    <a:prstClr val="white"/>
+                  </a:solidFill>
+                  <a:effectLst/>
+                  <a:uLnTx/>
+                  <a:uFillTx/>
+                  <a:latin typeface="+mj-lt"/>
+                  <a:cs typeface="Arial" pitchFamily="34" charset="0"/>
+                </a:endParaRPr>
+              </a:p>
+            </p:txBody>
+          </p:sp>
+          <p:sp>
+            <p:nvSpPr>
+              <p:cNvPr id="35" name="Oval 32">
+                <a:extLst>
+                  <a:ext uri="{FF2B5EF4-FFF2-40B4-BE49-F238E27FC236}">
+                    <a16:creationId xmlns:a16="http://schemas.microsoft.com/office/drawing/2014/main" id="{B86A9EA5-24F9-4D3F-AB41-726B8B8B7C20}"/>
+                  </a:ext>
+                </a:extLst>
+              </p:cNvPr>
+              <p:cNvSpPr/>
+              <p:nvPr/>
+            </p:nvSpPr>
+            <p:spPr>
+              <a:xfrm rot="1800000">
+                <a:off x="4394610" y="1398686"/>
+                <a:ext cx="161145" cy="161145"/>
+              </a:xfrm>
+              <a:prstGeom prst="ellipse">
+                <a:avLst/>
+              </a:prstGeom>
+              <a:grpFill/>
+              <a:ln w="25400" cap="rnd" cmpd="sng" algn="ctr">
+                <a:noFill/>
+                <a:prstDash val="solid"/>
+              </a:ln>
+              <a:effectLst/>
+            </p:spPr>
+            <p:txBody>
+              <a:bodyPr wrap="none" rtlCol="0" anchor="ctr"/>
+              <a:lstStyle/>
+              <a:p>
+                <a:pPr marL="0" marR="0" lvl="0" indent="0" algn="ctr" defTabSz="914400" eaLnBrk="1" fontAlgn="auto" latinLnBrk="0" hangingPunct="1">
+                  <a:lnSpc>
+                    <a:spcPct val="100000"/>
+                  </a:lnSpc>
+                  <a:spcBef>
+                    <a:spcPts val="0"/>
+                  </a:spcBef>
+                  <a:spcAft>
+                    <a:spcPts val="0"/>
+                  </a:spcAft>
+                  <a:buClrTx/>
+                  <a:buSzTx/>
+                  <a:buFontTx/>
+                  <a:buNone/>
+                  <a:tabLst/>
+                  <a:defRPr/>
+                </a:pPr>
+                <a:endParaRPr kumimoji="0" lang="en-US" sz="4400" i="0" u="none" strike="noStrike" kern="0" cap="none" spc="0" normalizeH="0" baseline="0">
+                  <a:ln>
+                    <a:noFill/>
+                  </a:ln>
+                  <a:solidFill>
+                    <a:prstClr val="white"/>
+                  </a:solidFill>
+                  <a:effectLst/>
+                  <a:uLnTx/>
+                  <a:uFillTx/>
+                  <a:latin typeface="+mj-lt"/>
+                  <a:cs typeface="Arial" pitchFamily="34" charset="0"/>
+                </a:endParaRPr>
+              </a:p>
+            </p:txBody>
+          </p:sp>
+        </p:grpSp>
+      </p:grpSp>
+      <p:sp>
+        <p:nvSpPr>
+          <p:cNvPr id="36" name="Down Arrow 40">
+            <a:extLst>
+              <a:ext uri="{FF2B5EF4-FFF2-40B4-BE49-F238E27FC236}">
+                <a16:creationId xmlns:a16="http://schemas.microsoft.com/office/drawing/2014/main" id="{0FE59E28-4CBD-4783-85B2-324EB3670127}"/>
+              </a:ext>
+            </a:extLst>
+          </p:cNvPr>
+          <p:cNvSpPr/>
+          <p:nvPr/>
+        </p:nvSpPr>
+        <p:spPr>
+          <a:xfrm rot="5400000">
+            <a:off x="4233175" y="2957116"/>
+            <a:ext cx="439632" cy="518965"/>
+          </a:xfrm>
+          <a:prstGeom prst="downArrow">
+            <a:avLst>
+              <a:gd name="adj1" fmla="val 50000"/>
+              <a:gd name="adj2" fmla="val 50000"/>
+            </a:avLst>
+          </a:prstGeom>
+          <a:solidFill>
+            <a:schemeClr val="bg1">
+              <a:lumMod val="75000"/>
+            </a:schemeClr>
+          </a:solidFill>
+          <a:ln>
+            <a:noFill/>
+          </a:ln>
+        </p:spPr>
+        <p:style>
+          <a:lnRef idx="2">
+            <a:schemeClr val="accent1">
+              <a:shade val="50000"/>
+            </a:schemeClr>
+          </a:lnRef>
+          <a:fillRef idx="1">
+            <a:schemeClr val="accent1"/>
+          </a:fillRef>
+          <a:effectRef idx="0">
+            <a:schemeClr val="accent1"/>
+          </a:effectRef>
+          <a:fontRef idx="minor">
+            <a:schemeClr val="lt1"/>
+          </a:fontRef>
+        </p:style>
+        <p:txBody>
+          <a:bodyPr rtlCol="0" anchor="ctr"/>
+          <a:lstStyle/>
+          <a:p>
+            <a:pPr algn="ctr"/>
+            <a:endParaRPr lang="en-US">
+              <a:latin typeface="+mj-lt"/>
+              <a:cs typeface="Arial" pitchFamily="34" charset="0"/>
+            </a:endParaRPr>
+          </a:p>
+        </p:txBody>
+      </p:sp>
+      <p:sp>
+        <p:nvSpPr>
+          <p:cNvPr id="37" name="Down Arrow 40">
+            <a:extLst>
+              <a:ext uri="{FF2B5EF4-FFF2-40B4-BE49-F238E27FC236}">
+                <a16:creationId xmlns:a16="http://schemas.microsoft.com/office/drawing/2014/main" id="{A0B76F1B-01A8-4996-9734-5669198AA028}"/>
+              </a:ext>
+            </a:extLst>
+          </p:cNvPr>
+          <p:cNvSpPr/>
+          <p:nvPr/>
+        </p:nvSpPr>
+        <p:spPr>
+          <a:xfrm rot="5400000">
+            <a:off x="1705506" y="2961350"/>
+            <a:ext cx="439632" cy="518965"/>
+          </a:xfrm>
+          <a:prstGeom prst="downArrow">
+            <a:avLst>
+              <a:gd name="adj1" fmla="val 50000"/>
+              <a:gd name="adj2" fmla="val 50000"/>
+            </a:avLst>
+          </a:prstGeom>
+          <a:solidFill>
+            <a:schemeClr val="bg1">
+              <a:lumMod val="75000"/>
+            </a:schemeClr>
+          </a:solidFill>
+          <a:ln>
+            <a:noFill/>
+          </a:ln>
+        </p:spPr>
+        <p:style>
+          <a:lnRef idx="2">
+            <a:schemeClr val="accent1">
+              <a:shade val="50000"/>
+            </a:schemeClr>
+          </a:lnRef>
+          <a:fillRef idx="1">
+            <a:schemeClr val="accent1"/>
+          </a:fillRef>
+          <a:effectRef idx="0">
+            <a:schemeClr val="accent1"/>
+          </a:effectRef>
+          <a:fontRef idx="minor">
+            <a:schemeClr val="lt1"/>
+          </a:fontRef>
+        </p:style>
+        <p:txBody>
+          <a:bodyPr rtlCol="0" anchor="ctr"/>
+          <a:lstStyle/>
+          <a:p>
+            <a:pPr algn="ctr"/>
+            <a:endParaRPr lang="en-US">
+              <a:latin typeface="+mj-lt"/>
+              <a:cs typeface="Arial" pitchFamily="34" charset="0"/>
+            </a:endParaRPr>
+          </a:p>
+        </p:txBody>
+      </p:sp>
+      <p:sp>
+        <p:nvSpPr>
+          <p:cNvPr id="26" name="四角形: 角を丸くする 25">
+            <a:extLst>
+              <a:ext uri="{FF2B5EF4-FFF2-40B4-BE49-F238E27FC236}">
+                <a16:creationId xmlns:a16="http://schemas.microsoft.com/office/drawing/2014/main" id="{3676A255-5FE7-4450-8438-735526CBA567}"/>
+              </a:ext>
+            </a:extLst>
+          </p:cNvPr>
+          <p:cNvSpPr/>
+          <p:nvPr/>
+        </p:nvSpPr>
+        <p:spPr>
+          <a:xfrm>
+            <a:off x="6052891" y="3558404"/>
+            <a:ext cx="1205375" cy="440267"/>
+          </a:xfrm>
+          <a:prstGeom prst="roundRect">
+            <a:avLst/>
+          </a:prstGeom>
+          <a:solidFill>
+            <a:srgbClr val="00B050"/>
+          </a:solidFill>
+          <a:ln>
+            <a:noFill/>
+          </a:ln>
+        </p:spPr>
+        <p:style>
+          <a:lnRef idx="1">
+            <a:schemeClr val="accent5"/>
+          </a:lnRef>
+          <a:fillRef idx="3">
+            <a:schemeClr val="accent5"/>
+          </a:fillRef>
+          <a:effectRef idx="2">
+            <a:schemeClr val="accent5"/>
+          </a:effectRef>
+          <a:fontRef idx="minor">
+            <a:schemeClr val="lt1"/>
+          </a:fontRef>
+        </p:style>
+        <p:txBody>
+          <a:bodyPr wrap="none" rtlCol="0" anchor="ctr"/>
+          <a:lstStyle/>
+          <a:p>
+            <a:pPr algn="ctr">
+              <a:lnSpc>
+                <a:spcPct val="80000"/>
+              </a:lnSpc>
+            </a:pPr>
+            <a:r>
+              <a:rPr lang="en-US" altLang="ja-JP" sz="2000" dirty="0"/>
+              <a:t>Consumed</a:t>
+            </a:r>
+          </a:p>
+          <a:p>
+            <a:pPr algn="ctr">
+              <a:lnSpc>
+                <a:spcPct val="80000"/>
+              </a:lnSpc>
+            </a:pPr>
+            <a:r>
+              <a:rPr lang="en-US" altLang="ja-JP" sz="2000" dirty="0"/>
+              <a:t>Thing</a:t>
+            </a:r>
+            <a:endParaRPr kumimoji="1" lang="ja-JP" altLang="en-US" sz="2000" dirty="0"/>
+          </a:p>
+        </p:txBody>
+      </p:sp>
+      <p:sp>
+        <p:nvSpPr>
+          <p:cNvPr id="27" name="四角形: 角を丸くする 26">
+            <a:extLst>
+              <a:ext uri="{FF2B5EF4-FFF2-40B4-BE49-F238E27FC236}">
+                <a16:creationId xmlns:a16="http://schemas.microsoft.com/office/drawing/2014/main" id="{6E7B91DA-21A4-46C0-8EDC-6AB81EDC472A}"/>
+              </a:ext>
+            </a:extLst>
+          </p:cNvPr>
+          <p:cNvSpPr/>
+          <p:nvPr/>
+        </p:nvSpPr>
+        <p:spPr>
+          <a:xfrm>
+            <a:off x="10321440" y="2989132"/>
+            <a:ext cx="2654969" cy="1119418"/>
+          </a:xfrm>
+          <a:prstGeom prst="roundRect">
+            <a:avLst/>
+          </a:prstGeom>
+          <a:solidFill>
+            <a:srgbClr val="7F7F7F"/>
+          </a:solidFill>
+          <a:ln>
+            <a:noFill/>
+          </a:ln>
+          <a:effectLst>
+            <a:outerShdw blurRad="50800" dist="38100" dir="2700000" algn="tl" rotWithShape="0">
+              <a:prstClr val="black">
+                <a:alpha val="40000"/>
+              </a:prstClr>
+            </a:outerShdw>
+          </a:effectLst>
+        </p:spPr>
+        <p:style>
+          <a:lnRef idx="3">
+            <a:schemeClr val="lt1"/>
+          </a:lnRef>
+          <a:fillRef idx="1">
+            <a:schemeClr val="accent3"/>
+          </a:fillRef>
+          <a:effectRef idx="1">
+            <a:schemeClr val="accent3"/>
+          </a:effectRef>
+          <a:fontRef idx="minor">
+            <a:schemeClr val="lt1"/>
+          </a:fontRef>
+        </p:style>
+        <p:txBody>
+          <a:bodyPr lIns="72000" tIns="36000" rIns="72000" bIns="36000" rtlCol="0" anchor="t"/>
+          <a:lstStyle/>
+          <a:p>
+            <a:pPr algn="ctr"/>
+            <a:r>
+              <a:rPr lang="en-US" altLang="ja-JP" sz="2400" b="1" dirty="0">
+                <a:solidFill>
+                  <a:schemeClr val="tx1"/>
+                </a:solidFill>
+              </a:rPr>
+              <a:t>Server</a:t>
+            </a:r>
+            <a:endParaRPr kumimoji="1" lang="en-US" altLang="ja-JP" sz="2400" b="1" dirty="0">
+              <a:solidFill>
+                <a:schemeClr val="tx1"/>
+              </a:solidFill>
+            </a:endParaRPr>
+          </a:p>
+        </p:txBody>
+      </p:sp>
+      <p:sp>
+        <p:nvSpPr>
+          <p:cNvPr id="28" name="四角形: 角を丸くする 27">
+            <a:extLst>
+              <a:ext uri="{FF2B5EF4-FFF2-40B4-BE49-F238E27FC236}">
+                <a16:creationId xmlns:a16="http://schemas.microsoft.com/office/drawing/2014/main" id="{CCBB7A6D-AA8C-432A-8CB0-517B0E87F413}"/>
+              </a:ext>
+            </a:extLst>
+          </p:cNvPr>
+          <p:cNvSpPr/>
+          <p:nvPr/>
+        </p:nvSpPr>
+        <p:spPr>
+          <a:xfrm>
+            <a:off x="10509417" y="3548841"/>
+            <a:ext cx="2282021" cy="440267"/>
+          </a:xfrm>
+          <a:prstGeom prst="roundRect">
+            <a:avLst/>
+          </a:prstGeom>
+          <a:solidFill>
+            <a:srgbClr val="00B050"/>
+          </a:solidFill>
+          <a:ln>
+            <a:noFill/>
+          </a:ln>
+        </p:spPr>
+        <p:style>
+          <a:lnRef idx="1">
+            <a:schemeClr val="accent5"/>
+          </a:lnRef>
+          <a:fillRef idx="3">
+            <a:schemeClr val="accent5"/>
+          </a:fillRef>
+          <a:effectRef idx="2">
+            <a:schemeClr val="accent5"/>
+          </a:effectRef>
+          <a:fontRef idx="minor">
+            <a:schemeClr val="lt1"/>
+          </a:fontRef>
+        </p:style>
+        <p:txBody>
+          <a:bodyPr rtlCol="0" anchor="ctr"/>
+          <a:lstStyle/>
+          <a:p>
+            <a:pPr algn="ctr"/>
+            <a:r>
+              <a:rPr lang="en-US" altLang="ja-JP" sz="2000" dirty="0"/>
+              <a:t>Exposed Thing</a:t>
+            </a:r>
+            <a:endParaRPr kumimoji="1" lang="ja-JP" altLang="en-US" sz="2000" dirty="0"/>
+          </a:p>
+        </p:txBody>
+      </p:sp>
+      <p:grpSp>
+        <p:nvGrpSpPr>
+          <p:cNvPr id="38" name="Group 38">
+            <a:extLst>
+              <a:ext uri="{FF2B5EF4-FFF2-40B4-BE49-F238E27FC236}">
+                <a16:creationId xmlns:a16="http://schemas.microsoft.com/office/drawing/2014/main" id="{54623AD8-AF8C-4B9D-9CD4-E46C4DC17924}"/>
+              </a:ext>
+            </a:extLst>
+          </p:cNvPr>
+          <p:cNvGrpSpPr/>
+          <p:nvPr/>
+        </p:nvGrpSpPr>
+        <p:grpSpPr>
+          <a:xfrm>
+            <a:off x="7807286" y="2720841"/>
+            <a:ext cx="2060941" cy="828000"/>
+            <a:chOff x="2670082" y="4186219"/>
+            <a:chExt cx="2060941" cy="828000"/>
+          </a:xfrm>
+        </p:grpSpPr>
+        <p:sp>
+          <p:nvSpPr>
+            <p:cNvPr id="39" name="角丸四角形 21">
+              <a:extLst>
+                <a:ext uri="{FF2B5EF4-FFF2-40B4-BE49-F238E27FC236}">
+                  <a16:creationId xmlns:a16="http://schemas.microsoft.com/office/drawing/2014/main" id="{251184E1-0CB2-4BB6-AE73-DD14D204793D}"/>
+                </a:ext>
+              </a:extLst>
+            </p:cNvPr>
+            <p:cNvSpPr/>
+            <p:nvPr/>
+          </p:nvSpPr>
+          <p:spPr bwMode="auto">
+            <a:xfrm>
+              <a:off x="2670082" y="4186219"/>
+              <a:ext cx="2060941" cy="828000"/>
+            </a:xfrm>
+            <a:prstGeom prst="foldedCorner">
+              <a:avLst>
+                <a:gd name="adj" fmla="val 20194"/>
+              </a:avLst>
+            </a:prstGeom>
+            <a:solidFill>
+              <a:srgbClr val="C0504D"/>
+            </a:solidFill>
+            <a:ln w="25400" cap="flat" cmpd="sng" algn="ctr">
+              <a:noFill/>
+              <a:prstDash val="solid"/>
+              <a:round/>
+              <a:headEnd type="none" w="med" len="med"/>
+              <a:tailEnd type="none" w="med" len="med"/>
+            </a:ln>
+            <a:effectLst/>
+            <a:extLst/>
+          </p:spPr>
+          <p:txBody>
+            <a:bodyPr vert="horz" wrap="none" lIns="432000" tIns="144000" rIns="0" bIns="0" numCol="1" rtlCol="0" anchor="ctr" anchorCtr="0" compatLnSpc="1">
+              <a:prstTxWarp prst="textNoShape">
+                <a:avLst/>
+              </a:prstTxWarp>
+              <a:noAutofit/>
+            </a:bodyPr>
+            <a:lstStyle/>
+            <a:p>
+              <a:pPr marL="0" marR="0" lvl="0" indent="0" algn="ctr" defTabSz="914400" eaLnBrk="1" fontAlgn="ctr" latinLnBrk="0" hangingPunct="1">
+                <a:lnSpc>
+                  <a:spcPct val="100000"/>
+                </a:lnSpc>
+                <a:spcBef>
+                  <a:spcPts val="0"/>
+                </a:spcBef>
+                <a:spcAft>
+                  <a:spcPts val="0"/>
+                </a:spcAft>
+                <a:buClrTx/>
+                <a:buSzTx/>
+                <a:buFontTx/>
+                <a:buNone/>
+                <a:tabLst/>
+                <a:defRPr/>
+              </a:pPr>
+              <a:r>
+                <a:rPr kumimoji="0" lang="en-US" altLang="ja-JP" sz="2000" i="0" u="none" strike="noStrike" kern="0" cap="none" spc="0" normalizeH="0" baseline="0" dirty="0" err="1">
+                  <a:ln>
+                    <a:noFill/>
+                  </a:ln>
+                  <a:solidFill>
+                    <a:prstClr val="white"/>
+                  </a:solidFill>
+                  <a:effectLst/>
+                  <a:uLnTx/>
+                  <a:uFillTx/>
+                  <a:latin typeface="+mj-lt"/>
+                  <a:ea typeface="HG明朝E" panose="02020909000000000000" pitchFamily="17" charset="-128"/>
+                  <a:cs typeface="Arial" pitchFamily="34" charset="0"/>
+                </a:rPr>
+                <a:t>WoT</a:t>
+              </a:r>
+              <a:r>
+                <a:rPr kumimoji="0" lang="en-US" altLang="ja-JP" sz="2000" i="0" u="none" strike="noStrike" kern="0" cap="none" spc="0" normalizeH="0" baseline="0">
+                  <a:ln>
+                    <a:noFill/>
+                  </a:ln>
+                  <a:solidFill>
+                    <a:prstClr val="white"/>
+                  </a:solidFill>
+                  <a:effectLst/>
+                  <a:uLnTx/>
+                  <a:uFillTx/>
+                  <a:latin typeface="+mj-lt"/>
+                  <a:ea typeface="HG明朝E" panose="02020909000000000000" pitchFamily="17" charset="-128"/>
+                  <a:cs typeface="Arial" pitchFamily="34" charset="0"/>
+                </a:rPr>
+                <a:t> Thing</a:t>
+              </a:r>
+              <a:br>
+                <a:rPr kumimoji="0" lang="en-US" altLang="ja-JP" sz="2000" i="0" u="none" strike="noStrike" kern="0" cap="none" spc="0" normalizeH="0" baseline="0" dirty="0">
+                  <a:ln>
+                    <a:noFill/>
+                  </a:ln>
+                  <a:solidFill>
+                    <a:prstClr val="white"/>
+                  </a:solidFill>
+                  <a:effectLst/>
+                  <a:uLnTx/>
+                  <a:uFillTx/>
+                  <a:latin typeface="+mj-lt"/>
+                  <a:ea typeface="HG明朝E" panose="02020909000000000000" pitchFamily="17" charset="-128"/>
+                  <a:cs typeface="Arial" pitchFamily="34" charset="0"/>
+                </a:rPr>
+              </a:br>
+              <a:r>
+                <a:rPr kumimoji="0" lang="en-US" altLang="ja-JP" sz="2000" i="0" u="none" strike="noStrike" kern="0" cap="none" spc="0" normalizeH="0" baseline="0" dirty="0">
+                  <a:ln>
+                    <a:noFill/>
+                  </a:ln>
+                  <a:solidFill>
+                    <a:prstClr val="white"/>
+                  </a:solidFill>
+                  <a:effectLst/>
+                  <a:uLnTx/>
+                  <a:uFillTx/>
+                  <a:latin typeface="+mj-lt"/>
+                  <a:ea typeface="HG明朝E" panose="02020909000000000000" pitchFamily="17" charset="-128"/>
+                  <a:cs typeface="Arial" pitchFamily="34" charset="0"/>
+                </a:rPr>
+                <a:t>Description</a:t>
+              </a:r>
+              <a:endParaRPr kumimoji="0" lang="en-US" altLang="ja-JP" sz="2800" i="0" u="none" strike="noStrike" kern="0" cap="none" spc="0" normalizeH="0" baseline="0" dirty="0">
+                <a:ln>
+                  <a:noFill/>
+                </a:ln>
+                <a:solidFill>
+                  <a:prstClr val="white"/>
+                </a:solidFill>
+                <a:effectLst/>
+                <a:uLnTx/>
+                <a:uFillTx/>
+                <a:latin typeface="+mj-lt"/>
+                <a:ea typeface="HG明朝E" panose="02020909000000000000" pitchFamily="17" charset="-128"/>
+                <a:cs typeface="Arial" pitchFamily="34" charset="0"/>
+              </a:endParaRPr>
+            </a:p>
+          </p:txBody>
+        </p:sp>
+        <p:grpSp>
+          <p:nvGrpSpPr>
+            <p:cNvPr id="40" name="Group 28">
+              <a:extLst>
+                <a:ext uri="{FF2B5EF4-FFF2-40B4-BE49-F238E27FC236}">
+                  <a16:creationId xmlns:a16="http://schemas.microsoft.com/office/drawing/2014/main" id="{D0B59A3B-B44C-447F-88A9-466AC134ABCA}"/>
+                </a:ext>
+              </a:extLst>
+            </p:cNvPr>
+            <p:cNvGrpSpPr/>
+            <p:nvPr/>
+          </p:nvGrpSpPr>
+          <p:grpSpPr>
+            <a:xfrm>
+              <a:off x="2812207" y="4399725"/>
+              <a:ext cx="413417" cy="426971"/>
+              <a:chOff x="4042160" y="993559"/>
+              <a:chExt cx="548293" cy="566272"/>
+            </a:xfrm>
+            <a:solidFill>
+              <a:sysClr val="window" lastClr="FFFFFF"/>
+            </a:solidFill>
+          </p:grpSpPr>
+          <p:sp>
+            <p:nvSpPr>
+              <p:cNvPr id="41" name="Isosceles Triangle 29">
+                <a:extLst>
+                  <a:ext uri="{FF2B5EF4-FFF2-40B4-BE49-F238E27FC236}">
+                    <a16:creationId xmlns:a16="http://schemas.microsoft.com/office/drawing/2014/main" id="{3D763714-5949-41F5-A62E-CB2678077A5E}"/>
+                  </a:ext>
+                </a:extLst>
+              </p:cNvPr>
+              <p:cNvSpPr/>
+              <p:nvPr/>
+            </p:nvSpPr>
+            <p:spPr>
+              <a:xfrm rot="1800000">
+                <a:off x="4184483" y="1052736"/>
+                <a:ext cx="405970" cy="349975"/>
+              </a:xfrm>
+              <a:prstGeom prst="triangle">
+                <a:avLst/>
+              </a:prstGeom>
+              <a:noFill/>
+              <a:ln w="28575" cap="rnd" cmpd="sng" algn="ctr">
+                <a:solidFill>
+                  <a:sysClr val="window" lastClr="FFFFFF"/>
+                </a:solidFill>
+                <a:prstDash val="solid"/>
+              </a:ln>
+              <a:effectLst/>
+            </p:spPr>
+            <p:txBody>
+              <a:bodyPr wrap="none" rtlCol="0" anchor="ctr"/>
+              <a:lstStyle/>
+              <a:p>
+                <a:pPr marL="0" marR="0" lvl="0" indent="0" algn="ctr" defTabSz="914400" eaLnBrk="1" fontAlgn="auto" latinLnBrk="0" hangingPunct="1">
+                  <a:lnSpc>
+                    <a:spcPct val="100000"/>
+                  </a:lnSpc>
+                  <a:spcBef>
+                    <a:spcPts val="0"/>
+                  </a:spcBef>
+                  <a:spcAft>
+                    <a:spcPts val="0"/>
+                  </a:spcAft>
+                  <a:buClrTx/>
+                  <a:buSzTx/>
+                  <a:buFontTx/>
+                  <a:buNone/>
+                  <a:tabLst/>
+                  <a:defRPr/>
+                </a:pPr>
+                <a:endParaRPr kumimoji="0" lang="en-US" sz="4400" i="0" u="none" strike="noStrike" kern="0" cap="none" spc="0" normalizeH="0" baseline="0">
+                  <a:ln>
+                    <a:noFill/>
+                  </a:ln>
+                  <a:solidFill>
+                    <a:prstClr val="white"/>
+                  </a:solidFill>
+                  <a:effectLst/>
+                  <a:uLnTx/>
+                  <a:uFillTx/>
+                  <a:latin typeface="+mj-lt"/>
+                  <a:cs typeface="Arial" pitchFamily="34" charset="0"/>
+                </a:endParaRPr>
+              </a:p>
+            </p:txBody>
+          </p:sp>
+          <p:sp>
+            <p:nvSpPr>
+              <p:cNvPr id="42" name="Oval 30">
+                <a:extLst>
+                  <a:ext uri="{FF2B5EF4-FFF2-40B4-BE49-F238E27FC236}">
+                    <a16:creationId xmlns:a16="http://schemas.microsoft.com/office/drawing/2014/main" id="{C024B941-B597-4400-9C8C-5888A8514B95}"/>
+                  </a:ext>
+                </a:extLst>
+              </p:cNvPr>
+              <p:cNvSpPr/>
+              <p:nvPr/>
+            </p:nvSpPr>
+            <p:spPr>
+              <a:xfrm rot="19800000">
+                <a:off x="4394607" y="993559"/>
+                <a:ext cx="161145" cy="161145"/>
+              </a:xfrm>
+              <a:prstGeom prst="ellipse">
+                <a:avLst/>
+              </a:prstGeom>
+              <a:grpFill/>
+              <a:ln w="25400" cap="rnd" cmpd="sng" algn="ctr">
+                <a:noFill/>
+                <a:prstDash val="solid"/>
+              </a:ln>
+              <a:effectLst/>
+            </p:spPr>
+            <p:txBody>
+              <a:bodyPr wrap="none" rtlCol="0" anchor="ctr"/>
+              <a:lstStyle/>
+              <a:p>
+                <a:pPr marL="0" marR="0" lvl="0" indent="0" algn="ctr" defTabSz="914400" eaLnBrk="1" fontAlgn="auto" latinLnBrk="0" hangingPunct="1">
+                  <a:lnSpc>
+                    <a:spcPct val="100000"/>
+                  </a:lnSpc>
+                  <a:spcBef>
+                    <a:spcPts val="0"/>
+                  </a:spcBef>
+                  <a:spcAft>
+                    <a:spcPts val="0"/>
+                  </a:spcAft>
+                  <a:buClrTx/>
+                  <a:buSzTx/>
+                  <a:buFontTx/>
+                  <a:buNone/>
+                  <a:tabLst/>
+                  <a:defRPr/>
+                </a:pPr>
+                <a:endParaRPr kumimoji="0" lang="en-US" sz="4400" i="0" u="none" strike="noStrike" kern="0" cap="none" spc="0" normalizeH="0" baseline="0">
+                  <a:ln>
+                    <a:noFill/>
+                  </a:ln>
+                  <a:solidFill>
+                    <a:prstClr val="white"/>
+                  </a:solidFill>
+                  <a:effectLst/>
+                  <a:uLnTx/>
+                  <a:uFillTx/>
+                  <a:latin typeface="+mj-lt"/>
+                  <a:cs typeface="Arial" pitchFamily="34" charset="0"/>
+                </a:endParaRPr>
+              </a:p>
+            </p:txBody>
+          </p:sp>
+          <p:sp>
+            <p:nvSpPr>
+              <p:cNvPr id="43" name="Oval 31">
+                <a:extLst>
+                  <a:ext uri="{FF2B5EF4-FFF2-40B4-BE49-F238E27FC236}">
+                    <a16:creationId xmlns:a16="http://schemas.microsoft.com/office/drawing/2014/main" id="{79654117-6FBA-44EE-9721-7B436910B0E8}"/>
+                  </a:ext>
+                </a:extLst>
+              </p:cNvPr>
+              <p:cNvSpPr/>
+              <p:nvPr/>
+            </p:nvSpPr>
+            <p:spPr>
+              <a:xfrm rot="19800000">
+                <a:off x="4042160" y="1196566"/>
+                <a:ext cx="161145" cy="161145"/>
+              </a:xfrm>
+              <a:prstGeom prst="ellipse">
+                <a:avLst/>
+              </a:prstGeom>
+              <a:grpFill/>
+              <a:ln w="25400" cap="rnd" cmpd="sng" algn="ctr">
+                <a:noFill/>
+                <a:prstDash val="solid"/>
+              </a:ln>
+              <a:effectLst/>
+            </p:spPr>
+            <p:txBody>
+              <a:bodyPr wrap="none" rtlCol="0" anchor="ctr"/>
+              <a:lstStyle/>
+              <a:p>
+                <a:pPr marL="0" marR="0" lvl="0" indent="0" algn="ctr" defTabSz="914400" eaLnBrk="1" fontAlgn="auto" latinLnBrk="0" hangingPunct="1">
+                  <a:lnSpc>
+                    <a:spcPct val="100000"/>
+                  </a:lnSpc>
+                  <a:spcBef>
+                    <a:spcPts val="0"/>
+                  </a:spcBef>
+                  <a:spcAft>
+                    <a:spcPts val="0"/>
+                  </a:spcAft>
+                  <a:buClrTx/>
+                  <a:buSzTx/>
+                  <a:buFontTx/>
+                  <a:buNone/>
+                  <a:tabLst/>
+                  <a:defRPr/>
+                </a:pPr>
+                <a:endParaRPr kumimoji="0" lang="en-US" sz="4400" i="0" u="none" strike="noStrike" kern="0" cap="none" spc="0" normalizeH="0" baseline="0">
+                  <a:ln>
+                    <a:noFill/>
+                  </a:ln>
+                  <a:solidFill>
+                    <a:prstClr val="white"/>
+                  </a:solidFill>
+                  <a:effectLst/>
+                  <a:uLnTx/>
+                  <a:uFillTx/>
+                  <a:latin typeface="+mj-lt"/>
+                  <a:cs typeface="Arial" pitchFamily="34" charset="0"/>
+                </a:endParaRPr>
+              </a:p>
+            </p:txBody>
+          </p:sp>
+          <p:sp>
+            <p:nvSpPr>
+              <p:cNvPr id="44" name="Oval 32">
+                <a:extLst>
+                  <a:ext uri="{FF2B5EF4-FFF2-40B4-BE49-F238E27FC236}">
+                    <a16:creationId xmlns:a16="http://schemas.microsoft.com/office/drawing/2014/main" id="{0FD77DD4-B4C6-4322-867A-28B9A3761A9F}"/>
+                  </a:ext>
+                </a:extLst>
+              </p:cNvPr>
+              <p:cNvSpPr/>
+              <p:nvPr/>
+            </p:nvSpPr>
+            <p:spPr>
+              <a:xfrm rot="1800000">
+                <a:off x="4394610" y="1398686"/>
+                <a:ext cx="161145" cy="161145"/>
+              </a:xfrm>
+              <a:prstGeom prst="ellipse">
+                <a:avLst/>
+              </a:prstGeom>
+              <a:grpFill/>
+              <a:ln w="25400" cap="rnd" cmpd="sng" algn="ctr">
+                <a:noFill/>
+                <a:prstDash val="solid"/>
+              </a:ln>
+              <a:effectLst/>
+            </p:spPr>
+            <p:txBody>
+              <a:bodyPr wrap="none" rtlCol="0" anchor="ctr"/>
+              <a:lstStyle/>
+              <a:p>
+                <a:pPr marL="0" marR="0" lvl="0" indent="0" algn="ctr" defTabSz="914400" eaLnBrk="1" fontAlgn="auto" latinLnBrk="0" hangingPunct="1">
+                  <a:lnSpc>
+                    <a:spcPct val="100000"/>
+                  </a:lnSpc>
+                  <a:spcBef>
+                    <a:spcPts val="0"/>
+                  </a:spcBef>
+                  <a:spcAft>
+                    <a:spcPts val="0"/>
+                  </a:spcAft>
+                  <a:buClrTx/>
+                  <a:buSzTx/>
+                  <a:buFontTx/>
+                  <a:buNone/>
+                  <a:tabLst/>
+                  <a:defRPr/>
+                </a:pPr>
+                <a:endParaRPr kumimoji="0" lang="en-US" sz="4400" i="0" u="none" strike="noStrike" kern="0" cap="none" spc="0" normalizeH="0" baseline="0">
+                  <a:ln>
+                    <a:noFill/>
+                  </a:ln>
+                  <a:solidFill>
+                    <a:prstClr val="white"/>
+                  </a:solidFill>
+                  <a:effectLst/>
+                  <a:uLnTx/>
+                  <a:uFillTx/>
+                  <a:latin typeface="+mj-lt"/>
+                  <a:cs typeface="Arial" pitchFamily="34" charset="0"/>
+                </a:endParaRPr>
+              </a:p>
+            </p:txBody>
+          </p:sp>
+        </p:grpSp>
+      </p:grpSp>
+      <p:sp>
+        <p:nvSpPr>
+          <p:cNvPr id="45" name="Down Arrow 40">
+            <a:extLst>
+              <a:ext uri="{FF2B5EF4-FFF2-40B4-BE49-F238E27FC236}">
+                <a16:creationId xmlns:a16="http://schemas.microsoft.com/office/drawing/2014/main" id="{55E81437-DDD4-4CDE-9015-53895EFDCBF2}"/>
+              </a:ext>
+            </a:extLst>
+          </p:cNvPr>
+          <p:cNvSpPr/>
+          <p:nvPr/>
+        </p:nvSpPr>
+        <p:spPr>
+          <a:xfrm rot="5400000">
+            <a:off x="9852382" y="2949466"/>
+            <a:ext cx="439632" cy="518965"/>
+          </a:xfrm>
+          <a:prstGeom prst="downArrow">
+            <a:avLst>
+              <a:gd name="adj1" fmla="val 50000"/>
+              <a:gd name="adj2" fmla="val 50000"/>
+            </a:avLst>
+          </a:prstGeom>
+          <a:solidFill>
+            <a:schemeClr val="bg1">
+              <a:lumMod val="75000"/>
+            </a:schemeClr>
+          </a:solidFill>
+          <a:ln>
+            <a:noFill/>
+          </a:ln>
+        </p:spPr>
+        <p:style>
+          <a:lnRef idx="2">
+            <a:schemeClr val="accent1">
+              <a:shade val="50000"/>
+            </a:schemeClr>
+          </a:lnRef>
+          <a:fillRef idx="1">
+            <a:schemeClr val="accent1"/>
+          </a:fillRef>
+          <a:effectRef idx="0">
+            <a:schemeClr val="accent1"/>
+          </a:effectRef>
+          <a:fontRef idx="minor">
+            <a:schemeClr val="lt1"/>
+          </a:fontRef>
+        </p:style>
+        <p:txBody>
+          <a:bodyPr rtlCol="0" anchor="ctr"/>
+          <a:lstStyle/>
+          <a:p>
+            <a:pPr algn="ctr"/>
+            <a:endParaRPr lang="en-US">
+              <a:latin typeface="+mj-lt"/>
+              <a:cs typeface="Arial" pitchFamily="34" charset="0"/>
+            </a:endParaRPr>
+          </a:p>
+        </p:txBody>
+      </p:sp>
+      <p:sp>
+        <p:nvSpPr>
+          <p:cNvPr id="46" name="Down Arrow 40">
+            <a:extLst>
+              <a:ext uri="{FF2B5EF4-FFF2-40B4-BE49-F238E27FC236}">
+                <a16:creationId xmlns:a16="http://schemas.microsoft.com/office/drawing/2014/main" id="{57518CB0-38ED-4231-8DC7-1F71028AF7E6}"/>
+              </a:ext>
+            </a:extLst>
+          </p:cNvPr>
+          <p:cNvSpPr/>
+          <p:nvPr/>
+        </p:nvSpPr>
+        <p:spPr>
+          <a:xfrm rot="5400000">
+            <a:off x="7352293" y="2928344"/>
+            <a:ext cx="439632" cy="518965"/>
+          </a:xfrm>
+          <a:prstGeom prst="downArrow">
+            <a:avLst>
+              <a:gd name="adj1" fmla="val 50000"/>
+              <a:gd name="adj2" fmla="val 50000"/>
+            </a:avLst>
+          </a:prstGeom>
+          <a:solidFill>
+            <a:schemeClr val="bg1">
+              <a:lumMod val="75000"/>
+            </a:schemeClr>
+          </a:solidFill>
+          <a:ln>
+            <a:noFill/>
+          </a:ln>
+        </p:spPr>
+        <p:style>
+          <a:lnRef idx="2">
+            <a:schemeClr val="accent1">
+              <a:shade val="50000"/>
+            </a:schemeClr>
+          </a:lnRef>
+          <a:fillRef idx="1">
+            <a:schemeClr val="accent1"/>
+          </a:fillRef>
+          <a:effectRef idx="0">
+            <a:schemeClr val="accent1"/>
+          </a:effectRef>
+          <a:fontRef idx="minor">
+            <a:schemeClr val="lt1"/>
+          </a:fontRef>
+        </p:style>
+        <p:txBody>
+          <a:bodyPr rtlCol="0" anchor="ctr"/>
+          <a:lstStyle/>
+          <a:p>
+            <a:pPr algn="ctr"/>
+            <a:endParaRPr lang="en-US">
+              <a:latin typeface="+mj-lt"/>
+              <a:cs typeface="Arial" pitchFamily="34" charset="0"/>
+            </a:endParaRPr>
+          </a:p>
+        </p:txBody>
+      </p:sp>
+      <p:cxnSp>
+        <p:nvCxnSpPr>
+          <p:cNvPr id="47" name="Gerade Verbindung mit Pfeil 42">
+            <a:extLst>
+              <a:ext uri="{FF2B5EF4-FFF2-40B4-BE49-F238E27FC236}">
+                <a16:creationId xmlns:a16="http://schemas.microsoft.com/office/drawing/2014/main" id="{4C549D1D-6490-46C6-A0DB-A197E4E7AF27}"/>
+              </a:ext>
+            </a:extLst>
+          </p:cNvPr>
+          <p:cNvCxnSpPr>
+            <a:cxnSpLocks/>
+            <a:stCxn id="26" idx="3"/>
+            <a:endCxn id="28" idx="1"/>
+          </p:cNvCxnSpPr>
+          <p:nvPr/>
+        </p:nvCxnSpPr>
+        <p:spPr>
+          <a:xfrm flipV="1">
+            <a:off x="7258266" y="3768975"/>
+            <a:ext cx="3251151" cy="9563"/>
+          </a:xfrm>
+          <a:prstGeom prst="straightConnector1">
+            <a:avLst/>
+          </a:prstGeom>
+          <a:ln w="38100">
+            <a:solidFill>
+              <a:srgbClr val="008000"/>
+            </a:solidFill>
+            <a:prstDash val="sysDot"/>
+            <a:headEnd type="arrow" w="med" len="med"/>
+            <a:tailEnd type="arrow" w="med" len="med"/>
+          </a:ln>
+        </p:spPr>
+        <p:style>
+          <a:lnRef idx="1">
+            <a:schemeClr val="accent1"/>
+          </a:lnRef>
+          <a:fillRef idx="0">
+            <a:schemeClr val="accent1"/>
+          </a:fillRef>
+          <a:effectRef idx="0">
+            <a:schemeClr val="accent1"/>
+          </a:effectRef>
+          <a:fontRef idx="minor">
+            <a:schemeClr val="tx1"/>
+          </a:fontRef>
+        </p:style>
+      </p:cxnSp>
+      <p:sp>
+        <p:nvSpPr>
+          <p:cNvPr id="48" name="テキスト ボックス 47">
+            <a:extLst>
+              <a:ext uri="{FF2B5EF4-FFF2-40B4-BE49-F238E27FC236}">
+                <a16:creationId xmlns:a16="http://schemas.microsoft.com/office/drawing/2014/main" id="{0112AFBD-461E-4171-93BA-9928E070A0D5}"/>
+              </a:ext>
+            </a:extLst>
+          </p:cNvPr>
+          <p:cNvSpPr txBox="1"/>
+          <p:nvPr/>
+        </p:nvSpPr>
+        <p:spPr>
+          <a:xfrm>
+            <a:off x="-429373" y="2450161"/>
+            <a:ext cx="1596271" cy="461665"/>
+          </a:xfrm>
+          <a:prstGeom prst="rect">
+            <a:avLst/>
+          </a:prstGeom>
+          <a:noFill/>
+        </p:spPr>
+        <p:txBody>
+          <a:bodyPr wrap="none" rtlCol="0">
+            <a:spAutoFit/>
+          </a:bodyPr>
+          <a:lstStyle/>
+          <a:p>
+            <a:pPr algn="ctr"/>
+            <a:r>
+              <a:rPr kumimoji="1" lang="en-US" altLang="ja-JP" sz="2400" dirty="0"/>
+              <a:t>Application</a:t>
+            </a:r>
+            <a:endParaRPr kumimoji="1" lang="ja-JP" altLang="en-US" sz="2400" dirty="0"/>
+          </a:p>
+        </p:txBody>
+      </p:sp>
+      <p:sp>
+        <p:nvSpPr>
+          <p:cNvPr id="49" name="テキスト ボックス 48">
+            <a:extLst>
+              <a:ext uri="{FF2B5EF4-FFF2-40B4-BE49-F238E27FC236}">
+                <a16:creationId xmlns:a16="http://schemas.microsoft.com/office/drawing/2014/main" id="{14334150-8563-43EE-9179-42A0B31BB43F}"/>
+              </a:ext>
+            </a:extLst>
+          </p:cNvPr>
+          <p:cNvSpPr txBox="1"/>
+          <p:nvPr/>
+        </p:nvSpPr>
+        <p:spPr>
+          <a:xfrm>
+            <a:off x="5639678" y="2450161"/>
+            <a:ext cx="874215" cy="461665"/>
+          </a:xfrm>
+          <a:prstGeom prst="rect">
+            <a:avLst/>
+          </a:prstGeom>
+          <a:noFill/>
+        </p:spPr>
+        <p:txBody>
+          <a:bodyPr wrap="none" rtlCol="0">
+            <a:spAutoFit/>
+          </a:bodyPr>
+          <a:lstStyle/>
+          <a:p>
+            <a:pPr algn="ctr"/>
+            <a:r>
+              <a:rPr kumimoji="1" lang="en-US" altLang="ja-JP" sz="2400" dirty="0"/>
+              <a:t>Proxy</a:t>
+            </a:r>
+            <a:endParaRPr kumimoji="1" lang="ja-JP" altLang="en-US" sz="2400" dirty="0"/>
+          </a:p>
+        </p:txBody>
+      </p:sp>
+      <p:sp>
+        <p:nvSpPr>
+          <p:cNvPr id="50" name="テキスト ボックス 49">
+            <a:extLst>
+              <a:ext uri="{FF2B5EF4-FFF2-40B4-BE49-F238E27FC236}">
+                <a16:creationId xmlns:a16="http://schemas.microsoft.com/office/drawing/2014/main" id="{7F60A16A-9215-4D32-A02A-32AD4AFC1AC3}"/>
+              </a:ext>
+            </a:extLst>
+          </p:cNvPr>
+          <p:cNvSpPr txBox="1"/>
+          <p:nvPr/>
+        </p:nvSpPr>
+        <p:spPr>
+          <a:xfrm>
+            <a:off x="11138944" y="2450161"/>
+            <a:ext cx="1019959" cy="461665"/>
+          </a:xfrm>
+          <a:prstGeom prst="rect">
+            <a:avLst/>
+          </a:prstGeom>
+          <a:noFill/>
+        </p:spPr>
+        <p:txBody>
+          <a:bodyPr wrap="none" rtlCol="0">
+            <a:spAutoFit/>
+          </a:bodyPr>
+          <a:lstStyle/>
+          <a:p>
+            <a:pPr algn="ctr"/>
+            <a:r>
+              <a:rPr kumimoji="1" lang="en-US" altLang="ja-JP" sz="2400" dirty="0"/>
+              <a:t>Device</a:t>
+            </a:r>
+            <a:endParaRPr kumimoji="1" lang="ja-JP" altLang="en-US" sz="2400" dirty="0"/>
+          </a:p>
+        </p:txBody>
+      </p:sp>
+    </p:spTree>
+    <p:extLst>
+      <p:ext uri="{BB962C8B-B14F-4D97-AF65-F5344CB8AC3E}">
+        <p14:creationId xmlns:p14="http://schemas.microsoft.com/office/powerpoint/2010/main" val="2454505532"/>
       </p:ext>
     </p:extLst>
   </p:cSld>
@@ -7547,6 +9877,1390 @@
       </p:grpSpPr>
       <p:sp>
         <p:nvSpPr>
+          <p:cNvPr id="54" name="正方形/長方形 53">
+            <a:extLst>
+              <a:ext uri="{FF2B5EF4-FFF2-40B4-BE49-F238E27FC236}">
+                <a16:creationId xmlns:a16="http://schemas.microsoft.com/office/drawing/2014/main" id="{5A8F7A9F-7BD7-4D28-A9D3-88016DE35CBB}"/>
+              </a:ext>
+            </a:extLst>
+          </p:cNvPr>
+          <p:cNvSpPr/>
+          <p:nvPr/>
+        </p:nvSpPr>
+        <p:spPr>
+          <a:xfrm>
+            <a:off x="-1198283" y="2002163"/>
+            <a:ext cx="14588565" cy="2853674"/>
+          </a:xfrm>
+          <a:prstGeom prst="rect">
+            <a:avLst/>
+          </a:prstGeom>
+          <a:solidFill>
+            <a:schemeClr val="bg1"/>
+          </a:solidFill>
+          <a:ln>
+            <a:noFill/>
+          </a:ln>
+        </p:spPr>
+        <p:style>
+          <a:lnRef idx="2">
+            <a:schemeClr val="accent1">
+              <a:shade val="50000"/>
+            </a:schemeClr>
+          </a:lnRef>
+          <a:fillRef idx="1">
+            <a:schemeClr val="accent1"/>
+          </a:fillRef>
+          <a:effectRef idx="0">
+            <a:schemeClr val="accent1"/>
+          </a:effectRef>
+          <a:fontRef idx="minor">
+            <a:schemeClr val="lt1"/>
+          </a:fontRef>
+        </p:style>
+        <p:txBody>
+          <a:bodyPr rtlCol="0" anchor="ctr"/>
+          <a:lstStyle/>
+          <a:p>
+            <a:pPr algn="ctr"/>
+            <a:endParaRPr kumimoji="1" lang="ja-JP" altLang="en-US" dirty="0"/>
+          </a:p>
+        </p:txBody>
+      </p:sp>
+      <p:sp>
+        <p:nvSpPr>
+          <p:cNvPr id="6" name="四角形: 角を丸くする 5">
+            <a:extLst>
+              <a:ext uri="{FF2B5EF4-FFF2-40B4-BE49-F238E27FC236}">
+                <a16:creationId xmlns:a16="http://schemas.microsoft.com/office/drawing/2014/main" id="{E1883DBD-7E83-4F3C-8FC8-563AEB36A257}"/>
+              </a:ext>
+            </a:extLst>
+          </p:cNvPr>
+          <p:cNvSpPr/>
+          <p:nvPr/>
+        </p:nvSpPr>
+        <p:spPr>
+          <a:xfrm>
+            <a:off x="1839673" y="3032148"/>
+            <a:ext cx="2654969" cy="1119418"/>
+          </a:xfrm>
+          <a:prstGeom prst="roundRect">
+            <a:avLst/>
+          </a:prstGeom>
+          <a:solidFill>
+            <a:srgbClr val="7F7F7F"/>
+          </a:solidFill>
+          <a:ln>
+            <a:noFill/>
+          </a:ln>
+          <a:effectLst>
+            <a:outerShdw blurRad="50800" dist="38100" dir="2700000" algn="tl" rotWithShape="0">
+              <a:prstClr val="black">
+                <a:alpha val="40000"/>
+              </a:prstClr>
+            </a:outerShdw>
+          </a:effectLst>
+        </p:spPr>
+        <p:style>
+          <a:lnRef idx="3">
+            <a:schemeClr val="lt1"/>
+          </a:lnRef>
+          <a:fillRef idx="1">
+            <a:schemeClr val="accent3"/>
+          </a:fillRef>
+          <a:effectRef idx="1">
+            <a:schemeClr val="accent3"/>
+          </a:effectRef>
+          <a:fontRef idx="minor">
+            <a:schemeClr val="lt1"/>
+          </a:fontRef>
+        </p:style>
+        <p:txBody>
+          <a:bodyPr lIns="72000" tIns="36000" rIns="72000" bIns="36000" rtlCol="0" anchor="t"/>
+          <a:lstStyle/>
+          <a:p>
+            <a:pPr algn="ctr"/>
+            <a:r>
+              <a:rPr kumimoji="1" lang="en-US" altLang="ja-JP" sz="2400" b="1" dirty="0">
+                <a:solidFill>
+                  <a:schemeClr val="tx1"/>
+                </a:solidFill>
+              </a:rPr>
+              <a:t>Client</a:t>
+            </a:r>
+          </a:p>
+        </p:txBody>
+      </p:sp>
+      <p:sp>
+        <p:nvSpPr>
+          <p:cNvPr id="8" name="四角形: 角を丸くする 7">
+            <a:extLst>
+              <a:ext uri="{FF2B5EF4-FFF2-40B4-BE49-F238E27FC236}">
+                <a16:creationId xmlns:a16="http://schemas.microsoft.com/office/drawing/2014/main" id="{A4B36517-6546-4324-B602-66920A143647}"/>
+              </a:ext>
+            </a:extLst>
+          </p:cNvPr>
+          <p:cNvSpPr/>
+          <p:nvPr/>
+        </p:nvSpPr>
+        <p:spPr>
+          <a:xfrm>
+            <a:off x="7549023" y="3039798"/>
+            <a:ext cx="2654969" cy="1119418"/>
+          </a:xfrm>
+          <a:prstGeom prst="roundRect">
+            <a:avLst/>
+          </a:prstGeom>
+          <a:solidFill>
+            <a:srgbClr val="7F7F7F"/>
+          </a:solidFill>
+          <a:ln>
+            <a:noFill/>
+          </a:ln>
+          <a:effectLst>
+            <a:outerShdw blurRad="50800" dist="38100" dir="2700000" algn="tl" rotWithShape="0">
+              <a:prstClr val="black">
+                <a:alpha val="40000"/>
+              </a:prstClr>
+            </a:outerShdw>
+          </a:effectLst>
+        </p:spPr>
+        <p:style>
+          <a:lnRef idx="3">
+            <a:schemeClr val="lt1"/>
+          </a:lnRef>
+          <a:fillRef idx="1">
+            <a:schemeClr val="accent3"/>
+          </a:fillRef>
+          <a:effectRef idx="1">
+            <a:schemeClr val="accent3"/>
+          </a:effectRef>
+          <a:fontRef idx="minor">
+            <a:schemeClr val="lt1"/>
+          </a:fontRef>
+        </p:style>
+        <p:txBody>
+          <a:bodyPr lIns="72000" tIns="36000" rIns="72000" bIns="36000" rtlCol="0" anchor="t"/>
+          <a:lstStyle/>
+          <a:p>
+            <a:pPr algn="ctr"/>
+            <a:r>
+              <a:rPr kumimoji="1" lang="en-US" altLang="ja-JP" sz="2400" b="1" dirty="0">
+                <a:solidFill>
+                  <a:schemeClr val="tx1"/>
+                </a:solidFill>
+              </a:rPr>
+              <a:t>Server</a:t>
+            </a:r>
+          </a:p>
+        </p:txBody>
+      </p:sp>
+      <p:sp>
+        <p:nvSpPr>
+          <p:cNvPr id="9" name="四角形: 角を丸くする 8">
+            <a:extLst>
+              <a:ext uri="{FF2B5EF4-FFF2-40B4-BE49-F238E27FC236}">
+                <a16:creationId xmlns:a16="http://schemas.microsoft.com/office/drawing/2014/main" id="{478343BE-306E-4657-841B-17ACD2762DA9}"/>
+              </a:ext>
+            </a:extLst>
+          </p:cNvPr>
+          <p:cNvSpPr/>
+          <p:nvPr/>
+        </p:nvSpPr>
+        <p:spPr>
+          <a:xfrm>
+            <a:off x="2273464" y="-866437"/>
+            <a:ext cx="812800" cy="440267"/>
+          </a:xfrm>
+          <a:prstGeom prst="roundRect">
+            <a:avLst/>
+          </a:prstGeom>
+          <a:solidFill>
+            <a:srgbClr val="00B050"/>
+          </a:solidFill>
+          <a:ln>
+            <a:noFill/>
+          </a:ln>
+        </p:spPr>
+        <p:style>
+          <a:lnRef idx="1">
+            <a:schemeClr val="accent5"/>
+          </a:lnRef>
+          <a:fillRef idx="3">
+            <a:schemeClr val="accent5"/>
+          </a:fillRef>
+          <a:effectRef idx="2">
+            <a:schemeClr val="accent5"/>
+          </a:effectRef>
+          <a:fontRef idx="minor">
+            <a:schemeClr val="lt1"/>
+          </a:fontRef>
+        </p:style>
+        <p:txBody>
+          <a:bodyPr rtlCol="0" anchor="ctr"/>
+          <a:lstStyle/>
+          <a:p>
+            <a:pPr algn="ctr"/>
+            <a:r>
+              <a:rPr kumimoji="1" lang="en-US" altLang="ja-JP" sz="3200" dirty="0"/>
+              <a:t>C</a:t>
+            </a:r>
+            <a:endParaRPr kumimoji="1" lang="ja-JP" altLang="en-US" sz="3200" dirty="0"/>
+          </a:p>
+        </p:txBody>
+      </p:sp>
+      <p:sp>
+        <p:nvSpPr>
+          <p:cNvPr id="10" name="四角形: 角を丸くする 9">
+            <a:extLst>
+              <a:ext uri="{FF2B5EF4-FFF2-40B4-BE49-F238E27FC236}">
+                <a16:creationId xmlns:a16="http://schemas.microsoft.com/office/drawing/2014/main" id="{7F7394D1-AB71-4F83-88CF-0D70AEA90BB3}"/>
+              </a:ext>
+            </a:extLst>
+          </p:cNvPr>
+          <p:cNvSpPr/>
+          <p:nvPr/>
+        </p:nvSpPr>
+        <p:spPr>
+          <a:xfrm>
+            <a:off x="7737000" y="3599507"/>
+            <a:ext cx="2282021" cy="440267"/>
+          </a:xfrm>
+          <a:prstGeom prst="roundRect">
+            <a:avLst/>
+          </a:prstGeom>
+          <a:solidFill>
+            <a:srgbClr val="00B050"/>
+          </a:solidFill>
+          <a:ln>
+            <a:noFill/>
+          </a:ln>
+        </p:spPr>
+        <p:style>
+          <a:lnRef idx="1">
+            <a:schemeClr val="accent5"/>
+          </a:lnRef>
+          <a:fillRef idx="3">
+            <a:schemeClr val="accent5"/>
+          </a:fillRef>
+          <a:effectRef idx="2">
+            <a:schemeClr val="accent5"/>
+          </a:effectRef>
+          <a:fontRef idx="minor">
+            <a:schemeClr val="lt1"/>
+          </a:fontRef>
+        </p:style>
+        <p:txBody>
+          <a:bodyPr rtlCol="0" anchor="ctr"/>
+          <a:lstStyle/>
+          <a:p>
+            <a:pPr algn="ctr"/>
+            <a:r>
+              <a:rPr lang="en-US" altLang="ja-JP" sz="2000" dirty="0"/>
+              <a:t>Exposed Thing</a:t>
+            </a:r>
+            <a:endParaRPr kumimoji="1" lang="ja-JP" altLang="en-US" sz="2000" dirty="0"/>
+          </a:p>
+        </p:txBody>
+      </p:sp>
+      <p:sp>
+        <p:nvSpPr>
+          <p:cNvPr id="13" name="四角形: 角を丸くする 12">
+            <a:extLst>
+              <a:ext uri="{FF2B5EF4-FFF2-40B4-BE49-F238E27FC236}">
+                <a16:creationId xmlns:a16="http://schemas.microsoft.com/office/drawing/2014/main" id="{B5CD2B9F-227C-466A-9DC6-760504E532C1}"/>
+              </a:ext>
+            </a:extLst>
+          </p:cNvPr>
+          <p:cNvSpPr/>
+          <p:nvPr/>
+        </p:nvSpPr>
+        <p:spPr>
+          <a:xfrm>
+            <a:off x="7421657" y="-1333106"/>
+            <a:ext cx="812800" cy="440267"/>
+          </a:xfrm>
+          <a:prstGeom prst="roundRect">
+            <a:avLst/>
+          </a:prstGeom>
+          <a:solidFill>
+            <a:srgbClr val="00B050"/>
+          </a:solidFill>
+          <a:ln>
+            <a:noFill/>
+          </a:ln>
+        </p:spPr>
+        <p:style>
+          <a:lnRef idx="1">
+            <a:schemeClr val="accent5"/>
+          </a:lnRef>
+          <a:fillRef idx="3">
+            <a:schemeClr val="accent5"/>
+          </a:fillRef>
+          <a:effectRef idx="2">
+            <a:schemeClr val="accent5"/>
+          </a:effectRef>
+          <a:fontRef idx="minor">
+            <a:schemeClr val="lt1"/>
+          </a:fontRef>
+        </p:style>
+        <p:txBody>
+          <a:bodyPr rtlCol="0" anchor="ctr"/>
+          <a:lstStyle/>
+          <a:p>
+            <a:pPr algn="ctr"/>
+            <a:r>
+              <a:rPr kumimoji="1" lang="en-US" altLang="ja-JP" sz="3200" dirty="0"/>
+              <a:t>C</a:t>
+            </a:r>
+            <a:endParaRPr kumimoji="1" lang="ja-JP" altLang="en-US" sz="3200" dirty="0"/>
+          </a:p>
+        </p:txBody>
+      </p:sp>
+      <p:sp>
+        <p:nvSpPr>
+          <p:cNvPr id="14" name="四角形: 角を丸くする 13">
+            <a:extLst>
+              <a:ext uri="{FF2B5EF4-FFF2-40B4-BE49-F238E27FC236}">
+                <a16:creationId xmlns:a16="http://schemas.microsoft.com/office/drawing/2014/main" id="{DAC9719D-BC55-4BAA-827B-3741647E133B}"/>
+              </a:ext>
+            </a:extLst>
+          </p:cNvPr>
+          <p:cNvSpPr/>
+          <p:nvPr/>
+        </p:nvSpPr>
+        <p:spPr>
+          <a:xfrm>
+            <a:off x="7421657" y="-2008619"/>
+            <a:ext cx="812800" cy="440267"/>
+          </a:xfrm>
+          <a:prstGeom prst="roundRect">
+            <a:avLst/>
+          </a:prstGeom>
+          <a:solidFill>
+            <a:srgbClr val="00B050"/>
+          </a:solidFill>
+          <a:ln>
+            <a:noFill/>
+          </a:ln>
+        </p:spPr>
+        <p:style>
+          <a:lnRef idx="1">
+            <a:schemeClr val="accent5"/>
+          </a:lnRef>
+          <a:fillRef idx="3">
+            <a:schemeClr val="accent5"/>
+          </a:fillRef>
+          <a:effectRef idx="2">
+            <a:schemeClr val="accent5"/>
+          </a:effectRef>
+          <a:fontRef idx="minor">
+            <a:schemeClr val="lt1"/>
+          </a:fontRef>
+        </p:style>
+        <p:txBody>
+          <a:bodyPr rtlCol="0" anchor="ctr"/>
+          <a:lstStyle/>
+          <a:p>
+            <a:pPr algn="ctr"/>
+            <a:r>
+              <a:rPr kumimoji="1" lang="en-US" altLang="ja-JP" sz="3200" dirty="0"/>
+              <a:t>E</a:t>
+            </a:r>
+            <a:endParaRPr kumimoji="1" lang="ja-JP" altLang="en-US" sz="3200" dirty="0"/>
+          </a:p>
+        </p:txBody>
+      </p:sp>
+      <p:sp>
+        <p:nvSpPr>
+          <p:cNvPr id="15" name="四角形: メモ 14">
+            <a:extLst>
+              <a:ext uri="{FF2B5EF4-FFF2-40B4-BE49-F238E27FC236}">
+                <a16:creationId xmlns:a16="http://schemas.microsoft.com/office/drawing/2014/main" id="{B13C0EAD-EA26-4ADA-AFD3-C60E5A7E354F}"/>
+              </a:ext>
+            </a:extLst>
+          </p:cNvPr>
+          <p:cNvSpPr/>
+          <p:nvPr/>
+        </p:nvSpPr>
+        <p:spPr>
+          <a:xfrm>
+            <a:off x="7421657" y="-646304"/>
+            <a:ext cx="812800" cy="440267"/>
+          </a:xfrm>
+          <a:prstGeom prst="foldedCorner">
+            <a:avLst/>
+          </a:prstGeom>
+          <a:solidFill>
+            <a:srgbClr val="4A7B7C"/>
+          </a:solidFill>
+          <a:ln>
+            <a:noFill/>
+          </a:ln>
+        </p:spPr>
+        <p:style>
+          <a:lnRef idx="1">
+            <a:schemeClr val="accent5"/>
+          </a:lnRef>
+          <a:fillRef idx="3">
+            <a:schemeClr val="accent5"/>
+          </a:fillRef>
+          <a:effectRef idx="2">
+            <a:schemeClr val="accent5"/>
+          </a:effectRef>
+          <a:fontRef idx="minor">
+            <a:schemeClr val="lt1"/>
+          </a:fontRef>
+        </p:style>
+        <p:txBody>
+          <a:bodyPr rtlCol="0" anchor="ctr"/>
+          <a:lstStyle/>
+          <a:p>
+            <a:pPr algn="ctr"/>
+            <a:r>
+              <a:rPr kumimoji="1" lang="en-US" altLang="ja-JP" sz="3200" dirty="0"/>
+              <a:t>TD</a:t>
+            </a:r>
+            <a:endParaRPr kumimoji="1" lang="ja-JP" altLang="en-US" sz="3200" dirty="0"/>
+          </a:p>
+        </p:txBody>
+      </p:sp>
+      <p:sp>
+        <p:nvSpPr>
+          <p:cNvPr id="16" name="テキスト ボックス 15">
+            <a:extLst>
+              <a:ext uri="{FF2B5EF4-FFF2-40B4-BE49-F238E27FC236}">
+                <a16:creationId xmlns:a16="http://schemas.microsoft.com/office/drawing/2014/main" id="{DF7894EE-1174-4828-B7DF-51B52BE5F642}"/>
+              </a:ext>
+            </a:extLst>
+          </p:cNvPr>
+          <p:cNvSpPr txBox="1"/>
+          <p:nvPr/>
+        </p:nvSpPr>
+        <p:spPr>
+          <a:xfrm>
+            <a:off x="8448945" y="-2111652"/>
+            <a:ext cx="2885726" cy="646331"/>
+          </a:xfrm>
+          <a:prstGeom prst="rect">
+            <a:avLst/>
+          </a:prstGeom>
+          <a:noFill/>
+        </p:spPr>
+        <p:txBody>
+          <a:bodyPr wrap="none" rtlCol="0">
+            <a:spAutoFit/>
+          </a:bodyPr>
+          <a:lstStyle/>
+          <a:p>
+            <a:r>
+              <a:rPr lang="en-US" altLang="ja-JP" sz="3600" dirty="0"/>
+              <a:t>Exposed</a:t>
+            </a:r>
+            <a:r>
+              <a:rPr lang="ja-JP" altLang="en-US" sz="3600" dirty="0"/>
+              <a:t> </a:t>
+            </a:r>
+            <a:r>
+              <a:rPr lang="en-US" altLang="ja-JP" sz="3600" dirty="0"/>
+              <a:t>Thing</a:t>
+            </a:r>
+            <a:endParaRPr kumimoji="1" lang="ja-JP" altLang="en-US" sz="3600" dirty="0"/>
+          </a:p>
+        </p:txBody>
+      </p:sp>
+      <p:sp>
+        <p:nvSpPr>
+          <p:cNvPr id="17" name="テキスト ボックス 16">
+            <a:extLst>
+              <a:ext uri="{FF2B5EF4-FFF2-40B4-BE49-F238E27FC236}">
+                <a16:creationId xmlns:a16="http://schemas.microsoft.com/office/drawing/2014/main" id="{0CF33ABF-3C66-435D-B875-AA53D751472E}"/>
+              </a:ext>
+            </a:extLst>
+          </p:cNvPr>
+          <p:cNvSpPr txBox="1"/>
+          <p:nvPr/>
+        </p:nvSpPr>
+        <p:spPr>
+          <a:xfrm>
+            <a:off x="8448945" y="-1429103"/>
+            <a:ext cx="3316934" cy="646331"/>
+          </a:xfrm>
+          <a:prstGeom prst="rect">
+            <a:avLst/>
+          </a:prstGeom>
+          <a:noFill/>
+        </p:spPr>
+        <p:txBody>
+          <a:bodyPr wrap="none" rtlCol="0">
+            <a:spAutoFit/>
+          </a:bodyPr>
+          <a:lstStyle/>
+          <a:p>
+            <a:r>
+              <a:rPr lang="en-US" altLang="ja-JP" sz="3600" dirty="0"/>
+              <a:t>Consumed Thing</a:t>
+            </a:r>
+            <a:endParaRPr kumimoji="1" lang="ja-JP" altLang="en-US" sz="3600" dirty="0"/>
+          </a:p>
+        </p:txBody>
+      </p:sp>
+      <p:sp>
+        <p:nvSpPr>
+          <p:cNvPr id="18" name="テキスト ボックス 17">
+            <a:extLst>
+              <a:ext uri="{FF2B5EF4-FFF2-40B4-BE49-F238E27FC236}">
+                <a16:creationId xmlns:a16="http://schemas.microsoft.com/office/drawing/2014/main" id="{F4CC1D14-7AA6-41AD-85BC-5B3BD9AC308C}"/>
+              </a:ext>
+            </a:extLst>
+          </p:cNvPr>
+          <p:cNvSpPr txBox="1"/>
+          <p:nvPr/>
+        </p:nvSpPr>
+        <p:spPr>
+          <a:xfrm>
+            <a:off x="8448945" y="-746554"/>
+            <a:ext cx="3462358" cy="646331"/>
+          </a:xfrm>
+          <a:prstGeom prst="rect">
+            <a:avLst/>
+          </a:prstGeom>
+          <a:noFill/>
+        </p:spPr>
+        <p:txBody>
+          <a:bodyPr wrap="none" rtlCol="0">
+            <a:spAutoFit/>
+          </a:bodyPr>
+          <a:lstStyle/>
+          <a:p>
+            <a:r>
+              <a:rPr lang="en-US" altLang="ja-JP" sz="3600" dirty="0"/>
+              <a:t>Thing Description</a:t>
+            </a:r>
+            <a:endParaRPr kumimoji="1" lang="ja-JP" altLang="en-US" sz="3600" dirty="0"/>
+          </a:p>
+        </p:txBody>
+      </p:sp>
+      <p:cxnSp>
+        <p:nvCxnSpPr>
+          <p:cNvPr id="21" name="直線矢印コネクタ 20">
+            <a:extLst>
+              <a:ext uri="{FF2B5EF4-FFF2-40B4-BE49-F238E27FC236}">
+                <a16:creationId xmlns:a16="http://schemas.microsoft.com/office/drawing/2014/main" id="{36428CDD-CC0D-4876-9F07-F4A6D227D45A}"/>
+              </a:ext>
+            </a:extLst>
+          </p:cNvPr>
+          <p:cNvCxnSpPr>
+            <a:cxnSpLocks/>
+          </p:cNvCxnSpPr>
+          <p:nvPr/>
+        </p:nvCxnSpPr>
+        <p:spPr>
+          <a:xfrm flipH="1">
+            <a:off x="2136189" y="-180230"/>
+            <a:ext cx="1389094" cy="0"/>
+          </a:xfrm>
+          <a:prstGeom prst="straightConnector1">
+            <a:avLst/>
+          </a:prstGeom>
+          <a:ln w="57150">
+            <a:solidFill>
+              <a:schemeClr val="tx1"/>
+            </a:solidFill>
+            <a:prstDash val="sysDash"/>
+            <a:tailEnd type="triangle"/>
+          </a:ln>
+        </p:spPr>
+        <p:style>
+          <a:lnRef idx="1">
+            <a:schemeClr val="accent1"/>
+          </a:lnRef>
+          <a:fillRef idx="0">
+            <a:schemeClr val="accent1"/>
+          </a:fillRef>
+          <a:effectRef idx="0">
+            <a:schemeClr val="accent1"/>
+          </a:effectRef>
+          <a:fontRef idx="minor">
+            <a:schemeClr val="tx1"/>
+          </a:fontRef>
+        </p:style>
+      </p:cxnSp>
+      <p:sp>
+        <p:nvSpPr>
+          <p:cNvPr id="19" name="四角形: 角を丸くする 18">
+            <a:extLst>
+              <a:ext uri="{FF2B5EF4-FFF2-40B4-BE49-F238E27FC236}">
+                <a16:creationId xmlns:a16="http://schemas.microsoft.com/office/drawing/2014/main" id="{46146C38-6712-4A36-BEAE-7DD2A922D693}"/>
+              </a:ext>
+            </a:extLst>
+          </p:cNvPr>
+          <p:cNvSpPr/>
+          <p:nvPr/>
+        </p:nvSpPr>
+        <p:spPr>
+          <a:xfrm>
+            <a:off x="2026146" y="3591857"/>
+            <a:ext cx="2282021" cy="440267"/>
+          </a:xfrm>
+          <a:prstGeom prst="roundRect">
+            <a:avLst/>
+          </a:prstGeom>
+          <a:solidFill>
+            <a:srgbClr val="00B050"/>
+          </a:solidFill>
+          <a:ln>
+            <a:noFill/>
+          </a:ln>
+        </p:spPr>
+        <p:style>
+          <a:lnRef idx="1">
+            <a:schemeClr val="accent5"/>
+          </a:lnRef>
+          <a:fillRef idx="3">
+            <a:schemeClr val="accent5"/>
+          </a:fillRef>
+          <a:effectRef idx="2">
+            <a:schemeClr val="accent5"/>
+          </a:effectRef>
+          <a:fontRef idx="minor">
+            <a:schemeClr val="lt1"/>
+          </a:fontRef>
+        </p:style>
+        <p:txBody>
+          <a:bodyPr wrap="none" rtlCol="0" anchor="ctr"/>
+          <a:lstStyle/>
+          <a:p>
+            <a:pPr algn="ctr"/>
+            <a:r>
+              <a:rPr kumimoji="1" lang="en-US" altLang="ja-JP" sz="2000" dirty="0"/>
+              <a:t>Consumed Thing</a:t>
+            </a:r>
+            <a:endParaRPr kumimoji="1" lang="ja-JP" altLang="en-US" sz="2000" dirty="0"/>
+          </a:p>
+        </p:txBody>
+      </p:sp>
+      <p:cxnSp>
+        <p:nvCxnSpPr>
+          <p:cNvPr id="25" name="Gerade Verbindung mit Pfeil 42">
+            <a:extLst>
+              <a:ext uri="{FF2B5EF4-FFF2-40B4-BE49-F238E27FC236}">
+                <a16:creationId xmlns:a16="http://schemas.microsoft.com/office/drawing/2014/main" id="{32FD418E-ACA3-4090-96FF-CBAAD989B740}"/>
+              </a:ext>
+            </a:extLst>
+          </p:cNvPr>
+          <p:cNvCxnSpPr>
+            <a:cxnSpLocks/>
+            <a:endCxn id="10" idx="1"/>
+          </p:cNvCxnSpPr>
+          <p:nvPr/>
+        </p:nvCxnSpPr>
+        <p:spPr>
+          <a:xfrm flipV="1">
+            <a:off x="4308167" y="3819641"/>
+            <a:ext cx="3428833" cy="7650"/>
+          </a:xfrm>
+          <a:prstGeom prst="straightConnector1">
+            <a:avLst/>
+          </a:prstGeom>
+          <a:ln w="38100">
+            <a:solidFill>
+              <a:srgbClr val="008000"/>
+            </a:solidFill>
+            <a:prstDash val="sysDot"/>
+            <a:headEnd type="arrow" w="med" len="med"/>
+            <a:tailEnd type="arrow" w="med" len="med"/>
+          </a:ln>
+        </p:spPr>
+        <p:style>
+          <a:lnRef idx="1">
+            <a:schemeClr val="accent1"/>
+          </a:lnRef>
+          <a:fillRef idx="0">
+            <a:schemeClr val="accent1"/>
+          </a:fillRef>
+          <a:effectRef idx="0">
+            <a:schemeClr val="accent1"/>
+          </a:effectRef>
+          <a:fontRef idx="minor">
+            <a:schemeClr val="tx1"/>
+          </a:fontRef>
+        </p:style>
+      </p:cxnSp>
+      <p:grpSp>
+        <p:nvGrpSpPr>
+          <p:cNvPr id="29" name="Group 38">
+            <a:extLst>
+              <a:ext uri="{FF2B5EF4-FFF2-40B4-BE49-F238E27FC236}">
+                <a16:creationId xmlns:a16="http://schemas.microsoft.com/office/drawing/2014/main" id="{4FFE457D-83D2-49D0-A0F3-DDFEEA55E2E5}"/>
+              </a:ext>
+            </a:extLst>
+          </p:cNvPr>
+          <p:cNvGrpSpPr/>
+          <p:nvPr/>
+        </p:nvGrpSpPr>
+        <p:grpSpPr>
+          <a:xfrm>
+            <a:off x="5034869" y="2771507"/>
+            <a:ext cx="2060941" cy="828000"/>
+            <a:chOff x="2670082" y="4186219"/>
+            <a:chExt cx="2060941" cy="828000"/>
+          </a:xfrm>
+        </p:grpSpPr>
+        <p:sp>
+          <p:nvSpPr>
+            <p:cNvPr id="30" name="角丸四角形 21">
+              <a:extLst>
+                <a:ext uri="{FF2B5EF4-FFF2-40B4-BE49-F238E27FC236}">
+                  <a16:creationId xmlns:a16="http://schemas.microsoft.com/office/drawing/2014/main" id="{024C5D63-C675-4753-B4EC-F2F06403B347}"/>
+                </a:ext>
+              </a:extLst>
+            </p:cNvPr>
+            <p:cNvSpPr/>
+            <p:nvPr/>
+          </p:nvSpPr>
+          <p:spPr bwMode="auto">
+            <a:xfrm>
+              <a:off x="2670082" y="4186219"/>
+              <a:ext cx="2060941" cy="828000"/>
+            </a:xfrm>
+            <a:prstGeom prst="foldedCorner">
+              <a:avLst>
+                <a:gd name="adj" fmla="val 20194"/>
+              </a:avLst>
+            </a:prstGeom>
+            <a:solidFill>
+              <a:srgbClr val="C0504D"/>
+            </a:solidFill>
+            <a:ln w="25400" cap="flat" cmpd="sng" algn="ctr">
+              <a:noFill/>
+              <a:prstDash val="solid"/>
+              <a:round/>
+              <a:headEnd type="none" w="med" len="med"/>
+              <a:tailEnd type="none" w="med" len="med"/>
+            </a:ln>
+            <a:effectLst/>
+            <a:extLst/>
+          </p:spPr>
+          <p:txBody>
+            <a:bodyPr vert="horz" wrap="none" lIns="432000" tIns="144000" rIns="0" bIns="0" numCol="1" rtlCol="0" anchor="ctr" anchorCtr="0" compatLnSpc="1">
+              <a:prstTxWarp prst="textNoShape">
+                <a:avLst/>
+              </a:prstTxWarp>
+              <a:noAutofit/>
+            </a:bodyPr>
+            <a:lstStyle/>
+            <a:p>
+              <a:pPr marL="0" marR="0" lvl="0" indent="0" algn="ctr" defTabSz="914400" eaLnBrk="1" fontAlgn="ctr" latinLnBrk="0" hangingPunct="1">
+                <a:lnSpc>
+                  <a:spcPct val="100000"/>
+                </a:lnSpc>
+                <a:spcBef>
+                  <a:spcPts val="0"/>
+                </a:spcBef>
+                <a:spcAft>
+                  <a:spcPts val="0"/>
+                </a:spcAft>
+                <a:buClrTx/>
+                <a:buSzTx/>
+                <a:buFontTx/>
+                <a:buNone/>
+                <a:tabLst/>
+                <a:defRPr/>
+              </a:pPr>
+              <a:r>
+                <a:rPr kumimoji="0" lang="en-US" altLang="ja-JP" sz="2000" i="0" u="none" strike="noStrike" kern="0" cap="none" spc="0" normalizeH="0" baseline="0" dirty="0" err="1">
+                  <a:ln>
+                    <a:noFill/>
+                  </a:ln>
+                  <a:solidFill>
+                    <a:prstClr val="white"/>
+                  </a:solidFill>
+                  <a:effectLst/>
+                  <a:uLnTx/>
+                  <a:uFillTx/>
+                  <a:latin typeface="+mj-lt"/>
+                  <a:ea typeface="HG明朝E" panose="02020909000000000000" pitchFamily="17" charset="-128"/>
+                  <a:cs typeface="Arial" pitchFamily="34" charset="0"/>
+                </a:rPr>
+                <a:t>WoT</a:t>
+              </a:r>
+              <a:r>
+                <a:rPr kumimoji="0" lang="en-US" altLang="ja-JP" sz="2000" i="0" u="none" strike="noStrike" kern="0" cap="none" spc="0" normalizeH="0" baseline="0" dirty="0">
+                  <a:ln>
+                    <a:noFill/>
+                  </a:ln>
+                  <a:solidFill>
+                    <a:prstClr val="white"/>
+                  </a:solidFill>
+                  <a:effectLst/>
+                  <a:uLnTx/>
+                  <a:uFillTx/>
+                  <a:latin typeface="+mj-lt"/>
+                  <a:ea typeface="HG明朝E" panose="02020909000000000000" pitchFamily="17" charset="-128"/>
+                  <a:cs typeface="Arial" pitchFamily="34" charset="0"/>
+                </a:rPr>
+                <a:t> Thing</a:t>
+              </a:r>
+              <a:br>
+                <a:rPr kumimoji="0" lang="en-US" altLang="ja-JP" sz="2000" i="0" u="none" strike="noStrike" kern="0" cap="none" spc="0" normalizeH="0" baseline="0" dirty="0">
+                  <a:ln>
+                    <a:noFill/>
+                  </a:ln>
+                  <a:solidFill>
+                    <a:prstClr val="white"/>
+                  </a:solidFill>
+                  <a:effectLst/>
+                  <a:uLnTx/>
+                  <a:uFillTx/>
+                  <a:latin typeface="+mj-lt"/>
+                  <a:ea typeface="HG明朝E" panose="02020909000000000000" pitchFamily="17" charset="-128"/>
+                  <a:cs typeface="Arial" pitchFamily="34" charset="0"/>
+                </a:rPr>
+              </a:br>
+              <a:r>
+                <a:rPr kumimoji="0" lang="en-US" altLang="ja-JP" sz="2000" i="0" u="none" strike="noStrike" kern="0" cap="none" spc="0" normalizeH="0" baseline="0" dirty="0">
+                  <a:ln>
+                    <a:noFill/>
+                  </a:ln>
+                  <a:solidFill>
+                    <a:prstClr val="white"/>
+                  </a:solidFill>
+                  <a:effectLst/>
+                  <a:uLnTx/>
+                  <a:uFillTx/>
+                  <a:latin typeface="+mj-lt"/>
+                  <a:ea typeface="HG明朝E" panose="02020909000000000000" pitchFamily="17" charset="-128"/>
+                  <a:cs typeface="Arial" pitchFamily="34" charset="0"/>
+                </a:rPr>
+                <a:t>Description</a:t>
+              </a:r>
+              <a:endParaRPr kumimoji="0" lang="en-US" altLang="ja-JP" sz="2800" i="0" u="none" strike="noStrike" kern="0" cap="none" spc="0" normalizeH="0" baseline="0" dirty="0">
+                <a:ln>
+                  <a:noFill/>
+                </a:ln>
+                <a:solidFill>
+                  <a:prstClr val="white"/>
+                </a:solidFill>
+                <a:effectLst/>
+                <a:uLnTx/>
+                <a:uFillTx/>
+                <a:latin typeface="+mj-lt"/>
+                <a:ea typeface="HG明朝E" panose="02020909000000000000" pitchFamily="17" charset="-128"/>
+                <a:cs typeface="Arial" pitchFamily="34" charset="0"/>
+              </a:endParaRPr>
+            </a:p>
+          </p:txBody>
+        </p:sp>
+        <p:grpSp>
+          <p:nvGrpSpPr>
+            <p:cNvPr id="31" name="Group 28">
+              <a:extLst>
+                <a:ext uri="{FF2B5EF4-FFF2-40B4-BE49-F238E27FC236}">
+                  <a16:creationId xmlns:a16="http://schemas.microsoft.com/office/drawing/2014/main" id="{A5488A5F-252B-4EB8-AA83-97711B5B4618}"/>
+                </a:ext>
+              </a:extLst>
+            </p:cNvPr>
+            <p:cNvGrpSpPr/>
+            <p:nvPr/>
+          </p:nvGrpSpPr>
+          <p:grpSpPr>
+            <a:xfrm>
+              <a:off x="2812207" y="4399725"/>
+              <a:ext cx="413417" cy="426971"/>
+              <a:chOff x="4042160" y="993559"/>
+              <a:chExt cx="548293" cy="566272"/>
+            </a:xfrm>
+            <a:solidFill>
+              <a:sysClr val="window" lastClr="FFFFFF"/>
+            </a:solidFill>
+          </p:grpSpPr>
+          <p:sp>
+            <p:nvSpPr>
+              <p:cNvPr id="32" name="Isosceles Triangle 29">
+                <a:extLst>
+                  <a:ext uri="{FF2B5EF4-FFF2-40B4-BE49-F238E27FC236}">
+                    <a16:creationId xmlns:a16="http://schemas.microsoft.com/office/drawing/2014/main" id="{AAB48341-E11F-47E0-ADE3-15F5732CB54D}"/>
+                  </a:ext>
+                </a:extLst>
+              </p:cNvPr>
+              <p:cNvSpPr/>
+              <p:nvPr/>
+            </p:nvSpPr>
+            <p:spPr>
+              <a:xfrm rot="1800000">
+                <a:off x="4184483" y="1052736"/>
+                <a:ext cx="405970" cy="349975"/>
+              </a:xfrm>
+              <a:prstGeom prst="triangle">
+                <a:avLst/>
+              </a:prstGeom>
+              <a:noFill/>
+              <a:ln w="28575" cap="rnd" cmpd="sng" algn="ctr">
+                <a:solidFill>
+                  <a:sysClr val="window" lastClr="FFFFFF"/>
+                </a:solidFill>
+                <a:prstDash val="solid"/>
+              </a:ln>
+              <a:effectLst/>
+            </p:spPr>
+            <p:txBody>
+              <a:bodyPr wrap="none" rtlCol="0" anchor="ctr"/>
+              <a:lstStyle/>
+              <a:p>
+                <a:pPr marL="0" marR="0" lvl="0" indent="0" algn="ctr" defTabSz="914400" eaLnBrk="1" fontAlgn="auto" latinLnBrk="0" hangingPunct="1">
+                  <a:lnSpc>
+                    <a:spcPct val="100000"/>
+                  </a:lnSpc>
+                  <a:spcBef>
+                    <a:spcPts val="0"/>
+                  </a:spcBef>
+                  <a:spcAft>
+                    <a:spcPts val="0"/>
+                  </a:spcAft>
+                  <a:buClrTx/>
+                  <a:buSzTx/>
+                  <a:buFontTx/>
+                  <a:buNone/>
+                  <a:tabLst/>
+                  <a:defRPr/>
+                </a:pPr>
+                <a:endParaRPr kumimoji="0" lang="en-US" sz="4400" i="0" u="none" strike="noStrike" kern="0" cap="none" spc="0" normalizeH="0" baseline="0">
+                  <a:ln>
+                    <a:noFill/>
+                  </a:ln>
+                  <a:solidFill>
+                    <a:prstClr val="white"/>
+                  </a:solidFill>
+                  <a:effectLst/>
+                  <a:uLnTx/>
+                  <a:uFillTx/>
+                  <a:latin typeface="+mj-lt"/>
+                  <a:cs typeface="Arial" pitchFamily="34" charset="0"/>
+                </a:endParaRPr>
+              </a:p>
+            </p:txBody>
+          </p:sp>
+          <p:sp>
+            <p:nvSpPr>
+              <p:cNvPr id="33" name="Oval 30">
+                <a:extLst>
+                  <a:ext uri="{FF2B5EF4-FFF2-40B4-BE49-F238E27FC236}">
+                    <a16:creationId xmlns:a16="http://schemas.microsoft.com/office/drawing/2014/main" id="{F5DD1807-415C-4F20-87B3-DC9D99DA43B9}"/>
+                  </a:ext>
+                </a:extLst>
+              </p:cNvPr>
+              <p:cNvSpPr/>
+              <p:nvPr/>
+            </p:nvSpPr>
+            <p:spPr>
+              <a:xfrm rot="19800000">
+                <a:off x="4394607" y="993559"/>
+                <a:ext cx="161145" cy="161145"/>
+              </a:xfrm>
+              <a:prstGeom prst="ellipse">
+                <a:avLst/>
+              </a:prstGeom>
+              <a:grpFill/>
+              <a:ln w="25400" cap="rnd" cmpd="sng" algn="ctr">
+                <a:noFill/>
+                <a:prstDash val="solid"/>
+              </a:ln>
+              <a:effectLst/>
+            </p:spPr>
+            <p:txBody>
+              <a:bodyPr wrap="none" rtlCol="0" anchor="ctr"/>
+              <a:lstStyle/>
+              <a:p>
+                <a:pPr marL="0" marR="0" lvl="0" indent="0" algn="ctr" defTabSz="914400" eaLnBrk="1" fontAlgn="auto" latinLnBrk="0" hangingPunct="1">
+                  <a:lnSpc>
+                    <a:spcPct val="100000"/>
+                  </a:lnSpc>
+                  <a:spcBef>
+                    <a:spcPts val="0"/>
+                  </a:spcBef>
+                  <a:spcAft>
+                    <a:spcPts val="0"/>
+                  </a:spcAft>
+                  <a:buClrTx/>
+                  <a:buSzTx/>
+                  <a:buFontTx/>
+                  <a:buNone/>
+                  <a:tabLst/>
+                  <a:defRPr/>
+                </a:pPr>
+                <a:endParaRPr kumimoji="0" lang="en-US" sz="4400" i="0" u="none" strike="noStrike" kern="0" cap="none" spc="0" normalizeH="0" baseline="0">
+                  <a:ln>
+                    <a:noFill/>
+                  </a:ln>
+                  <a:solidFill>
+                    <a:prstClr val="white"/>
+                  </a:solidFill>
+                  <a:effectLst/>
+                  <a:uLnTx/>
+                  <a:uFillTx/>
+                  <a:latin typeface="+mj-lt"/>
+                  <a:cs typeface="Arial" pitchFamily="34" charset="0"/>
+                </a:endParaRPr>
+              </a:p>
+            </p:txBody>
+          </p:sp>
+          <p:sp>
+            <p:nvSpPr>
+              <p:cNvPr id="34" name="Oval 31">
+                <a:extLst>
+                  <a:ext uri="{FF2B5EF4-FFF2-40B4-BE49-F238E27FC236}">
+                    <a16:creationId xmlns:a16="http://schemas.microsoft.com/office/drawing/2014/main" id="{ABEA0394-2BF9-4967-9823-22C32CCD88DA}"/>
+                  </a:ext>
+                </a:extLst>
+              </p:cNvPr>
+              <p:cNvSpPr/>
+              <p:nvPr/>
+            </p:nvSpPr>
+            <p:spPr>
+              <a:xfrm rot="19800000">
+                <a:off x="4042160" y="1196566"/>
+                <a:ext cx="161145" cy="161145"/>
+              </a:xfrm>
+              <a:prstGeom prst="ellipse">
+                <a:avLst/>
+              </a:prstGeom>
+              <a:grpFill/>
+              <a:ln w="25400" cap="rnd" cmpd="sng" algn="ctr">
+                <a:noFill/>
+                <a:prstDash val="solid"/>
+              </a:ln>
+              <a:effectLst/>
+            </p:spPr>
+            <p:txBody>
+              <a:bodyPr wrap="none" rtlCol="0" anchor="ctr"/>
+              <a:lstStyle/>
+              <a:p>
+                <a:pPr marL="0" marR="0" lvl="0" indent="0" algn="ctr" defTabSz="914400" eaLnBrk="1" fontAlgn="auto" latinLnBrk="0" hangingPunct="1">
+                  <a:lnSpc>
+                    <a:spcPct val="100000"/>
+                  </a:lnSpc>
+                  <a:spcBef>
+                    <a:spcPts val="0"/>
+                  </a:spcBef>
+                  <a:spcAft>
+                    <a:spcPts val="0"/>
+                  </a:spcAft>
+                  <a:buClrTx/>
+                  <a:buSzTx/>
+                  <a:buFontTx/>
+                  <a:buNone/>
+                  <a:tabLst/>
+                  <a:defRPr/>
+                </a:pPr>
+                <a:endParaRPr kumimoji="0" lang="en-US" sz="4400" i="0" u="none" strike="noStrike" kern="0" cap="none" spc="0" normalizeH="0" baseline="0">
+                  <a:ln>
+                    <a:noFill/>
+                  </a:ln>
+                  <a:solidFill>
+                    <a:prstClr val="white"/>
+                  </a:solidFill>
+                  <a:effectLst/>
+                  <a:uLnTx/>
+                  <a:uFillTx/>
+                  <a:latin typeface="+mj-lt"/>
+                  <a:cs typeface="Arial" pitchFamily="34" charset="0"/>
+                </a:endParaRPr>
+              </a:p>
+            </p:txBody>
+          </p:sp>
+          <p:sp>
+            <p:nvSpPr>
+              <p:cNvPr id="35" name="Oval 32">
+                <a:extLst>
+                  <a:ext uri="{FF2B5EF4-FFF2-40B4-BE49-F238E27FC236}">
+                    <a16:creationId xmlns:a16="http://schemas.microsoft.com/office/drawing/2014/main" id="{B86A9EA5-24F9-4D3F-AB41-726B8B8B7C20}"/>
+                  </a:ext>
+                </a:extLst>
+              </p:cNvPr>
+              <p:cNvSpPr/>
+              <p:nvPr/>
+            </p:nvSpPr>
+            <p:spPr>
+              <a:xfrm rot="1800000">
+                <a:off x="4394610" y="1398686"/>
+                <a:ext cx="161145" cy="161145"/>
+              </a:xfrm>
+              <a:prstGeom prst="ellipse">
+                <a:avLst/>
+              </a:prstGeom>
+              <a:grpFill/>
+              <a:ln w="25400" cap="rnd" cmpd="sng" algn="ctr">
+                <a:noFill/>
+                <a:prstDash val="solid"/>
+              </a:ln>
+              <a:effectLst/>
+            </p:spPr>
+            <p:txBody>
+              <a:bodyPr wrap="none" rtlCol="0" anchor="ctr"/>
+              <a:lstStyle/>
+              <a:p>
+                <a:pPr marL="0" marR="0" lvl="0" indent="0" algn="ctr" defTabSz="914400" eaLnBrk="1" fontAlgn="auto" latinLnBrk="0" hangingPunct="1">
+                  <a:lnSpc>
+                    <a:spcPct val="100000"/>
+                  </a:lnSpc>
+                  <a:spcBef>
+                    <a:spcPts val="0"/>
+                  </a:spcBef>
+                  <a:spcAft>
+                    <a:spcPts val="0"/>
+                  </a:spcAft>
+                  <a:buClrTx/>
+                  <a:buSzTx/>
+                  <a:buFontTx/>
+                  <a:buNone/>
+                  <a:tabLst/>
+                  <a:defRPr/>
+                </a:pPr>
+                <a:endParaRPr kumimoji="0" lang="en-US" sz="4400" i="0" u="none" strike="noStrike" kern="0" cap="none" spc="0" normalizeH="0" baseline="0">
+                  <a:ln>
+                    <a:noFill/>
+                  </a:ln>
+                  <a:solidFill>
+                    <a:prstClr val="white"/>
+                  </a:solidFill>
+                  <a:effectLst/>
+                  <a:uLnTx/>
+                  <a:uFillTx/>
+                  <a:latin typeface="+mj-lt"/>
+                  <a:cs typeface="Arial" pitchFamily="34" charset="0"/>
+                </a:endParaRPr>
+              </a:p>
+            </p:txBody>
+          </p:sp>
+        </p:grpSp>
+      </p:grpSp>
+      <p:sp>
+        <p:nvSpPr>
+          <p:cNvPr id="36" name="Down Arrow 40">
+            <a:extLst>
+              <a:ext uri="{FF2B5EF4-FFF2-40B4-BE49-F238E27FC236}">
+                <a16:creationId xmlns:a16="http://schemas.microsoft.com/office/drawing/2014/main" id="{0FE59E28-4CBD-4783-85B2-324EB3670127}"/>
+              </a:ext>
+            </a:extLst>
+          </p:cNvPr>
+          <p:cNvSpPr/>
+          <p:nvPr/>
+        </p:nvSpPr>
+        <p:spPr>
+          <a:xfrm rot="5400000">
+            <a:off x="7079965" y="3000132"/>
+            <a:ext cx="439632" cy="518965"/>
+          </a:xfrm>
+          <a:prstGeom prst="downArrow">
+            <a:avLst>
+              <a:gd name="adj1" fmla="val 50000"/>
+              <a:gd name="adj2" fmla="val 50000"/>
+            </a:avLst>
+          </a:prstGeom>
+          <a:solidFill>
+            <a:schemeClr val="bg1">
+              <a:lumMod val="75000"/>
+            </a:schemeClr>
+          </a:solidFill>
+          <a:ln>
+            <a:noFill/>
+          </a:ln>
+        </p:spPr>
+        <p:style>
+          <a:lnRef idx="2">
+            <a:schemeClr val="accent1">
+              <a:shade val="50000"/>
+            </a:schemeClr>
+          </a:lnRef>
+          <a:fillRef idx="1">
+            <a:schemeClr val="accent1"/>
+          </a:fillRef>
+          <a:effectRef idx="0">
+            <a:schemeClr val="accent1"/>
+          </a:effectRef>
+          <a:fontRef idx="minor">
+            <a:schemeClr val="lt1"/>
+          </a:fontRef>
+        </p:style>
+        <p:txBody>
+          <a:bodyPr rtlCol="0" anchor="ctr"/>
+          <a:lstStyle/>
+          <a:p>
+            <a:pPr algn="ctr"/>
+            <a:endParaRPr lang="en-US">
+              <a:latin typeface="+mj-lt"/>
+              <a:cs typeface="Arial" pitchFamily="34" charset="0"/>
+            </a:endParaRPr>
+          </a:p>
+        </p:txBody>
+      </p:sp>
+      <p:sp>
+        <p:nvSpPr>
+          <p:cNvPr id="37" name="Down Arrow 40">
+            <a:extLst>
+              <a:ext uri="{FF2B5EF4-FFF2-40B4-BE49-F238E27FC236}">
+                <a16:creationId xmlns:a16="http://schemas.microsoft.com/office/drawing/2014/main" id="{A0B76F1B-01A8-4996-9734-5669198AA028}"/>
+              </a:ext>
+            </a:extLst>
+          </p:cNvPr>
+          <p:cNvSpPr/>
+          <p:nvPr/>
+        </p:nvSpPr>
+        <p:spPr>
+          <a:xfrm rot="5400000">
+            <a:off x="4552296" y="3004366"/>
+            <a:ext cx="439632" cy="518965"/>
+          </a:xfrm>
+          <a:prstGeom prst="downArrow">
+            <a:avLst>
+              <a:gd name="adj1" fmla="val 50000"/>
+              <a:gd name="adj2" fmla="val 50000"/>
+            </a:avLst>
+          </a:prstGeom>
+          <a:solidFill>
+            <a:schemeClr val="bg1">
+              <a:lumMod val="75000"/>
+            </a:schemeClr>
+          </a:solidFill>
+          <a:ln>
+            <a:noFill/>
+          </a:ln>
+        </p:spPr>
+        <p:style>
+          <a:lnRef idx="2">
+            <a:schemeClr val="accent1">
+              <a:shade val="50000"/>
+            </a:schemeClr>
+          </a:lnRef>
+          <a:fillRef idx="1">
+            <a:schemeClr val="accent1"/>
+          </a:fillRef>
+          <a:effectRef idx="0">
+            <a:schemeClr val="accent1"/>
+          </a:effectRef>
+          <a:fontRef idx="minor">
+            <a:schemeClr val="lt1"/>
+          </a:fontRef>
+        </p:style>
+        <p:txBody>
+          <a:bodyPr rtlCol="0" anchor="ctr"/>
+          <a:lstStyle/>
+          <a:p>
+            <a:pPr algn="ctr"/>
+            <a:endParaRPr lang="en-US">
+              <a:latin typeface="+mj-lt"/>
+              <a:cs typeface="Arial" pitchFamily="34" charset="0"/>
+            </a:endParaRPr>
+          </a:p>
+        </p:txBody>
+      </p:sp>
+      <p:sp>
+        <p:nvSpPr>
+          <p:cNvPr id="2" name="テキスト ボックス 1">
+            <a:extLst>
+              <a:ext uri="{FF2B5EF4-FFF2-40B4-BE49-F238E27FC236}">
+                <a16:creationId xmlns:a16="http://schemas.microsoft.com/office/drawing/2014/main" id="{346B3C90-78F0-4665-966F-E68235C5672F}"/>
+              </a:ext>
+            </a:extLst>
+          </p:cNvPr>
+          <p:cNvSpPr txBox="1"/>
+          <p:nvPr/>
+        </p:nvSpPr>
+        <p:spPr>
+          <a:xfrm>
+            <a:off x="2370349" y="2501110"/>
+            <a:ext cx="1596271" cy="461665"/>
+          </a:xfrm>
+          <a:prstGeom prst="rect">
+            <a:avLst/>
+          </a:prstGeom>
+          <a:noFill/>
+        </p:spPr>
+        <p:txBody>
+          <a:bodyPr wrap="none" rtlCol="0">
+            <a:spAutoFit/>
+          </a:bodyPr>
+          <a:lstStyle/>
+          <a:p>
+            <a:pPr algn="ctr"/>
+            <a:r>
+              <a:rPr kumimoji="1" lang="en-US" altLang="ja-JP" sz="2400" dirty="0"/>
+              <a:t>Application</a:t>
+            </a:r>
+            <a:endParaRPr kumimoji="1" lang="ja-JP" altLang="en-US" sz="2400" dirty="0"/>
+          </a:p>
+        </p:txBody>
+      </p:sp>
+      <p:sp>
+        <p:nvSpPr>
+          <p:cNvPr id="26" name="テキスト ボックス 25">
+            <a:extLst>
+              <a:ext uri="{FF2B5EF4-FFF2-40B4-BE49-F238E27FC236}">
+                <a16:creationId xmlns:a16="http://schemas.microsoft.com/office/drawing/2014/main" id="{BB42CE8E-C759-48E4-BEF3-24B0D640A285}"/>
+              </a:ext>
+            </a:extLst>
+          </p:cNvPr>
+          <p:cNvSpPr txBox="1"/>
+          <p:nvPr/>
+        </p:nvSpPr>
+        <p:spPr>
+          <a:xfrm>
+            <a:off x="8366528" y="2501110"/>
+            <a:ext cx="1019959" cy="461665"/>
+          </a:xfrm>
+          <a:prstGeom prst="rect">
+            <a:avLst/>
+          </a:prstGeom>
+          <a:noFill/>
+        </p:spPr>
+        <p:txBody>
+          <a:bodyPr wrap="none" rtlCol="0">
+            <a:spAutoFit/>
+          </a:bodyPr>
+          <a:lstStyle/>
+          <a:p>
+            <a:pPr algn="ctr"/>
+            <a:r>
+              <a:rPr kumimoji="1" lang="en-US" altLang="ja-JP" sz="2400" dirty="0"/>
+              <a:t>Device</a:t>
+            </a:r>
+            <a:endParaRPr kumimoji="1" lang="ja-JP" altLang="en-US" sz="2400" dirty="0"/>
+          </a:p>
+        </p:txBody>
+      </p:sp>
+    </p:spTree>
+    <p:extLst>
+      <p:ext uri="{BB962C8B-B14F-4D97-AF65-F5344CB8AC3E}">
+        <p14:creationId xmlns:p14="http://schemas.microsoft.com/office/powerpoint/2010/main" val="4278680785"/>
+      </p:ext>
+    </p:extLst>
+  </p:cSld>
+  <p:clrMapOvr>
+    <a:masterClrMapping/>
+  </p:clrMapOvr>
+</p:sld>
+</file>
+
+<file path=ppt/slides/slide6.xml><?xml version="1.0" encoding="utf-8"?>
+<p:sld xmlns:a="http://schemas.openxmlformats.org/drawingml/2006/main" xmlns:r="http://schemas.openxmlformats.org/officeDocument/2006/relationships" xmlns:p="http://schemas.openxmlformats.org/presentationml/2006/main">
+  <p:cSld>
+    <p:spTree>
+      <p:nvGrpSpPr>
+        <p:cNvPr id="1" name=""/>
+        <p:cNvGrpSpPr/>
+        <p:nvPr/>
+      </p:nvGrpSpPr>
+      <p:grpSpPr>
+        <a:xfrm>
+          <a:off x="0" y="0"/>
+          <a:ext cx="0" cy="0"/>
+          <a:chOff x="0" y="0"/>
+          <a:chExt cx="0" cy="0"/>
+        </a:xfrm>
+      </p:grpSpPr>
+      <p:sp>
+        <p:nvSpPr>
           <p:cNvPr id="6" name="正方形/長方形 5">
             <a:extLst>
               <a:ext uri="{FF2B5EF4-FFF2-40B4-BE49-F238E27FC236}">
@@ -8544,7 +12258,7 @@
 </p:sld>
 </file>
 
-<file path=ppt/slides/slide6.xml><?xml version="1.0" encoding="utf-8"?>
+<file path=ppt/slides/slide7.xml><?xml version="1.0" encoding="utf-8"?>
 <p:sld xmlns:a="http://schemas.openxmlformats.org/drawingml/2006/main" xmlns:r="http://schemas.openxmlformats.org/officeDocument/2006/relationships" xmlns:p="http://schemas.openxmlformats.org/presentationml/2006/main">
   <p:cSld>
     <p:spTree>
@@ -9634,7 +13348,7 @@
 </p:sld>
 </file>
 
-<file path=ppt/slides/slide7.xml><?xml version="1.0" encoding="utf-8"?>
+<file path=ppt/slides/slide8.xml><?xml version="1.0" encoding="utf-8"?>
 <p:sld xmlns:a="http://schemas.openxmlformats.org/drawingml/2006/main" xmlns:r="http://schemas.openxmlformats.org/officeDocument/2006/relationships" xmlns:p="http://schemas.openxmlformats.org/presentationml/2006/main">
   <p:cSld>
     <p:spTree>
@@ -10705,7 +14419,7 @@
 </p:sld>
 </file>
 
-<file path=ppt/slides/slide8.xml><?xml version="1.0" encoding="utf-8"?>
+<file path=ppt/slides/slide9.xml><?xml version="1.0" encoding="utf-8"?>
 <p:sld xmlns:a="http://schemas.openxmlformats.org/drawingml/2006/main" xmlns:r="http://schemas.openxmlformats.org/officeDocument/2006/relationships" xmlns:p="http://schemas.openxmlformats.org/presentationml/2006/main">
   <p:cSld>
     <p:spTree>

</xml_diff>

<commit_message>
Updated slide 6 and 12 in arch-high-level-alt.pptx
</commit_message>
<xml_diff>
--- a/images/arch-high-level-alt.pptx
+++ b/images/arch-high-level-alt.pptx
@@ -219,7 +219,7 @@
           <a:p>
             <a:fld id="{B1A173A8-DAE6-4CFB-9894-525984AA74FE}" type="datetimeFigureOut">
               <a:rPr kumimoji="1" lang="ja-JP" altLang="en-US" smtClean="0"/>
-              <a:t>2019/4/15</a:t>
+              <a:t>2019/4/16</a:t>
             </a:fld>
             <a:endParaRPr kumimoji="1" lang="ja-JP" altLang="en-US"/>
           </a:p>
@@ -876,7 +876,7 @@
           <p:cNvPr id="2" name="タイトル 1">
             <a:extLst>
               <a:ext uri="{FF2B5EF4-FFF2-40B4-BE49-F238E27FC236}">
-                <a16:creationId xmlns:a16="http://schemas.microsoft.com/office/drawing/2014/main" xmlns="" id="{B0AE5386-06CD-4777-BDE9-99DC894AABF9}"/>
+                <a16:creationId xmlns="" xmlns:a16="http://schemas.microsoft.com/office/drawing/2014/main" id="{B0AE5386-06CD-4777-BDE9-99DC894AABF9}"/>
               </a:ext>
             </a:extLst>
           </p:cNvPr>
@@ -913,7 +913,7 @@
           <p:cNvPr id="3" name="字幕 2">
             <a:extLst>
               <a:ext uri="{FF2B5EF4-FFF2-40B4-BE49-F238E27FC236}">
-                <a16:creationId xmlns:a16="http://schemas.microsoft.com/office/drawing/2014/main" xmlns="" id="{F8B7B7C9-5AA1-45F9-B1E0-8E0BDE7DE7E0}"/>
+                <a16:creationId xmlns="" xmlns:a16="http://schemas.microsoft.com/office/drawing/2014/main" id="{F8B7B7C9-5AA1-45F9-B1E0-8E0BDE7DE7E0}"/>
               </a:ext>
             </a:extLst>
           </p:cNvPr>
@@ -983,7 +983,7 @@
           <p:cNvPr id="4" name="日付プレースホルダー 3">
             <a:extLst>
               <a:ext uri="{FF2B5EF4-FFF2-40B4-BE49-F238E27FC236}">
-                <a16:creationId xmlns:a16="http://schemas.microsoft.com/office/drawing/2014/main" xmlns="" id="{C705EE05-788B-43F6-85C2-14E6012E40AE}"/>
+                <a16:creationId xmlns="" xmlns:a16="http://schemas.microsoft.com/office/drawing/2014/main" id="{C705EE05-788B-43F6-85C2-14E6012E40AE}"/>
               </a:ext>
             </a:extLst>
           </p:cNvPr>
@@ -1001,7 +1001,7 @@
           <a:p>
             <a:fld id="{E759B8C4-E491-4AE8-BFE3-235CF9118C4F}" type="datetimeFigureOut">
               <a:rPr kumimoji="1" lang="ja-JP" altLang="en-US" smtClean="0"/>
-              <a:t>2019/4/15</a:t>
+              <a:t>2019/4/16</a:t>
             </a:fld>
             <a:endParaRPr kumimoji="1" lang="ja-JP" altLang="en-US"/>
           </a:p>
@@ -1012,7 +1012,7 @@
           <p:cNvPr id="5" name="フッター プレースホルダー 4">
             <a:extLst>
               <a:ext uri="{FF2B5EF4-FFF2-40B4-BE49-F238E27FC236}">
-                <a16:creationId xmlns:a16="http://schemas.microsoft.com/office/drawing/2014/main" xmlns="" id="{8DDC18EB-8AC1-45D6-9F58-9172ED7BC8E0}"/>
+                <a16:creationId xmlns="" xmlns:a16="http://schemas.microsoft.com/office/drawing/2014/main" id="{8DDC18EB-8AC1-45D6-9F58-9172ED7BC8E0}"/>
               </a:ext>
             </a:extLst>
           </p:cNvPr>
@@ -1037,7 +1037,7 @@
           <p:cNvPr id="6" name="スライド番号プレースホルダー 5">
             <a:extLst>
               <a:ext uri="{FF2B5EF4-FFF2-40B4-BE49-F238E27FC236}">
-                <a16:creationId xmlns:a16="http://schemas.microsoft.com/office/drawing/2014/main" xmlns="" id="{0DE5D2D8-61BE-441B-9F0D-2464100E8482}"/>
+                <a16:creationId xmlns="" xmlns:a16="http://schemas.microsoft.com/office/drawing/2014/main" id="{0DE5D2D8-61BE-441B-9F0D-2464100E8482}"/>
               </a:ext>
             </a:extLst>
           </p:cNvPr>
@@ -1096,7 +1096,7 @@
           <p:cNvPr id="2" name="タイトル 1">
             <a:extLst>
               <a:ext uri="{FF2B5EF4-FFF2-40B4-BE49-F238E27FC236}">
-                <a16:creationId xmlns:a16="http://schemas.microsoft.com/office/drawing/2014/main" xmlns="" id="{6C32ACCC-B684-492E-9779-7B0496F3984A}"/>
+                <a16:creationId xmlns="" xmlns:a16="http://schemas.microsoft.com/office/drawing/2014/main" id="{6C32ACCC-B684-492E-9779-7B0496F3984A}"/>
               </a:ext>
             </a:extLst>
           </p:cNvPr>
@@ -1124,7 +1124,7 @@
           <p:cNvPr id="3" name="縦書きテキスト プレースホルダー 2">
             <a:extLst>
               <a:ext uri="{FF2B5EF4-FFF2-40B4-BE49-F238E27FC236}">
-                <a16:creationId xmlns:a16="http://schemas.microsoft.com/office/drawing/2014/main" xmlns="" id="{A6F623A2-7372-4828-85F0-BCA3BF2DBE09}"/>
+                <a16:creationId xmlns="" xmlns:a16="http://schemas.microsoft.com/office/drawing/2014/main" id="{A6F623A2-7372-4828-85F0-BCA3BF2DBE09}"/>
               </a:ext>
             </a:extLst>
           </p:cNvPr>
@@ -1213,7 +1213,7 @@
           <p:cNvPr id="4" name="日付プレースホルダー 3">
             <a:extLst>
               <a:ext uri="{FF2B5EF4-FFF2-40B4-BE49-F238E27FC236}">
-                <a16:creationId xmlns:a16="http://schemas.microsoft.com/office/drawing/2014/main" xmlns="" id="{70C57D17-4F39-4F39-8B60-0BC59E9051BF}"/>
+                <a16:creationId xmlns="" xmlns:a16="http://schemas.microsoft.com/office/drawing/2014/main" id="{70C57D17-4F39-4F39-8B60-0BC59E9051BF}"/>
               </a:ext>
             </a:extLst>
           </p:cNvPr>
@@ -1231,7 +1231,7 @@
           <a:p>
             <a:fld id="{E759B8C4-E491-4AE8-BFE3-235CF9118C4F}" type="datetimeFigureOut">
               <a:rPr kumimoji="1" lang="ja-JP" altLang="en-US" smtClean="0"/>
-              <a:t>2019/4/15</a:t>
+              <a:t>2019/4/16</a:t>
             </a:fld>
             <a:endParaRPr kumimoji="1" lang="ja-JP" altLang="en-US"/>
           </a:p>
@@ -1242,7 +1242,7 @@
           <p:cNvPr id="5" name="フッター プレースホルダー 4">
             <a:extLst>
               <a:ext uri="{FF2B5EF4-FFF2-40B4-BE49-F238E27FC236}">
-                <a16:creationId xmlns:a16="http://schemas.microsoft.com/office/drawing/2014/main" xmlns="" id="{AA256A96-F080-46AD-9587-BD5C59E42972}"/>
+                <a16:creationId xmlns="" xmlns:a16="http://schemas.microsoft.com/office/drawing/2014/main" id="{AA256A96-F080-46AD-9587-BD5C59E42972}"/>
               </a:ext>
             </a:extLst>
           </p:cNvPr>
@@ -1267,7 +1267,7 @@
           <p:cNvPr id="6" name="スライド番号プレースホルダー 5">
             <a:extLst>
               <a:ext uri="{FF2B5EF4-FFF2-40B4-BE49-F238E27FC236}">
-                <a16:creationId xmlns:a16="http://schemas.microsoft.com/office/drawing/2014/main" xmlns="" id="{B6491D87-5E3C-49C1-886A-673DF285E8FC}"/>
+                <a16:creationId xmlns="" xmlns:a16="http://schemas.microsoft.com/office/drawing/2014/main" id="{B6491D87-5E3C-49C1-886A-673DF285E8FC}"/>
               </a:ext>
             </a:extLst>
           </p:cNvPr>
@@ -1326,7 +1326,7 @@
           <p:cNvPr id="2" name="縦書きタイトル 1">
             <a:extLst>
               <a:ext uri="{FF2B5EF4-FFF2-40B4-BE49-F238E27FC236}">
-                <a16:creationId xmlns:a16="http://schemas.microsoft.com/office/drawing/2014/main" xmlns="" id="{15E7C69B-6211-4D81-9725-4A0CFDADB294}"/>
+                <a16:creationId xmlns="" xmlns:a16="http://schemas.microsoft.com/office/drawing/2014/main" id="{15E7C69B-6211-4D81-9725-4A0CFDADB294}"/>
               </a:ext>
             </a:extLst>
           </p:cNvPr>
@@ -1359,7 +1359,7 @@
           <p:cNvPr id="3" name="縦書きテキスト プレースホルダー 2">
             <a:extLst>
               <a:ext uri="{FF2B5EF4-FFF2-40B4-BE49-F238E27FC236}">
-                <a16:creationId xmlns:a16="http://schemas.microsoft.com/office/drawing/2014/main" xmlns="" id="{77432613-C957-4A6E-9C51-600CB879CFF6}"/>
+                <a16:creationId xmlns="" xmlns:a16="http://schemas.microsoft.com/office/drawing/2014/main" id="{77432613-C957-4A6E-9C51-600CB879CFF6}"/>
               </a:ext>
             </a:extLst>
           </p:cNvPr>
@@ -1453,7 +1453,7 @@
           <p:cNvPr id="4" name="日付プレースホルダー 3">
             <a:extLst>
               <a:ext uri="{FF2B5EF4-FFF2-40B4-BE49-F238E27FC236}">
-                <a16:creationId xmlns:a16="http://schemas.microsoft.com/office/drawing/2014/main" xmlns="" id="{FA1C7298-7049-4289-A0E6-AD5956F4D7F6}"/>
+                <a16:creationId xmlns="" xmlns:a16="http://schemas.microsoft.com/office/drawing/2014/main" id="{FA1C7298-7049-4289-A0E6-AD5956F4D7F6}"/>
               </a:ext>
             </a:extLst>
           </p:cNvPr>
@@ -1471,7 +1471,7 @@
           <a:p>
             <a:fld id="{E759B8C4-E491-4AE8-BFE3-235CF9118C4F}" type="datetimeFigureOut">
               <a:rPr kumimoji="1" lang="ja-JP" altLang="en-US" smtClean="0"/>
-              <a:t>2019/4/15</a:t>
+              <a:t>2019/4/16</a:t>
             </a:fld>
             <a:endParaRPr kumimoji="1" lang="ja-JP" altLang="en-US"/>
           </a:p>
@@ -1482,7 +1482,7 @@
           <p:cNvPr id="5" name="フッター プレースホルダー 4">
             <a:extLst>
               <a:ext uri="{FF2B5EF4-FFF2-40B4-BE49-F238E27FC236}">
-                <a16:creationId xmlns:a16="http://schemas.microsoft.com/office/drawing/2014/main" xmlns="" id="{B9BF1BE9-4CC5-4EEA-9082-E8901AE2C555}"/>
+                <a16:creationId xmlns="" xmlns:a16="http://schemas.microsoft.com/office/drawing/2014/main" id="{B9BF1BE9-4CC5-4EEA-9082-E8901AE2C555}"/>
               </a:ext>
             </a:extLst>
           </p:cNvPr>
@@ -1507,7 +1507,7 @@
           <p:cNvPr id="6" name="スライド番号プレースホルダー 5">
             <a:extLst>
               <a:ext uri="{FF2B5EF4-FFF2-40B4-BE49-F238E27FC236}">
-                <a16:creationId xmlns:a16="http://schemas.microsoft.com/office/drawing/2014/main" xmlns="" id="{10BA49F0-C473-427E-9938-55EA97B6C26F}"/>
+                <a16:creationId xmlns="" xmlns:a16="http://schemas.microsoft.com/office/drawing/2014/main" id="{10BA49F0-C473-427E-9938-55EA97B6C26F}"/>
               </a:ext>
             </a:extLst>
           </p:cNvPr>
@@ -1566,7 +1566,7 @@
           <p:cNvPr id="2" name="タイトル 1">
             <a:extLst>
               <a:ext uri="{FF2B5EF4-FFF2-40B4-BE49-F238E27FC236}">
-                <a16:creationId xmlns:a16="http://schemas.microsoft.com/office/drawing/2014/main" xmlns="" id="{DE533B43-A092-4E42-AB2B-926D3E11CDE5}"/>
+                <a16:creationId xmlns="" xmlns:a16="http://schemas.microsoft.com/office/drawing/2014/main" id="{DE533B43-A092-4E42-AB2B-926D3E11CDE5}"/>
               </a:ext>
             </a:extLst>
           </p:cNvPr>
@@ -1594,7 +1594,7 @@
           <p:cNvPr id="3" name="コンテンツ プレースホルダー 2">
             <a:extLst>
               <a:ext uri="{FF2B5EF4-FFF2-40B4-BE49-F238E27FC236}">
-                <a16:creationId xmlns:a16="http://schemas.microsoft.com/office/drawing/2014/main" xmlns="" id="{968D7F2D-BA6E-47A2-AB91-FC04D5D62EFD}"/>
+                <a16:creationId xmlns="" xmlns:a16="http://schemas.microsoft.com/office/drawing/2014/main" id="{968D7F2D-BA6E-47A2-AB91-FC04D5D62EFD}"/>
               </a:ext>
             </a:extLst>
           </p:cNvPr>
@@ -1683,7 +1683,7 @@
           <p:cNvPr id="4" name="日付プレースホルダー 3">
             <a:extLst>
               <a:ext uri="{FF2B5EF4-FFF2-40B4-BE49-F238E27FC236}">
-                <a16:creationId xmlns:a16="http://schemas.microsoft.com/office/drawing/2014/main" xmlns="" id="{4C733C2B-46FD-4E62-9125-713B60005029}"/>
+                <a16:creationId xmlns="" xmlns:a16="http://schemas.microsoft.com/office/drawing/2014/main" id="{4C733C2B-46FD-4E62-9125-713B60005029}"/>
               </a:ext>
             </a:extLst>
           </p:cNvPr>
@@ -1701,7 +1701,7 @@
           <a:p>
             <a:fld id="{E759B8C4-E491-4AE8-BFE3-235CF9118C4F}" type="datetimeFigureOut">
               <a:rPr kumimoji="1" lang="ja-JP" altLang="en-US" smtClean="0"/>
-              <a:t>2019/4/15</a:t>
+              <a:t>2019/4/16</a:t>
             </a:fld>
             <a:endParaRPr kumimoji="1" lang="ja-JP" altLang="en-US"/>
           </a:p>
@@ -1712,7 +1712,7 @@
           <p:cNvPr id="5" name="フッター プレースホルダー 4">
             <a:extLst>
               <a:ext uri="{FF2B5EF4-FFF2-40B4-BE49-F238E27FC236}">
-                <a16:creationId xmlns:a16="http://schemas.microsoft.com/office/drawing/2014/main" xmlns="" id="{7C416CDC-D466-4479-A626-8632AADB50DE}"/>
+                <a16:creationId xmlns="" xmlns:a16="http://schemas.microsoft.com/office/drawing/2014/main" id="{7C416CDC-D466-4479-A626-8632AADB50DE}"/>
               </a:ext>
             </a:extLst>
           </p:cNvPr>
@@ -1737,7 +1737,7 @@
           <p:cNvPr id="6" name="スライド番号プレースホルダー 5">
             <a:extLst>
               <a:ext uri="{FF2B5EF4-FFF2-40B4-BE49-F238E27FC236}">
-                <a16:creationId xmlns:a16="http://schemas.microsoft.com/office/drawing/2014/main" xmlns="" id="{B8B19453-C914-47DC-AD9D-9C999D128398}"/>
+                <a16:creationId xmlns="" xmlns:a16="http://schemas.microsoft.com/office/drawing/2014/main" id="{B8B19453-C914-47DC-AD9D-9C999D128398}"/>
               </a:ext>
             </a:extLst>
           </p:cNvPr>
@@ -1796,7 +1796,7 @@
           <p:cNvPr id="2" name="タイトル 1">
             <a:extLst>
               <a:ext uri="{FF2B5EF4-FFF2-40B4-BE49-F238E27FC236}">
-                <a16:creationId xmlns:a16="http://schemas.microsoft.com/office/drawing/2014/main" xmlns="" id="{5BB318D5-6281-48A5-9FCA-58D130C13B28}"/>
+                <a16:creationId xmlns="" xmlns:a16="http://schemas.microsoft.com/office/drawing/2014/main" id="{5BB318D5-6281-48A5-9FCA-58D130C13B28}"/>
               </a:ext>
             </a:extLst>
           </p:cNvPr>
@@ -1833,7 +1833,7 @@
           <p:cNvPr id="3" name="テキスト プレースホルダー 2">
             <a:extLst>
               <a:ext uri="{FF2B5EF4-FFF2-40B4-BE49-F238E27FC236}">
-                <a16:creationId xmlns:a16="http://schemas.microsoft.com/office/drawing/2014/main" xmlns="" id="{6662277C-6E83-49A2-BD69-3E47EA715724}"/>
+                <a16:creationId xmlns="" xmlns:a16="http://schemas.microsoft.com/office/drawing/2014/main" id="{6662277C-6E83-49A2-BD69-3E47EA715724}"/>
               </a:ext>
             </a:extLst>
           </p:cNvPr>
@@ -1958,7 +1958,7 @@
           <p:cNvPr id="4" name="日付プレースホルダー 3">
             <a:extLst>
               <a:ext uri="{FF2B5EF4-FFF2-40B4-BE49-F238E27FC236}">
-                <a16:creationId xmlns:a16="http://schemas.microsoft.com/office/drawing/2014/main" xmlns="" id="{DF265671-F035-426E-9D0A-B3574DDA1D7F}"/>
+                <a16:creationId xmlns="" xmlns:a16="http://schemas.microsoft.com/office/drawing/2014/main" id="{DF265671-F035-426E-9D0A-B3574DDA1D7F}"/>
               </a:ext>
             </a:extLst>
           </p:cNvPr>
@@ -1976,7 +1976,7 @@
           <a:p>
             <a:fld id="{E759B8C4-E491-4AE8-BFE3-235CF9118C4F}" type="datetimeFigureOut">
               <a:rPr kumimoji="1" lang="ja-JP" altLang="en-US" smtClean="0"/>
-              <a:t>2019/4/15</a:t>
+              <a:t>2019/4/16</a:t>
             </a:fld>
             <a:endParaRPr kumimoji="1" lang="ja-JP" altLang="en-US"/>
           </a:p>
@@ -1987,7 +1987,7 @@
           <p:cNvPr id="5" name="フッター プレースホルダー 4">
             <a:extLst>
               <a:ext uri="{FF2B5EF4-FFF2-40B4-BE49-F238E27FC236}">
-                <a16:creationId xmlns:a16="http://schemas.microsoft.com/office/drawing/2014/main" xmlns="" id="{E02A148E-60FB-497E-B286-4ADCF5885ED6}"/>
+                <a16:creationId xmlns="" xmlns:a16="http://schemas.microsoft.com/office/drawing/2014/main" id="{E02A148E-60FB-497E-B286-4ADCF5885ED6}"/>
               </a:ext>
             </a:extLst>
           </p:cNvPr>
@@ -2012,7 +2012,7 @@
           <p:cNvPr id="6" name="スライド番号プレースホルダー 5">
             <a:extLst>
               <a:ext uri="{FF2B5EF4-FFF2-40B4-BE49-F238E27FC236}">
-                <a16:creationId xmlns:a16="http://schemas.microsoft.com/office/drawing/2014/main" xmlns="" id="{C09298F6-0CA1-49EC-94A1-1A4E6DC1316C}"/>
+                <a16:creationId xmlns="" xmlns:a16="http://schemas.microsoft.com/office/drawing/2014/main" id="{C09298F6-0CA1-49EC-94A1-1A4E6DC1316C}"/>
               </a:ext>
             </a:extLst>
           </p:cNvPr>
@@ -2071,7 +2071,7 @@
           <p:cNvPr id="2" name="タイトル 1">
             <a:extLst>
               <a:ext uri="{FF2B5EF4-FFF2-40B4-BE49-F238E27FC236}">
-                <a16:creationId xmlns:a16="http://schemas.microsoft.com/office/drawing/2014/main" xmlns="" id="{64F7F8D5-3A2A-4CDC-8977-8B8CBE139E53}"/>
+                <a16:creationId xmlns="" xmlns:a16="http://schemas.microsoft.com/office/drawing/2014/main" id="{64F7F8D5-3A2A-4CDC-8977-8B8CBE139E53}"/>
               </a:ext>
             </a:extLst>
           </p:cNvPr>
@@ -2099,7 +2099,7 @@
           <p:cNvPr id="3" name="コンテンツ プレースホルダー 2">
             <a:extLst>
               <a:ext uri="{FF2B5EF4-FFF2-40B4-BE49-F238E27FC236}">
-                <a16:creationId xmlns:a16="http://schemas.microsoft.com/office/drawing/2014/main" xmlns="" id="{2AC12DCD-B7FF-4006-94A6-F0E3A9FFD9CB}"/>
+                <a16:creationId xmlns="" xmlns:a16="http://schemas.microsoft.com/office/drawing/2014/main" id="{2AC12DCD-B7FF-4006-94A6-F0E3A9FFD9CB}"/>
               </a:ext>
             </a:extLst>
           </p:cNvPr>
@@ -2193,7 +2193,7 @@
           <p:cNvPr id="4" name="コンテンツ プレースホルダー 3">
             <a:extLst>
               <a:ext uri="{FF2B5EF4-FFF2-40B4-BE49-F238E27FC236}">
-                <a16:creationId xmlns:a16="http://schemas.microsoft.com/office/drawing/2014/main" xmlns="" id="{94E2FFCB-3665-4C7F-BAAA-2D90B8705817}"/>
+                <a16:creationId xmlns="" xmlns:a16="http://schemas.microsoft.com/office/drawing/2014/main" id="{94E2FFCB-3665-4C7F-BAAA-2D90B8705817}"/>
               </a:ext>
             </a:extLst>
           </p:cNvPr>
@@ -2287,7 +2287,7 @@
           <p:cNvPr id="5" name="日付プレースホルダー 4">
             <a:extLst>
               <a:ext uri="{FF2B5EF4-FFF2-40B4-BE49-F238E27FC236}">
-                <a16:creationId xmlns:a16="http://schemas.microsoft.com/office/drawing/2014/main" xmlns="" id="{85A8EA80-0886-4C47-9420-9865329F3C7D}"/>
+                <a16:creationId xmlns="" xmlns:a16="http://schemas.microsoft.com/office/drawing/2014/main" id="{85A8EA80-0886-4C47-9420-9865329F3C7D}"/>
               </a:ext>
             </a:extLst>
           </p:cNvPr>
@@ -2305,7 +2305,7 @@
           <a:p>
             <a:fld id="{E759B8C4-E491-4AE8-BFE3-235CF9118C4F}" type="datetimeFigureOut">
               <a:rPr kumimoji="1" lang="ja-JP" altLang="en-US" smtClean="0"/>
-              <a:t>2019/4/15</a:t>
+              <a:t>2019/4/16</a:t>
             </a:fld>
             <a:endParaRPr kumimoji="1" lang="ja-JP" altLang="en-US"/>
           </a:p>
@@ -2316,7 +2316,7 @@
           <p:cNvPr id="6" name="フッター プレースホルダー 5">
             <a:extLst>
               <a:ext uri="{FF2B5EF4-FFF2-40B4-BE49-F238E27FC236}">
-                <a16:creationId xmlns:a16="http://schemas.microsoft.com/office/drawing/2014/main" xmlns="" id="{9B456259-5B0C-481F-A285-55075DD06444}"/>
+                <a16:creationId xmlns="" xmlns:a16="http://schemas.microsoft.com/office/drawing/2014/main" id="{9B456259-5B0C-481F-A285-55075DD06444}"/>
               </a:ext>
             </a:extLst>
           </p:cNvPr>
@@ -2341,7 +2341,7 @@
           <p:cNvPr id="7" name="スライド番号プレースホルダー 6">
             <a:extLst>
               <a:ext uri="{FF2B5EF4-FFF2-40B4-BE49-F238E27FC236}">
-                <a16:creationId xmlns:a16="http://schemas.microsoft.com/office/drawing/2014/main" xmlns="" id="{39C83C17-B19B-48FC-A25F-78B16C6A0A4E}"/>
+                <a16:creationId xmlns="" xmlns:a16="http://schemas.microsoft.com/office/drawing/2014/main" id="{39C83C17-B19B-48FC-A25F-78B16C6A0A4E}"/>
               </a:ext>
             </a:extLst>
           </p:cNvPr>
@@ -2400,7 +2400,7 @@
           <p:cNvPr id="2" name="タイトル 1">
             <a:extLst>
               <a:ext uri="{FF2B5EF4-FFF2-40B4-BE49-F238E27FC236}">
-                <a16:creationId xmlns:a16="http://schemas.microsoft.com/office/drawing/2014/main" xmlns="" id="{BFCEE19A-1AF1-4354-8863-38E622D9C475}"/>
+                <a16:creationId xmlns="" xmlns:a16="http://schemas.microsoft.com/office/drawing/2014/main" id="{BFCEE19A-1AF1-4354-8863-38E622D9C475}"/>
               </a:ext>
             </a:extLst>
           </p:cNvPr>
@@ -2433,7 +2433,7 @@
           <p:cNvPr id="3" name="テキスト プレースホルダー 2">
             <a:extLst>
               <a:ext uri="{FF2B5EF4-FFF2-40B4-BE49-F238E27FC236}">
-                <a16:creationId xmlns:a16="http://schemas.microsoft.com/office/drawing/2014/main" xmlns="" id="{90B0566F-F44E-43BD-8971-2805C0DE85CC}"/>
+                <a16:creationId xmlns="" xmlns:a16="http://schemas.microsoft.com/office/drawing/2014/main" id="{90B0566F-F44E-43BD-8971-2805C0DE85CC}"/>
               </a:ext>
             </a:extLst>
           </p:cNvPr>
@@ -2504,7 +2504,7 @@
           <p:cNvPr id="4" name="コンテンツ プレースホルダー 3">
             <a:extLst>
               <a:ext uri="{FF2B5EF4-FFF2-40B4-BE49-F238E27FC236}">
-                <a16:creationId xmlns:a16="http://schemas.microsoft.com/office/drawing/2014/main" xmlns="" id="{FCBFC4B6-C123-47DB-8FA6-F3382722BE4B}"/>
+                <a16:creationId xmlns="" xmlns:a16="http://schemas.microsoft.com/office/drawing/2014/main" id="{FCBFC4B6-C123-47DB-8FA6-F3382722BE4B}"/>
               </a:ext>
             </a:extLst>
           </p:cNvPr>
@@ -2598,7 +2598,7 @@
           <p:cNvPr id="5" name="テキスト プレースホルダー 4">
             <a:extLst>
               <a:ext uri="{FF2B5EF4-FFF2-40B4-BE49-F238E27FC236}">
-                <a16:creationId xmlns:a16="http://schemas.microsoft.com/office/drawing/2014/main" xmlns="" id="{13B8DC78-FCA5-4C7B-BFDF-40DCB89D9DEC}"/>
+                <a16:creationId xmlns="" xmlns:a16="http://schemas.microsoft.com/office/drawing/2014/main" id="{13B8DC78-FCA5-4C7B-BFDF-40DCB89D9DEC}"/>
               </a:ext>
             </a:extLst>
           </p:cNvPr>
@@ -2669,7 +2669,7 @@
           <p:cNvPr id="6" name="コンテンツ プレースホルダー 5">
             <a:extLst>
               <a:ext uri="{FF2B5EF4-FFF2-40B4-BE49-F238E27FC236}">
-                <a16:creationId xmlns:a16="http://schemas.microsoft.com/office/drawing/2014/main" xmlns="" id="{2C066B74-B20F-4280-8776-9A428D1E666A}"/>
+                <a16:creationId xmlns="" xmlns:a16="http://schemas.microsoft.com/office/drawing/2014/main" id="{2C066B74-B20F-4280-8776-9A428D1E666A}"/>
               </a:ext>
             </a:extLst>
           </p:cNvPr>
@@ -2763,7 +2763,7 @@
           <p:cNvPr id="7" name="日付プレースホルダー 6">
             <a:extLst>
               <a:ext uri="{FF2B5EF4-FFF2-40B4-BE49-F238E27FC236}">
-                <a16:creationId xmlns:a16="http://schemas.microsoft.com/office/drawing/2014/main" xmlns="" id="{ABA28F0E-C923-4025-92F8-AB20427398EF}"/>
+                <a16:creationId xmlns="" xmlns:a16="http://schemas.microsoft.com/office/drawing/2014/main" id="{ABA28F0E-C923-4025-92F8-AB20427398EF}"/>
               </a:ext>
             </a:extLst>
           </p:cNvPr>
@@ -2781,7 +2781,7 @@
           <a:p>
             <a:fld id="{E759B8C4-E491-4AE8-BFE3-235CF9118C4F}" type="datetimeFigureOut">
               <a:rPr kumimoji="1" lang="ja-JP" altLang="en-US" smtClean="0"/>
-              <a:t>2019/4/15</a:t>
+              <a:t>2019/4/16</a:t>
             </a:fld>
             <a:endParaRPr kumimoji="1" lang="ja-JP" altLang="en-US"/>
           </a:p>
@@ -2792,7 +2792,7 @@
           <p:cNvPr id="8" name="フッター プレースホルダー 7">
             <a:extLst>
               <a:ext uri="{FF2B5EF4-FFF2-40B4-BE49-F238E27FC236}">
-                <a16:creationId xmlns:a16="http://schemas.microsoft.com/office/drawing/2014/main" xmlns="" id="{AD2CE8D3-DA68-4828-BC2B-3B68F1F7CFCF}"/>
+                <a16:creationId xmlns="" xmlns:a16="http://schemas.microsoft.com/office/drawing/2014/main" id="{AD2CE8D3-DA68-4828-BC2B-3B68F1F7CFCF}"/>
               </a:ext>
             </a:extLst>
           </p:cNvPr>
@@ -2817,7 +2817,7 @@
           <p:cNvPr id="9" name="スライド番号プレースホルダー 8">
             <a:extLst>
               <a:ext uri="{FF2B5EF4-FFF2-40B4-BE49-F238E27FC236}">
-                <a16:creationId xmlns:a16="http://schemas.microsoft.com/office/drawing/2014/main" xmlns="" id="{4C017CDA-E426-4BB6-A769-B19DEDAE19F9}"/>
+                <a16:creationId xmlns="" xmlns:a16="http://schemas.microsoft.com/office/drawing/2014/main" id="{4C017CDA-E426-4BB6-A769-B19DEDAE19F9}"/>
               </a:ext>
             </a:extLst>
           </p:cNvPr>
@@ -2876,7 +2876,7 @@
           <p:cNvPr id="2" name="タイトル 1">
             <a:extLst>
               <a:ext uri="{FF2B5EF4-FFF2-40B4-BE49-F238E27FC236}">
-                <a16:creationId xmlns:a16="http://schemas.microsoft.com/office/drawing/2014/main" xmlns="" id="{49DAC469-9EDE-4A75-AC27-3934A9F488FA}"/>
+                <a16:creationId xmlns="" xmlns:a16="http://schemas.microsoft.com/office/drawing/2014/main" id="{49DAC469-9EDE-4A75-AC27-3934A9F488FA}"/>
               </a:ext>
             </a:extLst>
           </p:cNvPr>
@@ -2904,7 +2904,7 @@
           <p:cNvPr id="3" name="日付プレースホルダー 2">
             <a:extLst>
               <a:ext uri="{FF2B5EF4-FFF2-40B4-BE49-F238E27FC236}">
-                <a16:creationId xmlns:a16="http://schemas.microsoft.com/office/drawing/2014/main" xmlns="" id="{32790FA6-BBFB-4799-B0C1-D6BD801BE872}"/>
+                <a16:creationId xmlns="" xmlns:a16="http://schemas.microsoft.com/office/drawing/2014/main" id="{32790FA6-BBFB-4799-B0C1-D6BD801BE872}"/>
               </a:ext>
             </a:extLst>
           </p:cNvPr>
@@ -2922,7 +2922,7 @@
           <a:p>
             <a:fld id="{E759B8C4-E491-4AE8-BFE3-235CF9118C4F}" type="datetimeFigureOut">
               <a:rPr kumimoji="1" lang="ja-JP" altLang="en-US" smtClean="0"/>
-              <a:t>2019/4/15</a:t>
+              <a:t>2019/4/16</a:t>
             </a:fld>
             <a:endParaRPr kumimoji="1" lang="ja-JP" altLang="en-US"/>
           </a:p>
@@ -2933,7 +2933,7 @@
           <p:cNvPr id="4" name="フッター プレースホルダー 3">
             <a:extLst>
               <a:ext uri="{FF2B5EF4-FFF2-40B4-BE49-F238E27FC236}">
-                <a16:creationId xmlns:a16="http://schemas.microsoft.com/office/drawing/2014/main" xmlns="" id="{4C21B8A1-EC10-4DA2-B539-33DF37CEA611}"/>
+                <a16:creationId xmlns="" xmlns:a16="http://schemas.microsoft.com/office/drawing/2014/main" id="{4C21B8A1-EC10-4DA2-B539-33DF37CEA611}"/>
               </a:ext>
             </a:extLst>
           </p:cNvPr>
@@ -2958,7 +2958,7 @@
           <p:cNvPr id="5" name="スライド番号プレースホルダー 4">
             <a:extLst>
               <a:ext uri="{FF2B5EF4-FFF2-40B4-BE49-F238E27FC236}">
-                <a16:creationId xmlns:a16="http://schemas.microsoft.com/office/drawing/2014/main" xmlns="" id="{EC1CC4AB-C935-4FDD-A6DE-FAA0A0604270}"/>
+                <a16:creationId xmlns="" xmlns:a16="http://schemas.microsoft.com/office/drawing/2014/main" id="{EC1CC4AB-C935-4FDD-A6DE-FAA0A0604270}"/>
               </a:ext>
             </a:extLst>
           </p:cNvPr>
@@ -3017,7 +3017,7 @@
           <p:cNvPr id="2" name="日付プレースホルダー 1">
             <a:extLst>
               <a:ext uri="{FF2B5EF4-FFF2-40B4-BE49-F238E27FC236}">
-                <a16:creationId xmlns:a16="http://schemas.microsoft.com/office/drawing/2014/main" xmlns="" id="{5570E765-C758-4B17-87DB-DDAD81C2B3CC}"/>
+                <a16:creationId xmlns="" xmlns:a16="http://schemas.microsoft.com/office/drawing/2014/main" id="{5570E765-C758-4B17-87DB-DDAD81C2B3CC}"/>
               </a:ext>
             </a:extLst>
           </p:cNvPr>
@@ -3035,7 +3035,7 @@
           <a:p>
             <a:fld id="{E759B8C4-E491-4AE8-BFE3-235CF9118C4F}" type="datetimeFigureOut">
               <a:rPr kumimoji="1" lang="ja-JP" altLang="en-US" smtClean="0"/>
-              <a:t>2019/4/15</a:t>
+              <a:t>2019/4/16</a:t>
             </a:fld>
             <a:endParaRPr kumimoji="1" lang="ja-JP" altLang="en-US"/>
           </a:p>
@@ -3046,7 +3046,7 @@
           <p:cNvPr id="3" name="フッター プレースホルダー 2">
             <a:extLst>
               <a:ext uri="{FF2B5EF4-FFF2-40B4-BE49-F238E27FC236}">
-                <a16:creationId xmlns:a16="http://schemas.microsoft.com/office/drawing/2014/main" xmlns="" id="{50900372-29BA-412B-A43C-36B319A9492D}"/>
+                <a16:creationId xmlns="" xmlns:a16="http://schemas.microsoft.com/office/drawing/2014/main" id="{50900372-29BA-412B-A43C-36B319A9492D}"/>
               </a:ext>
             </a:extLst>
           </p:cNvPr>
@@ -3071,7 +3071,7 @@
           <p:cNvPr id="4" name="スライド番号プレースホルダー 3">
             <a:extLst>
               <a:ext uri="{FF2B5EF4-FFF2-40B4-BE49-F238E27FC236}">
-                <a16:creationId xmlns:a16="http://schemas.microsoft.com/office/drawing/2014/main" xmlns="" id="{9C0FDDD0-73BB-4505-A635-6AD63243B199}"/>
+                <a16:creationId xmlns="" xmlns:a16="http://schemas.microsoft.com/office/drawing/2014/main" id="{9C0FDDD0-73BB-4505-A635-6AD63243B199}"/>
               </a:ext>
             </a:extLst>
           </p:cNvPr>
@@ -3130,7 +3130,7 @@
           <p:cNvPr id="2" name="タイトル 1">
             <a:extLst>
               <a:ext uri="{FF2B5EF4-FFF2-40B4-BE49-F238E27FC236}">
-                <a16:creationId xmlns:a16="http://schemas.microsoft.com/office/drawing/2014/main" xmlns="" id="{351C370B-9CA2-41A1-B66D-E063BA5F849E}"/>
+                <a16:creationId xmlns="" xmlns:a16="http://schemas.microsoft.com/office/drawing/2014/main" id="{351C370B-9CA2-41A1-B66D-E063BA5F849E}"/>
               </a:ext>
             </a:extLst>
           </p:cNvPr>
@@ -3167,7 +3167,7 @@
           <p:cNvPr id="3" name="コンテンツ プレースホルダー 2">
             <a:extLst>
               <a:ext uri="{FF2B5EF4-FFF2-40B4-BE49-F238E27FC236}">
-                <a16:creationId xmlns:a16="http://schemas.microsoft.com/office/drawing/2014/main" xmlns="" id="{B30C4421-E9A3-4729-A5C6-1EDF18A0F888}"/>
+                <a16:creationId xmlns="" xmlns:a16="http://schemas.microsoft.com/office/drawing/2014/main" id="{B30C4421-E9A3-4729-A5C6-1EDF18A0F888}"/>
               </a:ext>
             </a:extLst>
           </p:cNvPr>
@@ -3289,7 +3289,7 @@
           <p:cNvPr id="4" name="テキスト プレースホルダー 3">
             <a:extLst>
               <a:ext uri="{FF2B5EF4-FFF2-40B4-BE49-F238E27FC236}">
-                <a16:creationId xmlns:a16="http://schemas.microsoft.com/office/drawing/2014/main" xmlns="" id="{16CE3F4C-5E20-4870-837C-F58153301418}"/>
+                <a16:creationId xmlns="" xmlns:a16="http://schemas.microsoft.com/office/drawing/2014/main" id="{16CE3F4C-5E20-4870-837C-F58153301418}"/>
               </a:ext>
             </a:extLst>
           </p:cNvPr>
@@ -3360,7 +3360,7 @@
           <p:cNvPr id="5" name="日付プレースホルダー 4">
             <a:extLst>
               <a:ext uri="{FF2B5EF4-FFF2-40B4-BE49-F238E27FC236}">
-                <a16:creationId xmlns:a16="http://schemas.microsoft.com/office/drawing/2014/main" xmlns="" id="{0CAA11B5-50ED-43F1-8986-1192B2933928}"/>
+                <a16:creationId xmlns="" xmlns:a16="http://schemas.microsoft.com/office/drawing/2014/main" id="{0CAA11B5-50ED-43F1-8986-1192B2933928}"/>
               </a:ext>
             </a:extLst>
           </p:cNvPr>
@@ -3378,7 +3378,7 @@
           <a:p>
             <a:fld id="{E759B8C4-E491-4AE8-BFE3-235CF9118C4F}" type="datetimeFigureOut">
               <a:rPr kumimoji="1" lang="ja-JP" altLang="en-US" smtClean="0"/>
-              <a:t>2019/4/15</a:t>
+              <a:t>2019/4/16</a:t>
             </a:fld>
             <a:endParaRPr kumimoji="1" lang="ja-JP" altLang="en-US"/>
           </a:p>
@@ -3389,7 +3389,7 @@
           <p:cNvPr id="6" name="フッター プレースホルダー 5">
             <a:extLst>
               <a:ext uri="{FF2B5EF4-FFF2-40B4-BE49-F238E27FC236}">
-                <a16:creationId xmlns:a16="http://schemas.microsoft.com/office/drawing/2014/main" xmlns="" id="{7294E836-CBA9-4635-B585-4FD0420B4A8E}"/>
+                <a16:creationId xmlns="" xmlns:a16="http://schemas.microsoft.com/office/drawing/2014/main" id="{7294E836-CBA9-4635-B585-4FD0420B4A8E}"/>
               </a:ext>
             </a:extLst>
           </p:cNvPr>
@@ -3414,7 +3414,7 @@
           <p:cNvPr id="7" name="スライド番号プレースホルダー 6">
             <a:extLst>
               <a:ext uri="{FF2B5EF4-FFF2-40B4-BE49-F238E27FC236}">
-                <a16:creationId xmlns:a16="http://schemas.microsoft.com/office/drawing/2014/main" xmlns="" id="{4B3422D1-B979-4DDA-A019-974FE3BD0A88}"/>
+                <a16:creationId xmlns="" xmlns:a16="http://schemas.microsoft.com/office/drawing/2014/main" id="{4B3422D1-B979-4DDA-A019-974FE3BD0A88}"/>
               </a:ext>
             </a:extLst>
           </p:cNvPr>
@@ -3473,7 +3473,7 @@
           <p:cNvPr id="2" name="タイトル 1">
             <a:extLst>
               <a:ext uri="{FF2B5EF4-FFF2-40B4-BE49-F238E27FC236}">
-                <a16:creationId xmlns:a16="http://schemas.microsoft.com/office/drawing/2014/main" xmlns="" id="{D0D0EF93-AF35-419B-9E97-8104D2A81AE2}"/>
+                <a16:creationId xmlns="" xmlns:a16="http://schemas.microsoft.com/office/drawing/2014/main" id="{D0D0EF93-AF35-419B-9E97-8104D2A81AE2}"/>
               </a:ext>
             </a:extLst>
           </p:cNvPr>
@@ -3510,7 +3510,7 @@
           <p:cNvPr id="3" name="図プレースホルダー 2">
             <a:extLst>
               <a:ext uri="{FF2B5EF4-FFF2-40B4-BE49-F238E27FC236}">
-                <a16:creationId xmlns:a16="http://schemas.microsoft.com/office/drawing/2014/main" xmlns="" id="{CDD3F852-E036-410C-A5C2-8E9AD80A8FAE}"/>
+                <a16:creationId xmlns="" xmlns:a16="http://schemas.microsoft.com/office/drawing/2014/main" id="{CDD3F852-E036-410C-A5C2-8E9AD80A8FAE}"/>
               </a:ext>
             </a:extLst>
           </p:cNvPr>
@@ -3577,7 +3577,7 @@
           <p:cNvPr id="4" name="テキスト プレースホルダー 3">
             <a:extLst>
               <a:ext uri="{FF2B5EF4-FFF2-40B4-BE49-F238E27FC236}">
-                <a16:creationId xmlns:a16="http://schemas.microsoft.com/office/drawing/2014/main" xmlns="" id="{05D22DB9-4089-4E4A-ABFE-0A953078D7D5}"/>
+                <a16:creationId xmlns="" xmlns:a16="http://schemas.microsoft.com/office/drawing/2014/main" id="{05D22DB9-4089-4E4A-ABFE-0A953078D7D5}"/>
               </a:ext>
             </a:extLst>
           </p:cNvPr>
@@ -3648,7 +3648,7 @@
           <p:cNvPr id="5" name="日付プレースホルダー 4">
             <a:extLst>
               <a:ext uri="{FF2B5EF4-FFF2-40B4-BE49-F238E27FC236}">
-                <a16:creationId xmlns:a16="http://schemas.microsoft.com/office/drawing/2014/main" xmlns="" id="{BD9ED09D-D0B9-4630-BE96-6643D6772664}"/>
+                <a16:creationId xmlns="" xmlns:a16="http://schemas.microsoft.com/office/drawing/2014/main" id="{BD9ED09D-D0B9-4630-BE96-6643D6772664}"/>
               </a:ext>
             </a:extLst>
           </p:cNvPr>
@@ -3666,7 +3666,7 @@
           <a:p>
             <a:fld id="{E759B8C4-E491-4AE8-BFE3-235CF9118C4F}" type="datetimeFigureOut">
               <a:rPr kumimoji="1" lang="ja-JP" altLang="en-US" smtClean="0"/>
-              <a:t>2019/4/15</a:t>
+              <a:t>2019/4/16</a:t>
             </a:fld>
             <a:endParaRPr kumimoji="1" lang="ja-JP" altLang="en-US"/>
           </a:p>
@@ -3677,7 +3677,7 @@
           <p:cNvPr id="6" name="フッター プレースホルダー 5">
             <a:extLst>
               <a:ext uri="{FF2B5EF4-FFF2-40B4-BE49-F238E27FC236}">
-                <a16:creationId xmlns:a16="http://schemas.microsoft.com/office/drawing/2014/main" xmlns="" id="{45BEC95D-6C5E-4F2F-8629-97F28A00E4DD}"/>
+                <a16:creationId xmlns="" xmlns:a16="http://schemas.microsoft.com/office/drawing/2014/main" id="{45BEC95D-6C5E-4F2F-8629-97F28A00E4DD}"/>
               </a:ext>
             </a:extLst>
           </p:cNvPr>
@@ -3702,7 +3702,7 @@
           <p:cNvPr id="7" name="スライド番号プレースホルダー 6">
             <a:extLst>
               <a:ext uri="{FF2B5EF4-FFF2-40B4-BE49-F238E27FC236}">
-                <a16:creationId xmlns:a16="http://schemas.microsoft.com/office/drawing/2014/main" xmlns="" id="{EA57916D-5134-40CF-8198-69D4215B9759}"/>
+                <a16:creationId xmlns="" xmlns:a16="http://schemas.microsoft.com/office/drawing/2014/main" id="{EA57916D-5134-40CF-8198-69D4215B9759}"/>
               </a:ext>
             </a:extLst>
           </p:cNvPr>
@@ -3766,7 +3766,7 @@
           <p:cNvPr id="2" name="タイトル プレースホルダー 1">
             <a:extLst>
               <a:ext uri="{FF2B5EF4-FFF2-40B4-BE49-F238E27FC236}">
-                <a16:creationId xmlns:a16="http://schemas.microsoft.com/office/drawing/2014/main" xmlns="" id="{50A4AF0E-23D8-434D-973F-9AB268F8A559}"/>
+                <a16:creationId xmlns="" xmlns:a16="http://schemas.microsoft.com/office/drawing/2014/main" id="{50A4AF0E-23D8-434D-973F-9AB268F8A559}"/>
               </a:ext>
             </a:extLst>
           </p:cNvPr>
@@ -3804,7 +3804,7 @@
           <p:cNvPr id="3" name="テキスト プレースホルダー 2">
             <a:extLst>
               <a:ext uri="{FF2B5EF4-FFF2-40B4-BE49-F238E27FC236}">
-                <a16:creationId xmlns:a16="http://schemas.microsoft.com/office/drawing/2014/main" xmlns="" id="{6DC993BC-C589-4FFA-A289-55F82F599253}"/>
+                <a16:creationId xmlns="" xmlns:a16="http://schemas.microsoft.com/office/drawing/2014/main" id="{6DC993BC-C589-4FFA-A289-55F82F599253}"/>
               </a:ext>
             </a:extLst>
           </p:cNvPr>
@@ -3903,7 +3903,7 @@
           <p:cNvPr id="4" name="日付プレースホルダー 3">
             <a:extLst>
               <a:ext uri="{FF2B5EF4-FFF2-40B4-BE49-F238E27FC236}">
-                <a16:creationId xmlns:a16="http://schemas.microsoft.com/office/drawing/2014/main" xmlns="" id="{4CAEEEF7-F2CE-4E79-9E4E-4D90C24E1635}"/>
+                <a16:creationId xmlns="" xmlns:a16="http://schemas.microsoft.com/office/drawing/2014/main" id="{4CAEEEF7-F2CE-4E79-9E4E-4D90C24E1635}"/>
               </a:ext>
             </a:extLst>
           </p:cNvPr>
@@ -3939,7 +3939,7 @@
           <a:p>
             <a:fld id="{E759B8C4-E491-4AE8-BFE3-235CF9118C4F}" type="datetimeFigureOut">
               <a:rPr kumimoji="1" lang="ja-JP" altLang="en-US" smtClean="0"/>
-              <a:t>2019/4/15</a:t>
+              <a:t>2019/4/16</a:t>
             </a:fld>
             <a:endParaRPr kumimoji="1" lang="ja-JP" altLang="en-US"/>
           </a:p>
@@ -3950,7 +3950,7 @@
           <p:cNvPr id="5" name="フッター プレースホルダー 4">
             <a:extLst>
               <a:ext uri="{FF2B5EF4-FFF2-40B4-BE49-F238E27FC236}">
-                <a16:creationId xmlns:a16="http://schemas.microsoft.com/office/drawing/2014/main" xmlns="" id="{84FEEC23-00CA-4F1C-B31E-15207C084FC9}"/>
+                <a16:creationId xmlns="" xmlns:a16="http://schemas.microsoft.com/office/drawing/2014/main" id="{84FEEC23-00CA-4F1C-B31E-15207C084FC9}"/>
               </a:ext>
             </a:extLst>
           </p:cNvPr>
@@ -3993,7 +3993,7 @@
           <p:cNvPr id="6" name="スライド番号プレースホルダー 5">
             <a:extLst>
               <a:ext uri="{FF2B5EF4-FFF2-40B4-BE49-F238E27FC236}">
-                <a16:creationId xmlns:a16="http://schemas.microsoft.com/office/drawing/2014/main" xmlns="" id="{3B611013-F140-4044-B55B-00FCEB75687D}"/>
+                <a16:creationId xmlns="" xmlns:a16="http://schemas.microsoft.com/office/drawing/2014/main" id="{3B611013-F140-4044-B55B-00FCEB75687D}"/>
               </a:ext>
             </a:extLst>
           </p:cNvPr>
@@ -4361,7 +4361,7 @@
           <p:cNvPr id="6" name="正方形/長方形 5">
             <a:extLst>
               <a:ext uri="{FF2B5EF4-FFF2-40B4-BE49-F238E27FC236}">
-                <a16:creationId xmlns:a16="http://schemas.microsoft.com/office/drawing/2014/main" xmlns="" id="{E1883DBD-7E83-4F3C-8FC8-563AEB36A257}"/>
+                <a16:creationId xmlns="" xmlns:a16="http://schemas.microsoft.com/office/drawing/2014/main" id="{E1883DBD-7E83-4F3C-8FC8-563AEB36A257}"/>
               </a:ext>
             </a:extLst>
           </p:cNvPr>
@@ -4416,7 +4416,7 @@
           <p:cNvPr id="7" name="正方形/長方形 6">
             <a:extLst>
               <a:ext uri="{FF2B5EF4-FFF2-40B4-BE49-F238E27FC236}">
-                <a16:creationId xmlns:a16="http://schemas.microsoft.com/office/drawing/2014/main" xmlns="" id="{2D0890EB-64A0-42D9-B745-E7F92B9530F1}"/>
+                <a16:creationId xmlns="" xmlns:a16="http://schemas.microsoft.com/office/drawing/2014/main" id="{2D0890EB-64A0-42D9-B745-E7F92B9530F1}"/>
               </a:ext>
             </a:extLst>
           </p:cNvPr>
@@ -4464,7 +4464,7 @@
           <p:cNvPr id="8" name="正方形/長方形 7">
             <a:extLst>
               <a:ext uri="{FF2B5EF4-FFF2-40B4-BE49-F238E27FC236}">
-                <a16:creationId xmlns:a16="http://schemas.microsoft.com/office/drawing/2014/main" xmlns="" id="{A4B36517-6546-4324-B602-66920A143647}"/>
+                <a16:creationId xmlns="" xmlns:a16="http://schemas.microsoft.com/office/drawing/2014/main" id="{A4B36517-6546-4324-B602-66920A143647}"/>
               </a:ext>
             </a:extLst>
           </p:cNvPr>
@@ -4519,7 +4519,7 @@
           <p:cNvPr id="9" name="正方形/長方形 8">
             <a:extLst>
               <a:ext uri="{FF2B5EF4-FFF2-40B4-BE49-F238E27FC236}">
-                <a16:creationId xmlns:a16="http://schemas.microsoft.com/office/drawing/2014/main" xmlns="" id="{478343BE-306E-4657-841B-17ACD2762DA9}"/>
+                <a16:creationId xmlns="" xmlns:a16="http://schemas.microsoft.com/office/drawing/2014/main" id="{478343BE-306E-4657-841B-17ACD2762DA9}"/>
               </a:ext>
             </a:extLst>
           </p:cNvPr>
@@ -4567,7 +4567,7 @@
           <p:cNvPr id="10" name="正方形/長方形 9">
             <a:extLst>
               <a:ext uri="{FF2B5EF4-FFF2-40B4-BE49-F238E27FC236}">
-                <a16:creationId xmlns:a16="http://schemas.microsoft.com/office/drawing/2014/main" xmlns="" id="{7F7394D1-AB71-4F83-88CF-0D70AEA90BB3}"/>
+                <a16:creationId xmlns="" xmlns:a16="http://schemas.microsoft.com/office/drawing/2014/main" id="{7F7394D1-AB71-4F83-88CF-0D70AEA90BB3}"/>
               </a:ext>
             </a:extLst>
           </p:cNvPr>
@@ -4615,7 +4615,7 @@
           <p:cNvPr id="12" name="直線矢印コネクタ 11">
             <a:extLst>
               <a:ext uri="{FF2B5EF4-FFF2-40B4-BE49-F238E27FC236}">
-                <a16:creationId xmlns:a16="http://schemas.microsoft.com/office/drawing/2014/main" xmlns="" id="{6ECEBF56-DD7D-4150-AFC2-4CC9B5A510E0}"/>
+                <a16:creationId xmlns="" xmlns:a16="http://schemas.microsoft.com/office/drawing/2014/main" id="{6ECEBF56-DD7D-4150-AFC2-4CC9B5A510E0}"/>
               </a:ext>
             </a:extLst>
           </p:cNvPr>
@@ -4661,7 +4661,7 @@
           <p:cNvPr id="13" name="正方形/長方形 12">
             <a:extLst>
               <a:ext uri="{FF2B5EF4-FFF2-40B4-BE49-F238E27FC236}">
-                <a16:creationId xmlns:a16="http://schemas.microsoft.com/office/drawing/2014/main" xmlns="" id="{B5CD2B9F-227C-466A-9DC6-760504E532C1}"/>
+                <a16:creationId xmlns="" xmlns:a16="http://schemas.microsoft.com/office/drawing/2014/main" id="{B5CD2B9F-227C-466A-9DC6-760504E532C1}"/>
               </a:ext>
             </a:extLst>
           </p:cNvPr>
@@ -4709,7 +4709,7 @@
           <p:cNvPr id="14" name="正方形/長方形 13">
             <a:extLst>
               <a:ext uri="{FF2B5EF4-FFF2-40B4-BE49-F238E27FC236}">
-                <a16:creationId xmlns:a16="http://schemas.microsoft.com/office/drawing/2014/main" xmlns="" id="{DAC9719D-BC55-4BAA-827B-3741647E133B}"/>
+                <a16:creationId xmlns="" xmlns:a16="http://schemas.microsoft.com/office/drawing/2014/main" id="{DAC9719D-BC55-4BAA-827B-3741647E133B}"/>
               </a:ext>
             </a:extLst>
           </p:cNvPr>
@@ -4757,7 +4757,7 @@
           <p:cNvPr id="15" name="正方形/長方形 14">
             <a:extLst>
               <a:ext uri="{FF2B5EF4-FFF2-40B4-BE49-F238E27FC236}">
-                <a16:creationId xmlns:a16="http://schemas.microsoft.com/office/drawing/2014/main" xmlns="" id="{B13C0EAD-EA26-4ADA-AFD3-C60E5A7E354F}"/>
+                <a16:creationId xmlns="" xmlns:a16="http://schemas.microsoft.com/office/drawing/2014/main" id="{B13C0EAD-EA26-4ADA-AFD3-C60E5A7E354F}"/>
               </a:ext>
             </a:extLst>
           </p:cNvPr>
@@ -4805,7 +4805,7 @@
           <p:cNvPr id="16" name="テキスト ボックス 15">
             <a:extLst>
               <a:ext uri="{FF2B5EF4-FFF2-40B4-BE49-F238E27FC236}">
-                <a16:creationId xmlns:a16="http://schemas.microsoft.com/office/drawing/2014/main" xmlns="" id="{DF7894EE-1174-4828-B7DF-51B52BE5F642}"/>
+                <a16:creationId xmlns="" xmlns:a16="http://schemas.microsoft.com/office/drawing/2014/main" id="{DF7894EE-1174-4828-B7DF-51B52BE5F642}"/>
               </a:ext>
             </a:extLst>
           </p:cNvPr>
@@ -4841,7 +4841,7 @@
           <p:cNvPr id="17" name="テキスト ボックス 16">
             <a:extLst>
               <a:ext uri="{FF2B5EF4-FFF2-40B4-BE49-F238E27FC236}">
-                <a16:creationId xmlns:a16="http://schemas.microsoft.com/office/drawing/2014/main" xmlns="" id="{0CF33ABF-3C66-435D-B875-AA53D751472E}"/>
+                <a16:creationId xmlns="" xmlns:a16="http://schemas.microsoft.com/office/drawing/2014/main" id="{0CF33ABF-3C66-435D-B875-AA53D751472E}"/>
               </a:ext>
             </a:extLst>
           </p:cNvPr>
@@ -4877,7 +4877,7 @@
           <p:cNvPr id="18" name="テキスト ボックス 17">
             <a:extLst>
               <a:ext uri="{FF2B5EF4-FFF2-40B4-BE49-F238E27FC236}">
-                <a16:creationId xmlns:a16="http://schemas.microsoft.com/office/drawing/2014/main" xmlns="" id="{F4CC1D14-7AA6-41AD-85BC-5B3BD9AC308C}"/>
+                <a16:creationId xmlns="" xmlns:a16="http://schemas.microsoft.com/office/drawing/2014/main" id="{F4CC1D14-7AA6-41AD-85BC-5B3BD9AC308C}"/>
               </a:ext>
             </a:extLst>
           </p:cNvPr>
@@ -4913,7 +4913,7 @@
           <p:cNvPr id="20" name="直線矢印コネクタ 19">
             <a:extLst>
               <a:ext uri="{FF2B5EF4-FFF2-40B4-BE49-F238E27FC236}">
-                <a16:creationId xmlns:a16="http://schemas.microsoft.com/office/drawing/2014/main" xmlns="" id="{9E56DD88-5F22-4648-9215-023E80EB63DB}"/>
+                <a16:creationId xmlns="" xmlns:a16="http://schemas.microsoft.com/office/drawing/2014/main" id="{9E56DD88-5F22-4648-9215-023E80EB63DB}"/>
               </a:ext>
             </a:extLst>
           </p:cNvPr>
@@ -4958,7 +4958,7 @@
           <p:cNvPr id="21" name="直線矢印コネクタ 20">
             <a:extLst>
               <a:ext uri="{FF2B5EF4-FFF2-40B4-BE49-F238E27FC236}">
-                <a16:creationId xmlns:a16="http://schemas.microsoft.com/office/drawing/2014/main" xmlns="" id="{36428CDD-CC0D-4876-9F07-F4A6D227D45A}"/>
+                <a16:creationId xmlns="" xmlns:a16="http://schemas.microsoft.com/office/drawing/2014/main" id="{36428CDD-CC0D-4876-9F07-F4A6D227D45A}"/>
               </a:ext>
             </a:extLst>
           </p:cNvPr>
@@ -5034,7 +5034,7 @@
           <p:cNvPr id="24" name="正方形/長方形 23">
             <a:extLst>
               <a:ext uri="{FF2B5EF4-FFF2-40B4-BE49-F238E27FC236}">
-                <a16:creationId xmlns:a16="http://schemas.microsoft.com/office/drawing/2014/main" xmlns="" id="{7F22FDF9-CD34-44FC-A142-278E1B05C7F2}"/>
+                <a16:creationId xmlns="" xmlns:a16="http://schemas.microsoft.com/office/drawing/2014/main" id="{7F22FDF9-CD34-44FC-A142-278E1B05C7F2}"/>
               </a:ext>
             </a:extLst>
           </p:cNvPr>
@@ -5086,7 +5086,7 @@
           <p:cNvPr id="6" name="四角形: 角を丸くする 5">
             <a:extLst>
               <a:ext uri="{FF2B5EF4-FFF2-40B4-BE49-F238E27FC236}">
-                <a16:creationId xmlns:a16="http://schemas.microsoft.com/office/drawing/2014/main" xmlns="" id="{E1883DBD-7E83-4F3C-8FC8-563AEB36A257}"/>
+                <a16:creationId xmlns="" xmlns:a16="http://schemas.microsoft.com/office/drawing/2014/main" id="{E1883DBD-7E83-4F3C-8FC8-563AEB36A257}"/>
               </a:ext>
             </a:extLst>
           </p:cNvPr>
@@ -5150,7 +5150,7 @@
           <p:cNvPr id="8" name="四角形: 角を丸くする 7">
             <a:extLst>
               <a:ext uri="{FF2B5EF4-FFF2-40B4-BE49-F238E27FC236}">
-                <a16:creationId xmlns:a16="http://schemas.microsoft.com/office/drawing/2014/main" xmlns="" id="{A4B36517-6546-4324-B602-66920A143647}"/>
+                <a16:creationId xmlns="" xmlns:a16="http://schemas.microsoft.com/office/drawing/2014/main" id="{A4B36517-6546-4324-B602-66920A143647}"/>
               </a:ext>
             </a:extLst>
           </p:cNvPr>
@@ -5214,7 +5214,7 @@
           <p:cNvPr id="9" name="四角形: 角を丸くする 8">
             <a:extLst>
               <a:ext uri="{FF2B5EF4-FFF2-40B4-BE49-F238E27FC236}">
-                <a16:creationId xmlns:a16="http://schemas.microsoft.com/office/drawing/2014/main" xmlns="" id="{478343BE-306E-4657-841B-17ACD2762DA9}"/>
+                <a16:creationId xmlns="" xmlns:a16="http://schemas.microsoft.com/office/drawing/2014/main" id="{478343BE-306E-4657-841B-17ACD2762DA9}"/>
               </a:ext>
             </a:extLst>
           </p:cNvPr>
@@ -5268,7 +5268,7 @@
           <p:cNvPr id="10" name="四角形: 角を丸くする 9">
             <a:extLst>
               <a:ext uri="{FF2B5EF4-FFF2-40B4-BE49-F238E27FC236}">
-                <a16:creationId xmlns:a16="http://schemas.microsoft.com/office/drawing/2014/main" xmlns="" id="{7F7394D1-AB71-4F83-88CF-0D70AEA90BB3}"/>
+                <a16:creationId xmlns="" xmlns:a16="http://schemas.microsoft.com/office/drawing/2014/main" id="{7F7394D1-AB71-4F83-88CF-0D70AEA90BB3}"/>
               </a:ext>
             </a:extLst>
           </p:cNvPr>
@@ -5337,7 +5337,7 @@
           <p:cNvPr id="13" name="四角形: 角を丸くする 12">
             <a:extLst>
               <a:ext uri="{FF2B5EF4-FFF2-40B4-BE49-F238E27FC236}">
-                <a16:creationId xmlns:a16="http://schemas.microsoft.com/office/drawing/2014/main" xmlns="" id="{B5CD2B9F-227C-466A-9DC6-760504E532C1}"/>
+                <a16:creationId xmlns="" xmlns:a16="http://schemas.microsoft.com/office/drawing/2014/main" id="{B5CD2B9F-227C-466A-9DC6-760504E532C1}"/>
               </a:ext>
             </a:extLst>
           </p:cNvPr>
@@ -5391,7 +5391,7 @@
           <p:cNvPr id="14" name="四角形: 角を丸くする 13">
             <a:extLst>
               <a:ext uri="{FF2B5EF4-FFF2-40B4-BE49-F238E27FC236}">
-                <a16:creationId xmlns:a16="http://schemas.microsoft.com/office/drawing/2014/main" xmlns="" id="{DAC9719D-BC55-4BAA-827B-3741647E133B}"/>
+                <a16:creationId xmlns="" xmlns:a16="http://schemas.microsoft.com/office/drawing/2014/main" id="{DAC9719D-BC55-4BAA-827B-3741647E133B}"/>
               </a:ext>
             </a:extLst>
           </p:cNvPr>
@@ -5445,7 +5445,7 @@
           <p:cNvPr id="15" name="四角形: メモ 14">
             <a:extLst>
               <a:ext uri="{FF2B5EF4-FFF2-40B4-BE49-F238E27FC236}">
-                <a16:creationId xmlns:a16="http://schemas.microsoft.com/office/drawing/2014/main" xmlns="" id="{B13C0EAD-EA26-4ADA-AFD3-C60E5A7E354F}"/>
+                <a16:creationId xmlns="" xmlns:a16="http://schemas.microsoft.com/office/drawing/2014/main" id="{B13C0EAD-EA26-4ADA-AFD3-C60E5A7E354F}"/>
               </a:ext>
             </a:extLst>
           </p:cNvPr>
@@ -5499,7 +5499,7 @@
           <p:cNvPr id="16" name="テキスト ボックス 15">
             <a:extLst>
               <a:ext uri="{FF2B5EF4-FFF2-40B4-BE49-F238E27FC236}">
-                <a16:creationId xmlns:a16="http://schemas.microsoft.com/office/drawing/2014/main" xmlns="" id="{DF7894EE-1174-4828-B7DF-51B52BE5F642}"/>
+                <a16:creationId xmlns="" xmlns:a16="http://schemas.microsoft.com/office/drawing/2014/main" id="{DF7894EE-1174-4828-B7DF-51B52BE5F642}"/>
               </a:ext>
             </a:extLst>
           </p:cNvPr>
@@ -5543,7 +5543,7 @@
           <p:cNvPr id="17" name="テキスト ボックス 16">
             <a:extLst>
               <a:ext uri="{FF2B5EF4-FFF2-40B4-BE49-F238E27FC236}">
-                <a16:creationId xmlns:a16="http://schemas.microsoft.com/office/drawing/2014/main" xmlns="" id="{0CF33ABF-3C66-435D-B875-AA53D751472E}"/>
+                <a16:creationId xmlns="" xmlns:a16="http://schemas.microsoft.com/office/drawing/2014/main" id="{0CF33ABF-3C66-435D-B875-AA53D751472E}"/>
               </a:ext>
             </a:extLst>
           </p:cNvPr>
@@ -5579,7 +5579,7 @@
           <p:cNvPr id="18" name="テキスト ボックス 17">
             <a:extLst>
               <a:ext uri="{FF2B5EF4-FFF2-40B4-BE49-F238E27FC236}">
-                <a16:creationId xmlns:a16="http://schemas.microsoft.com/office/drawing/2014/main" xmlns="" id="{F4CC1D14-7AA6-41AD-85BC-5B3BD9AC308C}"/>
+                <a16:creationId xmlns="" xmlns:a16="http://schemas.microsoft.com/office/drawing/2014/main" id="{F4CC1D14-7AA6-41AD-85BC-5B3BD9AC308C}"/>
               </a:ext>
             </a:extLst>
           </p:cNvPr>
@@ -5615,7 +5615,7 @@
           <p:cNvPr id="21" name="直線矢印コネクタ 20">
             <a:extLst>
               <a:ext uri="{FF2B5EF4-FFF2-40B4-BE49-F238E27FC236}">
-                <a16:creationId xmlns:a16="http://schemas.microsoft.com/office/drawing/2014/main" xmlns="" id="{36428CDD-CC0D-4876-9F07-F4A6D227D45A}"/>
+                <a16:creationId xmlns="" xmlns:a16="http://schemas.microsoft.com/office/drawing/2014/main" id="{36428CDD-CC0D-4876-9F07-F4A6D227D45A}"/>
               </a:ext>
             </a:extLst>
           </p:cNvPr>
@@ -5660,7 +5660,7 @@
           <p:cNvPr id="19" name="四角形: 角を丸くする 18">
             <a:extLst>
               <a:ext uri="{FF2B5EF4-FFF2-40B4-BE49-F238E27FC236}">
-                <a16:creationId xmlns:a16="http://schemas.microsoft.com/office/drawing/2014/main" xmlns="" id="{46146C38-6712-4A36-BEAE-7DD2A922D693}"/>
+                <a16:creationId xmlns="" xmlns:a16="http://schemas.microsoft.com/office/drawing/2014/main" id="{46146C38-6712-4A36-BEAE-7DD2A922D693}"/>
               </a:ext>
             </a:extLst>
           </p:cNvPr>
@@ -5714,7 +5714,7 @@
           <p:cNvPr id="25" name="Gerade Verbindung mit Pfeil 42">
             <a:extLst>
               <a:ext uri="{FF2B5EF4-FFF2-40B4-BE49-F238E27FC236}">
-                <a16:creationId xmlns:a16="http://schemas.microsoft.com/office/drawing/2014/main" xmlns="" id="{32FD418E-ACA3-4090-96FF-CBAAD989B740}"/>
+                <a16:creationId xmlns="" xmlns:a16="http://schemas.microsoft.com/office/drawing/2014/main" id="{32FD418E-ACA3-4090-96FF-CBAAD989B740}"/>
               </a:ext>
             </a:extLst>
           </p:cNvPr>
@@ -5761,7 +5761,7 @@
           <p:cNvPr id="29" name="Group 38">
             <a:extLst>
               <a:ext uri="{FF2B5EF4-FFF2-40B4-BE49-F238E27FC236}">
-                <a16:creationId xmlns:a16="http://schemas.microsoft.com/office/drawing/2014/main" xmlns="" id="{4FFE457D-83D2-49D0-A0F3-DDFEEA55E2E5}"/>
+                <a16:creationId xmlns="" xmlns:a16="http://schemas.microsoft.com/office/drawing/2014/main" id="{4FFE457D-83D2-49D0-A0F3-DDFEEA55E2E5}"/>
               </a:ext>
             </a:extLst>
           </p:cNvPr>
@@ -5781,7 +5781,7 @@
             <p:cNvPr id="30" name="角丸四角形 21">
               <a:extLst>
                 <a:ext uri="{FF2B5EF4-FFF2-40B4-BE49-F238E27FC236}">
-                  <a16:creationId xmlns:a16="http://schemas.microsoft.com/office/drawing/2014/main" xmlns="" id="{024C5D63-C675-4753-B4EC-F2F06403B347}"/>
+                  <a16:creationId xmlns="" xmlns:a16="http://schemas.microsoft.com/office/drawing/2014/main" id="{024C5D63-C675-4753-B4EC-F2F06403B347}"/>
                 </a:ext>
               </a:extLst>
             </p:cNvPr>
@@ -5909,7 +5909,7 @@
             <p:cNvPr id="31" name="Group 28">
               <a:extLst>
                 <a:ext uri="{FF2B5EF4-FFF2-40B4-BE49-F238E27FC236}">
-                  <a16:creationId xmlns:a16="http://schemas.microsoft.com/office/drawing/2014/main" xmlns="" id="{A5488A5F-252B-4EB8-AA83-97711B5B4618}"/>
+                  <a16:creationId xmlns="" xmlns:a16="http://schemas.microsoft.com/office/drawing/2014/main" id="{A5488A5F-252B-4EB8-AA83-97711B5B4618}"/>
                 </a:ext>
               </a:extLst>
             </p:cNvPr>
@@ -5932,7 +5932,7 @@
               <p:cNvPr id="32" name="Isosceles Triangle 29">
                 <a:extLst>
                   <a:ext uri="{FF2B5EF4-FFF2-40B4-BE49-F238E27FC236}">
-                    <a16:creationId xmlns:a16="http://schemas.microsoft.com/office/drawing/2014/main" xmlns="" id="{AAB48341-E11F-47E0-ADE3-15F5732CB54D}"/>
+                    <a16:creationId xmlns="" xmlns:a16="http://schemas.microsoft.com/office/drawing/2014/main" id="{AAB48341-E11F-47E0-ADE3-15F5732CB54D}"/>
                   </a:ext>
                 </a:extLst>
               </p:cNvPr>
@@ -5998,7 +5998,7 @@
               <p:cNvPr id="33" name="Oval 30">
                 <a:extLst>
                   <a:ext uri="{FF2B5EF4-FFF2-40B4-BE49-F238E27FC236}">
-                    <a16:creationId xmlns:a16="http://schemas.microsoft.com/office/drawing/2014/main" xmlns="" id="{F5DD1807-415C-4F20-87B3-DC9D99DA43B9}"/>
+                    <a16:creationId xmlns="" xmlns:a16="http://schemas.microsoft.com/office/drawing/2014/main" id="{F5DD1807-415C-4F20-87B3-DC9D99DA43B9}"/>
                   </a:ext>
                 </a:extLst>
               </p:cNvPr>
@@ -6062,7 +6062,7 @@
               <p:cNvPr id="34" name="Oval 31">
                 <a:extLst>
                   <a:ext uri="{FF2B5EF4-FFF2-40B4-BE49-F238E27FC236}">
-                    <a16:creationId xmlns:a16="http://schemas.microsoft.com/office/drawing/2014/main" xmlns="" id="{ABEA0394-2BF9-4967-9823-22C32CCD88DA}"/>
+                    <a16:creationId xmlns="" xmlns:a16="http://schemas.microsoft.com/office/drawing/2014/main" id="{ABEA0394-2BF9-4967-9823-22C32CCD88DA}"/>
                   </a:ext>
                 </a:extLst>
               </p:cNvPr>
@@ -6126,7 +6126,7 @@
               <p:cNvPr id="35" name="Oval 32">
                 <a:extLst>
                   <a:ext uri="{FF2B5EF4-FFF2-40B4-BE49-F238E27FC236}">
-                    <a16:creationId xmlns:a16="http://schemas.microsoft.com/office/drawing/2014/main" xmlns="" id="{B86A9EA5-24F9-4D3F-AB41-726B8B8B7C20}"/>
+                    <a16:creationId xmlns="" xmlns:a16="http://schemas.microsoft.com/office/drawing/2014/main" id="{B86A9EA5-24F9-4D3F-AB41-726B8B8B7C20}"/>
                   </a:ext>
                 </a:extLst>
               </p:cNvPr>
@@ -6192,7 +6192,7 @@
           <p:cNvPr id="36" name="Down Arrow 40">
             <a:extLst>
               <a:ext uri="{FF2B5EF4-FFF2-40B4-BE49-F238E27FC236}">
-                <a16:creationId xmlns:a16="http://schemas.microsoft.com/office/drawing/2014/main" xmlns="" id="{0FE59E28-4CBD-4783-85B2-324EB3670127}"/>
+                <a16:creationId xmlns="" xmlns:a16="http://schemas.microsoft.com/office/drawing/2014/main" id="{0FE59E28-4CBD-4783-85B2-324EB3670127}"/>
               </a:ext>
             </a:extLst>
           </p:cNvPr>
@@ -6252,7 +6252,7 @@
           <p:cNvPr id="37" name="Down Arrow 40">
             <a:extLst>
               <a:ext uri="{FF2B5EF4-FFF2-40B4-BE49-F238E27FC236}">
-                <a16:creationId xmlns:a16="http://schemas.microsoft.com/office/drawing/2014/main" xmlns="" id="{A0B76F1B-01A8-4996-9734-5669198AA028}"/>
+                <a16:creationId xmlns="" xmlns:a16="http://schemas.microsoft.com/office/drawing/2014/main" id="{A0B76F1B-01A8-4996-9734-5669198AA028}"/>
               </a:ext>
             </a:extLst>
           </p:cNvPr>
@@ -6312,7 +6312,7 @@
           <p:cNvPr id="26" name="四角形: 角を丸くする 25">
             <a:extLst>
               <a:ext uri="{FF2B5EF4-FFF2-40B4-BE49-F238E27FC236}">
-                <a16:creationId xmlns:a16="http://schemas.microsoft.com/office/drawing/2014/main" xmlns="" id="{3676A255-5FE7-4450-8438-735526CBA567}"/>
+                <a16:creationId xmlns="" xmlns:a16="http://schemas.microsoft.com/office/drawing/2014/main" id="{3676A255-5FE7-4450-8438-735526CBA567}"/>
               </a:ext>
             </a:extLst>
           </p:cNvPr>
@@ -6381,7 +6381,7 @@
           <p:cNvPr id="27" name="四角形: 角を丸くする 26">
             <a:extLst>
               <a:ext uri="{FF2B5EF4-FFF2-40B4-BE49-F238E27FC236}">
-                <a16:creationId xmlns:a16="http://schemas.microsoft.com/office/drawing/2014/main" xmlns="" id="{6E7B91DA-21A4-46C0-8EDC-6AB81EDC472A}"/>
+                <a16:creationId xmlns="" xmlns:a16="http://schemas.microsoft.com/office/drawing/2014/main" id="{6E7B91DA-21A4-46C0-8EDC-6AB81EDC472A}"/>
               </a:ext>
             </a:extLst>
           </p:cNvPr>
@@ -6445,7 +6445,7 @@
           <p:cNvPr id="28" name="四角形: 角を丸くする 27">
             <a:extLst>
               <a:ext uri="{FF2B5EF4-FFF2-40B4-BE49-F238E27FC236}">
-                <a16:creationId xmlns:a16="http://schemas.microsoft.com/office/drawing/2014/main" xmlns="" id="{CCBB7A6D-AA8C-432A-8CB0-517B0E87F413}"/>
+                <a16:creationId xmlns="" xmlns:a16="http://schemas.microsoft.com/office/drawing/2014/main" id="{CCBB7A6D-AA8C-432A-8CB0-517B0E87F413}"/>
               </a:ext>
             </a:extLst>
           </p:cNvPr>
@@ -6499,7 +6499,7 @@
           <p:cNvPr id="38" name="Group 38">
             <a:extLst>
               <a:ext uri="{FF2B5EF4-FFF2-40B4-BE49-F238E27FC236}">
-                <a16:creationId xmlns:a16="http://schemas.microsoft.com/office/drawing/2014/main" xmlns="" id="{54623AD8-AF8C-4B9D-9CD4-E46C4DC17924}"/>
+                <a16:creationId xmlns="" xmlns:a16="http://schemas.microsoft.com/office/drawing/2014/main" id="{54623AD8-AF8C-4B9D-9CD4-E46C4DC17924}"/>
               </a:ext>
             </a:extLst>
           </p:cNvPr>
@@ -6519,7 +6519,7 @@
             <p:cNvPr id="39" name="角丸四角形 21">
               <a:extLst>
                 <a:ext uri="{FF2B5EF4-FFF2-40B4-BE49-F238E27FC236}">
-                  <a16:creationId xmlns:a16="http://schemas.microsoft.com/office/drawing/2014/main" xmlns="" id="{251184E1-0CB2-4BB6-AE73-DD14D204793D}"/>
+                  <a16:creationId xmlns="" xmlns:a16="http://schemas.microsoft.com/office/drawing/2014/main" id="{251184E1-0CB2-4BB6-AE73-DD14D204793D}"/>
                 </a:ext>
               </a:extLst>
             </p:cNvPr>
@@ -6647,7 +6647,7 @@
             <p:cNvPr id="40" name="Group 28">
               <a:extLst>
                 <a:ext uri="{FF2B5EF4-FFF2-40B4-BE49-F238E27FC236}">
-                  <a16:creationId xmlns:a16="http://schemas.microsoft.com/office/drawing/2014/main" xmlns="" id="{D0B59A3B-B44C-447F-88A9-466AC134ABCA}"/>
+                  <a16:creationId xmlns="" xmlns:a16="http://schemas.microsoft.com/office/drawing/2014/main" id="{D0B59A3B-B44C-447F-88A9-466AC134ABCA}"/>
                 </a:ext>
               </a:extLst>
             </p:cNvPr>
@@ -6670,7 +6670,7 @@
               <p:cNvPr id="41" name="Isosceles Triangle 29">
                 <a:extLst>
                   <a:ext uri="{FF2B5EF4-FFF2-40B4-BE49-F238E27FC236}">
-                    <a16:creationId xmlns:a16="http://schemas.microsoft.com/office/drawing/2014/main" xmlns="" id="{3D763714-5949-41F5-A62E-CB2678077A5E}"/>
+                    <a16:creationId xmlns="" xmlns:a16="http://schemas.microsoft.com/office/drawing/2014/main" id="{3D763714-5949-41F5-A62E-CB2678077A5E}"/>
                   </a:ext>
                 </a:extLst>
               </p:cNvPr>
@@ -6736,7 +6736,7 @@
               <p:cNvPr id="42" name="Oval 30">
                 <a:extLst>
                   <a:ext uri="{FF2B5EF4-FFF2-40B4-BE49-F238E27FC236}">
-                    <a16:creationId xmlns:a16="http://schemas.microsoft.com/office/drawing/2014/main" xmlns="" id="{C024B941-B597-4400-9C8C-5888A8514B95}"/>
+                    <a16:creationId xmlns="" xmlns:a16="http://schemas.microsoft.com/office/drawing/2014/main" id="{C024B941-B597-4400-9C8C-5888A8514B95}"/>
                   </a:ext>
                 </a:extLst>
               </p:cNvPr>
@@ -6800,7 +6800,7 @@
               <p:cNvPr id="43" name="Oval 31">
                 <a:extLst>
                   <a:ext uri="{FF2B5EF4-FFF2-40B4-BE49-F238E27FC236}">
-                    <a16:creationId xmlns:a16="http://schemas.microsoft.com/office/drawing/2014/main" xmlns="" id="{79654117-6FBA-44EE-9721-7B436910B0E8}"/>
+                    <a16:creationId xmlns="" xmlns:a16="http://schemas.microsoft.com/office/drawing/2014/main" id="{79654117-6FBA-44EE-9721-7B436910B0E8}"/>
                   </a:ext>
                 </a:extLst>
               </p:cNvPr>
@@ -6864,7 +6864,7 @@
               <p:cNvPr id="44" name="Oval 32">
                 <a:extLst>
                   <a:ext uri="{FF2B5EF4-FFF2-40B4-BE49-F238E27FC236}">
-                    <a16:creationId xmlns:a16="http://schemas.microsoft.com/office/drawing/2014/main" xmlns="" id="{0FD77DD4-B4C6-4322-867A-28B9A3761A9F}"/>
+                    <a16:creationId xmlns="" xmlns:a16="http://schemas.microsoft.com/office/drawing/2014/main" id="{0FD77DD4-B4C6-4322-867A-28B9A3761A9F}"/>
                   </a:ext>
                 </a:extLst>
               </p:cNvPr>
@@ -6930,7 +6930,7 @@
           <p:cNvPr id="45" name="Down Arrow 40">
             <a:extLst>
               <a:ext uri="{FF2B5EF4-FFF2-40B4-BE49-F238E27FC236}">
-                <a16:creationId xmlns:a16="http://schemas.microsoft.com/office/drawing/2014/main" xmlns="" id="{55E81437-DDD4-4CDE-9015-53895EFDCBF2}"/>
+                <a16:creationId xmlns="" xmlns:a16="http://schemas.microsoft.com/office/drawing/2014/main" id="{55E81437-DDD4-4CDE-9015-53895EFDCBF2}"/>
               </a:ext>
             </a:extLst>
           </p:cNvPr>
@@ -6990,7 +6990,7 @@
           <p:cNvPr id="46" name="Down Arrow 40">
             <a:extLst>
               <a:ext uri="{FF2B5EF4-FFF2-40B4-BE49-F238E27FC236}">
-                <a16:creationId xmlns:a16="http://schemas.microsoft.com/office/drawing/2014/main" xmlns="" id="{57518CB0-38ED-4231-8DC7-1F71028AF7E6}"/>
+                <a16:creationId xmlns="" xmlns:a16="http://schemas.microsoft.com/office/drawing/2014/main" id="{57518CB0-38ED-4231-8DC7-1F71028AF7E6}"/>
               </a:ext>
             </a:extLst>
           </p:cNvPr>
@@ -7050,7 +7050,7 @@
           <p:cNvPr id="47" name="Gerade Verbindung mit Pfeil 42">
             <a:extLst>
               <a:ext uri="{FF2B5EF4-FFF2-40B4-BE49-F238E27FC236}">
-                <a16:creationId xmlns:a16="http://schemas.microsoft.com/office/drawing/2014/main" xmlns="" id="{4C549D1D-6490-46C6-A0DB-A197E4E7AF27}"/>
+                <a16:creationId xmlns="" xmlns:a16="http://schemas.microsoft.com/office/drawing/2014/main" id="{4C549D1D-6490-46C6-A0DB-A197E4E7AF27}"/>
               </a:ext>
             </a:extLst>
           </p:cNvPr>
@@ -7128,7 +7128,7 @@
           <p:cNvPr id="24" name="正方形/長方形 23">
             <a:extLst>
               <a:ext uri="{FF2B5EF4-FFF2-40B4-BE49-F238E27FC236}">
-                <a16:creationId xmlns:a16="http://schemas.microsoft.com/office/drawing/2014/main" xmlns="" id="{7F22FDF9-CD34-44FC-A142-278E1B05C7F2}"/>
+                <a16:creationId xmlns="" xmlns:a16="http://schemas.microsoft.com/office/drawing/2014/main" id="{7F22FDF9-CD34-44FC-A142-278E1B05C7F2}"/>
               </a:ext>
             </a:extLst>
           </p:cNvPr>
@@ -7180,7 +7180,7 @@
           <p:cNvPr id="6" name="四角形: 角を丸くする 5">
             <a:extLst>
               <a:ext uri="{FF2B5EF4-FFF2-40B4-BE49-F238E27FC236}">
-                <a16:creationId xmlns:a16="http://schemas.microsoft.com/office/drawing/2014/main" xmlns="" id="{E1883DBD-7E83-4F3C-8FC8-563AEB36A257}"/>
+                <a16:creationId xmlns="" xmlns:a16="http://schemas.microsoft.com/office/drawing/2014/main" id="{E1883DBD-7E83-4F3C-8FC8-563AEB36A257}"/>
               </a:ext>
             </a:extLst>
           </p:cNvPr>
@@ -7244,7 +7244,7 @@
           <p:cNvPr id="8" name="四角形: 角を丸くする 7">
             <a:extLst>
               <a:ext uri="{FF2B5EF4-FFF2-40B4-BE49-F238E27FC236}">
-                <a16:creationId xmlns:a16="http://schemas.microsoft.com/office/drawing/2014/main" xmlns="" id="{A4B36517-6546-4324-B602-66920A143647}"/>
+                <a16:creationId xmlns="" xmlns:a16="http://schemas.microsoft.com/office/drawing/2014/main" id="{A4B36517-6546-4324-B602-66920A143647}"/>
               </a:ext>
             </a:extLst>
           </p:cNvPr>
@@ -7308,7 +7308,7 @@
           <p:cNvPr id="9" name="四角形: 角を丸くする 8">
             <a:extLst>
               <a:ext uri="{FF2B5EF4-FFF2-40B4-BE49-F238E27FC236}">
-                <a16:creationId xmlns:a16="http://schemas.microsoft.com/office/drawing/2014/main" xmlns="" id="{478343BE-306E-4657-841B-17ACD2762DA9}"/>
+                <a16:creationId xmlns="" xmlns:a16="http://schemas.microsoft.com/office/drawing/2014/main" id="{478343BE-306E-4657-841B-17ACD2762DA9}"/>
               </a:ext>
             </a:extLst>
           </p:cNvPr>
@@ -7362,7 +7362,7 @@
           <p:cNvPr id="10" name="四角形: 角を丸くする 9">
             <a:extLst>
               <a:ext uri="{FF2B5EF4-FFF2-40B4-BE49-F238E27FC236}">
-                <a16:creationId xmlns:a16="http://schemas.microsoft.com/office/drawing/2014/main" xmlns="" id="{7F7394D1-AB71-4F83-88CF-0D70AEA90BB3}"/>
+                <a16:creationId xmlns="" xmlns:a16="http://schemas.microsoft.com/office/drawing/2014/main" id="{7F7394D1-AB71-4F83-88CF-0D70AEA90BB3}"/>
               </a:ext>
             </a:extLst>
           </p:cNvPr>
@@ -7431,7 +7431,7 @@
           <p:cNvPr id="13" name="四角形: 角を丸くする 12">
             <a:extLst>
               <a:ext uri="{FF2B5EF4-FFF2-40B4-BE49-F238E27FC236}">
-                <a16:creationId xmlns:a16="http://schemas.microsoft.com/office/drawing/2014/main" xmlns="" id="{B5CD2B9F-227C-466A-9DC6-760504E532C1}"/>
+                <a16:creationId xmlns="" xmlns:a16="http://schemas.microsoft.com/office/drawing/2014/main" id="{B5CD2B9F-227C-466A-9DC6-760504E532C1}"/>
               </a:ext>
             </a:extLst>
           </p:cNvPr>
@@ -7485,7 +7485,7 @@
           <p:cNvPr id="14" name="四角形: 角を丸くする 13">
             <a:extLst>
               <a:ext uri="{FF2B5EF4-FFF2-40B4-BE49-F238E27FC236}">
-                <a16:creationId xmlns:a16="http://schemas.microsoft.com/office/drawing/2014/main" xmlns="" id="{DAC9719D-BC55-4BAA-827B-3741647E133B}"/>
+                <a16:creationId xmlns="" xmlns:a16="http://schemas.microsoft.com/office/drawing/2014/main" id="{DAC9719D-BC55-4BAA-827B-3741647E133B}"/>
               </a:ext>
             </a:extLst>
           </p:cNvPr>
@@ -7539,7 +7539,7 @@
           <p:cNvPr id="15" name="四角形: メモ 14">
             <a:extLst>
               <a:ext uri="{FF2B5EF4-FFF2-40B4-BE49-F238E27FC236}">
-                <a16:creationId xmlns:a16="http://schemas.microsoft.com/office/drawing/2014/main" xmlns="" id="{B13C0EAD-EA26-4ADA-AFD3-C60E5A7E354F}"/>
+                <a16:creationId xmlns="" xmlns:a16="http://schemas.microsoft.com/office/drawing/2014/main" id="{B13C0EAD-EA26-4ADA-AFD3-C60E5A7E354F}"/>
               </a:ext>
             </a:extLst>
           </p:cNvPr>
@@ -7593,7 +7593,7 @@
           <p:cNvPr id="16" name="テキスト ボックス 15">
             <a:extLst>
               <a:ext uri="{FF2B5EF4-FFF2-40B4-BE49-F238E27FC236}">
-                <a16:creationId xmlns:a16="http://schemas.microsoft.com/office/drawing/2014/main" xmlns="" id="{DF7894EE-1174-4828-B7DF-51B52BE5F642}"/>
+                <a16:creationId xmlns="" xmlns:a16="http://schemas.microsoft.com/office/drawing/2014/main" id="{DF7894EE-1174-4828-B7DF-51B52BE5F642}"/>
               </a:ext>
             </a:extLst>
           </p:cNvPr>
@@ -7637,7 +7637,7 @@
           <p:cNvPr id="17" name="テキスト ボックス 16">
             <a:extLst>
               <a:ext uri="{FF2B5EF4-FFF2-40B4-BE49-F238E27FC236}">
-                <a16:creationId xmlns:a16="http://schemas.microsoft.com/office/drawing/2014/main" xmlns="" id="{0CF33ABF-3C66-435D-B875-AA53D751472E}"/>
+                <a16:creationId xmlns="" xmlns:a16="http://schemas.microsoft.com/office/drawing/2014/main" id="{0CF33ABF-3C66-435D-B875-AA53D751472E}"/>
               </a:ext>
             </a:extLst>
           </p:cNvPr>
@@ -7673,7 +7673,7 @@
           <p:cNvPr id="18" name="テキスト ボックス 17">
             <a:extLst>
               <a:ext uri="{FF2B5EF4-FFF2-40B4-BE49-F238E27FC236}">
-                <a16:creationId xmlns:a16="http://schemas.microsoft.com/office/drawing/2014/main" xmlns="" id="{F4CC1D14-7AA6-41AD-85BC-5B3BD9AC308C}"/>
+                <a16:creationId xmlns="" xmlns:a16="http://schemas.microsoft.com/office/drawing/2014/main" id="{F4CC1D14-7AA6-41AD-85BC-5B3BD9AC308C}"/>
               </a:ext>
             </a:extLst>
           </p:cNvPr>
@@ -7709,7 +7709,7 @@
           <p:cNvPr id="21" name="直線矢印コネクタ 20">
             <a:extLst>
               <a:ext uri="{FF2B5EF4-FFF2-40B4-BE49-F238E27FC236}">
-                <a16:creationId xmlns:a16="http://schemas.microsoft.com/office/drawing/2014/main" xmlns="" id="{36428CDD-CC0D-4876-9F07-F4A6D227D45A}"/>
+                <a16:creationId xmlns="" xmlns:a16="http://schemas.microsoft.com/office/drawing/2014/main" id="{36428CDD-CC0D-4876-9F07-F4A6D227D45A}"/>
               </a:ext>
             </a:extLst>
           </p:cNvPr>
@@ -7754,7 +7754,7 @@
           <p:cNvPr id="19" name="四角形: 角を丸くする 18">
             <a:extLst>
               <a:ext uri="{FF2B5EF4-FFF2-40B4-BE49-F238E27FC236}">
-                <a16:creationId xmlns:a16="http://schemas.microsoft.com/office/drawing/2014/main" xmlns="" id="{46146C38-6712-4A36-BEAE-7DD2A922D693}"/>
+                <a16:creationId xmlns="" xmlns:a16="http://schemas.microsoft.com/office/drawing/2014/main" id="{46146C38-6712-4A36-BEAE-7DD2A922D693}"/>
               </a:ext>
             </a:extLst>
           </p:cNvPr>
@@ -7808,7 +7808,7 @@
           <p:cNvPr id="25" name="Gerade Verbindung mit Pfeil 42">
             <a:extLst>
               <a:ext uri="{FF2B5EF4-FFF2-40B4-BE49-F238E27FC236}">
-                <a16:creationId xmlns:a16="http://schemas.microsoft.com/office/drawing/2014/main" xmlns="" id="{32FD418E-ACA3-4090-96FF-CBAAD989B740}"/>
+                <a16:creationId xmlns="" xmlns:a16="http://schemas.microsoft.com/office/drawing/2014/main" id="{32FD418E-ACA3-4090-96FF-CBAAD989B740}"/>
               </a:ext>
             </a:extLst>
           </p:cNvPr>
@@ -7855,7 +7855,7 @@
           <p:cNvPr id="29" name="Group 38">
             <a:extLst>
               <a:ext uri="{FF2B5EF4-FFF2-40B4-BE49-F238E27FC236}">
-                <a16:creationId xmlns:a16="http://schemas.microsoft.com/office/drawing/2014/main" xmlns="" id="{4FFE457D-83D2-49D0-A0F3-DDFEEA55E2E5}"/>
+                <a16:creationId xmlns="" xmlns:a16="http://schemas.microsoft.com/office/drawing/2014/main" id="{4FFE457D-83D2-49D0-A0F3-DDFEEA55E2E5}"/>
               </a:ext>
             </a:extLst>
           </p:cNvPr>
@@ -7875,7 +7875,7 @@
             <p:cNvPr id="30" name="角丸四角形 21">
               <a:extLst>
                 <a:ext uri="{FF2B5EF4-FFF2-40B4-BE49-F238E27FC236}">
-                  <a16:creationId xmlns:a16="http://schemas.microsoft.com/office/drawing/2014/main" xmlns="" id="{024C5D63-C675-4753-B4EC-F2F06403B347}"/>
+                  <a16:creationId xmlns="" xmlns:a16="http://schemas.microsoft.com/office/drawing/2014/main" id="{024C5D63-C675-4753-B4EC-F2F06403B347}"/>
                 </a:ext>
               </a:extLst>
             </p:cNvPr>
@@ -8020,7 +8020,7 @@
             <p:cNvPr id="31" name="Group 28">
               <a:extLst>
                 <a:ext uri="{FF2B5EF4-FFF2-40B4-BE49-F238E27FC236}">
-                  <a16:creationId xmlns:a16="http://schemas.microsoft.com/office/drawing/2014/main" xmlns="" id="{A5488A5F-252B-4EB8-AA83-97711B5B4618}"/>
+                  <a16:creationId xmlns="" xmlns:a16="http://schemas.microsoft.com/office/drawing/2014/main" id="{A5488A5F-252B-4EB8-AA83-97711B5B4618}"/>
                 </a:ext>
               </a:extLst>
             </p:cNvPr>
@@ -8043,7 +8043,7 @@
               <p:cNvPr id="32" name="Isosceles Triangle 29">
                 <a:extLst>
                   <a:ext uri="{FF2B5EF4-FFF2-40B4-BE49-F238E27FC236}">
-                    <a16:creationId xmlns:a16="http://schemas.microsoft.com/office/drawing/2014/main" xmlns="" id="{AAB48341-E11F-47E0-ADE3-15F5732CB54D}"/>
+                    <a16:creationId xmlns="" xmlns:a16="http://schemas.microsoft.com/office/drawing/2014/main" id="{AAB48341-E11F-47E0-ADE3-15F5732CB54D}"/>
                   </a:ext>
                 </a:extLst>
               </p:cNvPr>
@@ -8109,7 +8109,7 @@
               <p:cNvPr id="33" name="Oval 30">
                 <a:extLst>
                   <a:ext uri="{FF2B5EF4-FFF2-40B4-BE49-F238E27FC236}">
-                    <a16:creationId xmlns:a16="http://schemas.microsoft.com/office/drawing/2014/main" xmlns="" id="{F5DD1807-415C-4F20-87B3-DC9D99DA43B9}"/>
+                    <a16:creationId xmlns="" xmlns:a16="http://schemas.microsoft.com/office/drawing/2014/main" id="{F5DD1807-415C-4F20-87B3-DC9D99DA43B9}"/>
                   </a:ext>
                 </a:extLst>
               </p:cNvPr>
@@ -8173,7 +8173,7 @@
               <p:cNvPr id="34" name="Oval 31">
                 <a:extLst>
                   <a:ext uri="{FF2B5EF4-FFF2-40B4-BE49-F238E27FC236}">
-                    <a16:creationId xmlns:a16="http://schemas.microsoft.com/office/drawing/2014/main" xmlns="" id="{ABEA0394-2BF9-4967-9823-22C32CCD88DA}"/>
+                    <a16:creationId xmlns="" xmlns:a16="http://schemas.microsoft.com/office/drawing/2014/main" id="{ABEA0394-2BF9-4967-9823-22C32CCD88DA}"/>
                   </a:ext>
                 </a:extLst>
               </p:cNvPr>
@@ -8237,7 +8237,7 @@
               <p:cNvPr id="35" name="Oval 32">
                 <a:extLst>
                   <a:ext uri="{FF2B5EF4-FFF2-40B4-BE49-F238E27FC236}">
-                    <a16:creationId xmlns:a16="http://schemas.microsoft.com/office/drawing/2014/main" xmlns="" id="{B86A9EA5-24F9-4D3F-AB41-726B8B8B7C20}"/>
+                    <a16:creationId xmlns="" xmlns:a16="http://schemas.microsoft.com/office/drawing/2014/main" id="{B86A9EA5-24F9-4D3F-AB41-726B8B8B7C20}"/>
                   </a:ext>
                 </a:extLst>
               </p:cNvPr>
@@ -8303,7 +8303,7 @@
           <p:cNvPr id="36" name="Down Arrow 40">
             <a:extLst>
               <a:ext uri="{FF2B5EF4-FFF2-40B4-BE49-F238E27FC236}">
-                <a16:creationId xmlns:a16="http://schemas.microsoft.com/office/drawing/2014/main" xmlns="" id="{0FE59E28-4CBD-4783-85B2-324EB3670127}"/>
+                <a16:creationId xmlns="" xmlns:a16="http://schemas.microsoft.com/office/drawing/2014/main" id="{0FE59E28-4CBD-4783-85B2-324EB3670127}"/>
               </a:ext>
             </a:extLst>
           </p:cNvPr>
@@ -8363,7 +8363,7 @@
           <p:cNvPr id="37" name="Down Arrow 40">
             <a:extLst>
               <a:ext uri="{FF2B5EF4-FFF2-40B4-BE49-F238E27FC236}">
-                <a16:creationId xmlns:a16="http://schemas.microsoft.com/office/drawing/2014/main" xmlns="" id="{A0B76F1B-01A8-4996-9734-5669198AA028}"/>
+                <a16:creationId xmlns="" xmlns:a16="http://schemas.microsoft.com/office/drawing/2014/main" id="{A0B76F1B-01A8-4996-9734-5669198AA028}"/>
               </a:ext>
             </a:extLst>
           </p:cNvPr>
@@ -8423,7 +8423,7 @@
           <p:cNvPr id="26" name="四角形: 角を丸くする 25">
             <a:extLst>
               <a:ext uri="{FF2B5EF4-FFF2-40B4-BE49-F238E27FC236}">
-                <a16:creationId xmlns:a16="http://schemas.microsoft.com/office/drawing/2014/main" xmlns="" id="{3676A255-5FE7-4450-8438-735526CBA567}"/>
+                <a16:creationId xmlns="" xmlns:a16="http://schemas.microsoft.com/office/drawing/2014/main" id="{3676A255-5FE7-4450-8438-735526CBA567}"/>
               </a:ext>
             </a:extLst>
           </p:cNvPr>
@@ -8492,7 +8492,7 @@
           <p:cNvPr id="27" name="四角形: 角を丸くする 26">
             <a:extLst>
               <a:ext uri="{FF2B5EF4-FFF2-40B4-BE49-F238E27FC236}">
-                <a16:creationId xmlns:a16="http://schemas.microsoft.com/office/drawing/2014/main" xmlns="" id="{6E7B91DA-21A4-46C0-8EDC-6AB81EDC472A}"/>
+                <a16:creationId xmlns="" xmlns:a16="http://schemas.microsoft.com/office/drawing/2014/main" id="{6E7B91DA-21A4-46C0-8EDC-6AB81EDC472A}"/>
               </a:ext>
             </a:extLst>
           </p:cNvPr>
@@ -8561,7 +8561,7 @@
           <p:cNvPr id="28" name="四角形: 角を丸くする 27">
             <a:extLst>
               <a:ext uri="{FF2B5EF4-FFF2-40B4-BE49-F238E27FC236}">
-                <a16:creationId xmlns:a16="http://schemas.microsoft.com/office/drawing/2014/main" xmlns="" id="{CCBB7A6D-AA8C-432A-8CB0-517B0E87F413}"/>
+                <a16:creationId xmlns="" xmlns:a16="http://schemas.microsoft.com/office/drawing/2014/main" id="{CCBB7A6D-AA8C-432A-8CB0-517B0E87F413}"/>
               </a:ext>
             </a:extLst>
           </p:cNvPr>
@@ -8615,7 +8615,7 @@
           <p:cNvPr id="38" name="Group 38">
             <a:extLst>
               <a:ext uri="{FF2B5EF4-FFF2-40B4-BE49-F238E27FC236}">
-                <a16:creationId xmlns:a16="http://schemas.microsoft.com/office/drawing/2014/main" xmlns="" id="{54623AD8-AF8C-4B9D-9CD4-E46C4DC17924}"/>
+                <a16:creationId xmlns="" xmlns:a16="http://schemas.microsoft.com/office/drawing/2014/main" id="{54623AD8-AF8C-4B9D-9CD4-E46C4DC17924}"/>
               </a:ext>
             </a:extLst>
           </p:cNvPr>
@@ -8635,7 +8635,7 @@
             <p:cNvPr id="39" name="角丸四角形 21">
               <a:extLst>
                 <a:ext uri="{FF2B5EF4-FFF2-40B4-BE49-F238E27FC236}">
-                  <a16:creationId xmlns:a16="http://schemas.microsoft.com/office/drawing/2014/main" xmlns="" id="{251184E1-0CB2-4BB6-AE73-DD14D204793D}"/>
+                  <a16:creationId xmlns="" xmlns:a16="http://schemas.microsoft.com/office/drawing/2014/main" id="{251184E1-0CB2-4BB6-AE73-DD14D204793D}"/>
                 </a:ext>
               </a:extLst>
             </p:cNvPr>
@@ -8797,7 +8797,7 @@
             <p:cNvPr id="40" name="Group 28">
               <a:extLst>
                 <a:ext uri="{FF2B5EF4-FFF2-40B4-BE49-F238E27FC236}">
-                  <a16:creationId xmlns:a16="http://schemas.microsoft.com/office/drawing/2014/main" xmlns="" id="{D0B59A3B-B44C-447F-88A9-466AC134ABCA}"/>
+                  <a16:creationId xmlns="" xmlns:a16="http://schemas.microsoft.com/office/drawing/2014/main" id="{D0B59A3B-B44C-447F-88A9-466AC134ABCA}"/>
                 </a:ext>
               </a:extLst>
             </p:cNvPr>
@@ -8820,7 +8820,7 @@
               <p:cNvPr id="41" name="Isosceles Triangle 29">
                 <a:extLst>
                   <a:ext uri="{FF2B5EF4-FFF2-40B4-BE49-F238E27FC236}">
-                    <a16:creationId xmlns:a16="http://schemas.microsoft.com/office/drawing/2014/main" xmlns="" id="{3D763714-5949-41F5-A62E-CB2678077A5E}"/>
+                    <a16:creationId xmlns="" xmlns:a16="http://schemas.microsoft.com/office/drawing/2014/main" id="{3D763714-5949-41F5-A62E-CB2678077A5E}"/>
                   </a:ext>
                 </a:extLst>
               </p:cNvPr>
@@ -8886,7 +8886,7 @@
               <p:cNvPr id="42" name="Oval 30">
                 <a:extLst>
                   <a:ext uri="{FF2B5EF4-FFF2-40B4-BE49-F238E27FC236}">
-                    <a16:creationId xmlns:a16="http://schemas.microsoft.com/office/drawing/2014/main" xmlns="" id="{C024B941-B597-4400-9C8C-5888A8514B95}"/>
+                    <a16:creationId xmlns="" xmlns:a16="http://schemas.microsoft.com/office/drawing/2014/main" id="{C024B941-B597-4400-9C8C-5888A8514B95}"/>
                   </a:ext>
                 </a:extLst>
               </p:cNvPr>
@@ -8950,7 +8950,7 @@
               <p:cNvPr id="43" name="Oval 31">
                 <a:extLst>
                   <a:ext uri="{FF2B5EF4-FFF2-40B4-BE49-F238E27FC236}">
-                    <a16:creationId xmlns:a16="http://schemas.microsoft.com/office/drawing/2014/main" xmlns="" id="{79654117-6FBA-44EE-9721-7B436910B0E8}"/>
+                    <a16:creationId xmlns="" xmlns:a16="http://schemas.microsoft.com/office/drawing/2014/main" id="{79654117-6FBA-44EE-9721-7B436910B0E8}"/>
                   </a:ext>
                 </a:extLst>
               </p:cNvPr>
@@ -9014,7 +9014,7 @@
               <p:cNvPr id="44" name="Oval 32">
                 <a:extLst>
                   <a:ext uri="{FF2B5EF4-FFF2-40B4-BE49-F238E27FC236}">
-                    <a16:creationId xmlns:a16="http://schemas.microsoft.com/office/drawing/2014/main" xmlns="" id="{0FD77DD4-B4C6-4322-867A-28B9A3761A9F}"/>
+                    <a16:creationId xmlns="" xmlns:a16="http://schemas.microsoft.com/office/drawing/2014/main" id="{0FD77DD4-B4C6-4322-867A-28B9A3761A9F}"/>
                   </a:ext>
                 </a:extLst>
               </p:cNvPr>
@@ -9080,7 +9080,7 @@
           <p:cNvPr id="45" name="Down Arrow 40">
             <a:extLst>
               <a:ext uri="{FF2B5EF4-FFF2-40B4-BE49-F238E27FC236}">
-                <a16:creationId xmlns:a16="http://schemas.microsoft.com/office/drawing/2014/main" xmlns="" id="{55E81437-DDD4-4CDE-9015-53895EFDCBF2}"/>
+                <a16:creationId xmlns="" xmlns:a16="http://schemas.microsoft.com/office/drawing/2014/main" id="{55E81437-DDD4-4CDE-9015-53895EFDCBF2}"/>
               </a:ext>
             </a:extLst>
           </p:cNvPr>
@@ -9140,7 +9140,7 @@
           <p:cNvPr id="46" name="Down Arrow 40">
             <a:extLst>
               <a:ext uri="{FF2B5EF4-FFF2-40B4-BE49-F238E27FC236}">
-                <a16:creationId xmlns:a16="http://schemas.microsoft.com/office/drawing/2014/main" xmlns="" id="{57518CB0-38ED-4231-8DC7-1F71028AF7E6}"/>
+                <a16:creationId xmlns="" xmlns:a16="http://schemas.microsoft.com/office/drawing/2014/main" id="{57518CB0-38ED-4231-8DC7-1F71028AF7E6}"/>
               </a:ext>
             </a:extLst>
           </p:cNvPr>
@@ -9200,7 +9200,7 @@
           <p:cNvPr id="47" name="Gerade Verbindung mit Pfeil 42">
             <a:extLst>
               <a:ext uri="{FF2B5EF4-FFF2-40B4-BE49-F238E27FC236}">
-                <a16:creationId xmlns:a16="http://schemas.microsoft.com/office/drawing/2014/main" xmlns="" id="{4C549D1D-6490-46C6-A0DB-A197E4E7AF27}"/>
+                <a16:creationId xmlns="" xmlns:a16="http://schemas.microsoft.com/office/drawing/2014/main" id="{4C549D1D-6490-46C6-A0DB-A197E4E7AF27}"/>
               </a:ext>
             </a:extLst>
           </p:cNvPr>
@@ -9248,7 +9248,7 @@
           <p:cNvPr id="48" name="テキスト ボックス 47">
             <a:extLst>
               <a:ext uri="{FF2B5EF4-FFF2-40B4-BE49-F238E27FC236}">
-                <a16:creationId xmlns:a16="http://schemas.microsoft.com/office/drawing/2014/main" xmlns="" id="{0112AFBD-461E-4171-93BA-9928E070A0D5}"/>
+                <a16:creationId xmlns="" xmlns:a16="http://schemas.microsoft.com/office/drawing/2014/main" id="{0112AFBD-461E-4171-93BA-9928E070A0D5}"/>
               </a:ext>
             </a:extLst>
           </p:cNvPr>
@@ -9285,7 +9285,7 @@
           <p:cNvPr id="49" name="テキスト ボックス 48">
             <a:extLst>
               <a:ext uri="{FF2B5EF4-FFF2-40B4-BE49-F238E27FC236}">
-                <a16:creationId xmlns:a16="http://schemas.microsoft.com/office/drawing/2014/main" xmlns="" id="{14334150-8563-43EE-9179-42A0B31BB43F}"/>
+                <a16:creationId xmlns="" xmlns:a16="http://schemas.microsoft.com/office/drawing/2014/main" id="{14334150-8563-43EE-9179-42A0B31BB43F}"/>
               </a:ext>
             </a:extLst>
           </p:cNvPr>
@@ -9322,7 +9322,7 @@
           <p:cNvPr id="50" name="テキスト ボックス 49">
             <a:extLst>
               <a:ext uri="{FF2B5EF4-FFF2-40B4-BE49-F238E27FC236}">
-                <a16:creationId xmlns:a16="http://schemas.microsoft.com/office/drawing/2014/main" xmlns="" id="{7F60A16A-9215-4D32-A02A-32AD4AFC1AC3}"/>
+                <a16:creationId xmlns="" xmlns:a16="http://schemas.microsoft.com/office/drawing/2014/main" id="{7F60A16A-9215-4D32-A02A-32AD4AFC1AC3}"/>
               </a:ext>
             </a:extLst>
           </p:cNvPr>
@@ -9389,7 +9389,7 @@
           <p:cNvPr id="24" name="正方形/長方形 23">
             <a:extLst>
               <a:ext uri="{FF2B5EF4-FFF2-40B4-BE49-F238E27FC236}">
-                <a16:creationId xmlns:a16="http://schemas.microsoft.com/office/drawing/2014/main" xmlns="" id="{7F22FDF9-CD34-44FC-A142-278E1B05C7F2}"/>
+                <a16:creationId xmlns="" xmlns:a16="http://schemas.microsoft.com/office/drawing/2014/main" id="{7F22FDF9-CD34-44FC-A142-278E1B05C7F2}"/>
               </a:ext>
             </a:extLst>
           </p:cNvPr>
@@ -9441,7 +9441,7 @@
           <p:cNvPr id="6" name="四角形: 角を丸くする 5">
             <a:extLst>
               <a:ext uri="{FF2B5EF4-FFF2-40B4-BE49-F238E27FC236}">
-                <a16:creationId xmlns:a16="http://schemas.microsoft.com/office/drawing/2014/main" xmlns="" id="{E1883DBD-7E83-4F3C-8FC8-563AEB36A257}"/>
+                <a16:creationId xmlns="" xmlns:a16="http://schemas.microsoft.com/office/drawing/2014/main" id="{E1883DBD-7E83-4F3C-8FC8-563AEB36A257}"/>
               </a:ext>
             </a:extLst>
           </p:cNvPr>
@@ -9490,13 +9490,18 @@
           <a:p>
             <a:pPr algn="ctr"/>
             <a:r>
-              <a:rPr kumimoji="1" lang="en-US" altLang="ja-JP" sz="1600" b="1" dirty="0">
+              <a:rPr kumimoji="1" lang="en-US" altLang="ja-JP" sz="1600" b="1" dirty="0" smtClean="0">
                 <a:solidFill>
                   <a:schemeClr val="tx1"/>
                 </a:solidFill>
               </a:rPr>
-              <a:t>Client</a:t>
-            </a:r>
+              <a:t>Servient</a:t>
+            </a:r>
+            <a:endParaRPr kumimoji="1" lang="en-US" altLang="ja-JP" sz="1600" b="1" dirty="0">
+              <a:solidFill>
+                <a:schemeClr val="tx1"/>
+              </a:solidFill>
+            </a:endParaRPr>
           </a:p>
         </p:txBody>
       </p:sp>
@@ -9505,7 +9510,7 @@
           <p:cNvPr id="8" name="四角形: 角を丸くする 7">
             <a:extLst>
               <a:ext uri="{FF2B5EF4-FFF2-40B4-BE49-F238E27FC236}">
-                <a16:creationId xmlns:a16="http://schemas.microsoft.com/office/drawing/2014/main" xmlns="" id="{A4B36517-6546-4324-B602-66920A143647}"/>
+                <a16:creationId xmlns="" xmlns:a16="http://schemas.microsoft.com/office/drawing/2014/main" id="{A4B36517-6546-4324-B602-66920A143647}"/>
               </a:ext>
             </a:extLst>
           </p:cNvPr>
@@ -9554,13 +9559,18 @@
           <a:p>
             <a:pPr algn="ctr"/>
             <a:r>
-              <a:rPr kumimoji="1" lang="en-US" altLang="ja-JP" sz="1600" b="1" dirty="0">
+              <a:rPr kumimoji="1" lang="en-US" altLang="ja-JP" sz="1600" b="1" dirty="0" smtClean="0">
                 <a:solidFill>
                   <a:schemeClr val="tx1"/>
                 </a:solidFill>
               </a:rPr>
               <a:t>Servient</a:t>
             </a:r>
+            <a:endParaRPr kumimoji="1" lang="en-US" altLang="ja-JP" sz="1600" b="1" dirty="0">
+              <a:solidFill>
+                <a:schemeClr val="tx1"/>
+              </a:solidFill>
+            </a:endParaRPr>
           </a:p>
         </p:txBody>
       </p:sp>
@@ -9569,7 +9579,7 @@
           <p:cNvPr id="10" name="四角形: 角を丸くする 9">
             <a:extLst>
               <a:ext uri="{FF2B5EF4-FFF2-40B4-BE49-F238E27FC236}">
-                <a16:creationId xmlns:a16="http://schemas.microsoft.com/office/drawing/2014/main" xmlns="" id="{7F7394D1-AB71-4F83-88CF-0D70AEA90BB3}"/>
+                <a16:creationId xmlns="" xmlns:a16="http://schemas.microsoft.com/office/drawing/2014/main" id="{7F7394D1-AB71-4F83-88CF-0D70AEA90BB3}"/>
               </a:ext>
             </a:extLst>
           </p:cNvPr>
@@ -9638,7 +9648,7 @@
           <p:cNvPr id="19" name="四角形: 角を丸くする 18">
             <a:extLst>
               <a:ext uri="{FF2B5EF4-FFF2-40B4-BE49-F238E27FC236}">
-                <a16:creationId xmlns:a16="http://schemas.microsoft.com/office/drawing/2014/main" xmlns="" id="{46146C38-6712-4A36-BEAE-7DD2A922D693}"/>
+                <a16:creationId xmlns="" xmlns:a16="http://schemas.microsoft.com/office/drawing/2014/main" id="{46146C38-6712-4A36-BEAE-7DD2A922D693}"/>
               </a:ext>
             </a:extLst>
           </p:cNvPr>
@@ -9692,7 +9702,7 @@
           <p:cNvPr id="25" name="Gerade Verbindung mit Pfeil 42">
             <a:extLst>
               <a:ext uri="{FF2B5EF4-FFF2-40B4-BE49-F238E27FC236}">
-                <a16:creationId xmlns:a16="http://schemas.microsoft.com/office/drawing/2014/main" xmlns="" id="{32FD418E-ACA3-4090-96FF-CBAAD989B740}"/>
+                <a16:creationId xmlns="" xmlns:a16="http://schemas.microsoft.com/office/drawing/2014/main" id="{32FD418E-ACA3-4090-96FF-CBAAD989B740}"/>
               </a:ext>
             </a:extLst>
           </p:cNvPr>
@@ -9739,7 +9749,7 @@
           <p:cNvPr id="29" name="Group 38">
             <a:extLst>
               <a:ext uri="{FF2B5EF4-FFF2-40B4-BE49-F238E27FC236}">
-                <a16:creationId xmlns:a16="http://schemas.microsoft.com/office/drawing/2014/main" xmlns="" id="{4FFE457D-83D2-49D0-A0F3-DDFEEA55E2E5}"/>
+                <a16:creationId xmlns="" xmlns:a16="http://schemas.microsoft.com/office/drawing/2014/main" id="{4FFE457D-83D2-49D0-A0F3-DDFEEA55E2E5}"/>
               </a:ext>
             </a:extLst>
           </p:cNvPr>
@@ -9759,7 +9769,7 @@
             <p:cNvPr id="30" name="角丸四角形 21">
               <a:extLst>
                 <a:ext uri="{FF2B5EF4-FFF2-40B4-BE49-F238E27FC236}">
-                  <a16:creationId xmlns:a16="http://schemas.microsoft.com/office/drawing/2014/main" xmlns="" id="{024C5D63-C675-4753-B4EC-F2F06403B347}"/>
+                  <a16:creationId xmlns="" xmlns:a16="http://schemas.microsoft.com/office/drawing/2014/main" id="{024C5D63-C675-4753-B4EC-F2F06403B347}"/>
                 </a:ext>
               </a:extLst>
             </p:cNvPr>
@@ -9904,7 +9914,7 @@
             <p:cNvPr id="31" name="Group 28">
               <a:extLst>
                 <a:ext uri="{FF2B5EF4-FFF2-40B4-BE49-F238E27FC236}">
-                  <a16:creationId xmlns:a16="http://schemas.microsoft.com/office/drawing/2014/main" xmlns="" id="{A5488A5F-252B-4EB8-AA83-97711B5B4618}"/>
+                  <a16:creationId xmlns="" xmlns:a16="http://schemas.microsoft.com/office/drawing/2014/main" id="{A5488A5F-252B-4EB8-AA83-97711B5B4618}"/>
                 </a:ext>
               </a:extLst>
             </p:cNvPr>
@@ -9927,7 +9937,7 @@
               <p:cNvPr id="32" name="Isosceles Triangle 29">
                 <a:extLst>
                   <a:ext uri="{FF2B5EF4-FFF2-40B4-BE49-F238E27FC236}">
-                    <a16:creationId xmlns:a16="http://schemas.microsoft.com/office/drawing/2014/main" xmlns="" id="{AAB48341-E11F-47E0-ADE3-15F5732CB54D}"/>
+                    <a16:creationId xmlns="" xmlns:a16="http://schemas.microsoft.com/office/drawing/2014/main" id="{AAB48341-E11F-47E0-ADE3-15F5732CB54D}"/>
                   </a:ext>
                 </a:extLst>
               </p:cNvPr>
@@ -9993,7 +10003,7 @@
               <p:cNvPr id="33" name="Oval 30">
                 <a:extLst>
                   <a:ext uri="{FF2B5EF4-FFF2-40B4-BE49-F238E27FC236}">
-                    <a16:creationId xmlns:a16="http://schemas.microsoft.com/office/drawing/2014/main" xmlns="" id="{F5DD1807-415C-4F20-87B3-DC9D99DA43B9}"/>
+                    <a16:creationId xmlns="" xmlns:a16="http://schemas.microsoft.com/office/drawing/2014/main" id="{F5DD1807-415C-4F20-87B3-DC9D99DA43B9}"/>
                   </a:ext>
                 </a:extLst>
               </p:cNvPr>
@@ -10057,7 +10067,7 @@
               <p:cNvPr id="34" name="Oval 31">
                 <a:extLst>
                   <a:ext uri="{FF2B5EF4-FFF2-40B4-BE49-F238E27FC236}">
-                    <a16:creationId xmlns:a16="http://schemas.microsoft.com/office/drawing/2014/main" xmlns="" id="{ABEA0394-2BF9-4967-9823-22C32CCD88DA}"/>
+                    <a16:creationId xmlns="" xmlns:a16="http://schemas.microsoft.com/office/drawing/2014/main" id="{ABEA0394-2BF9-4967-9823-22C32CCD88DA}"/>
                   </a:ext>
                 </a:extLst>
               </p:cNvPr>
@@ -10121,7 +10131,7 @@
               <p:cNvPr id="35" name="Oval 32">
                 <a:extLst>
                   <a:ext uri="{FF2B5EF4-FFF2-40B4-BE49-F238E27FC236}">
-                    <a16:creationId xmlns:a16="http://schemas.microsoft.com/office/drawing/2014/main" xmlns="" id="{B86A9EA5-24F9-4D3F-AB41-726B8B8B7C20}"/>
+                    <a16:creationId xmlns="" xmlns:a16="http://schemas.microsoft.com/office/drawing/2014/main" id="{B86A9EA5-24F9-4D3F-AB41-726B8B8B7C20}"/>
                   </a:ext>
                 </a:extLst>
               </p:cNvPr>
@@ -10187,7 +10197,7 @@
           <p:cNvPr id="36" name="Down Arrow 40">
             <a:extLst>
               <a:ext uri="{FF2B5EF4-FFF2-40B4-BE49-F238E27FC236}">
-                <a16:creationId xmlns:a16="http://schemas.microsoft.com/office/drawing/2014/main" xmlns="" id="{0FE59E28-4CBD-4783-85B2-324EB3670127}"/>
+                <a16:creationId xmlns="" xmlns:a16="http://schemas.microsoft.com/office/drawing/2014/main" id="{0FE59E28-4CBD-4783-85B2-324EB3670127}"/>
               </a:ext>
             </a:extLst>
           </p:cNvPr>
@@ -10247,7 +10257,7 @@
           <p:cNvPr id="37" name="Down Arrow 40">
             <a:extLst>
               <a:ext uri="{FF2B5EF4-FFF2-40B4-BE49-F238E27FC236}">
-                <a16:creationId xmlns:a16="http://schemas.microsoft.com/office/drawing/2014/main" xmlns="" id="{A0B76F1B-01A8-4996-9734-5669198AA028}"/>
+                <a16:creationId xmlns="" xmlns:a16="http://schemas.microsoft.com/office/drawing/2014/main" id="{A0B76F1B-01A8-4996-9734-5669198AA028}"/>
               </a:ext>
             </a:extLst>
           </p:cNvPr>
@@ -10307,7 +10317,7 @@
           <p:cNvPr id="26" name="四角形: 角を丸くする 25">
             <a:extLst>
               <a:ext uri="{FF2B5EF4-FFF2-40B4-BE49-F238E27FC236}">
-                <a16:creationId xmlns:a16="http://schemas.microsoft.com/office/drawing/2014/main" xmlns="" id="{3676A255-5FE7-4450-8438-735526CBA567}"/>
+                <a16:creationId xmlns="" xmlns:a16="http://schemas.microsoft.com/office/drawing/2014/main" id="{3676A255-5FE7-4450-8438-735526CBA567}"/>
               </a:ext>
             </a:extLst>
           </p:cNvPr>
@@ -10376,7 +10386,7 @@
           <p:cNvPr id="27" name="四角形: 角を丸くする 26">
             <a:extLst>
               <a:ext uri="{FF2B5EF4-FFF2-40B4-BE49-F238E27FC236}">
-                <a16:creationId xmlns:a16="http://schemas.microsoft.com/office/drawing/2014/main" xmlns="" id="{6E7B91DA-21A4-46C0-8EDC-6AB81EDC472A}"/>
+                <a16:creationId xmlns="" xmlns:a16="http://schemas.microsoft.com/office/drawing/2014/main" id="{6E7B91DA-21A4-46C0-8EDC-6AB81EDC472A}"/>
               </a:ext>
             </a:extLst>
           </p:cNvPr>
@@ -10425,12 +10435,12 @@
           <a:p>
             <a:pPr algn="ctr"/>
             <a:r>
-              <a:rPr lang="en-US" altLang="ja-JP" sz="1600" b="1" dirty="0">
+              <a:rPr lang="en-US" altLang="ja-JP" sz="1600" b="1" dirty="0" smtClean="0">
                 <a:solidFill>
                   <a:schemeClr val="tx1"/>
                 </a:solidFill>
               </a:rPr>
-              <a:t>Server</a:t>
+              <a:t>Servient</a:t>
             </a:r>
             <a:endParaRPr kumimoji="1" lang="en-US" altLang="ja-JP" sz="1600" b="1" dirty="0">
               <a:solidFill>
@@ -10445,7 +10455,7 @@
           <p:cNvPr id="28" name="四角形: 角を丸くする 27">
             <a:extLst>
               <a:ext uri="{FF2B5EF4-FFF2-40B4-BE49-F238E27FC236}">
-                <a16:creationId xmlns:a16="http://schemas.microsoft.com/office/drawing/2014/main" xmlns="" id="{CCBB7A6D-AA8C-432A-8CB0-517B0E87F413}"/>
+                <a16:creationId xmlns="" xmlns:a16="http://schemas.microsoft.com/office/drawing/2014/main" id="{CCBB7A6D-AA8C-432A-8CB0-517B0E87F413}"/>
               </a:ext>
             </a:extLst>
           </p:cNvPr>
@@ -10499,7 +10509,7 @@
           <p:cNvPr id="38" name="Group 38">
             <a:extLst>
               <a:ext uri="{FF2B5EF4-FFF2-40B4-BE49-F238E27FC236}">
-                <a16:creationId xmlns:a16="http://schemas.microsoft.com/office/drawing/2014/main" xmlns="" id="{54623AD8-AF8C-4B9D-9CD4-E46C4DC17924}"/>
+                <a16:creationId xmlns="" xmlns:a16="http://schemas.microsoft.com/office/drawing/2014/main" id="{54623AD8-AF8C-4B9D-9CD4-E46C4DC17924}"/>
               </a:ext>
             </a:extLst>
           </p:cNvPr>
@@ -10519,7 +10529,7 @@
             <p:cNvPr id="39" name="角丸四角形 21">
               <a:extLst>
                 <a:ext uri="{FF2B5EF4-FFF2-40B4-BE49-F238E27FC236}">
-                  <a16:creationId xmlns:a16="http://schemas.microsoft.com/office/drawing/2014/main" xmlns="" id="{251184E1-0CB2-4BB6-AE73-DD14D204793D}"/>
+                  <a16:creationId xmlns="" xmlns:a16="http://schemas.microsoft.com/office/drawing/2014/main" id="{251184E1-0CB2-4BB6-AE73-DD14D204793D}"/>
                 </a:ext>
               </a:extLst>
             </p:cNvPr>
@@ -10681,7 +10691,7 @@
             <p:cNvPr id="40" name="Group 28">
               <a:extLst>
                 <a:ext uri="{FF2B5EF4-FFF2-40B4-BE49-F238E27FC236}">
-                  <a16:creationId xmlns:a16="http://schemas.microsoft.com/office/drawing/2014/main" xmlns="" id="{D0B59A3B-B44C-447F-88A9-466AC134ABCA}"/>
+                  <a16:creationId xmlns="" xmlns:a16="http://schemas.microsoft.com/office/drawing/2014/main" id="{D0B59A3B-B44C-447F-88A9-466AC134ABCA}"/>
                 </a:ext>
               </a:extLst>
             </p:cNvPr>
@@ -10704,7 +10714,7 @@
               <p:cNvPr id="41" name="Isosceles Triangle 29">
                 <a:extLst>
                   <a:ext uri="{FF2B5EF4-FFF2-40B4-BE49-F238E27FC236}">
-                    <a16:creationId xmlns:a16="http://schemas.microsoft.com/office/drawing/2014/main" xmlns="" id="{3D763714-5949-41F5-A62E-CB2678077A5E}"/>
+                    <a16:creationId xmlns="" xmlns:a16="http://schemas.microsoft.com/office/drawing/2014/main" id="{3D763714-5949-41F5-A62E-CB2678077A5E}"/>
                   </a:ext>
                 </a:extLst>
               </p:cNvPr>
@@ -10770,7 +10780,7 @@
               <p:cNvPr id="42" name="Oval 30">
                 <a:extLst>
                   <a:ext uri="{FF2B5EF4-FFF2-40B4-BE49-F238E27FC236}">
-                    <a16:creationId xmlns:a16="http://schemas.microsoft.com/office/drawing/2014/main" xmlns="" id="{C024B941-B597-4400-9C8C-5888A8514B95}"/>
+                    <a16:creationId xmlns="" xmlns:a16="http://schemas.microsoft.com/office/drawing/2014/main" id="{C024B941-B597-4400-9C8C-5888A8514B95}"/>
                   </a:ext>
                 </a:extLst>
               </p:cNvPr>
@@ -10834,7 +10844,7 @@
               <p:cNvPr id="43" name="Oval 31">
                 <a:extLst>
                   <a:ext uri="{FF2B5EF4-FFF2-40B4-BE49-F238E27FC236}">
-                    <a16:creationId xmlns:a16="http://schemas.microsoft.com/office/drawing/2014/main" xmlns="" id="{79654117-6FBA-44EE-9721-7B436910B0E8}"/>
+                    <a16:creationId xmlns="" xmlns:a16="http://schemas.microsoft.com/office/drawing/2014/main" id="{79654117-6FBA-44EE-9721-7B436910B0E8}"/>
                   </a:ext>
                 </a:extLst>
               </p:cNvPr>
@@ -10898,7 +10908,7 @@
               <p:cNvPr id="44" name="Oval 32">
                 <a:extLst>
                   <a:ext uri="{FF2B5EF4-FFF2-40B4-BE49-F238E27FC236}">
-                    <a16:creationId xmlns:a16="http://schemas.microsoft.com/office/drawing/2014/main" xmlns="" id="{0FD77DD4-B4C6-4322-867A-28B9A3761A9F}"/>
+                    <a16:creationId xmlns="" xmlns:a16="http://schemas.microsoft.com/office/drawing/2014/main" id="{0FD77DD4-B4C6-4322-867A-28B9A3761A9F}"/>
                   </a:ext>
                 </a:extLst>
               </p:cNvPr>
@@ -10964,7 +10974,7 @@
           <p:cNvPr id="45" name="Down Arrow 40">
             <a:extLst>
               <a:ext uri="{FF2B5EF4-FFF2-40B4-BE49-F238E27FC236}">
-                <a16:creationId xmlns:a16="http://schemas.microsoft.com/office/drawing/2014/main" xmlns="" id="{55E81437-DDD4-4CDE-9015-53895EFDCBF2}"/>
+                <a16:creationId xmlns="" xmlns:a16="http://schemas.microsoft.com/office/drawing/2014/main" id="{55E81437-DDD4-4CDE-9015-53895EFDCBF2}"/>
               </a:ext>
             </a:extLst>
           </p:cNvPr>
@@ -11024,7 +11034,7 @@
           <p:cNvPr id="46" name="Down Arrow 40">
             <a:extLst>
               <a:ext uri="{FF2B5EF4-FFF2-40B4-BE49-F238E27FC236}">
-                <a16:creationId xmlns:a16="http://schemas.microsoft.com/office/drawing/2014/main" xmlns="" id="{57518CB0-38ED-4231-8DC7-1F71028AF7E6}"/>
+                <a16:creationId xmlns="" xmlns:a16="http://schemas.microsoft.com/office/drawing/2014/main" id="{57518CB0-38ED-4231-8DC7-1F71028AF7E6}"/>
               </a:ext>
             </a:extLst>
           </p:cNvPr>
@@ -11084,7 +11094,7 @@
           <p:cNvPr id="47" name="Gerade Verbindung mit Pfeil 42">
             <a:extLst>
               <a:ext uri="{FF2B5EF4-FFF2-40B4-BE49-F238E27FC236}">
-                <a16:creationId xmlns:a16="http://schemas.microsoft.com/office/drawing/2014/main" xmlns="" id="{4C549D1D-6490-46C6-A0DB-A197E4E7AF27}"/>
+                <a16:creationId xmlns="" xmlns:a16="http://schemas.microsoft.com/office/drawing/2014/main" id="{4C549D1D-6490-46C6-A0DB-A197E4E7AF27}"/>
               </a:ext>
             </a:extLst>
           </p:cNvPr>
@@ -11132,7 +11142,7 @@
           <p:cNvPr id="49" name="テキスト ボックス 48">
             <a:extLst>
               <a:ext uri="{FF2B5EF4-FFF2-40B4-BE49-F238E27FC236}">
-                <a16:creationId xmlns:a16="http://schemas.microsoft.com/office/drawing/2014/main" xmlns="" id="{14334150-8563-43EE-9179-42A0B31BB43F}"/>
+                <a16:creationId xmlns="" xmlns:a16="http://schemas.microsoft.com/office/drawing/2014/main" id="{14334150-8563-43EE-9179-42A0B31BB43F}"/>
               </a:ext>
             </a:extLst>
           </p:cNvPr>
@@ -11141,8 +11151,8 @@
         </p:nvSpPr>
         <p:spPr>
           <a:xfrm>
-            <a:off x="5855823" y="2836438"/>
-            <a:ext cx="645369" cy="338554"/>
+            <a:off x="5526048" y="2836438"/>
+            <a:ext cx="1266822" cy="338554"/>
           </a:xfrm>
           <a:prstGeom prst="rect">
             <a:avLst/>
@@ -11157,8 +11167,82 @@
           <a:p>
             <a:pPr algn="ctr"/>
             <a:r>
-              <a:rPr kumimoji="1" lang="en-US" altLang="ja-JP" sz="1600" dirty="0"/>
-              <a:t>Proxy</a:t>
+              <a:rPr kumimoji="1" lang="en-US" altLang="ja-JP" sz="1600" dirty="0" smtClean="0"/>
+              <a:t>Intermediary</a:t>
+            </a:r>
+            <a:endParaRPr kumimoji="1" lang="ja-JP" altLang="en-US" sz="1600" dirty="0"/>
+          </a:p>
+        </p:txBody>
+      </p:sp>
+      <p:sp>
+        <p:nvSpPr>
+          <p:cNvPr id="48" name="テキスト ボックス 48">
+            <a:extLst>
+              <a:ext uri="{FF2B5EF4-FFF2-40B4-BE49-F238E27FC236}">
+                <a16:creationId xmlns="" xmlns:a16="http://schemas.microsoft.com/office/drawing/2014/main" id="{14334150-8563-43EE-9179-42A0B31BB43F}"/>
+              </a:ext>
+            </a:extLst>
+          </p:cNvPr>
+          <p:cNvSpPr txBox="1"/>
+          <p:nvPr/>
+        </p:nvSpPr>
+        <p:spPr>
+          <a:xfrm>
+            <a:off x="10375553" y="2836195"/>
+            <a:ext cx="641522" cy="338554"/>
+          </a:xfrm>
+          <a:prstGeom prst="rect">
+            <a:avLst/>
+          </a:prstGeom>
+          <a:noFill/>
+        </p:spPr>
+        <p:txBody>
+          <a:bodyPr wrap="none" rtlCol="0">
+            <a:spAutoFit/>
+          </a:bodyPr>
+          <a:lstStyle/>
+          <a:p>
+            <a:pPr algn="ctr"/>
+            <a:r>
+              <a:rPr kumimoji="1" lang="en-US" altLang="ja-JP" sz="1600" dirty="0" smtClean="0"/>
+              <a:t>Thing</a:t>
+            </a:r>
+            <a:endParaRPr kumimoji="1" lang="ja-JP" altLang="en-US" sz="1600" dirty="0"/>
+          </a:p>
+        </p:txBody>
+      </p:sp>
+      <p:sp>
+        <p:nvSpPr>
+          <p:cNvPr id="50" name="テキスト ボックス 48">
+            <a:extLst>
+              <a:ext uri="{FF2B5EF4-FFF2-40B4-BE49-F238E27FC236}">
+                <a16:creationId xmlns="" xmlns:a16="http://schemas.microsoft.com/office/drawing/2014/main" id="{14334150-8563-43EE-9179-42A0B31BB43F}"/>
+              </a:ext>
+            </a:extLst>
+          </p:cNvPr>
+          <p:cNvSpPr txBox="1"/>
+          <p:nvPr/>
+        </p:nvSpPr>
+        <p:spPr>
+          <a:xfrm>
+            <a:off x="1018551" y="2836195"/>
+            <a:ext cx="1035861" cy="338554"/>
+          </a:xfrm>
+          <a:prstGeom prst="rect">
+            <a:avLst/>
+          </a:prstGeom>
+          <a:noFill/>
+        </p:spPr>
+        <p:txBody>
+          <a:bodyPr wrap="none" rtlCol="0">
+            <a:spAutoFit/>
+          </a:bodyPr>
+          <a:lstStyle/>
+          <a:p>
+            <a:pPr algn="ctr"/>
+            <a:r>
+              <a:rPr kumimoji="1" lang="en-US" altLang="ja-JP" sz="1600" dirty="0" smtClean="0"/>
+              <a:t>Consumer</a:t>
             </a:r>
             <a:endParaRPr kumimoji="1" lang="ja-JP" altLang="en-US" sz="1600" dirty="0"/>
           </a:p>
@@ -11199,7 +11283,7 @@
           <p:cNvPr id="8" name="四角形: 角を丸くする 7">
             <a:extLst>
               <a:ext uri="{FF2B5EF4-FFF2-40B4-BE49-F238E27FC236}">
-                <a16:creationId xmlns:a16="http://schemas.microsoft.com/office/drawing/2014/main" xmlns="" id="{A4B36517-6546-4324-B602-66920A143647}"/>
+                <a16:creationId xmlns="" xmlns:a16="http://schemas.microsoft.com/office/drawing/2014/main" id="{A4B36517-6546-4324-B602-66920A143647}"/>
               </a:ext>
             </a:extLst>
           </p:cNvPr>
@@ -11268,7 +11352,7 @@
           <p:cNvPr id="9" name="四角形: 角を丸くする 8">
             <a:extLst>
               <a:ext uri="{FF2B5EF4-FFF2-40B4-BE49-F238E27FC236}">
-                <a16:creationId xmlns:a16="http://schemas.microsoft.com/office/drawing/2014/main" xmlns="" id="{478343BE-306E-4657-841B-17ACD2762DA9}"/>
+                <a16:creationId xmlns="" xmlns:a16="http://schemas.microsoft.com/office/drawing/2014/main" id="{478343BE-306E-4657-841B-17ACD2762DA9}"/>
               </a:ext>
             </a:extLst>
           </p:cNvPr>
@@ -11322,7 +11406,7 @@
           <p:cNvPr id="10" name="四角形: 角を丸くする 9">
             <a:extLst>
               <a:ext uri="{FF2B5EF4-FFF2-40B4-BE49-F238E27FC236}">
-                <a16:creationId xmlns:a16="http://schemas.microsoft.com/office/drawing/2014/main" xmlns="" id="{7F7394D1-AB71-4F83-88CF-0D70AEA90BB3}"/>
+                <a16:creationId xmlns="" xmlns:a16="http://schemas.microsoft.com/office/drawing/2014/main" id="{7F7394D1-AB71-4F83-88CF-0D70AEA90BB3}"/>
               </a:ext>
             </a:extLst>
           </p:cNvPr>
@@ -11380,7 +11464,7 @@
           <p:cNvPr id="13" name="四角形: 角を丸くする 12">
             <a:extLst>
               <a:ext uri="{FF2B5EF4-FFF2-40B4-BE49-F238E27FC236}">
-                <a16:creationId xmlns:a16="http://schemas.microsoft.com/office/drawing/2014/main" xmlns="" id="{B5CD2B9F-227C-466A-9DC6-760504E532C1}"/>
+                <a16:creationId xmlns="" xmlns:a16="http://schemas.microsoft.com/office/drawing/2014/main" id="{B5CD2B9F-227C-466A-9DC6-760504E532C1}"/>
               </a:ext>
             </a:extLst>
           </p:cNvPr>
@@ -11434,7 +11518,7 @@
           <p:cNvPr id="14" name="四角形: 角を丸くする 13">
             <a:extLst>
               <a:ext uri="{FF2B5EF4-FFF2-40B4-BE49-F238E27FC236}">
-                <a16:creationId xmlns:a16="http://schemas.microsoft.com/office/drawing/2014/main" xmlns="" id="{DAC9719D-BC55-4BAA-827B-3741647E133B}"/>
+                <a16:creationId xmlns="" xmlns:a16="http://schemas.microsoft.com/office/drawing/2014/main" id="{DAC9719D-BC55-4BAA-827B-3741647E133B}"/>
               </a:ext>
             </a:extLst>
           </p:cNvPr>
@@ -11488,7 +11572,7 @@
           <p:cNvPr id="15" name="四角形: メモ 14">
             <a:extLst>
               <a:ext uri="{FF2B5EF4-FFF2-40B4-BE49-F238E27FC236}">
-                <a16:creationId xmlns:a16="http://schemas.microsoft.com/office/drawing/2014/main" xmlns="" id="{B13C0EAD-EA26-4ADA-AFD3-C60E5A7E354F}"/>
+                <a16:creationId xmlns="" xmlns:a16="http://schemas.microsoft.com/office/drawing/2014/main" id="{B13C0EAD-EA26-4ADA-AFD3-C60E5A7E354F}"/>
               </a:ext>
             </a:extLst>
           </p:cNvPr>
@@ -11542,7 +11626,7 @@
           <p:cNvPr id="16" name="テキスト ボックス 15">
             <a:extLst>
               <a:ext uri="{FF2B5EF4-FFF2-40B4-BE49-F238E27FC236}">
-                <a16:creationId xmlns:a16="http://schemas.microsoft.com/office/drawing/2014/main" xmlns="" id="{DF7894EE-1174-4828-B7DF-51B52BE5F642}"/>
+                <a16:creationId xmlns="" xmlns:a16="http://schemas.microsoft.com/office/drawing/2014/main" id="{DF7894EE-1174-4828-B7DF-51B52BE5F642}"/>
               </a:ext>
             </a:extLst>
           </p:cNvPr>
@@ -11586,7 +11670,7 @@
           <p:cNvPr id="17" name="テキスト ボックス 16">
             <a:extLst>
               <a:ext uri="{FF2B5EF4-FFF2-40B4-BE49-F238E27FC236}">
-                <a16:creationId xmlns:a16="http://schemas.microsoft.com/office/drawing/2014/main" xmlns="" id="{0CF33ABF-3C66-435D-B875-AA53D751472E}"/>
+                <a16:creationId xmlns="" xmlns:a16="http://schemas.microsoft.com/office/drawing/2014/main" id="{0CF33ABF-3C66-435D-B875-AA53D751472E}"/>
               </a:ext>
             </a:extLst>
           </p:cNvPr>
@@ -11622,7 +11706,7 @@
           <p:cNvPr id="18" name="テキスト ボックス 17">
             <a:extLst>
               <a:ext uri="{FF2B5EF4-FFF2-40B4-BE49-F238E27FC236}">
-                <a16:creationId xmlns:a16="http://schemas.microsoft.com/office/drawing/2014/main" xmlns="" id="{F4CC1D14-7AA6-41AD-85BC-5B3BD9AC308C}"/>
+                <a16:creationId xmlns="" xmlns:a16="http://schemas.microsoft.com/office/drawing/2014/main" id="{F4CC1D14-7AA6-41AD-85BC-5B3BD9AC308C}"/>
               </a:ext>
             </a:extLst>
           </p:cNvPr>
@@ -11658,7 +11742,7 @@
           <p:cNvPr id="21" name="直線矢印コネクタ 20">
             <a:extLst>
               <a:ext uri="{FF2B5EF4-FFF2-40B4-BE49-F238E27FC236}">
-                <a16:creationId xmlns:a16="http://schemas.microsoft.com/office/drawing/2014/main" xmlns="" id="{36428CDD-CC0D-4876-9F07-F4A6D227D45A}"/>
+                <a16:creationId xmlns="" xmlns:a16="http://schemas.microsoft.com/office/drawing/2014/main" id="{36428CDD-CC0D-4876-9F07-F4A6D227D45A}"/>
               </a:ext>
             </a:extLst>
           </p:cNvPr>
@@ -11703,7 +11787,7 @@
           <p:cNvPr id="26" name="テキスト ボックス 25">
             <a:extLst>
               <a:ext uri="{FF2B5EF4-FFF2-40B4-BE49-F238E27FC236}">
-                <a16:creationId xmlns:a16="http://schemas.microsoft.com/office/drawing/2014/main" xmlns="" id="{BB42CE8E-C759-48E4-BEF3-24B0D640A285}"/>
+                <a16:creationId xmlns="" xmlns:a16="http://schemas.microsoft.com/office/drawing/2014/main" id="{BB42CE8E-C759-48E4-BEF3-24B0D640A285}"/>
               </a:ext>
             </a:extLst>
           </p:cNvPr>
@@ -11740,7 +11824,7 @@
           <p:cNvPr id="27" name="Gerade Verbindung mit Pfeil 42">
             <a:extLst>
               <a:ext uri="{FF2B5EF4-FFF2-40B4-BE49-F238E27FC236}">
-                <a16:creationId xmlns:a16="http://schemas.microsoft.com/office/drawing/2014/main" xmlns="" id="{32FD418E-ACA3-4090-96FF-CBAAD989B740}"/>
+                <a16:creationId xmlns="" xmlns:a16="http://schemas.microsoft.com/office/drawing/2014/main" id="{32FD418E-ACA3-4090-96FF-CBAAD989B740}"/>
               </a:ext>
             </a:extLst>
           </p:cNvPr>
@@ -11786,7 +11870,7 @@
           <p:cNvPr id="38" name="テキスト ボックス 25">
             <a:extLst>
               <a:ext uri="{FF2B5EF4-FFF2-40B4-BE49-F238E27FC236}">
-                <a16:creationId xmlns:a16="http://schemas.microsoft.com/office/drawing/2014/main" xmlns="" id="{BB42CE8E-C759-48E4-BEF3-24B0D640A285}"/>
+                <a16:creationId xmlns="" xmlns:a16="http://schemas.microsoft.com/office/drawing/2014/main" id="{BB42CE8E-C759-48E4-BEF3-24B0D640A285}"/>
               </a:ext>
             </a:extLst>
           </p:cNvPr>
@@ -11853,7 +11937,7 @@
           <p:cNvPr id="6" name="四角形: 角を丸くする 5">
             <a:extLst>
               <a:ext uri="{FF2B5EF4-FFF2-40B4-BE49-F238E27FC236}">
-                <a16:creationId xmlns:a16="http://schemas.microsoft.com/office/drawing/2014/main" xmlns="" id="{E1883DBD-7E83-4F3C-8FC8-563AEB36A257}"/>
+                <a16:creationId xmlns="" xmlns:a16="http://schemas.microsoft.com/office/drawing/2014/main" id="{E1883DBD-7E83-4F3C-8FC8-563AEB36A257}"/>
               </a:ext>
             </a:extLst>
           </p:cNvPr>
@@ -11922,7 +12006,7 @@
           <p:cNvPr id="9" name="四角形: 角を丸くする 8">
             <a:extLst>
               <a:ext uri="{FF2B5EF4-FFF2-40B4-BE49-F238E27FC236}">
-                <a16:creationId xmlns:a16="http://schemas.microsoft.com/office/drawing/2014/main" xmlns="" id="{478343BE-306E-4657-841B-17ACD2762DA9}"/>
+                <a16:creationId xmlns="" xmlns:a16="http://schemas.microsoft.com/office/drawing/2014/main" id="{478343BE-306E-4657-841B-17ACD2762DA9}"/>
               </a:ext>
             </a:extLst>
           </p:cNvPr>
@@ -11976,7 +12060,7 @@
           <p:cNvPr id="13" name="四角形: 角を丸くする 12">
             <a:extLst>
               <a:ext uri="{FF2B5EF4-FFF2-40B4-BE49-F238E27FC236}">
-                <a16:creationId xmlns:a16="http://schemas.microsoft.com/office/drawing/2014/main" xmlns="" id="{B5CD2B9F-227C-466A-9DC6-760504E532C1}"/>
+                <a16:creationId xmlns="" xmlns:a16="http://schemas.microsoft.com/office/drawing/2014/main" id="{B5CD2B9F-227C-466A-9DC6-760504E532C1}"/>
               </a:ext>
             </a:extLst>
           </p:cNvPr>
@@ -12030,7 +12114,7 @@
           <p:cNvPr id="14" name="四角形: 角を丸くする 13">
             <a:extLst>
               <a:ext uri="{FF2B5EF4-FFF2-40B4-BE49-F238E27FC236}">
-                <a16:creationId xmlns:a16="http://schemas.microsoft.com/office/drawing/2014/main" xmlns="" id="{DAC9719D-BC55-4BAA-827B-3741647E133B}"/>
+                <a16:creationId xmlns="" xmlns:a16="http://schemas.microsoft.com/office/drawing/2014/main" id="{DAC9719D-BC55-4BAA-827B-3741647E133B}"/>
               </a:ext>
             </a:extLst>
           </p:cNvPr>
@@ -12084,7 +12168,7 @@
           <p:cNvPr id="15" name="四角形: メモ 14">
             <a:extLst>
               <a:ext uri="{FF2B5EF4-FFF2-40B4-BE49-F238E27FC236}">
-                <a16:creationId xmlns:a16="http://schemas.microsoft.com/office/drawing/2014/main" xmlns="" id="{B13C0EAD-EA26-4ADA-AFD3-C60E5A7E354F}"/>
+                <a16:creationId xmlns="" xmlns:a16="http://schemas.microsoft.com/office/drawing/2014/main" id="{B13C0EAD-EA26-4ADA-AFD3-C60E5A7E354F}"/>
               </a:ext>
             </a:extLst>
           </p:cNvPr>
@@ -12138,7 +12222,7 @@
           <p:cNvPr id="16" name="テキスト ボックス 15">
             <a:extLst>
               <a:ext uri="{FF2B5EF4-FFF2-40B4-BE49-F238E27FC236}">
-                <a16:creationId xmlns:a16="http://schemas.microsoft.com/office/drawing/2014/main" xmlns="" id="{DF7894EE-1174-4828-B7DF-51B52BE5F642}"/>
+                <a16:creationId xmlns="" xmlns:a16="http://schemas.microsoft.com/office/drawing/2014/main" id="{DF7894EE-1174-4828-B7DF-51B52BE5F642}"/>
               </a:ext>
             </a:extLst>
           </p:cNvPr>
@@ -12182,7 +12266,7 @@
           <p:cNvPr id="17" name="テキスト ボックス 16">
             <a:extLst>
               <a:ext uri="{FF2B5EF4-FFF2-40B4-BE49-F238E27FC236}">
-                <a16:creationId xmlns:a16="http://schemas.microsoft.com/office/drawing/2014/main" xmlns="" id="{0CF33ABF-3C66-435D-B875-AA53D751472E}"/>
+                <a16:creationId xmlns="" xmlns:a16="http://schemas.microsoft.com/office/drawing/2014/main" id="{0CF33ABF-3C66-435D-B875-AA53D751472E}"/>
               </a:ext>
             </a:extLst>
           </p:cNvPr>
@@ -12218,7 +12302,7 @@
           <p:cNvPr id="18" name="テキスト ボックス 17">
             <a:extLst>
               <a:ext uri="{FF2B5EF4-FFF2-40B4-BE49-F238E27FC236}">
-                <a16:creationId xmlns:a16="http://schemas.microsoft.com/office/drawing/2014/main" xmlns="" id="{F4CC1D14-7AA6-41AD-85BC-5B3BD9AC308C}"/>
+                <a16:creationId xmlns="" xmlns:a16="http://schemas.microsoft.com/office/drawing/2014/main" id="{F4CC1D14-7AA6-41AD-85BC-5B3BD9AC308C}"/>
               </a:ext>
             </a:extLst>
           </p:cNvPr>
@@ -12254,7 +12338,7 @@
           <p:cNvPr id="21" name="直線矢印コネクタ 20">
             <a:extLst>
               <a:ext uri="{FF2B5EF4-FFF2-40B4-BE49-F238E27FC236}">
-                <a16:creationId xmlns:a16="http://schemas.microsoft.com/office/drawing/2014/main" xmlns="" id="{36428CDD-CC0D-4876-9F07-F4A6D227D45A}"/>
+                <a16:creationId xmlns="" xmlns:a16="http://schemas.microsoft.com/office/drawing/2014/main" id="{36428CDD-CC0D-4876-9F07-F4A6D227D45A}"/>
               </a:ext>
             </a:extLst>
           </p:cNvPr>
@@ -12299,7 +12383,7 @@
           <p:cNvPr id="19" name="四角形: 角を丸くする 18">
             <a:extLst>
               <a:ext uri="{FF2B5EF4-FFF2-40B4-BE49-F238E27FC236}">
-                <a16:creationId xmlns:a16="http://schemas.microsoft.com/office/drawing/2014/main" xmlns="" id="{46146C38-6712-4A36-BEAE-7DD2A922D693}"/>
+                <a16:creationId xmlns="" xmlns:a16="http://schemas.microsoft.com/office/drawing/2014/main" id="{46146C38-6712-4A36-BEAE-7DD2A922D693}"/>
               </a:ext>
             </a:extLst>
           </p:cNvPr>
@@ -12353,7 +12437,7 @@
           <p:cNvPr id="26" name="テキスト ボックス 25">
             <a:extLst>
               <a:ext uri="{FF2B5EF4-FFF2-40B4-BE49-F238E27FC236}">
-                <a16:creationId xmlns:a16="http://schemas.microsoft.com/office/drawing/2014/main" xmlns="" id="{BB42CE8E-C759-48E4-BEF3-24B0D640A285}"/>
+                <a16:creationId xmlns="" xmlns:a16="http://schemas.microsoft.com/office/drawing/2014/main" id="{BB42CE8E-C759-48E4-BEF3-24B0D640A285}"/>
               </a:ext>
             </a:extLst>
           </p:cNvPr>
@@ -12390,7 +12474,7 @@
           <p:cNvPr id="27" name="Gerade Verbindung mit Pfeil 42">
             <a:extLst>
               <a:ext uri="{FF2B5EF4-FFF2-40B4-BE49-F238E27FC236}">
-                <a16:creationId xmlns:a16="http://schemas.microsoft.com/office/drawing/2014/main" xmlns="" id="{32FD418E-ACA3-4090-96FF-CBAAD989B740}"/>
+                <a16:creationId xmlns="" xmlns:a16="http://schemas.microsoft.com/office/drawing/2014/main" id="{32FD418E-ACA3-4090-96FF-CBAAD989B740}"/>
               </a:ext>
             </a:extLst>
           </p:cNvPr>
@@ -12436,7 +12520,7 @@
           <p:cNvPr id="28" name="テキスト ボックス 25">
             <a:extLst>
               <a:ext uri="{FF2B5EF4-FFF2-40B4-BE49-F238E27FC236}">
-                <a16:creationId xmlns:a16="http://schemas.microsoft.com/office/drawing/2014/main" xmlns="" id="{BB42CE8E-C759-48E4-BEF3-24B0D640A285}"/>
+                <a16:creationId xmlns="" xmlns:a16="http://schemas.microsoft.com/office/drawing/2014/main" id="{BB42CE8E-C759-48E4-BEF3-24B0D640A285}"/>
               </a:ext>
             </a:extLst>
           </p:cNvPr>
@@ -12503,7 +12587,7 @@
           <p:cNvPr id="49" name="テキスト ボックス 48">
             <a:extLst>
               <a:ext uri="{FF2B5EF4-FFF2-40B4-BE49-F238E27FC236}">
-                <a16:creationId xmlns:a16="http://schemas.microsoft.com/office/drawing/2014/main" xmlns="" id="{14334150-8563-43EE-9179-42A0B31BB43F}"/>
+                <a16:creationId xmlns="" xmlns:a16="http://schemas.microsoft.com/office/drawing/2014/main" id="{14334150-8563-43EE-9179-42A0B31BB43F}"/>
               </a:ext>
             </a:extLst>
           </p:cNvPr>
@@ -12540,7 +12624,7 @@
           <p:cNvPr id="48" name="四角形: 角を丸くする 5">
             <a:extLst>
               <a:ext uri="{FF2B5EF4-FFF2-40B4-BE49-F238E27FC236}">
-                <a16:creationId xmlns:a16="http://schemas.microsoft.com/office/drawing/2014/main" xmlns="" id="{E1883DBD-7E83-4F3C-8FC8-563AEB36A257}"/>
+                <a16:creationId xmlns="" xmlns:a16="http://schemas.microsoft.com/office/drawing/2014/main" id="{E1883DBD-7E83-4F3C-8FC8-563AEB36A257}"/>
               </a:ext>
             </a:extLst>
           </p:cNvPr>
@@ -12609,7 +12693,7 @@
           <p:cNvPr id="10" name="四角形: 角を丸くする 9">
             <a:extLst>
               <a:ext uri="{FF2B5EF4-FFF2-40B4-BE49-F238E27FC236}">
-                <a16:creationId xmlns:a16="http://schemas.microsoft.com/office/drawing/2014/main" xmlns="" id="{7F7394D1-AB71-4F83-88CF-0D70AEA90BB3}"/>
+                <a16:creationId xmlns="" xmlns:a16="http://schemas.microsoft.com/office/drawing/2014/main" id="{7F7394D1-AB71-4F83-88CF-0D70AEA90BB3}"/>
               </a:ext>
             </a:extLst>
           </p:cNvPr>
@@ -12678,7 +12762,7 @@
           <p:cNvPr id="26" name="四角形: 角を丸くする 25">
             <a:extLst>
               <a:ext uri="{FF2B5EF4-FFF2-40B4-BE49-F238E27FC236}">
-                <a16:creationId xmlns:a16="http://schemas.microsoft.com/office/drawing/2014/main" xmlns="" id="{3676A255-5FE7-4450-8438-735526CBA567}"/>
+                <a16:creationId xmlns="" xmlns:a16="http://schemas.microsoft.com/office/drawing/2014/main" id="{3676A255-5FE7-4450-8438-735526CBA567}"/>
               </a:ext>
             </a:extLst>
           </p:cNvPr>
@@ -12747,7 +12831,7 @@
           <p:cNvPr id="55" name="テキスト ボックス 25">
             <a:extLst>
               <a:ext uri="{FF2B5EF4-FFF2-40B4-BE49-F238E27FC236}">
-                <a16:creationId xmlns:a16="http://schemas.microsoft.com/office/drawing/2014/main" xmlns="" id="{BB42CE8E-C759-48E4-BEF3-24B0D640A285}"/>
+                <a16:creationId xmlns="" xmlns:a16="http://schemas.microsoft.com/office/drawing/2014/main" id="{BB42CE8E-C759-48E4-BEF3-24B0D640A285}"/>
               </a:ext>
             </a:extLst>
           </p:cNvPr>
@@ -12784,7 +12868,7 @@
           <p:cNvPr id="56" name="テキスト ボックス 25">
             <a:extLst>
               <a:ext uri="{FF2B5EF4-FFF2-40B4-BE49-F238E27FC236}">
-                <a16:creationId xmlns:a16="http://schemas.microsoft.com/office/drawing/2014/main" xmlns="" id="{BB42CE8E-C759-48E4-BEF3-24B0D640A285}"/>
+                <a16:creationId xmlns="" xmlns:a16="http://schemas.microsoft.com/office/drawing/2014/main" id="{BB42CE8E-C759-48E4-BEF3-24B0D640A285}"/>
               </a:ext>
             </a:extLst>
           </p:cNvPr>
@@ -12821,7 +12905,7 @@
           <p:cNvPr id="57" name="Gerade Verbindung mit Pfeil 42">
             <a:extLst>
               <a:ext uri="{FF2B5EF4-FFF2-40B4-BE49-F238E27FC236}">
-                <a16:creationId xmlns:a16="http://schemas.microsoft.com/office/drawing/2014/main" xmlns="" id="{32FD418E-ACA3-4090-96FF-CBAAD989B740}"/>
+                <a16:creationId xmlns="" xmlns:a16="http://schemas.microsoft.com/office/drawing/2014/main" id="{32FD418E-ACA3-4090-96FF-CBAAD989B740}"/>
               </a:ext>
             </a:extLst>
           </p:cNvPr>
@@ -12867,7 +12951,7 @@
           <p:cNvPr id="58" name="Gerade Verbindung mit Pfeil 42">
             <a:extLst>
               <a:ext uri="{FF2B5EF4-FFF2-40B4-BE49-F238E27FC236}">
-                <a16:creationId xmlns:a16="http://schemas.microsoft.com/office/drawing/2014/main" xmlns="" id="{32FD418E-ACA3-4090-96FF-CBAAD989B740}"/>
+                <a16:creationId xmlns="" xmlns:a16="http://schemas.microsoft.com/office/drawing/2014/main" id="{32FD418E-ACA3-4090-96FF-CBAAD989B740}"/>
               </a:ext>
             </a:extLst>
           </p:cNvPr>
@@ -12943,7 +13027,7 @@
           <p:cNvPr id="6" name="四角形: 角を丸くする 5">
             <a:extLst>
               <a:ext uri="{FF2B5EF4-FFF2-40B4-BE49-F238E27FC236}">
-                <a16:creationId xmlns:a16="http://schemas.microsoft.com/office/drawing/2014/main" xmlns="" id="{E1883DBD-7E83-4F3C-8FC8-563AEB36A257}"/>
+                <a16:creationId xmlns="" xmlns:a16="http://schemas.microsoft.com/office/drawing/2014/main" id="{E1883DBD-7E83-4F3C-8FC8-563AEB36A257}"/>
               </a:ext>
             </a:extLst>
           </p:cNvPr>
@@ -13023,7 +13107,7 @@
           <p:cNvPr id="7" name="四角形: メモ 6">
             <a:extLst>
               <a:ext uri="{FF2B5EF4-FFF2-40B4-BE49-F238E27FC236}">
-                <a16:creationId xmlns:a16="http://schemas.microsoft.com/office/drawing/2014/main" xmlns="" id="{2D0890EB-64A0-42D9-B745-E7F92B9530F1}"/>
+                <a16:creationId xmlns="" xmlns:a16="http://schemas.microsoft.com/office/drawing/2014/main" id="{2D0890EB-64A0-42D9-B745-E7F92B9530F1}"/>
               </a:ext>
             </a:extLst>
           </p:cNvPr>
@@ -13077,7 +13161,7 @@
           <p:cNvPr id="8" name="四角形: 角を丸くする 7">
             <a:extLst>
               <a:ext uri="{FF2B5EF4-FFF2-40B4-BE49-F238E27FC236}">
-                <a16:creationId xmlns:a16="http://schemas.microsoft.com/office/drawing/2014/main" xmlns="" id="{A4B36517-6546-4324-B602-66920A143647}"/>
+                <a16:creationId xmlns="" xmlns:a16="http://schemas.microsoft.com/office/drawing/2014/main" id="{A4B36517-6546-4324-B602-66920A143647}"/>
               </a:ext>
             </a:extLst>
           </p:cNvPr>
@@ -13157,7 +13241,7 @@
           <p:cNvPr id="9" name="四角形: 角を丸くする 8">
             <a:extLst>
               <a:ext uri="{FF2B5EF4-FFF2-40B4-BE49-F238E27FC236}">
-                <a16:creationId xmlns:a16="http://schemas.microsoft.com/office/drawing/2014/main" xmlns="" id="{478343BE-306E-4657-841B-17ACD2762DA9}"/>
+                <a16:creationId xmlns="" xmlns:a16="http://schemas.microsoft.com/office/drawing/2014/main" id="{478343BE-306E-4657-841B-17ACD2762DA9}"/>
               </a:ext>
             </a:extLst>
           </p:cNvPr>
@@ -13211,7 +13295,7 @@
           <p:cNvPr id="10" name="四角形: 角を丸くする 9">
             <a:extLst>
               <a:ext uri="{FF2B5EF4-FFF2-40B4-BE49-F238E27FC236}">
-                <a16:creationId xmlns:a16="http://schemas.microsoft.com/office/drawing/2014/main" xmlns="" id="{7F7394D1-AB71-4F83-88CF-0D70AEA90BB3}"/>
+                <a16:creationId xmlns="" xmlns:a16="http://schemas.microsoft.com/office/drawing/2014/main" id="{7F7394D1-AB71-4F83-88CF-0D70AEA90BB3}"/>
               </a:ext>
             </a:extLst>
           </p:cNvPr>
@@ -13265,7 +13349,7 @@
           <p:cNvPr id="12" name="直線矢印コネクタ 11">
             <a:extLst>
               <a:ext uri="{FF2B5EF4-FFF2-40B4-BE49-F238E27FC236}">
-                <a16:creationId xmlns:a16="http://schemas.microsoft.com/office/drawing/2014/main" xmlns="" id="{6ECEBF56-DD7D-4150-AFC2-4CC9B5A510E0}"/>
+                <a16:creationId xmlns="" xmlns:a16="http://schemas.microsoft.com/office/drawing/2014/main" id="{6ECEBF56-DD7D-4150-AFC2-4CC9B5A510E0}"/>
               </a:ext>
             </a:extLst>
           </p:cNvPr>
@@ -13308,7 +13392,7 @@
           <p:cNvPr id="13" name="四角形: 角を丸くする 12">
             <a:extLst>
               <a:ext uri="{FF2B5EF4-FFF2-40B4-BE49-F238E27FC236}">
-                <a16:creationId xmlns:a16="http://schemas.microsoft.com/office/drawing/2014/main" xmlns="" id="{B5CD2B9F-227C-466A-9DC6-760504E532C1}"/>
+                <a16:creationId xmlns="" xmlns:a16="http://schemas.microsoft.com/office/drawing/2014/main" id="{B5CD2B9F-227C-466A-9DC6-760504E532C1}"/>
               </a:ext>
             </a:extLst>
           </p:cNvPr>
@@ -13362,7 +13446,7 @@
           <p:cNvPr id="14" name="四角形: 角を丸くする 13">
             <a:extLst>
               <a:ext uri="{FF2B5EF4-FFF2-40B4-BE49-F238E27FC236}">
-                <a16:creationId xmlns:a16="http://schemas.microsoft.com/office/drawing/2014/main" xmlns="" id="{DAC9719D-BC55-4BAA-827B-3741647E133B}"/>
+                <a16:creationId xmlns="" xmlns:a16="http://schemas.microsoft.com/office/drawing/2014/main" id="{DAC9719D-BC55-4BAA-827B-3741647E133B}"/>
               </a:ext>
             </a:extLst>
           </p:cNvPr>
@@ -13416,7 +13500,7 @@
           <p:cNvPr id="15" name="四角形: メモ 14">
             <a:extLst>
               <a:ext uri="{FF2B5EF4-FFF2-40B4-BE49-F238E27FC236}">
-                <a16:creationId xmlns:a16="http://schemas.microsoft.com/office/drawing/2014/main" xmlns="" id="{B13C0EAD-EA26-4ADA-AFD3-C60E5A7E354F}"/>
+                <a16:creationId xmlns="" xmlns:a16="http://schemas.microsoft.com/office/drawing/2014/main" id="{B13C0EAD-EA26-4ADA-AFD3-C60E5A7E354F}"/>
               </a:ext>
             </a:extLst>
           </p:cNvPr>
@@ -13470,7 +13554,7 @@
           <p:cNvPr id="16" name="テキスト ボックス 15">
             <a:extLst>
               <a:ext uri="{FF2B5EF4-FFF2-40B4-BE49-F238E27FC236}">
-                <a16:creationId xmlns:a16="http://schemas.microsoft.com/office/drawing/2014/main" xmlns="" id="{DF7894EE-1174-4828-B7DF-51B52BE5F642}"/>
+                <a16:creationId xmlns="" xmlns:a16="http://schemas.microsoft.com/office/drawing/2014/main" id="{DF7894EE-1174-4828-B7DF-51B52BE5F642}"/>
               </a:ext>
             </a:extLst>
           </p:cNvPr>
@@ -13506,7 +13590,7 @@
           <p:cNvPr id="17" name="テキスト ボックス 16">
             <a:extLst>
               <a:ext uri="{FF2B5EF4-FFF2-40B4-BE49-F238E27FC236}">
-                <a16:creationId xmlns:a16="http://schemas.microsoft.com/office/drawing/2014/main" xmlns="" id="{0CF33ABF-3C66-435D-B875-AA53D751472E}"/>
+                <a16:creationId xmlns="" xmlns:a16="http://schemas.microsoft.com/office/drawing/2014/main" id="{0CF33ABF-3C66-435D-B875-AA53D751472E}"/>
               </a:ext>
             </a:extLst>
           </p:cNvPr>
@@ -13542,7 +13626,7 @@
           <p:cNvPr id="18" name="テキスト ボックス 17">
             <a:extLst>
               <a:ext uri="{FF2B5EF4-FFF2-40B4-BE49-F238E27FC236}">
-                <a16:creationId xmlns:a16="http://schemas.microsoft.com/office/drawing/2014/main" xmlns="" id="{F4CC1D14-7AA6-41AD-85BC-5B3BD9AC308C}"/>
+                <a16:creationId xmlns="" xmlns:a16="http://schemas.microsoft.com/office/drawing/2014/main" id="{F4CC1D14-7AA6-41AD-85BC-5B3BD9AC308C}"/>
               </a:ext>
             </a:extLst>
           </p:cNvPr>
@@ -13578,7 +13662,7 @@
           <p:cNvPr id="20" name="直線矢印コネクタ 19">
             <a:extLst>
               <a:ext uri="{FF2B5EF4-FFF2-40B4-BE49-F238E27FC236}">
-                <a16:creationId xmlns:a16="http://schemas.microsoft.com/office/drawing/2014/main" xmlns="" id="{9E56DD88-5F22-4648-9215-023E80EB63DB}"/>
+                <a16:creationId xmlns="" xmlns:a16="http://schemas.microsoft.com/office/drawing/2014/main" id="{9E56DD88-5F22-4648-9215-023E80EB63DB}"/>
               </a:ext>
             </a:extLst>
           </p:cNvPr>
@@ -13621,7 +13705,7 @@
           <p:cNvPr id="21" name="直線矢印コネクタ 20">
             <a:extLst>
               <a:ext uri="{FF2B5EF4-FFF2-40B4-BE49-F238E27FC236}">
-                <a16:creationId xmlns:a16="http://schemas.microsoft.com/office/drawing/2014/main" xmlns="" id="{36428CDD-CC0D-4876-9F07-F4A6D227D45A}"/>
+                <a16:creationId xmlns="" xmlns:a16="http://schemas.microsoft.com/office/drawing/2014/main" id="{36428CDD-CC0D-4876-9F07-F4A6D227D45A}"/>
               </a:ext>
             </a:extLst>
           </p:cNvPr>
@@ -13696,7 +13780,7 @@
           <p:cNvPr id="6" name="四角形: 角を丸くする 5">
             <a:extLst>
               <a:ext uri="{FF2B5EF4-FFF2-40B4-BE49-F238E27FC236}">
-                <a16:creationId xmlns:a16="http://schemas.microsoft.com/office/drawing/2014/main" xmlns="" id="{E1883DBD-7E83-4F3C-8FC8-563AEB36A257}"/>
+                <a16:creationId xmlns="" xmlns:a16="http://schemas.microsoft.com/office/drawing/2014/main" id="{E1883DBD-7E83-4F3C-8FC8-563AEB36A257}"/>
               </a:ext>
             </a:extLst>
           </p:cNvPr>
@@ -13760,7 +13844,7 @@
           <p:cNvPr id="7" name="四角形: メモ 6">
             <a:extLst>
               <a:ext uri="{FF2B5EF4-FFF2-40B4-BE49-F238E27FC236}">
-                <a16:creationId xmlns:a16="http://schemas.microsoft.com/office/drawing/2014/main" xmlns="" id="{2D0890EB-64A0-42D9-B745-E7F92B9530F1}"/>
+                <a16:creationId xmlns="" xmlns:a16="http://schemas.microsoft.com/office/drawing/2014/main" id="{2D0890EB-64A0-42D9-B745-E7F92B9530F1}"/>
               </a:ext>
             </a:extLst>
           </p:cNvPr>
@@ -13814,7 +13898,7 @@
           <p:cNvPr id="8" name="四角形: 角を丸くする 7">
             <a:extLst>
               <a:ext uri="{FF2B5EF4-FFF2-40B4-BE49-F238E27FC236}">
-                <a16:creationId xmlns:a16="http://schemas.microsoft.com/office/drawing/2014/main" xmlns="" id="{A4B36517-6546-4324-B602-66920A143647}"/>
+                <a16:creationId xmlns="" xmlns:a16="http://schemas.microsoft.com/office/drawing/2014/main" id="{A4B36517-6546-4324-B602-66920A143647}"/>
               </a:ext>
             </a:extLst>
           </p:cNvPr>
@@ -13878,7 +13962,7 @@
           <p:cNvPr id="9" name="四角形: 角を丸くする 8">
             <a:extLst>
               <a:ext uri="{FF2B5EF4-FFF2-40B4-BE49-F238E27FC236}">
-                <a16:creationId xmlns:a16="http://schemas.microsoft.com/office/drawing/2014/main" xmlns="" id="{478343BE-306E-4657-841B-17ACD2762DA9}"/>
+                <a16:creationId xmlns="" xmlns:a16="http://schemas.microsoft.com/office/drawing/2014/main" id="{478343BE-306E-4657-841B-17ACD2762DA9}"/>
               </a:ext>
             </a:extLst>
           </p:cNvPr>
@@ -13932,7 +14016,7 @@
           <p:cNvPr id="10" name="四角形: 角を丸くする 9">
             <a:extLst>
               <a:ext uri="{FF2B5EF4-FFF2-40B4-BE49-F238E27FC236}">
-                <a16:creationId xmlns:a16="http://schemas.microsoft.com/office/drawing/2014/main" xmlns="" id="{7F7394D1-AB71-4F83-88CF-0D70AEA90BB3}"/>
+                <a16:creationId xmlns="" xmlns:a16="http://schemas.microsoft.com/office/drawing/2014/main" id="{7F7394D1-AB71-4F83-88CF-0D70AEA90BB3}"/>
               </a:ext>
             </a:extLst>
           </p:cNvPr>
@@ -13986,7 +14070,7 @@
           <p:cNvPr id="12" name="直線矢印コネクタ 11">
             <a:extLst>
               <a:ext uri="{FF2B5EF4-FFF2-40B4-BE49-F238E27FC236}">
-                <a16:creationId xmlns:a16="http://schemas.microsoft.com/office/drawing/2014/main" xmlns="" id="{6ECEBF56-DD7D-4150-AFC2-4CC9B5A510E0}"/>
+                <a16:creationId xmlns="" xmlns:a16="http://schemas.microsoft.com/office/drawing/2014/main" id="{6ECEBF56-DD7D-4150-AFC2-4CC9B5A510E0}"/>
               </a:ext>
             </a:extLst>
           </p:cNvPr>
@@ -14029,7 +14113,7 @@
           <p:cNvPr id="13" name="四角形: 角を丸くする 12">
             <a:extLst>
               <a:ext uri="{FF2B5EF4-FFF2-40B4-BE49-F238E27FC236}">
-                <a16:creationId xmlns:a16="http://schemas.microsoft.com/office/drawing/2014/main" xmlns="" id="{B5CD2B9F-227C-466A-9DC6-760504E532C1}"/>
+                <a16:creationId xmlns="" xmlns:a16="http://schemas.microsoft.com/office/drawing/2014/main" id="{B5CD2B9F-227C-466A-9DC6-760504E532C1}"/>
               </a:ext>
             </a:extLst>
           </p:cNvPr>
@@ -14083,7 +14167,7 @@
           <p:cNvPr id="14" name="四角形: 角を丸くする 13">
             <a:extLst>
               <a:ext uri="{FF2B5EF4-FFF2-40B4-BE49-F238E27FC236}">
-                <a16:creationId xmlns:a16="http://schemas.microsoft.com/office/drawing/2014/main" xmlns="" id="{DAC9719D-BC55-4BAA-827B-3741647E133B}"/>
+                <a16:creationId xmlns="" xmlns:a16="http://schemas.microsoft.com/office/drawing/2014/main" id="{DAC9719D-BC55-4BAA-827B-3741647E133B}"/>
               </a:ext>
             </a:extLst>
           </p:cNvPr>
@@ -14137,7 +14221,7 @@
           <p:cNvPr id="15" name="四角形: メモ 14">
             <a:extLst>
               <a:ext uri="{FF2B5EF4-FFF2-40B4-BE49-F238E27FC236}">
-                <a16:creationId xmlns:a16="http://schemas.microsoft.com/office/drawing/2014/main" xmlns="" id="{B13C0EAD-EA26-4ADA-AFD3-C60E5A7E354F}"/>
+                <a16:creationId xmlns="" xmlns:a16="http://schemas.microsoft.com/office/drawing/2014/main" id="{B13C0EAD-EA26-4ADA-AFD3-C60E5A7E354F}"/>
               </a:ext>
             </a:extLst>
           </p:cNvPr>
@@ -14191,7 +14275,7 @@
           <p:cNvPr id="16" name="テキスト ボックス 15">
             <a:extLst>
               <a:ext uri="{FF2B5EF4-FFF2-40B4-BE49-F238E27FC236}">
-                <a16:creationId xmlns:a16="http://schemas.microsoft.com/office/drawing/2014/main" xmlns="" id="{DF7894EE-1174-4828-B7DF-51B52BE5F642}"/>
+                <a16:creationId xmlns="" xmlns:a16="http://schemas.microsoft.com/office/drawing/2014/main" id="{DF7894EE-1174-4828-B7DF-51B52BE5F642}"/>
               </a:ext>
             </a:extLst>
           </p:cNvPr>
@@ -14235,7 +14319,7 @@
           <p:cNvPr id="17" name="テキスト ボックス 16">
             <a:extLst>
               <a:ext uri="{FF2B5EF4-FFF2-40B4-BE49-F238E27FC236}">
-                <a16:creationId xmlns:a16="http://schemas.microsoft.com/office/drawing/2014/main" xmlns="" id="{0CF33ABF-3C66-435D-B875-AA53D751472E}"/>
+                <a16:creationId xmlns="" xmlns:a16="http://schemas.microsoft.com/office/drawing/2014/main" id="{0CF33ABF-3C66-435D-B875-AA53D751472E}"/>
               </a:ext>
             </a:extLst>
           </p:cNvPr>
@@ -14271,7 +14355,7 @@
           <p:cNvPr id="18" name="テキスト ボックス 17">
             <a:extLst>
               <a:ext uri="{FF2B5EF4-FFF2-40B4-BE49-F238E27FC236}">
-                <a16:creationId xmlns:a16="http://schemas.microsoft.com/office/drawing/2014/main" xmlns="" id="{F4CC1D14-7AA6-41AD-85BC-5B3BD9AC308C}"/>
+                <a16:creationId xmlns="" xmlns:a16="http://schemas.microsoft.com/office/drawing/2014/main" id="{F4CC1D14-7AA6-41AD-85BC-5B3BD9AC308C}"/>
               </a:ext>
             </a:extLst>
           </p:cNvPr>
@@ -14307,7 +14391,7 @@
           <p:cNvPr id="20" name="直線矢印コネクタ 19">
             <a:extLst>
               <a:ext uri="{FF2B5EF4-FFF2-40B4-BE49-F238E27FC236}">
-                <a16:creationId xmlns:a16="http://schemas.microsoft.com/office/drawing/2014/main" xmlns="" id="{9E56DD88-5F22-4648-9215-023E80EB63DB}"/>
+                <a16:creationId xmlns="" xmlns:a16="http://schemas.microsoft.com/office/drawing/2014/main" id="{9E56DD88-5F22-4648-9215-023E80EB63DB}"/>
               </a:ext>
             </a:extLst>
           </p:cNvPr>
@@ -14350,7 +14434,7 @@
           <p:cNvPr id="21" name="直線矢印コネクタ 20">
             <a:extLst>
               <a:ext uri="{FF2B5EF4-FFF2-40B4-BE49-F238E27FC236}">
-                <a16:creationId xmlns:a16="http://schemas.microsoft.com/office/drawing/2014/main" xmlns="" id="{36428CDD-CC0D-4876-9F07-F4A6D227D45A}"/>
+                <a16:creationId xmlns="" xmlns:a16="http://schemas.microsoft.com/office/drawing/2014/main" id="{36428CDD-CC0D-4876-9F07-F4A6D227D45A}"/>
               </a:ext>
             </a:extLst>
           </p:cNvPr>
@@ -14425,7 +14509,7 @@
           <p:cNvPr id="54" name="正方形/長方形 53">
             <a:extLst>
               <a:ext uri="{FF2B5EF4-FFF2-40B4-BE49-F238E27FC236}">
-                <a16:creationId xmlns:a16="http://schemas.microsoft.com/office/drawing/2014/main" xmlns="" id="{5A8F7A9F-7BD7-4D28-A9D3-88016DE35CBB}"/>
+                <a16:creationId xmlns="" xmlns:a16="http://schemas.microsoft.com/office/drawing/2014/main" id="{5A8F7A9F-7BD7-4D28-A9D3-88016DE35CBB}"/>
               </a:ext>
             </a:extLst>
           </p:cNvPr>
@@ -14477,7 +14561,7 @@
           <p:cNvPr id="6" name="四角形: 角を丸くする 5">
             <a:extLst>
               <a:ext uri="{FF2B5EF4-FFF2-40B4-BE49-F238E27FC236}">
-                <a16:creationId xmlns:a16="http://schemas.microsoft.com/office/drawing/2014/main" xmlns="" id="{E1883DBD-7E83-4F3C-8FC8-563AEB36A257}"/>
+                <a16:creationId xmlns="" xmlns:a16="http://schemas.microsoft.com/office/drawing/2014/main" id="{E1883DBD-7E83-4F3C-8FC8-563AEB36A257}"/>
               </a:ext>
             </a:extLst>
           </p:cNvPr>
@@ -14541,7 +14625,7 @@
           <p:cNvPr id="8" name="四角形: 角を丸くする 7">
             <a:extLst>
               <a:ext uri="{FF2B5EF4-FFF2-40B4-BE49-F238E27FC236}">
-                <a16:creationId xmlns:a16="http://schemas.microsoft.com/office/drawing/2014/main" xmlns="" id="{A4B36517-6546-4324-B602-66920A143647}"/>
+                <a16:creationId xmlns="" xmlns:a16="http://schemas.microsoft.com/office/drawing/2014/main" id="{A4B36517-6546-4324-B602-66920A143647}"/>
               </a:ext>
             </a:extLst>
           </p:cNvPr>
@@ -14605,7 +14689,7 @@
           <p:cNvPr id="9" name="四角形: 角を丸くする 8">
             <a:extLst>
               <a:ext uri="{FF2B5EF4-FFF2-40B4-BE49-F238E27FC236}">
-                <a16:creationId xmlns:a16="http://schemas.microsoft.com/office/drawing/2014/main" xmlns="" id="{478343BE-306E-4657-841B-17ACD2762DA9}"/>
+                <a16:creationId xmlns="" xmlns:a16="http://schemas.microsoft.com/office/drawing/2014/main" id="{478343BE-306E-4657-841B-17ACD2762DA9}"/>
               </a:ext>
             </a:extLst>
           </p:cNvPr>
@@ -14659,7 +14743,7 @@
           <p:cNvPr id="10" name="四角形: 角を丸くする 9">
             <a:extLst>
               <a:ext uri="{FF2B5EF4-FFF2-40B4-BE49-F238E27FC236}">
-                <a16:creationId xmlns:a16="http://schemas.microsoft.com/office/drawing/2014/main" xmlns="" id="{7F7394D1-AB71-4F83-88CF-0D70AEA90BB3}"/>
+                <a16:creationId xmlns="" xmlns:a16="http://schemas.microsoft.com/office/drawing/2014/main" id="{7F7394D1-AB71-4F83-88CF-0D70AEA90BB3}"/>
               </a:ext>
             </a:extLst>
           </p:cNvPr>
@@ -14713,7 +14797,7 @@
           <p:cNvPr id="13" name="四角形: 角を丸くする 12">
             <a:extLst>
               <a:ext uri="{FF2B5EF4-FFF2-40B4-BE49-F238E27FC236}">
-                <a16:creationId xmlns:a16="http://schemas.microsoft.com/office/drawing/2014/main" xmlns="" id="{B5CD2B9F-227C-466A-9DC6-760504E532C1}"/>
+                <a16:creationId xmlns="" xmlns:a16="http://schemas.microsoft.com/office/drawing/2014/main" id="{B5CD2B9F-227C-466A-9DC6-760504E532C1}"/>
               </a:ext>
             </a:extLst>
           </p:cNvPr>
@@ -14767,7 +14851,7 @@
           <p:cNvPr id="14" name="四角形: 角を丸くする 13">
             <a:extLst>
               <a:ext uri="{FF2B5EF4-FFF2-40B4-BE49-F238E27FC236}">
-                <a16:creationId xmlns:a16="http://schemas.microsoft.com/office/drawing/2014/main" xmlns="" id="{DAC9719D-BC55-4BAA-827B-3741647E133B}"/>
+                <a16:creationId xmlns="" xmlns:a16="http://schemas.microsoft.com/office/drawing/2014/main" id="{DAC9719D-BC55-4BAA-827B-3741647E133B}"/>
               </a:ext>
             </a:extLst>
           </p:cNvPr>
@@ -14821,7 +14905,7 @@
           <p:cNvPr id="15" name="四角形: メモ 14">
             <a:extLst>
               <a:ext uri="{FF2B5EF4-FFF2-40B4-BE49-F238E27FC236}">
-                <a16:creationId xmlns:a16="http://schemas.microsoft.com/office/drawing/2014/main" xmlns="" id="{B13C0EAD-EA26-4ADA-AFD3-C60E5A7E354F}"/>
+                <a16:creationId xmlns="" xmlns:a16="http://schemas.microsoft.com/office/drawing/2014/main" id="{B13C0EAD-EA26-4ADA-AFD3-C60E5A7E354F}"/>
               </a:ext>
             </a:extLst>
           </p:cNvPr>
@@ -14875,7 +14959,7 @@
           <p:cNvPr id="16" name="テキスト ボックス 15">
             <a:extLst>
               <a:ext uri="{FF2B5EF4-FFF2-40B4-BE49-F238E27FC236}">
-                <a16:creationId xmlns:a16="http://schemas.microsoft.com/office/drawing/2014/main" xmlns="" id="{DF7894EE-1174-4828-B7DF-51B52BE5F642}"/>
+                <a16:creationId xmlns="" xmlns:a16="http://schemas.microsoft.com/office/drawing/2014/main" id="{DF7894EE-1174-4828-B7DF-51B52BE5F642}"/>
               </a:ext>
             </a:extLst>
           </p:cNvPr>
@@ -14919,7 +15003,7 @@
           <p:cNvPr id="17" name="テキスト ボックス 16">
             <a:extLst>
               <a:ext uri="{FF2B5EF4-FFF2-40B4-BE49-F238E27FC236}">
-                <a16:creationId xmlns:a16="http://schemas.microsoft.com/office/drawing/2014/main" xmlns="" id="{0CF33ABF-3C66-435D-B875-AA53D751472E}"/>
+                <a16:creationId xmlns="" xmlns:a16="http://schemas.microsoft.com/office/drawing/2014/main" id="{0CF33ABF-3C66-435D-B875-AA53D751472E}"/>
               </a:ext>
             </a:extLst>
           </p:cNvPr>
@@ -14955,7 +15039,7 @@
           <p:cNvPr id="18" name="テキスト ボックス 17">
             <a:extLst>
               <a:ext uri="{FF2B5EF4-FFF2-40B4-BE49-F238E27FC236}">
-                <a16:creationId xmlns:a16="http://schemas.microsoft.com/office/drawing/2014/main" xmlns="" id="{F4CC1D14-7AA6-41AD-85BC-5B3BD9AC308C}"/>
+                <a16:creationId xmlns="" xmlns:a16="http://schemas.microsoft.com/office/drawing/2014/main" id="{F4CC1D14-7AA6-41AD-85BC-5B3BD9AC308C}"/>
               </a:ext>
             </a:extLst>
           </p:cNvPr>
@@ -14991,7 +15075,7 @@
           <p:cNvPr id="21" name="直線矢印コネクタ 20">
             <a:extLst>
               <a:ext uri="{FF2B5EF4-FFF2-40B4-BE49-F238E27FC236}">
-                <a16:creationId xmlns:a16="http://schemas.microsoft.com/office/drawing/2014/main" xmlns="" id="{36428CDD-CC0D-4876-9F07-F4A6D227D45A}"/>
+                <a16:creationId xmlns="" xmlns:a16="http://schemas.microsoft.com/office/drawing/2014/main" id="{36428CDD-CC0D-4876-9F07-F4A6D227D45A}"/>
               </a:ext>
             </a:extLst>
           </p:cNvPr>
@@ -15036,7 +15120,7 @@
           <p:cNvPr id="19" name="四角形: 角を丸くする 18">
             <a:extLst>
               <a:ext uri="{FF2B5EF4-FFF2-40B4-BE49-F238E27FC236}">
-                <a16:creationId xmlns:a16="http://schemas.microsoft.com/office/drawing/2014/main" xmlns="" id="{46146C38-6712-4A36-BEAE-7DD2A922D693}"/>
+                <a16:creationId xmlns="" xmlns:a16="http://schemas.microsoft.com/office/drawing/2014/main" id="{46146C38-6712-4A36-BEAE-7DD2A922D693}"/>
               </a:ext>
             </a:extLst>
           </p:cNvPr>
@@ -15090,7 +15174,7 @@
           <p:cNvPr id="25" name="Gerade Verbindung mit Pfeil 42">
             <a:extLst>
               <a:ext uri="{FF2B5EF4-FFF2-40B4-BE49-F238E27FC236}">
-                <a16:creationId xmlns:a16="http://schemas.microsoft.com/office/drawing/2014/main" xmlns="" id="{32FD418E-ACA3-4090-96FF-CBAAD989B740}"/>
+                <a16:creationId xmlns="" xmlns:a16="http://schemas.microsoft.com/office/drawing/2014/main" id="{32FD418E-ACA3-4090-96FF-CBAAD989B740}"/>
               </a:ext>
             </a:extLst>
           </p:cNvPr>
@@ -15137,7 +15221,7 @@
           <p:cNvPr id="29" name="Group 38">
             <a:extLst>
               <a:ext uri="{FF2B5EF4-FFF2-40B4-BE49-F238E27FC236}">
-                <a16:creationId xmlns:a16="http://schemas.microsoft.com/office/drawing/2014/main" xmlns="" id="{4FFE457D-83D2-49D0-A0F3-DDFEEA55E2E5}"/>
+                <a16:creationId xmlns="" xmlns:a16="http://schemas.microsoft.com/office/drawing/2014/main" id="{4FFE457D-83D2-49D0-A0F3-DDFEEA55E2E5}"/>
               </a:ext>
             </a:extLst>
           </p:cNvPr>
@@ -15157,7 +15241,7 @@
             <p:cNvPr id="30" name="角丸四角形 21">
               <a:extLst>
                 <a:ext uri="{FF2B5EF4-FFF2-40B4-BE49-F238E27FC236}">
-                  <a16:creationId xmlns:a16="http://schemas.microsoft.com/office/drawing/2014/main" xmlns="" id="{024C5D63-C675-4753-B4EC-F2F06403B347}"/>
+                  <a16:creationId xmlns="" xmlns:a16="http://schemas.microsoft.com/office/drawing/2014/main" id="{024C5D63-C675-4753-B4EC-F2F06403B347}"/>
                 </a:ext>
               </a:extLst>
             </p:cNvPr>
@@ -15285,7 +15369,7 @@
             <p:cNvPr id="31" name="Group 28">
               <a:extLst>
                 <a:ext uri="{FF2B5EF4-FFF2-40B4-BE49-F238E27FC236}">
-                  <a16:creationId xmlns:a16="http://schemas.microsoft.com/office/drawing/2014/main" xmlns="" id="{A5488A5F-252B-4EB8-AA83-97711B5B4618}"/>
+                  <a16:creationId xmlns="" xmlns:a16="http://schemas.microsoft.com/office/drawing/2014/main" id="{A5488A5F-252B-4EB8-AA83-97711B5B4618}"/>
                 </a:ext>
               </a:extLst>
             </p:cNvPr>
@@ -15308,7 +15392,7 @@
               <p:cNvPr id="32" name="Isosceles Triangle 29">
                 <a:extLst>
                   <a:ext uri="{FF2B5EF4-FFF2-40B4-BE49-F238E27FC236}">
-                    <a16:creationId xmlns:a16="http://schemas.microsoft.com/office/drawing/2014/main" xmlns="" id="{AAB48341-E11F-47E0-ADE3-15F5732CB54D}"/>
+                    <a16:creationId xmlns="" xmlns:a16="http://schemas.microsoft.com/office/drawing/2014/main" id="{AAB48341-E11F-47E0-ADE3-15F5732CB54D}"/>
                   </a:ext>
                 </a:extLst>
               </p:cNvPr>
@@ -15374,7 +15458,7 @@
               <p:cNvPr id="33" name="Oval 30">
                 <a:extLst>
                   <a:ext uri="{FF2B5EF4-FFF2-40B4-BE49-F238E27FC236}">
-                    <a16:creationId xmlns:a16="http://schemas.microsoft.com/office/drawing/2014/main" xmlns="" id="{F5DD1807-415C-4F20-87B3-DC9D99DA43B9}"/>
+                    <a16:creationId xmlns="" xmlns:a16="http://schemas.microsoft.com/office/drawing/2014/main" id="{F5DD1807-415C-4F20-87B3-DC9D99DA43B9}"/>
                   </a:ext>
                 </a:extLst>
               </p:cNvPr>
@@ -15438,7 +15522,7 @@
               <p:cNvPr id="34" name="Oval 31">
                 <a:extLst>
                   <a:ext uri="{FF2B5EF4-FFF2-40B4-BE49-F238E27FC236}">
-                    <a16:creationId xmlns:a16="http://schemas.microsoft.com/office/drawing/2014/main" xmlns="" id="{ABEA0394-2BF9-4967-9823-22C32CCD88DA}"/>
+                    <a16:creationId xmlns="" xmlns:a16="http://schemas.microsoft.com/office/drawing/2014/main" id="{ABEA0394-2BF9-4967-9823-22C32CCD88DA}"/>
                   </a:ext>
                 </a:extLst>
               </p:cNvPr>
@@ -15502,7 +15586,7 @@
               <p:cNvPr id="35" name="Oval 32">
                 <a:extLst>
                   <a:ext uri="{FF2B5EF4-FFF2-40B4-BE49-F238E27FC236}">
-                    <a16:creationId xmlns:a16="http://schemas.microsoft.com/office/drawing/2014/main" xmlns="" id="{B86A9EA5-24F9-4D3F-AB41-726B8B8B7C20}"/>
+                    <a16:creationId xmlns="" xmlns:a16="http://schemas.microsoft.com/office/drawing/2014/main" id="{B86A9EA5-24F9-4D3F-AB41-726B8B8B7C20}"/>
                   </a:ext>
                 </a:extLst>
               </p:cNvPr>
@@ -15568,7 +15652,7 @@
           <p:cNvPr id="36" name="Down Arrow 40">
             <a:extLst>
               <a:ext uri="{FF2B5EF4-FFF2-40B4-BE49-F238E27FC236}">
-                <a16:creationId xmlns:a16="http://schemas.microsoft.com/office/drawing/2014/main" xmlns="" id="{0FE59E28-4CBD-4783-85B2-324EB3670127}"/>
+                <a16:creationId xmlns="" xmlns:a16="http://schemas.microsoft.com/office/drawing/2014/main" id="{0FE59E28-4CBD-4783-85B2-324EB3670127}"/>
               </a:ext>
             </a:extLst>
           </p:cNvPr>
@@ -15628,7 +15712,7 @@
           <p:cNvPr id="37" name="Down Arrow 40">
             <a:extLst>
               <a:ext uri="{FF2B5EF4-FFF2-40B4-BE49-F238E27FC236}">
-                <a16:creationId xmlns:a16="http://schemas.microsoft.com/office/drawing/2014/main" xmlns="" id="{A0B76F1B-01A8-4996-9734-5669198AA028}"/>
+                <a16:creationId xmlns="" xmlns:a16="http://schemas.microsoft.com/office/drawing/2014/main" id="{A0B76F1B-01A8-4996-9734-5669198AA028}"/>
               </a:ext>
             </a:extLst>
           </p:cNvPr>
@@ -15718,7 +15802,7 @@
           <p:cNvPr id="54" name="正方形/長方形 53">
             <a:extLst>
               <a:ext uri="{FF2B5EF4-FFF2-40B4-BE49-F238E27FC236}">
-                <a16:creationId xmlns:a16="http://schemas.microsoft.com/office/drawing/2014/main" xmlns="" id="{5A8F7A9F-7BD7-4D28-A9D3-88016DE35CBB}"/>
+                <a16:creationId xmlns="" xmlns:a16="http://schemas.microsoft.com/office/drawing/2014/main" id="{5A8F7A9F-7BD7-4D28-A9D3-88016DE35CBB}"/>
               </a:ext>
             </a:extLst>
           </p:cNvPr>
@@ -15770,7 +15854,7 @@
           <p:cNvPr id="6" name="四角形: 角を丸くする 5">
             <a:extLst>
               <a:ext uri="{FF2B5EF4-FFF2-40B4-BE49-F238E27FC236}">
-                <a16:creationId xmlns:a16="http://schemas.microsoft.com/office/drawing/2014/main" xmlns="" id="{E1883DBD-7E83-4F3C-8FC8-563AEB36A257}"/>
+                <a16:creationId xmlns="" xmlns:a16="http://schemas.microsoft.com/office/drawing/2014/main" id="{E1883DBD-7E83-4F3C-8FC8-563AEB36A257}"/>
               </a:ext>
             </a:extLst>
           </p:cNvPr>
@@ -15834,7 +15918,7 @@
           <p:cNvPr id="8" name="四角形: 角を丸くする 7">
             <a:extLst>
               <a:ext uri="{FF2B5EF4-FFF2-40B4-BE49-F238E27FC236}">
-                <a16:creationId xmlns:a16="http://schemas.microsoft.com/office/drawing/2014/main" xmlns="" id="{A4B36517-6546-4324-B602-66920A143647}"/>
+                <a16:creationId xmlns="" xmlns:a16="http://schemas.microsoft.com/office/drawing/2014/main" id="{A4B36517-6546-4324-B602-66920A143647}"/>
               </a:ext>
             </a:extLst>
           </p:cNvPr>
@@ -15898,7 +15982,7 @@
           <p:cNvPr id="9" name="四角形: 角を丸くする 8">
             <a:extLst>
               <a:ext uri="{FF2B5EF4-FFF2-40B4-BE49-F238E27FC236}">
-                <a16:creationId xmlns:a16="http://schemas.microsoft.com/office/drawing/2014/main" xmlns="" id="{478343BE-306E-4657-841B-17ACD2762DA9}"/>
+                <a16:creationId xmlns="" xmlns:a16="http://schemas.microsoft.com/office/drawing/2014/main" id="{478343BE-306E-4657-841B-17ACD2762DA9}"/>
               </a:ext>
             </a:extLst>
           </p:cNvPr>
@@ -15952,7 +16036,7 @@
           <p:cNvPr id="10" name="四角形: 角を丸くする 9">
             <a:extLst>
               <a:ext uri="{FF2B5EF4-FFF2-40B4-BE49-F238E27FC236}">
-                <a16:creationId xmlns:a16="http://schemas.microsoft.com/office/drawing/2014/main" xmlns="" id="{7F7394D1-AB71-4F83-88CF-0D70AEA90BB3}"/>
+                <a16:creationId xmlns="" xmlns:a16="http://schemas.microsoft.com/office/drawing/2014/main" id="{7F7394D1-AB71-4F83-88CF-0D70AEA90BB3}"/>
               </a:ext>
             </a:extLst>
           </p:cNvPr>
@@ -16006,7 +16090,7 @@
           <p:cNvPr id="13" name="四角形: 角を丸くする 12">
             <a:extLst>
               <a:ext uri="{FF2B5EF4-FFF2-40B4-BE49-F238E27FC236}">
-                <a16:creationId xmlns:a16="http://schemas.microsoft.com/office/drawing/2014/main" xmlns="" id="{B5CD2B9F-227C-466A-9DC6-760504E532C1}"/>
+                <a16:creationId xmlns="" xmlns:a16="http://schemas.microsoft.com/office/drawing/2014/main" id="{B5CD2B9F-227C-466A-9DC6-760504E532C1}"/>
               </a:ext>
             </a:extLst>
           </p:cNvPr>
@@ -16060,7 +16144,7 @@
           <p:cNvPr id="14" name="四角形: 角を丸くする 13">
             <a:extLst>
               <a:ext uri="{FF2B5EF4-FFF2-40B4-BE49-F238E27FC236}">
-                <a16:creationId xmlns:a16="http://schemas.microsoft.com/office/drawing/2014/main" xmlns="" id="{DAC9719D-BC55-4BAA-827B-3741647E133B}"/>
+                <a16:creationId xmlns="" xmlns:a16="http://schemas.microsoft.com/office/drawing/2014/main" id="{DAC9719D-BC55-4BAA-827B-3741647E133B}"/>
               </a:ext>
             </a:extLst>
           </p:cNvPr>
@@ -16114,7 +16198,7 @@
           <p:cNvPr id="15" name="四角形: メモ 14">
             <a:extLst>
               <a:ext uri="{FF2B5EF4-FFF2-40B4-BE49-F238E27FC236}">
-                <a16:creationId xmlns:a16="http://schemas.microsoft.com/office/drawing/2014/main" xmlns="" id="{B13C0EAD-EA26-4ADA-AFD3-C60E5A7E354F}"/>
+                <a16:creationId xmlns="" xmlns:a16="http://schemas.microsoft.com/office/drawing/2014/main" id="{B13C0EAD-EA26-4ADA-AFD3-C60E5A7E354F}"/>
               </a:ext>
             </a:extLst>
           </p:cNvPr>
@@ -16168,7 +16252,7 @@
           <p:cNvPr id="16" name="テキスト ボックス 15">
             <a:extLst>
               <a:ext uri="{FF2B5EF4-FFF2-40B4-BE49-F238E27FC236}">
-                <a16:creationId xmlns:a16="http://schemas.microsoft.com/office/drawing/2014/main" xmlns="" id="{DF7894EE-1174-4828-B7DF-51B52BE5F642}"/>
+                <a16:creationId xmlns="" xmlns:a16="http://schemas.microsoft.com/office/drawing/2014/main" id="{DF7894EE-1174-4828-B7DF-51B52BE5F642}"/>
               </a:ext>
             </a:extLst>
           </p:cNvPr>
@@ -16212,7 +16296,7 @@
           <p:cNvPr id="17" name="テキスト ボックス 16">
             <a:extLst>
               <a:ext uri="{FF2B5EF4-FFF2-40B4-BE49-F238E27FC236}">
-                <a16:creationId xmlns:a16="http://schemas.microsoft.com/office/drawing/2014/main" xmlns="" id="{0CF33ABF-3C66-435D-B875-AA53D751472E}"/>
+                <a16:creationId xmlns="" xmlns:a16="http://schemas.microsoft.com/office/drawing/2014/main" id="{0CF33ABF-3C66-435D-B875-AA53D751472E}"/>
               </a:ext>
             </a:extLst>
           </p:cNvPr>
@@ -16248,7 +16332,7 @@
           <p:cNvPr id="18" name="テキスト ボックス 17">
             <a:extLst>
               <a:ext uri="{FF2B5EF4-FFF2-40B4-BE49-F238E27FC236}">
-                <a16:creationId xmlns:a16="http://schemas.microsoft.com/office/drawing/2014/main" xmlns="" id="{F4CC1D14-7AA6-41AD-85BC-5B3BD9AC308C}"/>
+                <a16:creationId xmlns="" xmlns:a16="http://schemas.microsoft.com/office/drawing/2014/main" id="{F4CC1D14-7AA6-41AD-85BC-5B3BD9AC308C}"/>
               </a:ext>
             </a:extLst>
           </p:cNvPr>
@@ -16284,7 +16368,7 @@
           <p:cNvPr id="21" name="直線矢印コネクタ 20">
             <a:extLst>
               <a:ext uri="{FF2B5EF4-FFF2-40B4-BE49-F238E27FC236}">
-                <a16:creationId xmlns:a16="http://schemas.microsoft.com/office/drawing/2014/main" xmlns="" id="{36428CDD-CC0D-4876-9F07-F4A6D227D45A}"/>
+                <a16:creationId xmlns="" xmlns:a16="http://schemas.microsoft.com/office/drawing/2014/main" id="{36428CDD-CC0D-4876-9F07-F4A6D227D45A}"/>
               </a:ext>
             </a:extLst>
           </p:cNvPr>
@@ -16329,7 +16413,7 @@
           <p:cNvPr id="19" name="四角形: 角を丸くする 18">
             <a:extLst>
               <a:ext uri="{FF2B5EF4-FFF2-40B4-BE49-F238E27FC236}">
-                <a16:creationId xmlns:a16="http://schemas.microsoft.com/office/drawing/2014/main" xmlns="" id="{46146C38-6712-4A36-BEAE-7DD2A922D693}"/>
+                <a16:creationId xmlns="" xmlns:a16="http://schemas.microsoft.com/office/drawing/2014/main" id="{46146C38-6712-4A36-BEAE-7DD2A922D693}"/>
               </a:ext>
             </a:extLst>
           </p:cNvPr>
@@ -16383,7 +16467,7 @@
           <p:cNvPr id="25" name="Gerade Verbindung mit Pfeil 42">
             <a:extLst>
               <a:ext uri="{FF2B5EF4-FFF2-40B4-BE49-F238E27FC236}">
-                <a16:creationId xmlns:a16="http://schemas.microsoft.com/office/drawing/2014/main" xmlns="" id="{32FD418E-ACA3-4090-96FF-CBAAD989B740}"/>
+                <a16:creationId xmlns="" xmlns:a16="http://schemas.microsoft.com/office/drawing/2014/main" id="{32FD418E-ACA3-4090-96FF-CBAAD989B740}"/>
               </a:ext>
             </a:extLst>
           </p:cNvPr>
@@ -16430,7 +16514,7 @@
           <p:cNvPr id="29" name="Group 38">
             <a:extLst>
               <a:ext uri="{FF2B5EF4-FFF2-40B4-BE49-F238E27FC236}">
-                <a16:creationId xmlns:a16="http://schemas.microsoft.com/office/drawing/2014/main" xmlns="" id="{4FFE457D-83D2-49D0-A0F3-DDFEEA55E2E5}"/>
+                <a16:creationId xmlns="" xmlns:a16="http://schemas.microsoft.com/office/drawing/2014/main" id="{4FFE457D-83D2-49D0-A0F3-DDFEEA55E2E5}"/>
               </a:ext>
             </a:extLst>
           </p:cNvPr>
@@ -16450,7 +16534,7 @@
             <p:cNvPr id="30" name="角丸四角形 21">
               <a:extLst>
                 <a:ext uri="{FF2B5EF4-FFF2-40B4-BE49-F238E27FC236}">
-                  <a16:creationId xmlns:a16="http://schemas.microsoft.com/office/drawing/2014/main" xmlns="" id="{024C5D63-C675-4753-B4EC-F2F06403B347}"/>
+                  <a16:creationId xmlns="" xmlns:a16="http://schemas.microsoft.com/office/drawing/2014/main" id="{024C5D63-C675-4753-B4EC-F2F06403B347}"/>
                 </a:ext>
               </a:extLst>
             </p:cNvPr>
@@ -16595,7 +16679,7 @@
             <p:cNvPr id="31" name="Group 28">
               <a:extLst>
                 <a:ext uri="{FF2B5EF4-FFF2-40B4-BE49-F238E27FC236}">
-                  <a16:creationId xmlns:a16="http://schemas.microsoft.com/office/drawing/2014/main" xmlns="" id="{A5488A5F-252B-4EB8-AA83-97711B5B4618}"/>
+                  <a16:creationId xmlns="" xmlns:a16="http://schemas.microsoft.com/office/drawing/2014/main" id="{A5488A5F-252B-4EB8-AA83-97711B5B4618}"/>
                 </a:ext>
               </a:extLst>
             </p:cNvPr>
@@ -16618,7 +16702,7 @@
               <p:cNvPr id="32" name="Isosceles Triangle 29">
                 <a:extLst>
                   <a:ext uri="{FF2B5EF4-FFF2-40B4-BE49-F238E27FC236}">
-                    <a16:creationId xmlns:a16="http://schemas.microsoft.com/office/drawing/2014/main" xmlns="" id="{AAB48341-E11F-47E0-ADE3-15F5732CB54D}"/>
+                    <a16:creationId xmlns="" xmlns:a16="http://schemas.microsoft.com/office/drawing/2014/main" id="{AAB48341-E11F-47E0-ADE3-15F5732CB54D}"/>
                   </a:ext>
                 </a:extLst>
               </p:cNvPr>
@@ -16684,7 +16768,7 @@
               <p:cNvPr id="33" name="Oval 30">
                 <a:extLst>
                   <a:ext uri="{FF2B5EF4-FFF2-40B4-BE49-F238E27FC236}">
-                    <a16:creationId xmlns:a16="http://schemas.microsoft.com/office/drawing/2014/main" xmlns="" id="{F5DD1807-415C-4F20-87B3-DC9D99DA43B9}"/>
+                    <a16:creationId xmlns="" xmlns:a16="http://schemas.microsoft.com/office/drawing/2014/main" id="{F5DD1807-415C-4F20-87B3-DC9D99DA43B9}"/>
                   </a:ext>
                 </a:extLst>
               </p:cNvPr>
@@ -16748,7 +16832,7 @@
               <p:cNvPr id="34" name="Oval 31">
                 <a:extLst>
                   <a:ext uri="{FF2B5EF4-FFF2-40B4-BE49-F238E27FC236}">
-                    <a16:creationId xmlns:a16="http://schemas.microsoft.com/office/drawing/2014/main" xmlns="" id="{ABEA0394-2BF9-4967-9823-22C32CCD88DA}"/>
+                    <a16:creationId xmlns="" xmlns:a16="http://schemas.microsoft.com/office/drawing/2014/main" id="{ABEA0394-2BF9-4967-9823-22C32CCD88DA}"/>
                   </a:ext>
                 </a:extLst>
               </p:cNvPr>
@@ -16812,7 +16896,7 @@
               <p:cNvPr id="35" name="Oval 32">
                 <a:extLst>
                   <a:ext uri="{FF2B5EF4-FFF2-40B4-BE49-F238E27FC236}">
-                    <a16:creationId xmlns:a16="http://schemas.microsoft.com/office/drawing/2014/main" xmlns="" id="{B86A9EA5-24F9-4D3F-AB41-726B8B8B7C20}"/>
+                    <a16:creationId xmlns="" xmlns:a16="http://schemas.microsoft.com/office/drawing/2014/main" id="{B86A9EA5-24F9-4D3F-AB41-726B8B8B7C20}"/>
                   </a:ext>
                 </a:extLst>
               </p:cNvPr>
@@ -16878,7 +16962,7 @@
           <p:cNvPr id="36" name="Down Arrow 40">
             <a:extLst>
               <a:ext uri="{FF2B5EF4-FFF2-40B4-BE49-F238E27FC236}">
-                <a16:creationId xmlns:a16="http://schemas.microsoft.com/office/drawing/2014/main" xmlns="" id="{0FE59E28-4CBD-4783-85B2-324EB3670127}"/>
+                <a16:creationId xmlns="" xmlns:a16="http://schemas.microsoft.com/office/drawing/2014/main" id="{0FE59E28-4CBD-4783-85B2-324EB3670127}"/>
               </a:ext>
             </a:extLst>
           </p:cNvPr>
@@ -16938,7 +17022,7 @@
           <p:cNvPr id="37" name="Down Arrow 40">
             <a:extLst>
               <a:ext uri="{FF2B5EF4-FFF2-40B4-BE49-F238E27FC236}">
-                <a16:creationId xmlns:a16="http://schemas.microsoft.com/office/drawing/2014/main" xmlns="" id="{A0B76F1B-01A8-4996-9734-5669198AA028}"/>
+                <a16:creationId xmlns="" xmlns:a16="http://schemas.microsoft.com/office/drawing/2014/main" id="{A0B76F1B-01A8-4996-9734-5669198AA028}"/>
               </a:ext>
             </a:extLst>
           </p:cNvPr>
@@ -16998,7 +17082,7 @@
           <p:cNvPr id="2" name="テキスト ボックス 1">
             <a:extLst>
               <a:ext uri="{FF2B5EF4-FFF2-40B4-BE49-F238E27FC236}">
-                <a16:creationId xmlns:a16="http://schemas.microsoft.com/office/drawing/2014/main" xmlns="" id="{346B3C90-78F0-4665-966F-E68235C5672F}"/>
+                <a16:creationId xmlns="" xmlns:a16="http://schemas.microsoft.com/office/drawing/2014/main" id="{346B3C90-78F0-4665-966F-E68235C5672F}"/>
               </a:ext>
             </a:extLst>
           </p:cNvPr>
@@ -17035,7 +17119,7 @@
           <p:cNvPr id="26" name="テキスト ボックス 25">
             <a:extLst>
               <a:ext uri="{FF2B5EF4-FFF2-40B4-BE49-F238E27FC236}">
-                <a16:creationId xmlns:a16="http://schemas.microsoft.com/office/drawing/2014/main" xmlns="" id="{BB42CE8E-C759-48E4-BEF3-24B0D640A285}"/>
+                <a16:creationId xmlns="" xmlns:a16="http://schemas.microsoft.com/office/drawing/2014/main" id="{BB42CE8E-C759-48E4-BEF3-24B0D640A285}"/>
               </a:ext>
             </a:extLst>
           </p:cNvPr>
@@ -17102,7 +17186,7 @@
           <p:cNvPr id="54" name="正方形/長方形 53">
             <a:extLst>
               <a:ext uri="{FF2B5EF4-FFF2-40B4-BE49-F238E27FC236}">
-                <a16:creationId xmlns:a16="http://schemas.microsoft.com/office/drawing/2014/main" xmlns="" id="{5A8F7A9F-7BD7-4D28-A9D3-88016DE35CBB}"/>
+                <a16:creationId xmlns="" xmlns:a16="http://schemas.microsoft.com/office/drawing/2014/main" id="{5A8F7A9F-7BD7-4D28-A9D3-88016DE35CBB}"/>
               </a:ext>
             </a:extLst>
           </p:cNvPr>
@@ -17154,7 +17238,7 @@
           <p:cNvPr id="6" name="四角形: 角を丸くする 5">
             <a:extLst>
               <a:ext uri="{FF2B5EF4-FFF2-40B4-BE49-F238E27FC236}">
-                <a16:creationId xmlns:a16="http://schemas.microsoft.com/office/drawing/2014/main" xmlns="" id="{E1883DBD-7E83-4F3C-8FC8-563AEB36A257}"/>
+                <a16:creationId xmlns="" xmlns:a16="http://schemas.microsoft.com/office/drawing/2014/main" id="{E1883DBD-7E83-4F3C-8FC8-563AEB36A257}"/>
               </a:ext>
             </a:extLst>
           </p:cNvPr>
@@ -17203,13 +17287,18 @@
           <a:p>
             <a:pPr algn="ctr"/>
             <a:r>
-              <a:rPr kumimoji="1" lang="en-US" altLang="ja-JP" sz="2400" b="1" dirty="0">
+              <a:rPr kumimoji="1" lang="en-US" altLang="ja-JP" sz="2400" b="1" dirty="0" smtClean="0">
                 <a:solidFill>
                   <a:schemeClr val="tx1"/>
                 </a:solidFill>
               </a:rPr>
-              <a:t>Client</a:t>
-            </a:r>
+              <a:t>Servient</a:t>
+            </a:r>
+            <a:endParaRPr kumimoji="1" lang="en-US" altLang="ja-JP" sz="2400" b="1" dirty="0">
+              <a:solidFill>
+                <a:schemeClr val="tx1"/>
+              </a:solidFill>
+            </a:endParaRPr>
           </a:p>
         </p:txBody>
       </p:sp>
@@ -17218,7 +17307,7 @@
           <p:cNvPr id="8" name="四角形: 角を丸くする 7">
             <a:extLst>
               <a:ext uri="{FF2B5EF4-FFF2-40B4-BE49-F238E27FC236}">
-                <a16:creationId xmlns:a16="http://schemas.microsoft.com/office/drawing/2014/main" xmlns="" id="{A4B36517-6546-4324-B602-66920A143647}"/>
+                <a16:creationId xmlns="" xmlns:a16="http://schemas.microsoft.com/office/drawing/2014/main" id="{A4B36517-6546-4324-B602-66920A143647}"/>
               </a:ext>
             </a:extLst>
           </p:cNvPr>
@@ -17267,13 +17356,18 @@
           <a:p>
             <a:pPr algn="ctr"/>
             <a:r>
-              <a:rPr kumimoji="1" lang="en-US" altLang="ja-JP" sz="2400" b="1" dirty="0">
+              <a:rPr kumimoji="1" lang="en-US" altLang="ja-JP" sz="2400" b="1" dirty="0" smtClean="0">
                 <a:solidFill>
                   <a:schemeClr val="tx1"/>
                 </a:solidFill>
               </a:rPr>
-              <a:t>Server</a:t>
-            </a:r>
+              <a:t>Servient</a:t>
+            </a:r>
+            <a:endParaRPr kumimoji="1" lang="en-US" altLang="ja-JP" sz="2400" b="1" dirty="0">
+              <a:solidFill>
+                <a:schemeClr val="tx1"/>
+              </a:solidFill>
+            </a:endParaRPr>
           </a:p>
         </p:txBody>
       </p:sp>
@@ -17282,7 +17376,7 @@
           <p:cNvPr id="9" name="四角形: 角を丸くする 8">
             <a:extLst>
               <a:ext uri="{FF2B5EF4-FFF2-40B4-BE49-F238E27FC236}">
-                <a16:creationId xmlns:a16="http://schemas.microsoft.com/office/drawing/2014/main" xmlns="" id="{478343BE-306E-4657-841B-17ACD2762DA9}"/>
+                <a16:creationId xmlns="" xmlns:a16="http://schemas.microsoft.com/office/drawing/2014/main" id="{478343BE-306E-4657-841B-17ACD2762DA9}"/>
               </a:ext>
             </a:extLst>
           </p:cNvPr>
@@ -17336,7 +17430,7 @@
           <p:cNvPr id="10" name="四角形: 角を丸くする 9">
             <a:extLst>
               <a:ext uri="{FF2B5EF4-FFF2-40B4-BE49-F238E27FC236}">
-                <a16:creationId xmlns:a16="http://schemas.microsoft.com/office/drawing/2014/main" xmlns="" id="{7F7394D1-AB71-4F83-88CF-0D70AEA90BB3}"/>
+                <a16:creationId xmlns="" xmlns:a16="http://schemas.microsoft.com/office/drawing/2014/main" id="{7F7394D1-AB71-4F83-88CF-0D70AEA90BB3}"/>
               </a:ext>
             </a:extLst>
           </p:cNvPr>
@@ -17390,7 +17484,7 @@
           <p:cNvPr id="13" name="四角形: 角を丸くする 12">
             <a:extLst>
               <a:ext uri="{FF2B5EF4-FFF2-40B4-BE49-F238E27FC236}">
-                <a16:creationId xmlns:a16="http://schemas.microsoft.com/office/drawing/2014/main" xmlns="" id="{B5CD2B9F-227C-466A-9DC6-760504E532C1}"/>
+                <a16:creationId xmlns="" xmlns:a16="http://schemas.microsoft.com/office/drawing/2014/main" id="{B5CD2B9F-227C-466A-9DC6-760504E532C1}"/>
               </a:ext>
             </a:extLst>
           </p:cNvPr>
@@ -17444,7 +17538,7 @@
           <p:cNvPr id="14" name="四角形: 角を丸くする 13">
             <a:extLst>
               <a:ext uri="{FF2B5EF4-FFF2-40B4-BE49-F238E27FC236}">
-                <a16:creationId xmlns:a16="http://schemas.microsoft.com/office/drawing/2014/main" xmlns="" id="{DAC9719D-BC55-4BAA-827B-3741647E133B}"/>
+                <a16:creationId xmlns="" xmlns:a16="http://schemas.microsoft.com/office/drawing/2014/main" id="{DAC9719D-BC55-4BAA-827B-3741647E133B}"/>
               </a:ext>
             </a:extLst>
           </p:cNvPr>
@@ -17498,7 +17592,7 @@
           <p:cNvPr id="15" name="四角形: メモ 14">
             <a:extLst>
               <a:ext uri="{FF2B5EF4-FFF2-40B4-BE49-F238E27FC236}">
-                <a16:creationId xmlns:a16="http://schemas.microsoft.com/office/drawing/2014/main" xmlns="" id="{B13C0EAD-EA26-4ADA-AFD3-C60E5A7E354F}"/>
+                <a16:creationId xmlns="" xmlns:a16="http://schemas.microsoft.com/office/drawing/2014/main" id="{B13C0EAD-EA26-4ADA-AFD3-C60E5A7E354F}"/>
               </a:ext>
             </a:extLst>
           </p:cNvPr>
@@ -17552,7 +17646,7 @@
           <p:cNvPr id="16" name="テキスト ボックス 15">
             <a:extLst>
               <a:ext uri="{FF2B5EF4-FFF2-40B4-BE49-F238E27FC236}">
-                <a16:creationId xmlns:a16="http://schemas.microsoft.com/office/drawing/2014/main" xmlns="" id="{DF7894EE-1174-4828-B7DF-51B52BE5F642}"/>
+                <a16:creationId xmlns="" xmlns:a16="http://schemas.microsoft.com/office/drawing/2014/main" id="{DF7894EE-1174-4828-B7DF-51B52BE5F642}"/>
               </a:ext>
             </a:extLst>
           </p:cNvPr>
@@ -17596,7 +17690,7 @@
           <p:cNvPr id="17" name="テキスト ボックス 16">
             <a:extLst>
               <a:ext uri="{FF2B5EF4-FFF2-40B4-BE49-F238E27FC236}">
-                <a16:creationId xmlns:a16="http://schemas.microsoft.com/office/drawing/2014/main" xmlns="" id="{0CF33ABF-3C66-435D-B875-AA53D751472E}"/>
+                <a16:creationId xmlns="" xmlns:a16="http://schemas.microsoft.com/office/drawing/2014/main" id="{0CF33ABF-3C66-435D-B875-AA53D751472E}"/>
               </a:ext>
             </a:extLst>
           </p:cNvPr>
@@ -17632,7 +17726,7 @@
           <p:cNvPr id="18" name="テキスト ボックス 17">
             <a:extLst>
               <a:ext uri="{FF2B5EF4-FFF2-40B4-BE49-F238E27FC236}">
-                <a16:creationId xmlns:a16="http://schemas.microsoft.com/office/drawing/2014/main" xmlns="" id="{F4CC1D14-7AA6-41AD-85BC-5B3BD9AC308C}"/>
+                <a16:creationId xmlns="" xmlns:a16="http://schemas.microsoft.com/office/drawing/2014/main" id="{F4CC1D14-7AA6-41AD-85BC-5B3BD9AC308C}"/>
               </a:ext>
             </a:extLst>
           </p:cNvPr>
@@ -17668,7 +17762,7 @@
           <p:cNvPr id="21" name="直線矢印コネクタ 20">
             <a:extLst>
               <a:ext uri="{FF2B5EF4-FFF2-40B4-BE49-F238E27FC236}">
-                <a16:creationId xmlns:a16="http://schemas.microsoft.com/office/drawing/2014/main" xmlns="" id="{36428CDD-CC0D-4876-9F07-F4A6D227D45A}"/>
+                <a16:creationId xmlns="" xmlns:a16="http://schemas.microsoft.com/office/drawing/2014/main" id="{36428CDD-CC0D-4876-9F07-F4A6D227D45A}"/>
               </a:ext>
             </a:extLst>
           </p:cNvPr>
@@ -17713,7 +17807,7 @@
           <p:cNvPr id="19" name="四角形: 角を丸くする 18">
             <a:extLst>
               <a:ext uri="{FF2B5EF4-FFF2-40B4-BE49-F238E27FC236}">
-                <a16:creationId xmlns:a16="http://schemas.microsoft.com/office/drawing/2014/main" xmlns="" id="{46146C38-6712-4A36-BEAE-7DD2A922D693}"/>
+                <a16:creationId xmlns="" xmlns:a16="http://schemas.microsoft.com/office/drawing/2014/main" id="{46146C38-6712-4A36-BEAE-7DD2A922D693}"/>
               </a:ext>
             </a:extLst>
           </p:cNvPr>
@@ -17767,7 +17861,7 @@
           <p:cNvPr id="25" name="Gerade Verbindung mit Pfeil 42">
             <a:extLst>
               <a:ext uri="{FF2B5EF4-FFF2-40B4-BE49-F238E27FC236}">
-                <a16:creationId xmlns:a16="http://schemas.microsoft.com/office/drawing/2014/main" xmlns="" id="{32FD418E-ACA3-4090-96FF-CBAAD989B740}"/>
+                <a16:creationId xmlns="" xmlns:a16="http://schemas.microsoft.com/office/drawing/2014/main" id="{32FD418E-ACA3-4090-96FF-CBAAD989B740}"/>
               </a:ext>
             </a:extLst>
           </p:cNvPr>
@@ -17814,7 +17908,7 @@
           <p:cNvPr id="29" name="Group 38">
             <a:extLst>
               <a:ext uri="{FF2B5EF4-FFF2-40B4-BE49-F238E27FC236}">
-                <a16:creationId xmlns:a16="http://schemas.microsoft.com/office/drawing/2014/main" xmlns="" id="{4FFE457D-83D2-49D0-A0F3-DDFEEA55E2E5}"/>
+                <a16:creationId xmlns="" xmlns:a16="http://schemas.microsoft.com/office/drawing/2014/main" id="{4FFE457D-83D2-49D0-A0F3-DDFEEA55E2E5}"/>
               </a:ext>
             </a:extLst>
           </p:cNvPr>
@@ -17834,7 +17928,7 @@
             <p:cNvPr id="30" name="角丸四角形 21">
               <a:extLst>
                 <a:ext uri="{FF2B5EF4-FFF2-40B4-BE49-F238E27FC236}">
-                  <a16:creationId xmlns:a16="http://schemas.microsoft.com/office/drawing/2014/main" xmlns="" id="{024C5D63-C675-4753-B4EC-F2F06403B347}"/>
+                  <a16:creationId xmlns="" xmlns:a16="http://schemas.microsoft.com/office/drawing/2014/main" id="{024C5D63-C675-4753-B4EC-F2F06403B347}"/>
                 </a:ext>
               </a:extLst>
             </p:cNvPr>
@@ -17979,7 +18073,7 @@
             <p:cNvPr id="31" name="Group 28">
               <a:extLst>
                 <a:ext uri="{FF2B5EF4-FFF2-40B4-BE49-F238E27FC236}">
-                  <a16:creationId xmlns:a16="http://schemas.microsoft.com/office/drawing/2014/main" xmlns="" id="{A5488A5F-252B-4EB8-AA83-97711B5B4618}"/>
+                  <a16:creationId xmlns="" xmlns:a16="http://schemas.microsoft.com/office/drawing/2014/main" id="{A5488A5F-252B-4EB8-AA83-97711B5B4618}"/>
                 </a:ext>
               </a:extLst>
             </p:cNvPr>
@@ -18002,7 +18096,7 @@
               <p:cNvPr id="32" name="Isosceles Triangle 29">
                 <a:extLst>
                   <a:ext uri="{FF2B5EF4-FFF2-40B4-BE49-F238E27FC236}">
-                    <a16:creationId xmlns:a16="http://schemas.microsoft.com/office/drawing/2014/main" xmlns="" id="{AAB48341-E11F-47E0-ADE3-15F5732CB54D}"/>
+                    <a16:creationId xmlns="" xmlns:a16="http://schemas.microsoft.com/office/drawing/2014/main" id="{AAB48341-E11F-47E0-ADE3-15F5732CB54D}"/>
                   </a:ext>
                 </a:extLst>
               </p:cNvPr>
@@ -18068,7 +18162,7 @@
               <p:cNvPr id="33" name="Oval 30">
                 <a:extLst>
                   <a:ext uri="{FF2B5EF4-FFF2-40B4-BE49-F238E27FC236}">
-                    <a16:creationId xmlns:a16="http://schemas.microsoft.com/office/drawing/2014/main" xmlns="" id="{F5DD1807-415C-4F20-87B3-DC9D99DA43B9}"/>
+                    <a16:creationId xmlns="" xmlns:a16="http://schemas.microsoft.com/office/drawing/2014/main" id="{F5DD1807-415C-4F20-87B3-DC9D99DA43B9}"/>
                   </a:ext>
                 </a:extLst>
               </p:cNvPr>
@@ -18132,7 +18226,7 @@
               <p:cNvPr id="34" name="Oval 31">
                 <a:extLst>
                   <a:ext uri="{FF2B5EF4-FFF2-40B4-BE49-F238E27FC236}">
-                    <a16:creationId xmlns:a16="http://schemas.microsoft.com/office/drawing/2014/main" xmlns="" id="{ABEA0394-2BF9-4967-9823-22C32CCD88DA}"/>
+                    <a16:creationId xmlns="" xmlns:a16="http://schemas.microsoft.com/office/drawing/2014/main" id="{ABEA0394-2BF9-4967-9823-22C32CCD88DA}"/>
                   </a:ext>
                 </a:extLst>
               </p:cNvPr>
@@ -18196,7 +18290,7 @@
               <p:cNvPr id="35" name="Oval 32">
                 <a:extLst>
                   <a:ext uri="{FF2B5EF4-FFF2-40B4-BE49-F238E27FC236}">
-                    <a16:creationId xmlns:a16="http://schemas.microsoft.com/office/drawing/2014/main" xmlns="" id="{B86A9EA5-24F9-4D3F-AB41-726B8B8B7C20}"/>
+                    <a16:creationId xmlns="" xmlns:a16="http://schemas.microsoft.com/office/drawing/2014/main" id="{B86A9EA5-24F9-4D3F-AB41-726B8B8B7C20}"/>
                   </a:ext>
                 </a:extLst>
               </p:cNvPr>
@@ -18262,7 +18356,7 @@
           <p:cNvPr id="36" name="Down Arrow 40">
             <a:extLst>
               <a:ext uri="{FF2B5EF4-FFF2-40B4-BE49-F238E27FC236}">
-                <a16:creationId xmlns:a16="http://schemas.microsoft.com/office/drawing/2014/main" xmlns="" id="{0FE59E28-4CBD-4783-85B2-324EB3670127}"/>
+                <a16:creationId xmlns="" xmlns:a16="http://schemas.microsoft.com/office/drawing/2014/main" id="{0FE59E28-4CBD-4783-85B2-324EB3670127}"/>
               </a:ext>
             </a:extLst>
           </p:cNvPr>
@@ -18322,7 +18416,7 @@
           <p:cNvPr id="37" name="Down Arrow 40">
             <a:extLst>
               <a:ext uri="{FF2B5EF4-FFF2-40B4-BE49-F238E27FC236}">
-                <a16:creationId xmlns:a16="http://schemas.microsoft.com/office/drawing/2014/main" xmlns="" id="{A0B76F1B-01A8-4996-9734-5669198AA028}"/>
+                <a16:creationId xmlns="" xmlns:a16="http://schemas.microsoft.com/office/drawing/2014/main" id="{A0B76F1B-01A8-4996-9734-5669198AA028}"/>
               </a:ext>
             </a:extLst>
           </p:cNvPr>
@@ -18374,6 +18468,80 @@
               <a:latin typeface="+mj-lt"/>
               <a:cs typeface="Arial" pitchFamily="34" charset="0"/>
             </a:endParaRPr>
+          </a:p>
+        </p:txBody>
+      </p:sp>
+      <p:sp>
+        <p:nvSpPr>
+          <p:cNvPr id="26" name="テキスト ボックス 25">
+            <a:extLst>
+              <a:ext uri="{FF2B5EF4-FFF2-40B4-BE49-F238E27FC236}">
+                <a16:creationId xmlns="" xmlns:a16="http://schemas.microsoft.com/office/drawing/2014/main" id="{BB42CE8E-C759-48E4-BEF3-24B0D640A285}"/>
+              </a:ext>
+            </a:extLst>
+          </p:cNvPr>
+          <p:cNvSpPr txBox="1"/>
+          <p:nvPr/>
+        </p:nvSpPr>
+        <p:spPr>
+          <a:xfrm>
+            <a:off x="8439528" y="2442160"/>
+            <a:ext cx="873958" cy="461665"/>
+          </a:xfrm>
+          <a:prstGeom prst="rect">
+            <a:avLst/>
+          </a:prstGeom>
+          <a:noFill/>
+        </p:spPr>
+        <p:txBody>
+          <a:bodyPr wrap="none" rtlCol="0">
+            <a:spAutoFit/>
+          </a:bodyPr>
+          <a:lstStyle/>
+          <a:p>
+            <a:pPr algn="ctr"/>
+            <a:r>
+              <a:rPr kumimoji="1" lang="en-US" altLang="ja-JP" sz="2400" dirty="0" smtClean="0"/>
+              <a:t>Thing</a:t>
+            </a:r>
+            <a:endParaRPr kumimoji="1" lang="ja-JP" altLang="en-US" sz="2400" dirty="0"/>
+          </a:p>
+        </p:txBody>
+      </p:sp>
+      <p:sp>
+        <p:nvSpPr>
+          <p:cNvPr id="27" name="テキスト ボックス 25">
+            <a:extLst>
+              <a:ext uri="{FF2B5EF4-FFF2-40B4-BE49-F238E27FC236}">
+                <a16:creationId xmlns="" xmlns:a16="http://schemas.microsoft.com/office/drawing/2014/main" id="{BB42CE8E-C759-48E4-BEF3-24B0D640A285}"/>
+              </a:ext>
+            </a:extLst>
+          </p:cNvPr>
+          <p:cNvSpPr txBox="1"/>
+          <p:nvPr/>
+        </p:nvSpPr>
+        <p:spPr>
+          <a:xfrm>
+            <a:off x="2436827" y="2440919"/>
+            <a:ext cx="1460657" cy="461665"/>
+          </a:xfrm>
+          <a:prstGeom prst="rect">
+            <a:avLst/>
+          </a:prstGeom>
+          <a:noFill/>
+        </p:spPr>
+        <p:txBody>
+          <a:bodyPr wrap="none" rtlCol="0">
+            <a:spAutoFit/>
+          </a:bodyPr>
+          <a:lstStyle/>
+          <a:p>
+            <a:pPr algn="ctr"/>
+            <a:r>
+              <a:rPr kumimoji="1" lang="en-US" altLang="ja-JP" sz="2400" dirty="0" smtClean="0"/>
+              <a:t>Consumer</a:t>
+            </a:r>
+            <a:endParaRPr kumimoji="1" lang="ja-JP" altLang="en-US" sz="2400" dirty="0"/>
           </a:p>
         </p:txBody>
       </p:sp>
@@ -18412,7 +18580,7 @@
           <p:cNvPr id="6" name="正方形/長方形 5">
             <a:extLst>
               <a:ext uri="{FF2B5EF4-FFF2-40B4-BE49-F238E27FC236}">
-                <a16:creationId xmlns:a16="http://schemas.microsoft.com/office/drawing/2014/main" xmlns="" id="{E1883DBD-7E83-4F3C-8FC8-563AEB36A257}"/>
+                <a16:creationId xmlns="" xmlns:a16="http://schemas.microsoft.com/office/drawing/2014/main" id="{E1883DBD-7E83-4F3C-8FC8-563AEB36A257}"/>
               </a:ext>
             </a:extLst>
           </p:cNvPr>
@@ -18467,7 +18635,7 @@
           <p:cNvPr id="7" name="正方形/長方形 6">
             <a:extLst>
               <a:ext uri="{FF2B5EF4-FFF2-40B4-BE49-F238E27FC236}">
-                <a16:creationId xmlns:a16="http://schemas.microsoft.com/office/drawing/2014/main" xmlns="" id="{2D0890EB-64A0-42D9-B745-E7F92B9530F1}"/>
+                <a16:creationId xmlns="" xmlns:a16="http://schemas.microsoft.com/office/drawing/2014/main" id="{2D0890EB-64A0-42D9-B745-E7F92B9530F1}"/>
               </a:ext>
             </a:extLst>
           </p:cNvPr>
@@ -18515,7 +18683,7 @@
           <p:cNvPr id="8" name="正方形/長方形 7">
             <a:extLst>
               <a:ext uri="{FF2B5EF4-FFF2-40B4-BE49-F238E27FC236}">
-                <a16:creationId xmlns:a16="http://schemas.microsoft.com/office/drawing/2014/main" xmlns="" id="{A4B36517-6546-4324-B602-66920A143647}"/>
+                <a16:creationId xmlns="" xmlns:a16="http://schemas.microsoft.com/office/drawing/2014/main" id="{A4B36517-6546-4324-B602-66920A143647}"/>
               </a:ext>
             </a:extLst>
           </p:cNvPr>
@@ -18570,7 +18738,7 @@
           <p:cNvPr id="9" name="正方形/長方形 8">
             <a:extLst>
               <a:ext uri="{FF2B5EF4-FFF2-40B4-BE49-F238E27FC236}">
-                <a16:creationId xmlns:a16="http://schemas.microsoft.com/office/drawing/2014/main" xmlns="" id="{478343BE-306E-4657-841B-17ACD2762DA9}"/>
+                <a16:creationId xmlns="" xmlns:a16="http://schemas.microsoft.com/office/drawing/2014/main" id="{478343BE-306E-4657-841B-17ACD2762DA9}"/>
               </a:ext>
             </a:extLst>
           </p:cNvPr>
@@ -18618,7 +18786,7 @@
           <p:cNvPr id="10" name="正方形/長方形 9">
             <a:extLst>
               <a:ext uri="{FF2B5EF4-FFF2-40B4-BE49-F238E27FC236}">
-                <a16:creationId xmlns:a16="http://schemas.microsoft.com/office/drawing/2014/main" xmlns="" id="{7F7394D1-AB71-4F83-88CF-0D70AEA90BB3}"/>
+                <a16:creationId xmlns="" xmlns:a16="http://schemas.microsoft.com/office/drawing/2014/main" id="{7F7394D1-AB71-4F83-88CF-0D70AEA90BB3}"/>
               </a:ext>
             </a:extLst>
           </p:cNvPr>
@@ -18666,7 +18834,7 @@
           <p:cNvPr id="12" name="直線矢印コネクタ 11">
             <a:extLst>
               <a:ext uri="{FF2B5EF4-FFF2-40B4-BE49-F238E27FC236}">
-                <a16:creationId xmlns:a16="http://schemas.microsoft.com/office/drawing/2014/main" xmlns="" id="{6ECEBF56-DD7D-4150-AFC2-4CC9B5A510E0}"/>
+                <a16:creationId xmlns="" xmlns:a16="http://schemas.microsoft.com/office/drawing/2014/main" id="{6ECEBF56-DD7D-4150-AFC2-4CC9B5A510E0}"/>
               </a:ext>
             </a:extLst>
           </p:cNvPr>
@@ -18713,7 +18881,7 @@
           <p:cNvPr id="13" name="正方形/長方形 12">
             <a:extLst>
               <a:ext uri="{FF2B5EF4-FFF2-40B4-BE49-F238E27FC236}">
-                <a16:creationId xmlns:a16="http://schemas.microsoft.com/office/drawing/2014/main" xmlns="" id="{B5CD2B9F-227C-466A-9DC6-760504E532C1}"/>
+                <a16:creationId xmlns="" xmlns:a16="http://schemas.microsoft.com/office/drawing/2014/main" id="{B5CD2B9F-227C-466A-9DC6-760504E532C1}"/>
               </a:ext>
             </a:extLst>
           </p:cNvPr>
@@ -18761,7 +18929,7 @@
           <p:cNvPr id="14" name="正方形/長方形 13">
             <a:extLst>
               <a:ext uri="{FF2B5EF4-FFF2-40B4-BE49-F238E27FC236}">
-                <a16:creationId xmlns:a16="http://schemas.microsoft.com/office/drawing/2014/main" xmlns="" id="{DAC9719D-BC55-4BAA-827B-3741647E133B}"/>
+                <a16:creationId xmlns="" xmlns:a16="http://schemas.microsoft.com/office/drawing/2014/main" id="{DAC9719D-BC55-4BAA-827B-3741647E133B}"/>
               </a:ext>
             </a:extLst>
           </p:cNvPr>
@@ -18809,7 +18977,7 @@
           <p:cNvPr id="15" name="正方形/長方形 14">
             <a:extLst>
               <a:ext uri="{FF2B5EF4-FFF2-40B4-BE49-F238E27FC236}">
-                <a16:creationId xmlns:a16="http://schemas.microsoft.com/office/drawing/2014/main" xmlns="" id="{B13C0EAD-EA26-4ADA-AFD3-C60E5A7E354F}"/>
+                <a16:creationId xmlns="" xmlns:a16="http://schemas.microsoft.com/office/drawing/2014/main" id="{B13C0EAD-EA26-4ADA-AFD3-C60E5A7E354F}"/>
               </a:ext>
             </a:extLst>
           </p:cNvPr>
@@ -18857,7 +19025,7 @@
           <p:cNvPr id="16" name="テキスト ボックス 15">
             <a:extLst>
               <a:ext uri="{FF2B5EF4-FFF2-40B4-BE49-F238E27FC236}">
-                <a16:creationId xmlns:a16="http://schemas.microsoft.com/office/drawing/2014/main" xmlns="" id="{DF7894EE-1174-4828-B7DF-51B52BE5F642}"/>
+                <a16:creationId xmlns="" xmlns:a16="http://schemas.microsoft.com/office/drawing/2014/main" id="{DF7894EE-1174-4828-B7DF-51B52BE5F642}"/>
               </a:ext>
             </a:extLst>
           </p:cNvPr>
@@ -18893,7 +19061,7 @@
           <p:cNvPr id="17" name="テキスト ボックス 16">
             <a:extLst>
               <a:ext uri="{FF2B5EF4-FFF2-40B4-BE49-F238E27FC236}">
-                <a16:creationId xmlns:a16="http://schemas.microsoft.com/office/drawing/2014/main" xmlns="" id="{0CF33ABF-3C66-435D-B875-AA53D751472E}"/>
+                <a16:creationId xmlns="" xmlns:a16="http://schemas.microsoft.com/office/drawing/2014/main" id="{0CF33ABF-3C66-435D-B875-AA53D751472E}"/>
               </a:ext>
             </a:extLst>
           </p:cNvPr>
@@ -18929,7 +19097,7 @@
           <p:cNvPr id="18" name="テキスト ボックス 17">
             <a:extLst>
               <a:ext uri="{FF2B5EF4-FFF2-40B4-BE49-F238E27FC236}">
-                <a16:creationId xmlns:a16="http://schemas.microsoft.com/office/drawing/2014/main" xmlns="" id="{F4CC1D14-7AA6-41AD-85BC-5B3BD9AC308C}"/>
+                <a16:creationId xmlns="" xmlns:a16="http://schemas.microsoft.com/office/drawing/2014/main" id="{F4CC1D14-7AA6-41AD-85BC-5B3BD9AC308C}"/>
               </a:ext>
             </a:extLst>
           </p:cNvPr>
@@ -18965,7 +19133,7 @@
           <p:cNvPr id="20" name="直線矢印コネクタ 19">
             <a:extLst>
               <a:ext uri="{FF2B5EF4-FFF2-40B4-BE49-F238E27FC236}">
-                <a16:creationId xmlns:a16="http://schemas.microsoft.com/office/drawing/2014/main" xmlns="" id="{9E56DD88-5F22-4648-9215-023E80EB63DB}"/>
+                <a16:creationId xmlns="" xmlns:a16="http://schemas.microsoft.com/office/drawing/2014/main" id="{9E56DD88-5F22-4648-9215-023E80EB63DB}"/>
               </a:ext>
             </a:extLst>
           </p:cNvPr>
@@ -19012,7 +19180,7 @@
           <p:cNvPr id="21" name="直線矢印コネクタ 20">
             <a:extLst>
               <a:ext uri="{FF2B5EF4-FFF2-40B4-BE49-F238E27FC236}">
-                <a16:creationId xmlns:a16="http://schemas.microsoft.com/office/drawing/2014/main" xmlns="" id="{36428CDD-CC0D-4876-9F07-F4A6D227D45A}"/>
+                <a16:creationId xmlns="" xmlns:a16="http://schemas.microsoft.com/office/drawing/2014/main" id="{36428CDD-CC0D-4876-9F07-F4A6D227D45A}"/>
               </a:ext>
             </a:extLst>
           </p:cNvPr>
@@ -19058,7 +19226,7 @@
           <p:cNvPr id="19" name="正方形/長方形 18">
             <a:extLst>
               <a:ext uri="{FF2B5EF4-FFF2-40B4-BE49-F238E27FC236}">
-                <a16:creationId xmlns:a16="http://schemas.microsoft.com/office/drawing/2014/main" xmlns="" id="{76EF8CAA-478B-4564-9805-6636E01D4D8D}"/>
+                <a16:creationId xmlns="" xmlns:a16="http://schemas.microsoft.com/office/drawing/2014/main" id="{76EF8CAA-478B-4564-9805-6636E01D4D8D}"/>
               </a:ext>
             </a:extLst>
           </p:cNvPr>
@@ -19114,7 +19282,7 @@
           <p:cNvPr id="22" name="正方形/長方形 21">
             <a:extLst>
               <a:ext uri="{FF2B5EF4-FFF2-40B4-BE49-F238E27FC236}">
-                <a16:creationId xmlns:a16="http://schemas.microsoft.com/office/drawing/2014/main" xmlns="" id="{BE33F6A6-FA02-4D45-8D06-8FA66E05C4F9}"/>
+                <a16:creationId xmlns="" xmlns:a16="http://schemas.microsoft.com/office/drawing/2014/main" id="{BE33F6A6-FA02-4D45-8D06-8FA66E05C4F9}"/>
               </a:ext>
             </a:extLst>
           </p:cNvPr>
@@ -19162,7 +19330,7 @@
           <p:cNvPr id="23" name="正方形/長方形 22">
             <a:extLst>
               <a:ext uri="{FF2B5EF4-FFF2-40B4-BE49-F238E27FC236}">
-                <a16:creationId xmlns:a16="http://schemas.microsoft.com/office/drawing/2014/main" xmlns="" id="{7F0C855D-0048-480E-A03C-33E211D8C8DD}"/>
+                <a16:creationId xmlns="" xmlns:a16="http://schemas.microsoft.com/office/drawing/2014/main" id="{7F0C855D-0048-480E-A03C-33E211D8C8DD}"/>
               </a:ext>
             </a:extLst>
           </p:cNvPr>
@@ -19210,7 +19378,7 @@
           <p:cNvPr id="24" name="直線矢印コネクタ 23">
             <a:extLst>
               <a:ext uri="{FF2B5EF4-FFF2-40B4-BE49-F238E27FC236}">
-                <a16:creationId xmlns:a16="http://schemas.microsoft.com/office/drawing/2014/main" xmlns="" id="{F22D427E-0D82-4BE9-A3F7-81851DD7C118}"/>
+                <a16:creationId xmlns="" xmlns:a16="http://schemas.microsoft.com/office/drawing/2014/main" id="{F22D427E-0D82-4BE9-A3F7-81851DD7C118}"/>
               </a:ext>
             </a:extLst>
           </p:cNvPr>
@@ -19257,7 +19425,7 @@
           <p:cNvPr id="36" name="正方形/長方形 35">
             <a:extLst>
               <a:ext uri="{FF2B5EF4-FFF2-40B4-BE49-F238E27FC236}">
-                <a16:creationId xmlns:a16="http://schemas.microsoft.com/office/drawing/2014/main" xmlns="" id="{FD7F07D0-3FC7-4410-82E4-8F87131DD7F7}"/>
+                <a16:creationId xmlns="" xmlns:a16="http://schemas.microsoft.com/office/drawing/2014/main" id="{FD7F07D0-3FC7-4410-82E4-8F87131DD7F7}"/>
               </a:ext>
             </a:extLst>
           </p:cNvPr>
@@ -19305,7 +19473,7 @@
           <p:cNvPr id="37" name="直線矢印コネクタ 36">
             <a:extLst>
               <a:ext uri="{FF2B5EF4-FFF2-40B4-BE49-F238E27FC236}">
-                <a16:creationId xmlns:a16="http://schemas.microsoft.com/office/drawing/2014/main" xmlns="" id="{6BD9E49F-5CD9-42F8-BA68-788D2162493F}"/>
+                <a16:creationId xmlns="" xmlns:a16="http://schemas.microsoft.com/office/drawing/2014/main" id="{6BD9E49F-5CD9-42F8-BA68-788D2162493F}"/>
               </a:ext>
             </a:extLst>
           </p:cNvPr>
@@ -19351,7 +19519,7 @@
           <p:cNvPr id="41" name="直線矢印コネクタ 40">
             <a:extLst>
               <a:ext uri="{FF2B5EF4-FFF2-40B4-BE49-F238E27FC236}">
-                <a16:creationId xmlns:a16="http://schemas.microsoft.com/office/drawing/2014/main" xmlns="" id="{63598CD4-2A21-4660-B822-90189A8A543F}"/>
+                <a16:creationId xmlns="" xmlns:a16="http://schemas.microsoft.com/office/drawing/2014/main" id="{63598CD4-2A21-4660-B822-90189A8A543F}"/>
               </a:ext>
             </a:extLst>
           </p:cNvPr>
@@ -19428,7 +19596,7 @@
           <p:cNvPr id="6" name="四角形: 角を丸くする 5">
             <a:extLst>
               <a:ext uri="{FF2B5EF4-FFF2-40B4-BE49-F238E27FC236}">
-                <a16:creationId xmlns:a16="http://schemas.microsoft.com/office/drawing/2014/main" xmlns="" id="{E1883DBD-7E83-4F3C-8FC8-563AEB36A257}"/>
+                <a16:creationId xmlns="" xmlns:a16="http://schemas.microsoft.com/office/drawing/2014/main" id="{E1883DBD-7E83-4F3C-8FC8-563AEB36A257}"/>
               </a:ext>
             </a:extLst>
           </p:cNvPr>
@@ -19496,7 +19664,7 @@
           <p:cNvPr id="7" name="四角形: メモ 6">
             <a:extLst>
               <a:ext uri="{FF2B5EF4-FFF2-40B4-BE49-F238E27FC236}">
-                <a16:creationId xmlns:a16="http://schemas.microsoft.com/office/drawing/2014/main" xmlns="" id="{2D0890EB-64A0-42D9-B745-E7F92B9530F1}"/>
+                <a16:creationId xmlns="" xmlns:a16="http://schemas.microsoft.com/office/drawing/2014/main" id="{2D0890EB-64A0-42D9-B745-E7F92B9530F1}"/>
               </a:ext>
             </a:extLst>
           </p:cNvPr>
@@ -19550,7 +19718,7 @@
           <p:cNvPr id="8" name="四角形: 角を丸くする 7">
             <a:extLst>
               <a:ext uri="{FF2B5EF4-FFF2-40B4-BE49-F238E27FC236}">
-                <a16:creationId xmlns:a16="http://schemas.microsoft.com/office/drawing/2014/main" xmlns="" id="{A4B36517-6546-4324-B602-66920A143647}"/>
+                <a16:creationId xmlns="" xmlns:a16="http://schemas.microsoft.com/office/drawing/2014/main" id="{A4B36517-6546-4324-B602-66920A143647}"/>
               </a:ext>
             </a:extLst>
           </p:cNvPr>
@@ -19618,7 +19786,7 @@
           <p:cNvPr id="9" name="四角形: 角を丸くする 8">
             <a:extLst>
               <a:ext uri="{FF2B5EF4-FFF2-40B4-BE49-F238E27FC236}">
-                <a16:creationId xmlns:a16="http://schemas.microsoft.com/office/drawing/2014/main" xmlns="" id="{478343BE-306E-4657-841B-17ACD2762DA9}"/>
+                <a16:creationId xmlns="" xmlns:a16="http://schemas.microsoft.com/office/drawing/2014/main" id="{478343BE-306E-4657-841B-17ACD2762DA9}"/>
               </a:ext>
             </a:extLst>
           </p:cNvPr>
@@ -19672,7 +19840,7 @@
           <p:cNvPr id="10" name="四角形: 角を丸くする 9">
             <a:extLst>
               <a:ext uri="{FF2B5EF4-FFF2-40B4-BE49-F238E27FC236}">
-                <a16:creationId xmlns:a16="http://schemas.microsoft.com/office/drawing/2014/main" xmlns="" id="{7F7394D1-AB71-4F83-88CF-0D70AEA90BB3}"/>
+                <a16:creationId xmlns="" xmlns:a16="http://schemas.microsoft.com/office/drawing/2014/main" id="{7F7394D1-AB71-4F83-88CF-0D70AEA90BB3}"/>
               </a:ext>
             </a:extLst>
           </p:cNvPr>
@@ -19726,7 +19894,7 @@
           <p:cNvPr id="12" name="直線矢印コネクタ 11">
             <a:extLst>
               <a:ext uri="{FF2B5EF4-FFF2-40B4-BE49-F238E27FC236}">
-                <a16:creationId xmlns:a16="http://schemas.microsoft.com/office/drawing/2014/main" xmlns="" id="{6ECEBF56-DD7D-4150-AFC2-4CC9B5A510E0}"/>
+                <a16:creationId xmlns="" xmlns:a16="http://schemas.microsoft.com/office/drawing/2014/main" id="{6ECEBF56-DD7D-4150-AFC2-4CC9B5A510E0}"/>
               </a:ext>
             </a:extLst>
           </p:cNvPr>
@@ -19771,7 +19939,7 @@
           <p:cNvPr id="13" name="四角形: 角を丸くする 12">
             <a:extLst>
               <a:ext uri="{FF2B5EF4-FFF2-40B4-BE49-F238E27FC236}">
-                <a16:creationId xmlns:a16="http://schemas.microsoft.com/office/drawing/2014/main" xmlns="" id="{B5CD2B9F-227C-466A-9DC6-760504E532C1}"/>
+                <a16:creationId xmlns="" xmlns:a16="http://schemas.microsoft.com/office/drawing/2014/main" id="{B5CD2B9F-227C-466A-9DC6-760504E532C1}"/>
               </a:ext>
             </a:extLst>
           </p:cNvPr>
@@ -19822,7 +19990,7 @@
           <p:cNvPr id="14" name="四角形: 角を丸くする 13">
             <a:extLst>
               <a:ext uri="{FF2B5EF4-FFF2-40B4-BE49-F238E27FC236}">
-                <a16:creationId xmlns:a16="http://schemas.microsoft.com/office/drawing/2014/main" xmlns="" id="{DAC9719D-BC55-4BAA-827B-3741647E133B}"/>
+                <a16:creationId xmlns="" xmlns:a16="http://schemas.microsoft.com/office/drawing/2014/main" id="{DAC9719D-BC55-4BAA-827B-3741647E133B}"/>
               </a:ext>
             </a:extLst>
           </p:cNvPr>
@@ -19873,7 +20041,7 @@
           <p:cNvPr id="15" name="四角形: メモ 14">
             <a:extLst>
               <a:ext uri="{FF2B5EF4-FFF2-40B4-BE49-F238E27FC236}">
-                <a16:creationId xmlns:a16="http://schemas.microsoft.com/office/drawing/2014/main" xmlns="" id="{B13C0EAD-EA26-4ADA-AFD3-C60E5A7E354F}"/>
+                <a16:creationId xmlns="" xmlns:a16="http://schemas.microsoft.com/office/drawing/2014/main" id="{B13C0EAD-EA26-4ADA-AFD3-C60E5A7E354F}"/>
               </a:ext>
             </a:extLst>
           </p:cNvPr>
@@ -19924,7 +20092,7 @@
           <p:cNvPr id="16" name="テキスト ボックス 15">
             <a:extLst>
               <a:ext uri="{FF2B5EF4-FFF2-40B4-BE49-F238E27FC236}">
-                <a16:creationId xmlns:a16="http://schemas.microsoft.com/office/drawing/2014/main" xmlns="" id="{DF7894EE-1174-4828-B7DF-51B52BE5F642}"/>
+                <a16:creationId xmlns="" xmlns:a16="http://schemas.microsoft.com/office/drawing/2014/main" id="{DF7894EE-1174-4828-B7DF-51B52BE5F642}"/>
               </a:ext>
             </a:extLst>
           </p:cNvPr>
@@ -19960,7 +20128,7 @@
           <p:cNvPr id="17" name="テキスト ボックス 16">
             <a:extLst>
               <a:ext uri="{FF2B5EF4-FFF2-40B4-BE49-F238E27FC236}">
-                <a16:creationId xmlns:a16="http://schemas.microsoft.com/office/drawing/2014/main" xmlns="" id="{0CF33ABF-3C66-435D-B875-AA53D751472E}"/>
+                <a16:creationId xmlns="" xmlns:a16="http://schemas.microsoft.com/office/drawing/2014/main" id="{0CF33ABF-3C66-435D-B875-AA53D751472E}"/>
               </a:ext>
             </a:extLst>
           </p:cNvPr>
@@ -19996,7 +20164,7 @@
           <p:cNvPr id="18" name="テキスト ボックス 17">
             <a:extLst>
               <a:ext uri="{FF2B5EF4-FFF2-40B4-BE49-F238E27FC236}">
-                <a16:creationId xmlns:a16="http://schemas.microsoft.com/office/drawing/2014/main" xmlns="" id="{F4CC1D14-7AA6-41AD-85BC-5B3BD9AC308C}"/>
+                <a16:creationId xmlns="" xmlns:a16="http://schemas.microsoft.com/office/drawing/2014/main" id="{F4CC1D14-7AA6-41AD-85BC-5B3BD9AC308C}"/>
               </a:ext>
             </a:extLst>
           </p:cNvPr>
@@ -20032,7 +20200,7 @@
           <p:cNvPr id="20" name="直線矢印コネクタ 19">
             <a:extLst>
               <a:ext uri="{FF2B5EF4-FFF2-40B4-BE49-F238E27FC236}">
-                <a16:creationId xmlns:a16="http://schemas.microsoft.com/office/drawing/2014/main" xmlns="" id="{9E56DD88-5F22-4648-9215-023E80EB63DB}"/>
+                <a16:creationId xmlns="" xmlns:a16="http://schemas.microsoft.com/office/drawing/2014/main" id="{9E56DD88-5F22-4648-9215-023E80EB63DB}"/>
               </a:ext>
             </a:extLst>
           </p:cNvPr>
@@ -20077,7 +20245,7 @@
           <p:cNvPr id="21" name="直線矢印コネクタ 20">
             <a:extLst>
               <a:ext uri="{FF2B5EF4-FFF2-40B4-BE49-F238E27FC236}">
-                <a16:creationId xmlns:a16="http://schemas.microsoft.com/office/drawing/2014/main" xmlns="" id="{36428CDD-CC0D-4876-9F07-F4A6D227D45A}"/>
+                <a16:creationId xmlns="" xmlns:a16="http://schemas.microsoft.com/office/drawing/2014/main" id="{36428CDD-CC0D-4876-9F07-F4A6D227D45A}"/>
               </a:ext>
             </a:extLst>
           </p:cNvPr>
@@ -20122,7 +20290,7 @@
           <p:cNvPr id="19" name="四角形: 角を丸くする 18">
             <a:extLst>
               <a:ext uri="{FF2B5EF4-FFF2-40B4-BE49-F238E27FC236}">
-                <a16:creationId xmlns:a16="http://schemas.microsoft.com/office/drawing/2014/main" xmlns="" id="{76EF8CAA-478B-4564-9805-6636E01D4D8D}"/>
+                <a16:creationId xmlns="" xmlns:a16="http://schemas.microsoft.com/office/drawing/2014/main" id="{76EF8CAA-478B-4564-9805-6636E01D4D8D}"/>
               </a:ext>
             </a:extLst>
           </p:cNvPr>
@@ -20191,7 +20359,7 @@
           <p:cNvPr id="22" name="四角形: 角を丸くする 21">
             <a:extLst>
               <a:ext uri="{FF2B5EF4-FFF2-40B4-BE49-F238E27FC236}">
-                <a16:creationId xmlns:a16="http://schemas.microsoft.com/office/drawing/2014/main" xmlns="" id="{BE33F6A6-FA02-4D45-8D06-8FA66E05C4F9}"/>
+                <a16:creationId xmlns="" xmlns:a16="http://schemas.microsoft.com/office/drawing/2014/main" id="{BE33F6A6-FA02-4D45-8D06-8FA66E05C4F9}"/>
               </a:ext>
             </a:extLst>
           </p:cNvPr>
@@ -20245,7 +20413,7 @@
           <p:cNvPr id="23" name="四角形: 角を丸くする 22">
             <a:extLst>
               <a:ext uri="{FF2B5EF4-FFF2-40B4-BE49-F238E27FC236}">
-                <a16:creationId xmlns:a16="http://schemas.microsoft.com/office/drawing/2014/main" xmlns="" id="{7F0C855D-0048-480E-A03C-33E211D8C8DD}"/>
+                <a16:creationId xmlns="" xmlns:a16="http://schemas.microsoft.com/office/drawing/2014/main" id="{7F0C855D-0048-480E-A03C-33E211D8C8DD}"/>
               </a:ext>
             </a:extLst>
           </p:cNvPr>
@@ -20299,7 +20467,7 @@
           <p:cNvPr id="24" name="直線矢印コネクタ 23">
             <a:extLst>
               <a:ext uri="{FF2B5EF4-FFF2-40B4-BE49-F238E27FC236}">
-                <a16:creationId xmlns:a16="http://schemas.microsoft.com/office/drawing/2014/main" xmlns="" id="{F22D427E-0D82-4BE9-A3F7-81851DD7C118}"/>
+                <a16:creationId xmlns="" xmlns:a16="http://schemas.microsoft.com/office/drawing/2014/main" id="{F22D427E-0D82-4BE9-A3F7-81851DD7C118}"/>
               </a:ext>
             </a:extLst>
           </p:cNvPr>
@@ -20344,7 +20512,7 @@
           <p:cNvPr id="36" name="四角形: メモ 35">
             <a:extLst>
               <a:ext uri="{FF2B5EF4-FFF2-40B4-BE49-F238E27FC236}">
-                <a16:creationId xmlns:a16="http://schemas.microsoft.com/office/drawing/2014/main" xmlns="" id="{FD7F07D0-3FC7-4410-82E4-8F87131DD7F7}"/>
+                <a16:creationId xmlns="" xmlns:a16="http://schemas.microsoft.com/office/drawing/2014/main" id="{FD7F07D0-3FC7-4410-82E4-8F87131DD7F7}"/>
               </a:ext>
             </a:extLst>
           </p:cNvPr>
@@ -20398,7 +20566,7 @@
           <p:cNvPr id="37" name="直線矢印コネクタ 36">
             <a:extLst>
               <a:ext uri="{FF2B5EF4-FFF2-40B4-BE49-F238E27FC236}">
-                <a16:creationId xmlns:a16="http://schemas.microsoft.com/office/drawing/2014/main" xmlns="" id="{6BD9E49F-5CD9-42F8-BA68-788D2162493F}"/>
+                <a16:creationId xmlns="" xmlns:a16="http://schemas.microsoft.com/office/drawing/2014/main" id="{6BD9E49F-5CD9-42F8-BA68-788D2162493F}"/>
               </a:ext>
             </a:extLst>
           </p:cNvPr>
@@ -20443,7 +20611,7 @@
           <p:cNvPr id="41" name="直線矢印コネクタ 40">
             <a:extLst>
               <a:ext uri="{FF2B5EF4-FFF2-40B4-BE49-F238E27FC236}">
-                <a16:creationId xmlns:a16="http://schemas.microsoft.com/office/drawing/2014/main" xmlns="" id="{63598CD4-2A21-4660-B822-90189A8A543F}"/>
+                <a16:creationId xmlns="" xmlns:a16="http://schemas.microsoft.com/office/drawing/2014/main" id="{63598CD4-2A21-4660-B822-90189A8A543F}"/>
               </a:ext>
             </a:extLst>
           </p:cNvPr>
@@ -20518,7 +20686,7 @@
           <p:cNvPr id="6" name="四角形: 角を丸くする 5">
             <a:extLst>
               <a:ext uri="{FF2B5EF4-FFF2-40B4-BE49-F238E27FC236}">
-                <a16:creationId xmlns:a16="http://schemas.microsoft.com/office/drawing/2014/main" xmlns="" id="{E1883DBD-7E83-4F3C-8FC8-563AEB36A257}"/>
+                <a16:creationId xmlns="" xmlns:a16="http://schemas.microsoft.com/office/drawing/2014/main" id="{E1883DBD-7E83-4F3C-8FC8-563AEB36A257}"/>
               </a:ext>
             </a:extLst>
           </p:cNvPr>
@@ -20578,7 +20746,7 @@
           <p:cNvPr id="7" name="四角形: メモ 6">
             <a:extLst>
               <a:ext uri="{FF2B5EF4-FFF2-40B4-BE49-F238E27FC236}">
-                <a16:creationId xmlns:a16="http://schemas.microsoft.com/office/drawing/2014/main" xmlns="" id="{2D0890EB-64A0-42D9-B745-E7F92B9530F1}"/>
+                <a16:creationId xmlns="" xmlns:a16="http://schemas.microsoft.com/office/drawing/2014/main" id="{2D0890EB-64A0-42D9-B745-E7F92B9530F1}"/>
               </a:ext>
             </a:extLst>
           </p:cNvPr>
@@ -20632,7 +20800,7 @@
           <p:cNvPr id="8" name="四角形: 角を丸くする 7">
             <a:extLst>
               <a:ext uri="{FF2B5EF4-FFF2-40B4-BE49-F238E27FC236}">
-                <a16:creationId xmlns:a16="http://schemas.microsoft.com/office/drawing/2014/main" xmlns="" id="{A4B36517-6546-4324-B602-66920A143647}"/>
+                <a16:creationId xmlns="" xmlns:a16="http://schemas.microsoft.com/office/drawing/2014/main" id="{A4B36517-6546-4324-B602-66920A143647}"/>
               </a:ext>
             </a:extLst>
           </p:cNvPr>
@@ -20697,7 +20865,7 @@
           <p:cNvPr id="9" name="四角形: 角を丸くする 8">
             <a:extLst>
               <a:ext uri="{FF2B5EF4-FFF2-40B4-BE49-F238E27FC236}">
-                <a16:creationId xmlns:a16="http://schemas.microsoft.com/office/drawing/2014/main" xmlns="" id="{478343BE-306E-4657-841B-17ACD2762DA9}"/>
+                <a16:creationId xmlns="" xmlns:a16="http://schemas.microsoft.com/office/drawing/2014/main" id="{478343BE-306E-4657-841B-17ACD2762DA9}"/>
               </a:ext>
             </a:extLst>
           </p:cNvPr>
@@ -20751,7 +20919,7 @@
           <p:cNvPr id="10" name="四角形: 角を丸くする 9">
             <a:extLst>
               <a:ext uri="{FF2B5EF4-FFF2-40B4-BE49-F238E27FC236}">
-                <a16:creationId xmlns:a16="http://schemas.microsoft.com/office/drawing/2014/main" xmlns="" id="{7F7394D1-AB71-4F83-88CF-0D70AEA90BB3}"/>
+                <a16:creationId xmlns="" xmlns:a16="http://schemas.microsoft.com/office/drawing/2014/main" id="{7F7394D1-AB71-4F83-88CF-0D70AEA90BB3}"/>
               </a:ext>
             </a:extLst>
           </p:cNvPr>
@@ -20805,7 +20973,7 @@
           <p:cNvPr id="12" name="直線矢印コネクタ 11">
             <a:extLst>
               <a:ext uri="{FF2B5EF4-FFF2-40B4-BE49-F238E27FC236}">
-                <a16:creationId xmlns:a16="http://schemas.microsoft.com/office/drawing/2014/main" xmlns="" id="{6ECEBF56-DD7D-4150-AFC2-4CC9B5A510E0}"/>
+                <a16:creationId xmlns="" xmlns:a16="http://schemas.microsoft.com/office/drawing/2014/main" id="{6ECEBF56-DD7D-4150-AFC2-4CC9B5A510E0}"/>
               </a:ext>
             </a:extLst>
           </p:cNvPr>
@@ -20850,7 +21018,7 @@
           <p:cNvPr id="13" name="四角形: 角を丸くする 12">
             <a:extLst>
               <a:ext uri="{FF2B5EF4-FFF2-40B4-BE49-F238E27FC236}">
-                <a16:creationId xmlns:a16="http://schemas.microsoft.com/office/drawing/2014/main" xmlns="" id="{B5CD2B9F-227C-466A-9DC6-760504E532C1}"/>
+                <a16:creationId xmlns="" xmlns:a16="http://schemas.microsoft.com/office/drawing/2014/main" id="{B5CD2B9F-227C-466A-9DC6-760504E532C1}"/>
               </a:ext>
             </a:extLst>
           </p:cNvPr>
@@ -20901,7 +21069,7 @@
           <p:cNvPr id="14" name="四角形: 角を丸くする 13">
             <a:extLst>
               <a:ext uri="{FF2B5EF4-FFF2-40B4-BE49-F238E27FC236}">
-                <a16:creationId xmlns:a16="http://schemas.microsoft.com/office/drawing/2014/main" xmlns="" id="{DAC9719D-BC55-4BAA-827B-3741647E133B}"/>
+                <a16:creationId xmlns="" xmlns:a16="http://schemas.microsoft.com/office/drawing/2014/main" id="{DAC9719D-BC55-4BAA-827B-3741647E133B}"/>
               </a:ext>
             </a:extLst>
           </p:cNvPr>
@@ -20952,7 +21120,7 @@
           <p:cNvPr id="15" name="四角形: メモ 14">
             <a:extLst>
               <a:ext uri="{FF2B5EF4-FFF2-40B4-BE49-F238E27FC236}">
-                <a16:creationId xmlns:a16="http://schemas.microsoft.com/office/drawing/2014/main" xmlns="" id="{B13C0EAD-EA26-4ADA-AFD3-C60E5A7E354F}"/>
+                <a16:creationId xmlns="" xmlns:a16="http://schemas.microsoft.com/office/drawing/2014/main" id="{B13C0EAD-EA26-4ADA-AFD3-C60E5A7E354F}"/>
               </a:ext>
             </a:extLst>
           </p:cNvPr>
@@ -21003,7 +21171,7 @@
           <p:cNvPr id="16" name="テキスト ボックス 15">
             <a:extLst>
               <a:ext uri="{FF2B5EF4-FFF2-40B4-BE49-F238E27FC236}">
-                <a16:creationId xmlns:a16="http://schemas.microsoft.com/office/drawing/2014/main" xmlns="" id="{DF7894EE-1174-4828-B7DF-51B52BE5F642}"/>
+                <a16:creationId xmlns="" xmlns:a16="http://schemas.microsoft.com/office/drawing/2014/main" id="{DF7894EE-1174-4828-B7DF-51B52BE5F642}"/>
               </a:ext>
             </a:extLst>
           </p:cNvPr>
@@ -21039,7 +21207,7 @@
           <p:cNvPr id="17" name="テキスト ボックス 16">
             <a:extLst>
               <a:ext uri="{FF2B5EF4-FFF2-40B4-BE49-F238E27FC236}">
-                <a16:creationId xmlns:a16="http://schemas.microsoft.com/office/drawing/2014/main" xmlns="" id="{0CF33ABF-3C66-435D-B875-AA53D751472E}"/>
+                <a16:creationId xmlns="" xmlns:a16="http://schemas.microsoft.com/office/drawing/2014/main" id="{0CF33ABF-3C66-435D-B875-AA53D751472E}"/>
               </a:ext>
             </a:extLst>
           </p:cNvPr>
@@ -21075,7 +21243,7 @@
           <p:cNvPr id="18" name="テキスト ボックス 17">
             <a:extLst>
               <a:ext uri="{FF2B5EF4-FFF2-40B4-BE49-F238E27FC236}">
-                <a16:creationId xmlns:a16="http://schemas.microsoft.com/office/drawing/2014/main" xmlns="" id="{F4CC1D14-7AA6-41AD-85BC-5B3BD9AC308C}"/>
+                <a16:creationId xmlns="" xmlns:a16="http://schemas.microsoft.com/office/drawing/2014/main" id="{F4CC1D14-7AA6-41AD-85BC-5B3BD9AC308C}"/>
               </a:ext>
             </a:extLst>
           </p:cNvPr>
@@ -21111,7 +21279,7 @@
           <p:cNvPr id="20" name="直線矢印コネクタ 19">
             <a:extLst>
               <a:ext uri="{FF2B5EF4-FFF2-40B4-BE49-F238E27FC236}">
-                <a16:creationId xmlns:a16="http://schemas.microsoft.com/office/drawing/2014/main" xmlns="" id="{9E56DD88-5F22-4648-9215-023E80EB63DB}"/>
+                <a16:creationId xmlns="" xmlns:a16="http://schemas.microsoft.com/office/drawing/2014/main" id="{9E56DD88-5F22-4648-9215-023E80EB63DB}"/>
               </a:ext>
             </a:extLst>
           </p:cNvPr>
@@ -21156,7 +21324,7 @@
           <p:cNvPr id="21" name="直線矢印コネクタ 20">
             <a:extLst>
               <a:ext uri="{FF2B5EF4-FFF2-40B4-BE49-F238E27FC236}">
-                <a16:creationId xmlns:a16="http://schemas.microsoft.com/office/drawing/2014/main" xmlns="" id="{36428CDD-CC0D-4876-9F07-F4A6D227D45A}"/>
+                <a16:creationId xmlns="" xmlns:a16="http://schemas.microsoft.com/office/drawing/2014/main" id="{36428CDD-CC0D-4876-9F07-F4A6D227D45A}"/>
               </a:ext>
             </a:extLst>
           </p:cNvPr>
@@ -21201,7 +21369,7 @@
           <p:cNvPr id="19" name="四角形: 角を丸くする 18">
             <a:extLst>
               <a:ext uri="{FF2B5EF4-FFF2-40B4-BE49-F238E27FC236}">
-                <a16:creationId xmlns:a16="http://schemas.microsoft.com/office/drawing/2014/main" xmlns="" id="{76EF8CAA-478B-4564-9805-6636E01D4D8D}"/>
+                <a16:creationId xmlns="" xmlns:a16="http://schemas.microsoft.com/office/drawing/2014/main" id="{76EF8CAA-478B-4564-9805-6636E01D4D8D}"/>
               </a:ext>
             </a:extLst>
           </p:cNvPr>
@@ -21262,7 +21430,7 @@
           <p:cNvPr id="22" name="四角形: 角を丸くする 21">
             <a:extLst>
               <a:ext uri="{FF2B5EF4-FFF2-40B4-BE49-F238E27FC236}">
-                <a16:creationId xmlns:a16="http://schemas.microsoft.com/office/drawing/2014/main" xmlns="" id="{BE33F6A6-FA02-4D45-8D06-8FA66E05C4F9}"/>
+                <a16:creationId xmlns="" xmlns:a16="http://schemas.microsoft.com/office/drawing/2014/main" id="{BE33F6A6-FA02-4D45-8D06-8FA66E05C4F9}"/>
               </a:ext>
             </a:extLst>
           </p:cNvPr>
@@ -21316,7 +21484,7 @@
           <p:cNvPr id="23" name="四角形: 角を丸くする 22">
             <a:extLst>
               <a:ext uri="{FF2B5EF4-FFF2-40B4-BE49-F238E27FC236}">
-                <a16:creationId xmlns:a16="http://schemas.microsoft.com/office/drawing/2014/main" xmlns="" id="{7F0C855D-0048-480E-A03C-33E211D8C8DD}"/>
+                <a16:creationId xmlns="" xmlns:a16="http://schemas.microsoft.com/office/drawing/2014/main" id="{7F0C855D-0048-480E-A03C-33E211D8C8DD}"/>
               </a:ext>
             </a:extLst>
           </p:cNvPr>
@@ -21370,7 +21538,7 @@
           <p:cNvPr id="24" name="直線矢印コネクタ 23">
             <a:extLst>
               <a:ext uri="{FF2B5EF4-FFF2-40B4-BE49-F238E27FC236}">
-                <a16:creationId xmlns:a16="http://schemas.microsoft.com/office/drawing/2014/main" xmlns="" id="{F22D427E-0D82-4BE9-A3F7-81851DD7C118}"/>
+                <a16:creationId xmlns="" xmlns:a16="http://schemas.microsoft.com/office/drawing/2014/main" id="{F22D427E-0D82-4BE9-A3F7-81851DD7C118}"/>
               </a:ext>
             </a:extLst>
           </p:cNvPr>
@@ -21415,7 +21583,7 @@
           <p:cNvPr id="36" name="四角形: メモ 35">
             <a:extLst>
               <a:ext uri="{FF2B5EF4-FFF2-40B4-BE49-F238E27FC236}">
-                <a16:creationId xmlns:a16="http://schemas.microsoft.com/office/drawing/2014/main" xmlns="" id="{FD7F07D0-3FC7-4410-82E4-8F87131DD7F7}"/>
+                <a16:creationId xmlns="" xmlns:a16="http://schemas.microsoft.com/office/drawing/2014/main" id="{FD7F07D0-3FC7-4410-82E4-8F87131DD7F7}"/>
               </a:ext>
             </a:extLst>
           </p:cNvPr>
@@ -21469,7 +21637,7 @@
           <p:cNvPr id="37" name="直線矢印コネクタ 36">
             <a:extLst>
               <a:ext uri="{FF2B5EF4-FFF2-40B4-BE49-F238E27FC236}">
-                <a16:creationId xmlns:a16="http://schemas.microsoft.com/office/drawing/2014/main" xmlns="" id="{6BD9E49F-5CD9-42F8-BA68-788D2162493F}"/>
+                <a16:creationId xmlns="" xmlns:a16="http://schemas.microsoft.com/office/drawing/2014/main" id="{6BD9E49F-5CD9-42F8-BA68-788D2162493F}"/>
               </a:ext>
             </a:extLst>
           </p:cNvPr>
@@ -21514,7 +21682,7 @@
           <p:cNvPr id="41" name="直線矢印コネクタ 40">
             <a:extLst>
               <a:ext uri="{FF2B5EF4-FFF2-40B4-BE49-F238E27FC236}">
-                <a16:creationId xmlns:a16="http://schemas.microsoft.com/office/drawing/2014/main" xmlns="" id="{63598CD4-2A21-4660-B822-90189A8A543F}"/>
+                <a16:creationId xmlns="" xmlns:a16="http://schemas.microsoft.com/office/drawing/2014/main" id="{63598CD4-2A21-4660-B822-90189A8A543F}"/>
               </a:ext>
             </a:extLst>
           </p:cNvPr>

</xml_diff>